<commit_message>
first draft of all the technical sections
</commit_message>
<xml_diff>
--- a/figures.pptx
+++ b/figures.pptx
@@ -9,6 +9,7 @@
     <p:sldId id="266" r:id="rId3"/>
     <p:sldId id="267" r:id="rId4"/>
     <p:sldId id="268" r:id="rId5"/>
+    <p:sldId id="269" r:id="rId6"/>
   </p:sldIdLst>
   <p:sldSz cx="12192000" cy="6858000"/>
   <p:notesSz cx="6858000" cy="9144000"/>
@@ -19073,6 +19074,3536 @@
 </p:sld>
 </file>
 
+<file path=ppt/slides/slide5.xml><?xml version="1.0" encoding="utf-8"?>
+<p:sld xmlns:a="http://schemas.openxmlformats.org/drawingml/2006/main" xmlns:r="http://schemas.openxmlformats.org/officeDocument/2006/relationships" xmlns:p="http://schemas.openxmlformats.org/presentationml/2006/main">
+  <p:cSld>
+    <p:spTree>
+      <p:nvGrpSpPr>
+        <p:cNvPr id="1" name=""/>
+        <p:cNvGrpSpPr/>
+        <p:nvPr/>
+      </p:nvGrpSpPr>
+      <p:grpSpPr>
+        <a:xfrm>
+          <a:off x="0" y="0"/>
+          <a:ext cx="0" cy="0"/>
+          <a:chOff x="0" y="0"/>
+          <a:chExt cx="0" cy="0"/>
+        </a:xfrm>
+      </p:grpSpPr>
+      <p:grpSp>
+        <p:nvGrpSpPr>
+          <p:cNvPr id="2" name="Group 1">
+            <a:extLst>
+              <a:ext uri="{FF2B5EF4-FFF2-40B4-BE49-F238E27FC236}">
+                <a16:creationId xmlns:a16="http://schemas.microsoft.com/office/drawing/2014/main" id="{B5B3E00E-36AD-1B99-670E-ACC3DFACD001}"/>
+              </a:ext>
+            </a:extLst>
+          </p:cNvPr>
+          <p:cNvGrpSpPr/>
+          <p:nvPr/>
+        </p:nvGrpSpPr>
+        <p:grpSpPr>
+          <a:xfrm>
+            <a:off x="1375905" y="4364140"/>
+            <a:ext cx="1138945" cy="903204"/>
+            <a:chOff x="7691043" y="3600627"/>
+            <a:chExt cx="1138945" cy="903204"/>
+          </a:xfrm>
+        </p:grpSpPr>
+        <p:grpSp>
+          <p:nvGrpSpPr>
+            <p:cNvPr id="3" name="Group 2">
+              <a:extLst>
+                <a:ext uri="{FF2B5EF4-FFF2-40B4-BE49-F238E27FC236}">
+                  <a16:creationId xmlns:a16="http://schemas.microsoft.com/office/drawing/2014/main" id="{43FD067E-5B6F-F0D9-1784-F0B95CCDE00A}"/>
+                </a:ext>
+              </a:extLst>
+            </p:cNvPr>
+            <p:cNvGrpSpPr/>
+            <p:nvPr/>
+          </p:nvGrpSpPr>
+          <p:grpSpPr>
+            <a:xfrm>
+              <a:off x="8070834" y="3827808"/>
+              <a:ext cx="601598" cy="496651"/>
+              <a:chOff x="355600" y="488950"/>
+              <a:chExt cx="584200" cy="635961"/>
+            </a:xfrm>
+          </p:grpSpPr>
+          <p:sp>
+            <p:nvSpPr>
+              <p:cNvPr id="11" name="Oval 10">
+                <a:extLst>
+                  <a:ext uri="{FF2B5EF4-FFF2-40B4-BE49-F238E27FC236}">
+                    <a16:creationId xmlns:a16="http://schemas.microsoft.com/office/drawing/2014/main" id="{E5600EDD-EA64-16AD-E06E-323D1D4EAB05}"/>
+                  </a:ext>
+                </a:extLst>
+              </p:cNvPr>
+              <p:cNvSpPr/>
+              <p:nvPr/>
+            </p:nvSpPr>
+            <p:spPr>
+              <a:xfrm>
+                <a:off x="368300" y="488950"/>
+                <a:ext cx="114300" cy="115261"/>
+              </a:xfrm>
+              <a:prstGeom prst="ellipse">
+                <a:avLst/>
+              </a:prstGeom>
+              <a:solidFill>
+                <a:schemeClr val="accent2">
+                  <a:lumMod val="60000"/>
+                  <a:lumOff val="40000"/>
+                </a:schemeClr>
+              </a:solidFill>
+              <a:ln>
+                <a:solidFill>
+                  <a:srgbClr val="C00000"/>
+                </a:solidFill>
+              </a:ln>
+            </p:spPr>
+            <p:style>
+              <a:lnRef idx="2">
+                <a:schemeClr val="accent1">
+                  <a:shade val="50000"/>
+                </a:schemeClr>
+              </a:lnRef>
+              <a:fillRef idx="1">
+                <a:schemeClr val="accent1"/>
+              </a:fillRef>
+              <a:effectRef idx="0">
+                <a:schemeClr val="accent1"/>
+              </a:effectRef>
+              <a:fontRef idx="minor">
+                <a:schemeClr val="lt1"/>
+              </a:fontRef>
+            </p:style>
+            <p:txBody>
+              <a:bodyPr rot="0" spcFirstLastPara="0" vert="horz" wrap="square" lIns="91440" tIns="45720" rIns="91440" bIns="45720" numCol="1" spcCol="0" rtlCol="0" fromWordArt="0" anchor="ctr" anchorCtr="0" forceAA="0" compatLnSpc="1">
+                <a:prstTxWarp prst="textNoShape">
+                  <a:avLst/>
+                </a:prstTxWarp>
+                <a:noAutofit/>
+              </a:bodyPr>
+              <a:lstStyle/>
+              <a:p>
+                <a:endParaRPr lang="en-US" dirty="0">
+                  <a:solidFill>
+                    <a:srgbClr val="0070C0"/>
+                  </a:solidFill>
+                </a:endParaRPr>
+              </a:p>
+            </p:txBody>
+          </p:sp>
+          <p:sp>
+            <p:nvSpPr>
+              <p:cNvPr id="12" name="Oval 11">
+                <a:extLst>
+                  <a:ext uri="{FF2B5EF4-FFF2-40B4-BE49-F238E27FC236}">
+                    <a16:creationId xmlns:a16="http://schemas.microsoft.com/office/drawing/2014/main" id="{F995D46B-A09D-3E01-C6F6-D14D0A41043A}"/>
+                  </a:ext>
+                </a:extLst>
+              </p:cNvPr>
+              <p:cNvSpPr/>
+              <p:nvPr/>
+            </p:nvSpPr>
+            <p:spPr>
+              <a:xfrm>
+                <a:off x="825500" y="539750"/>
+                <a:ext cx="114300" cy="115261"/>
+              </a:xfrm>
+              <a:prstGeom prst="ellipse">
+                <a:avLst/>
+              </a:prstGeom>
+              <a:solidFill>
+                <a:schemeClr val="accent4">
+                  <a:lumMod val="20000"/>
+                  <a:lumOff val="80000"/>
+                </a:schemeClr>
+              </a:solidFill>
+              <a:ln>
+                <a:solidFill>
+                  <a:schemeClr val="accent4">
+                    <a:lumMod val="60000"/>
+                    <a:lumOff val="40000"/>
+                  </a:schemeClr>
+                </a:solidFill>
+              </a:ln>
+            </p:spPr>
+            <p:style>
+              <a:lnRef idx="2">
+                <a:schemeClr val="accent1">
+                  <a:shade val="50000"/>
+                </a:schemeClr>
+              </a:lnRef>
+              <a:fillRef idx="1">
+                <a:schemeClr val="accent1"/>
+              </a:fillRef>
+              <a:effectRef idx="0">
+                <a:schemeClr val="accent1"/>
+              </a:effectRef>
+              <a:fontRef idx="minor">
+                <a:schemeClr val="lt1"/>
+              </a:fontRef>
+            </p:style>
+            <p:txBody>
+              <a:bodyPr rot="0" spcFirstLastPara="0" vert="horz" wrap="square" lIns="91440" tIns="45720" rIns="91440" bIns="45720" numCol="1" spcCol="0" rtlCol="0" fromWordArt="0" anchor="ctr" anchorCtr="0" forceAA="0" compatLnSpc="1">
+                <a:prstTxWarp prst="textNoShape">
+                  <a:avLst/>
+                </a:prstTxWarp>
+                <a:noAutofit/>
+              </a:bodyPr>
+              <a:lstStyle/>
+              <a:p>
+                <a:endParaRPr lang="en-US" dirty="0">
+                  <a:solidFill>
+                    <a:srgbClr val="0070C0"/>
+                  </a:solidFill>
+                </a:endParaRPr>
+              </a:p>
+            </p:txBody>
+          </p:sp>
+          <p:sp>
+            <p:nvSpPr>
+              <p:cNvPr id="13" name="Oval 12">
+                <a:extLst>
+                  <a:ext uri="{FF2B5EF4-FFF2-40B4-BE49-F238E27FC236}">
+                    <a16:creationId xmlns:a16="http://schemas.microsoft.com/office/drawing/2014/main" id="{D381A1B5-BFDA-D7FF-8205-C39DED23AB09}"/>
+                  </a:ext>
+                </a:extLst>
+              </p:cNvPr>
+              <p:cNvSpPr/>
+              <p:nvPr/>
+            </p:nvSpPr>
+            <p:spPr>
+              <a:xfrm>
+                <a:off x="355600" y="1009650"/>
+                <a:ext cx="114300" cy="115261"/>
+              </a:xfrm>
+              <a:prstGeom prst="ellipse">
+                <a:avLst/>
+              </a:prstGeom>
+              <a:solidFill>
+                <a:schemeClr val="accent4">
+                  <a:lumMod val="20000"/>
+                  <a:lumOff val="80000"/>
+                </a:schemeClr>
+              </a:solidFill>
+              <a:ln>
+                <a:solidFill>
+                  <a:schemeClr val="accent4">
+                    <a:lumMod val="60000"/>
+                    <a:lumOff val="40000"/>
+                  </a:schemeClr>
+                </a:solidFill>
+              </a:ln>
+            </p:spPr>
+            <p:style>
+              <a:lnRef idx="2">
+                <a:schemeClr val="accent1">
+                  <a:shade val="50000"/>
+                </a:schemeClr>
+              </a:lnRef>
+              <a:fillRef idx="1">
+                <a:schemeClr val="accent1"/>
+              </a:fillRef>
+              <a:effectRef idx="0">
+                <a:schemeClr val="accent1"/>
+              </a:effectRef>
+              <a:fontRef idx="minor">
+                <a:schemeClr val="lt1"/>
+              </a:fontRef>
+            </p:style>
+            <p:txBody>
+              <a:bodyPr rot="0" spcFirstLastPara="0" vert="horz" wrap="square" lIns="91440" tIns="45720" rIns="91440" bIns="45720" numCol="1" spcCol="0" rtlCol="0" fromWordArt="0" anchor="ctr" anchorCtr="0" forceAA="0" compatLnSpc="1">
+                <a:prstTxWarp prst="textNoShape">
+                  <a:avLst/>
+                </a:prstTxWarp>
+                <a:noAutofit/>
+              </a:bodyPr>
+              <a:lstStyle/>
+              <a:p>
+                <a:endParaRPr lang="en-US" dirty="0">
+                  <a:solidFill>
+                    <a:srgbClr val="0070C0"/>
+                  </a:solidFill>
+                </a:endParaRPr>
+              </a:p>
+            </p:txBody>
+          </p:sp>
+        </p:grpSp>
+        <p:cxnSp>
+          <p:nvCxnSpPr>
+            <p:cNvPr id="4" name="Straight Arrow Connector 3">
+              <a:extLst>
+                <a:ext uri="{FF2B5EF4-FFF2-40B4-BE49-F238E27FC236}">
+                  <a16:creationId xmlns:a16="http://schemas.microsoft.com/office/drawing/2014/main" id="{0A6DE654-C333-BF74-1E0B-8EA674ABCD47}"/>
+                </a:ext>
+              </a:extLst>
+            </p:cNvPr>
+            <p:cNvCxnSpPr>
+              <a:stCxn id="13" idx="7"/>
+              <a:endCxn id="12" idx="3"/>
+            </p:cNvCxnSpPr>
+            <p:nvPr/>
+          </p:nvCxnSpPr>
+          <p:spPr>
+            <a:xfrm flipV="1">
+              <a:off x="8171302" y="3944072"/>
+              <a:ext cx="400665" cy="303173"/>
+            </a:xfrm>
+            <a:prstGeom prst="straightConnector1">
+              <a:avLst/>
+            </a:prstGeom>
+            <a:ln w="12700">
+              <a:solidFill>
+                <a:schemeClr val="tx1"/>
+              </a:solidFill>
+              <a:tailEnd type="triangle" w="sm" len="med"/>
+            </a:ln>
+          </p:spPr>
+          <p:style>
+            <a:lnRef idx="1">
+              <a:schemeClr val="accent1"/>
+            </a:lnRef>
+            <a:fillRef idx="0">
+              <a:schemeClr val="accent1"/>
+            </a:fillRef>
+            <a:effectRef idx="0">
+              <a:schemeClr val="accent1"/>
+            </a:effectRef>
+            <a:fontRef idx="minor">
+              <a:schemeClr val="tx1"/>
+            </a:fontRef>
+          </p:style>
+        </p:cxnSp>
+        <p:cxnSp>
+          <p:nvCxnSpPr>
+            <p:cNvPr id="5" name="Straight Arrow Connector 4">
+              <a:extLst>
+                <a:ext uri="{FF2B5EF4-FFF2-40B4-BE49-F238E27FC236}">
+                  <a16:creationId xmlns:a16="http://schemas.microsoft.com/office/drawing/2014/main" id="{15CA0A79-4F7C-AFA2-0226-E20E31837FA7}"/>
+                </a:ext>
+              </a:extLst>
+            </p:cNvPr>
+            <p:cNvCxnSpPr>
+              <a:endCxn id="13" idx="3"/>
+            </p:cNvCxnSpPr>
+            <p:nvPr/>
+          </p:nvCxnSpPr>
+          <p:spPr>
+            <a:xfrm flipV="1">
+              <a:off x="7927995" y="4310887"/>
+              <a:ext cx="159610" cy="192944"/>
+            </a:xfrm>
+            <a:prstGeom prst="straightConnector1">
+              <a:avLst/>
+            </a:prstGeom>
+            <a:ln w="12700">
+              <a:solidFill>
+                <a:schemeClr val="tx1"/>
+              </a:solidFill>
+              <a:tailEnd type="triangle" w="sm" len="med"/>
+            </a:ln>
+          </p:spPr>
+          <p:style>
+            <a:lnRef idx="1">
+              <a:schemeClr val="accent1"/>
+            </a:lnRef>
+            <a:fillRef idx="0">
+              <a:schemeClr val="accent1"/>
+            </a:fillRef>
+            <a:effectRef idx="0">
+              <a:schemeClr val="accent1"/>
+            </a:effectRef>
+            <a:fontRef idx="minor">
+              <a:schemeClr val="tx1"/>
+            </a:fontRef>
+          </p:style>
+        </p:cxnSp>
+        <p:cxnSp>
+          <p:nvCxnSpPr>
+            <p:cNvPr id="6" name="Straight Arrow Connector 5">
+              <a:extLst>
+                <a:ext uri="{FF2B5EF4-FFF2-40B4-BE49-F238E27FC236}">
+                  <a16:creationId xmlns:a16="http://schemas.microsoft.com/office/drawing/2014/main" id="{9EC6DED2-AAE5-BED7-D0D4-3EA678D446CF}"/>
+                </a:ext>
+              </a:extLst>
+            </p:cNvPr>
+            <p:cNvCxnSpPr>
+              <a:stCxn id="13" idx="0"/>
+              <a:endCxn id="11" idx="4"/>
+            </p:cNvCxnSpPr>
+            <p:nvPr/>
+          </p:nvCxnSpPr>
+          <p:spPr>
+            <a:xfrm flipV="1">
+              <a:off x="8129687" y="3917595"/>
+              <a:ext cx="13078" cy="316474"/>
+            </a:xfrm>
+            <a:prstGeom prst="straightConnector1">
+              <a:avLst/>
+            </a:prstGeom>
+            <a:ln w="12700">
+              <a:solidFill>
+                <a:schemeClr val="tx1"/>
+              </a:solidFill>
+              <a:tailEnd type="triangle" w="sm" len="med"/>
+            </a:ln>
+          </p:spPr>
+          <p:style>
+            <a:lnRef idx="1">
+              <a:schemeClr val="accent1"/>
+            </a:lnRef>
+            <a:fillRef idx="0">
+              <a:schemeClr val="accent1"/>
+            </a:fillRef>
+            <a:effectRef idx="0">
+              <a:schemeClr val="accent1"/>
+            </a:effectRef>
+            <a:fontRef idx="minor">
+              <a:schemeClr val="tx1"/>
+            </a:fontRef>
+          </p:style>
+        </p:cxnSp>
+        <p:cxnSp>
+          <p:nvCxnSpPr>
+            <p:cNvPr id="7" name="Straight Arrow Connector 6">
+              <a:extLst>
+                <a:ext uri="{FF2B5EF4-FFF2-40B4-BE49-F238E27FC236}">
+                  <a16:creationId xmlns:a16="http://schemas.microsoft.com/office/drawing/2014/main" id="{A965939C-B653-11EB-BF38-CC9FB4FE4AA7}"/>
+                </a:ext>
+              </a:extLst>
+            </p:cNvPr>
+            <p:cNvCxnSpPr>
+              <a:stCxn id="12" idx="2"/>
+              <a:endCxn id="11" idx="6"/>
+            </p:cNvCxnSpPr>
+            <p:nvPr/>
+          </p:nvCxnSpPr>
+          <p:spPr>
+            <a:xfrm flipH="1" flipV="1">
+              <a:off x="8201617" y="3872611"/>
+              <a:ext cx="353111" cy="39653"/>
+            </a:xfrm>
+            <a:prstGeom prst="straightConnector1">
+              <a:avLst/>
+            </a:prstGeom>
+            <a:ln w="12700">
+              <a:solidFill>
+                <a:schemeClr val="tx1"/>
+              </a:solidFill>
+              <a:tailEnd type="triangle" w="sm" len="med"/>
+            </a:ln>
+          </p:spPr>
+          <p:style>
+            <a:lnRef idx="1">
+              <a:schemeClr val="accent1"/>
+            </a:lnRef>
+            <a:fillRef idx="0">
+              <a:schemeClr val="accent1"/>
+            </a:fillRef>
+            <a:effectRef idx="0">
+              <a:schemeClr val="accent1"/>
+            </a:effectRef>
+            <a:fontRef idx="minor">
+              <a:schemeClr val="tx1"/>
+            </a:fontRef>
+          </p:style>
+        </p:cxnSp>
+        <p:sp>
+          <p:nvSpPr>
+            <p:cNvPr id="8" name="Text Box 2">
+              <a:extLst>
+                <a:ext uri="{FF2B5EF4-FFF2-40B4-BE49-F238E27FC236}">
+                  <a16:creationId xmlns:a16="http://schemas.microsoft.com/office/drawing/2014/main" id="{7FCD0976-8022-365E-039C-BBACC3B553C2}"/>
+                </a:ext>
+              </a:extLst>
+            </p:cNvPr>
+            <p:cNvSpPr txBox="1">
+              <a:spLocks noChangeArrowheads="1"/>
+            </p:cNvSpPr>
+            <p:nvPr/>
+          </p:nvSpPr>
+          <p:spPr bwMode="auto">
+            <a:xfrm>
+              <a:off x="8171302" y="3600627"/>
+              <a:ext cx="410107" cy="231134"/>
+            </a:xfrm>
+            <a:prstGeom prst="rect">
+              <a:avLst/>
+            </a:prstGeom>
+            <a:noFill/>
+            <a:ln w="9525">
+              <a:noFill/>
+              <a:miter lim="800000"/>
+              <a:headEnd/>
+              <a:tailEnd/>
+            </a:ln>
+          </p:spPr>
+          <p:txBody>
+            <a:bodyPr rot="0" vert="horz" wrap="square" lIns="91440" tIns="45720" rIns="91440" bIns="45720" anchor="t" anchorCtr="0">
+              <a:noAutofit/>
+            </a:bodyPr>
+            <a:lstStyle/>
+            <a:p>
+              <a:pPr marL="0" marR="0">
+                <a:lnSpc>
+                  <a:spcPct val="107000"/>
+                </a:lnSpc>
+                <a:spcBef>
+                  <a:spcPts val="0"/>
+                </a:spcBef>
+                <a:spcAft>
+                  <a:spcPts val="800"/>
+                </a:spcAft>
+              </a:pPr>
+              <a:r>
+                <a:rPr lang="en-US" sz="1200" dirty="0">
+                  <a:solidFill>
+                    <a:srgbClr val="0070C0"/>
+                  </a:solidFill>
+                  <a:effectLst/>
+                  <a:latin typeface="Calibri" panose="020F0502020204030204" pitchFamily="34" charset="0"/>
+                  <a:ea typeface="DengXian" panose="02010600030101010101" pitchFamily="2" charset="-122"/>
+                  <a:cs typeface="Times New Roman" panose="02020603050405020304" pitchFamily="18" charset="0"/>
+                </a:rPr>
+                <a:t>S3</a:t>
+              </a:r>
+              <a:endParaRPr lang="en-US" sz="1100" dirty="0">
+                <a:solidFill>
+                  <a:srgbClr val="0070C0"/>
+                </a:solidFill>
+                <a:effectLst/>
+                <a:latin typeface="Calibri" panose="020F0502020204030204" pitchFamily="34" charset="0"/>
+                <a:ea typeface="DengXian" panose="02010600030101010101" pitchFamily="2" charset="-122"/>
+                <a:cs typeface="Times New Roman" panose="02020603050405020304" pitchFamily="18" charset="0"/>
+              </a:endParaRPr>
+            </a:p>
+          </p:txBody>
+        </p:sp>
+        <p:sp>
+          <p:nvSpPr>
+            <p:cNvPr id="9" name="Text Box 2">
+              <a:extLst>
+                <a:ext uri="{FF2B5EF4-FFF2-40B4-BE49-F238E27FC236}">
+                  <a16:creationId xmlns:a16="http://schemas.microsoft.com/office/drawing/2014/main" id="{C8868525-A16D-29BB-0D20-CA12758993E6}"/>
+                </a:ext>
+              </a:extLst>
+            </p:cNvPr>
+            <p:cNvSpPr txBox="1">
+              <a:spLocks noChangeArrowheads="1"/>
+            </p:cNvSpPr>
+            <p:nvPr/>
+          </p:nvSpPr>
+          <p:spPr bwMode="auto">
+            <a:xfrm>
+              <a:off x="8419881" y="3967383"/>
+              <a:ext cx="410107" cy="231134"/>
+            </a:xfrm>
+            <a:prstGeom prst="rect">
+              <a:avLst/>
+            </a:prstGeom>
+            <a:noFill/>
+            <a:ln w="9525">
+              <a:noFill/>
+              <a:miter lim="800000"/>
+              <a:headEnd/>
+              <a:tailEnd/>
+            </a:ln>
+          </p:spPr>
+          <p:txBody>
+            <a:bodyPr rot="0" vert="horz" wrap="square" lIns="91440" tIns="45720" rIns="91440" bIns="45720" anchor="t" anchorCtr="0">
+              <a:noAutofit/>
+            </a:bodyPr>
+            <a:lstStyle/>
+            <a:p>
+              <a:pPr marL="0" marR="0">
+                <a:lnSpc>
+                  <a:spcPct val="107000"/>
+                </a:lnSpc>
+                <a:spcBef>
+                  <a:spcPts val="0"/>
+                </a:spcBef>
+                <a:spcAft>
+                  <a:spcPts val="800"/>
+                </a:spcAft>
+              </a:pPr>
+              <a:r>
+                <a:rPr lang="en-US" sz="1200" dirty="0">
+                  <a:solidFill>
+                    <a:srgbClr val="0070C0"/>
+                  </a:solidFill>
+                  <a:effectLst/>
+                  <a:latin typeface="Calibri" panose="020F0502020204030204" pitchFamily="34" charset="0"/>
+                  <a:ea typeface="DengXian" panose="02010600030101010101" pitchFamily="2" charset="-122"/>
+                  <a:cs typeface="Times New Roman" panose="02020603050405020304" pitchFamily="18" charset="0"/>
+                </a:rPr>
+                <a:t>S4</a:t>
+              </a:r>
+              <a:endParaRPr lang="en-US" sz="1100" dirty="0">
+                <a:solidFill>
+                  <a:srgbClr val="0070C0"/>
+                </a:solidFill>
+                <a:effectLst/>
+                <a:latin typeface="Calibri" panose="020F0502020204030204" pitchFamily="34" charset="0"/>
+                <a:ea typeface="DengXian" panose="02010600030101010101" pitchFamily="2" charset="-122"/>
+                <a:cs typeface="Times New Roman" panose="02020603050405020304" pitchFamily="18" charset="0"/>
+              </a:endParaRPr>
+            </a:p>
+          </p:txBody>
+        </p:sp>
+        <p:sp>
+          <p:nvSpPr>
+            <p:cNvPr id="10" name="Text Box 2">
+              <a:extLst>
+                <a:ext uri="{FF2B5EF4-FFF2-40B4-BE49-F238E27FC236}">
+                  <a16:creationId xmlns:a16="http://schemas.microsoft.com/office/drawing/2014/main" id="{A9CCBF9D-1911-3007-3CCA-9D4147C8FAFC}"/>
+                </a:ext>
+              </a:extLst>
+            </p:cNvPr>
+            <p:cNvSpPr txBox="1">
+              <a:spLocks noChangeArrowheads="1"/>
+            </p:cNvSpPr>
+            <p:nvPr/>
+          </p:nvSpPr>
+          <p:spPr bwMode="auto">
+            <a:xfrm>
+              <a:off x="7691043" y="4191197"/>
+              <a:ext cx="410107" cy="231134"/>
+            </a:xfrm>
+            <a:prstGeom prst="rect">
+              <a:avLst/>
+            </a:prstGeom>
+            <a:noFill/>
+            <a:ln w="9525">
+              <a:noFill/>
+              <a:miter lim="800000"/>
+              <a:headEnd/>
+              <a:tailEnd/>
+            </a:ln>
+          </p:spPr>
+          <p:txBody>
+            <a:bodyPr rot="0" vert="horz" wrap="square" lIns="91440" tIns="45720" rIns="91440" bIns="45720" anchor="t" anchorCtr="0">
+              <a:noAutofit/>
+            </a:bodyPr>
+            <a:lstStyle/>
+            <a:p>
+              <a:pPr marL="0" marR="0">
+                <a:lnSpc>
+                  <a:spcPct val="107000"/>
+                </a:lnSpc>
+                <a:spcBef>
+                  <a:spcPts val="0"/>
+                </a:spcBef>
+                <a:spcAft>
+                  <a:spcPts val="800"/>
+                </a:spcAft>
+              </a:pPr>
+              <a:r>
+                <a:rPr lang="en-US" sz="1200" dirty="0">
+                  <a:solidFill>
+                    <a:srgbClr val="0070C0"/>
+                  </a:solidFill>
+                  <a:effectLst/>
+                  <a:latin typeface="Calibri" panose="020F0502020204030204" pitchFamily="34" charset="0"/>
+                  <a:ea typeface="DengXian" panose="02010600030101010101" pitchFamily="2" charset="-122"/>
+                  <a:cs typeface="Times New Roman" panose="02020603050405020304" pitchFamily="18" charset="0"/>
+                </a:rPr>
+                <a:t>S5</a:t>
+              </a:r>
+              <a:endParaRPr lang="en-US" sz="1100" dirty="0">
+                <a:solidFill>
+                  <a:srgbClr val="0070C0"/>
+                </a:solidFill>
+                <a:effectLst/>
+                <a:latin typeface="Calibri" panose="020F0502020204030204" pitchFamily="34" charset="0"/>
+                <a:ea typeface="DengXian" panose="02010600030101010101" pitchFamily="2" charset="-122"/>
+                <a:cs typeface="Times New Roman" panose="02020603050405020304" pitchFamily="18" charset="0"/>
+              </a:endParaRPr>
+            </a:p>
+          </p:txBody>
+        </p:sp>
+      </p:grpSp>
+      <p:cxnSp>
+        <p:nvCxnSpPr>
+          <p:cNvPr id="14" name="Straight Arrow Connector 13">
+            <a:extLst>
+              <a:ext uri="{FF2B5EF4-FFF2-40B4-BE49-F238E27FC236}">
+                <a16:creationId xmlns:a16="http://schemas.microsoft.com/office/drawing/2014/main" id="{1AA3B3B6-8F4B-817A-A44B-D7EAC7BCE28D}"/>
+              </a:ext>
+            </a:extLst>
+          </p:cNvPr>
+          <p:cNvCxnSpPr>
+            <a:cxnSpLocks/>
+          </p:cNvCxnSpPr>
+          <p:nvPr/>
+        </p:nvCxnSpPr>
+        <p:spPr>
+          <a:xfrm>
+            <a:off x="6141968" y="3398804"/>
+            <a:ext cx="371940" cy="1362"/>
+          </a:xfrm>
+          <a:prstGeom prst="straightConnector1">
+            <a:avLst/>
+          </a:prstGeom>
+          <a:ln w="12700">
+            <a:tailEnd type="triangle"/>
+          </a:ln>
+        </p:spPr>
+        <p:style>
+          <a:lnRef idx="1">
+            <a:schemeClr val="dk1"/>
+          </a:lnRef>
+          <a:fillRef idx="0">
+            <a:schemeClr val="dk1"/>
+          </a:fillRef>
+          <a:effectRef idx="0">
+            <a:schemeClr val="dk1"/>
+          </a:effectRef>
+          <a:fontRef idx="minor">
+            <a:schemeClr val="tx1"/>
+          </a:fontRef>
+        </p:style>
+      </p:cxnSp>
+      <p:sp>
+        <p:nvSpPr>
+          <p:cNvPr id="15" name="TextBox 14">
+            <a:extLst>
+              <a:ext uri="{FF2B5EF4-FFF2-40B4-BE49-F238E27FC236}">
+                <a16:creationId xmlns:a16="http://schemas.microsoft.com/office/drawing/2014/main" id="{0B028F61-D399-8C9E-24A9-8A3F354F7CED}"/>
+              </a:ext>
+            </a:extLst>
+          </p:cNvPr>
+          <p:cNvSpPr txBox="1"/>
+          <p:nvPr/>
+        </p:nvSpPr>
+        <p:spPr>
+          <a:xfrm>
+            <a:off x="470197" y="3894487"/>
+            <a:ext cx="2444929" cy="646331"/>
+          </a:xfrm>
+          <a:prstGeom prst="rect">
+            <a:avLst/>
+          </a:prstGeom>
+          <a:noFill/>
+        </p:spPr>
+        <p:txBody>
+          <a:bodyPr wrap="square" rtlCol="0">
+            <a:spAutoFit/>
+          </a:bodyPr>
+          <a:lstStyle/>
+          <a:p>
+            <a:pPr algn="ctr"/>
+            <a:r>
+              <a:rPr lang="en-US" i="1" dirty="0"/>
+              <a:t>PDG subgraph from </a:t>
+            </a:r>
+            <a:r>
+              <a:rPr lang="en-US" i="1" dirty="0" err="1">
+                <a:latin typeface="Courier New" panose="02070309020205020404" pitchFamily="49" charset="0"/>
+                <a:cs typeface="Courier New" panose="02070309020205020404" pitchFamily="49" charset="0"/>
+              </a:rPr>
+              <a:t>GNNExplainer</a:t>
+            </a:r>
+            <a:endParaRPr lang="en-US" i="1" dirty="0">
+              <a:latin typeface="Courier New" panose="02070309020205020404" pitchFamily="49" charset="0"/>
+              <a:cs typeface="Courier New" panose="02070309020205020404" pitchFamily="49" charset="0"/>
+            </a:endParaRPr>
+          </a:p>
+        </p:txBody>
+      </p:sp>
+      <p:sp>
+        <p:nvSpPr>
+          <p:cNvPr id="16" name="TextBox 15">
+            <a:extLst>
+              <a:ext uri="{FF2B5EF4-FFF2-40B4-BE49-F238E27FC236}">
+                <a16:creationId xmlns:a16="http://schemas.microsoft.com/office/drawing/2014/main" id="{E635067D-EC04-BB3E-2B5F-5CB7422D7B02}"/>
+              </a:ext>
+            </a:extLst>
+          </p:cNvPr>
+          <p:cNvSpPr txBox="1"/>
+          <p:nvPr/>
+        </p:nvSpPr>
+        <p:spPr>
+          <a:xfrm>
+            <a:off x="5225414" y="3212337"/>
+            <a:ext cx="927049" cy="369332"/>
+          </a:xfrm>
+          <a:prstGeom prst="rect">
+            <a:avLst/>
+          </a:prstGeom>
+          <a:gradFill flip="none" rotWithShape="1">
+            <a:gsLst>
+              <a:gs pos="0">
+                <a:schemeClr val="accent5">
+                  <a:lumMod val="67000"/>
+                </a:schemeClr>
+              </a:gs>
+              <a:gs pos="48000">
+                <a:schemeClr val="accent5">
+                  <a:lumMod val="97000"/>
+                  <a:lumOff val="3000"/>
+                </a:schemeClr>
+              </a:gs>
+              <a:gs pos="100000">
+                <a:schemeClr val="accent5">
+                  <a:lumMod val="60000"/>
+                  <a:lumOff val="40000"/>
+                </a:schemeClr>
+              </a:gs>
+            </a:gsLst>
+            <a:lin ang="16200000" scaled="1"/>
+            <a:tileRect/>
+          </a:gradFill>
+          <a:ln>
+            <a:noFill/>
+          </a:ln>
+        </p:spPr>
+        <p:style>
+          <a:lnRef idx="0">
+            <a:scrgbClr r="0" g="0" b="0"/>
+          </a:lnRef>
+          <a:fillRef idx="0">
+            <a:scrgbClr r="0" g="0" b="0"/>
+          </a:fillRef>
+          <a:effectRef idx="0">
+            <a:scrgbClr r="0" g="0" b="0"/>
+          </a:effectRef>
+          <a:fontRef idx="minor">
+            <a:schemeClr val="lt1"/>
+          </a:fontRef>
+        </p:style>
+        <p:txBody>
+          <a:bodyPr wrap="square" rtlCol="0">
+            <a:spAutoFit/>
+          </a:bodyPr>
+          <a:lstStyle/>
+          <a:p>
+            <a:pPr algn="ctr"/>
+            <a:r>
+              <a:rPr lang="en-US" dirty="0"/>
+              <a:t>R-GCN</a:t>
+            </a:r>
+          </a:p>
+        </p:txBody>
+      </p:sp>
+      <p:grpSp>
+        <p:nvGrpSpPr>
+          <p:cNvPr id="17" name="Group 16">
+            <a:extLst>
+              <a:ext uri="{FF2B5EF4-FFF2-40B4-BE49-F238E27FC236}">
+                <a16:creationId xmlns:a16="http://schemas.microsoft.com/office/drawing/2014/main" id="{F1B3F5D3-87BA-0B02-1DB3-F519A02EAAC5}"/>
+              </a:ext>
+            </a:extLst>
+          </p:cNvPr>
+          <p:cNvGrpSpPr/>
+          <p:nvPr/>
+        </p:nvGrpSpPr>
+        <p:grpSpPr>
+          <a:xfrm>
+            <a:off x="1017104" y="1873422"/>
+            <a:ext cx="1417486" cy="1375459"/>
+            <a:chOff x="914408" y="2830660"/>
+            <a:chExt cx="1417486" cy="1375459"/>
+          </a:xfrm>
+        </p:grpSpPr>
+        <p:grpSp>
+          <p:nvGrpSpPr>
+            <p:cNvPr id="18" name="Group 17">
+              <a:extLst>
+                <a:ext uri="{FF2B5EF4-FFF2-40B4-BE49-F238E27FC236}">
+                  <a16:creationId xmlns:a16="http://schemas.microsoft.com/office/drawing/2014/main" id="{9811A882-5880-522B-62F2-C3BFCCD4CF96}"/>
+                </a:ext>
+              </a:extLst>
+            </p:cNvPr>
+            <p:cNvGrpSpPr/>
+            <p:nvPr/>
+          </p:nvGrpSpPr>
+          <p:grpSpPr>
+            <a:xfrm>
+              <a:off x="1151945" y="2966663"/>
+              <a:ext cx="1023821" cy="1021105"/>
+              <a:chOff x="-63500" y="50800"/>
+              <a:chExt cx="1003300" cy="1074111"/>
+            </a:xfrm>
+          </p:grpSpPr>
+          <p:sp>
+            <p:nvSpPr>
+              <p:cNvPr id="34" name="Oval 33">
+                <a:extLst>
+                  <a:ext uri="{FF2B5EF4-FFF2-40B4-BE49-F238E27FC236}">
+                    <a16:creationId xmlns:a16="http://schemas.microsoft.com/office/drawing/2014/main" id="{D01FFA17-B20B-2AAE-D31A-24FAF8341770}"/>
+                  </a:ext>
+                </a:extLst>
+              </p:cNvPr>
+              <p:cNvSpPr/>
+              <p:nvPr/>
+            </p:nvSpPr>
+            <p:spPr>
+              <a:xfrm>
+                <a:off x="368300" y="488950"/>
+                <a:ext cx="114300" cy="115261"/>
+              </a:xfrm>
+              <a:prstGeom prst="ellipse">
+                <a:avLst/>
+              </a:prstGeom>
+              <a:solidFill>
+                <a:schemeClr val="accent2">
+                  <a:lumMod val="60000"/>
+                  <a:lumOff val="40000"/>
+                </a:schemeClr>
+              </a:solidFill>
+              <a:ln>
+                <a:solidFill>
+                  <a:srgbClr val="C00000"/>
+                </a:solidFill>
+              </a:ln>
+            </p:spPr>
+            <p:style>
+              <a:lnRef idx="2">
+                <a:schemeClr val="accent1">
+                  <a:shade val="50000"/>
+                </a:schemeClr>
+              </a:lnRef>
+              <a:fillRef idx="1">
+                <a:schemeClr val="accent1"/>
+              </a:fillRef>
+              <a:effectRef idx="0">
+                <a:schemeClr val="accent1"/>
+              </a:effectRef>
+              <a:fontRef idx="minor">
+                <a:schemeClr val="lt1"/>
+              </a:fontRef>
+            </p:style>
+            <p:txBody>
+              <a:bodyPr rot="0" spcFirstLastPara="0" vert="horz" wrap="square" lIns="91440" tIns="45720" rIns="91440" bIns="45720" numCol="1" spcCol="0" rtlCol="0" fromWordArt="0" anchor="ctr" anchorCtr="0" forceAA="0" compatLnSpc="1">
+                <a:prstTxWarp prst="textNoShape">
+                  <a:avLst/>
+                </a:prstTxWarp>
+                <a:noAutofit/>
+              </a:bodyPr>
+              <a:lstStyle/>
+              <a:p>
+                <a:endParaRPr lang="en-US" dirty="0">
+                  <a:solidFill>
+                    <a:srgbClr val="0070C0"/>
+                  </a:solidFill>
+                </a:endParaRPr>
+              </a:p>
+            </p:txBody>
+          </p:sp>
+          <p:sp>
+            <p:nvSpPr>
+              <p:cNvPr id="35" name="Oval 34">
+                <a:extLst>
+                  <a:ext uri="{FF2B5EF4-FFF2-40B4-BE49-F238E27FC236}">
+                    <a16:creationId xmlns:a16="http://schemas.microsoft.com/office/drawing/2014/main" id="{BB9DDECC-488E-DA94-8737-C40868D8CC31}"/>
+                  </a:ext>
+                </a:extLst>
+              </p:cNvPr>
+              <p:cNvSpPr/>
+              <p:nvPr/>
+            </p:nvSpPr>
+            <p:spPr>
+              <a:xfrm>
+                <a:off x="-63500" y="590786"/>
+                <a:ext cx="114300" cy="115261"/>
+              </a:xfrm>
+              <a:prstGeom prst="ellipse">
+                <a:avLst/>
+              </a:prstGeom>
+              <a:solidFill>
+                <a:schemeClr val="accent4">
+                  <a:lumMod val="20000"/>
+                  <a:lumOff val="80000"/>
+                </a:schemeClr>
+              </a:solidFill>
+              <a:ln>
+                <a:solidFill>
+                  <a:schemeClr val="accent4">
+                    <a:lumMod val="60000"/>
+                    <a:lumOff val="40000"/>
+                  </a:schemeClr>
+                </a:solidFill>
+              </a:ln>
+            </p:spPr>
+            <p:style>
+              <a:lnRef idx="2">
+                <a:schemeClr val="accent1">
+                  <a:shade val="50000"/>
+                </a:schemeClr>
+              </a:lnRef>
+              <a:fillRef idx="1">
+                <a:schemeClr val="accent1"/>
+              </a:fillRef>
+              <a:effectRef idx="0">
+                <a:schemeClr val="accent1"/>
+              </a:effectRef>
+              <a:fontRef idx="minor">
+                <a:schemeClr val="lt1"/>
+              </a:fontRef>
+            </p:style>
+            <p:txBody>
+              <a:bodyPr rot="0" spcFirstLastPara="0" vert="horz" wrap="square" lIns="91440" tIns="45720" rIns="91440" bIns="45720" numCol="1" spcCol="0" rtlCol="0" fromWordArt="0" anchor="ctr" anchorCtr="0" forceAA="0" compatLnSpc="1">
+                <a:prstTxWarp prst="textNoShape">
+                  <a:avLst/>
+                </a:prstTxWarp>
+                <a:noAutofit/>
+              </a:bodyPr>
+              <a:lstStyle/>
+              <a:p>
+                <a:endParaRPr lang="en-US" dirty="0">
+                  <a:solidFill>
+                    <a:srgbClr val="0070C0"/>
+                  </a:solidFill>
+                </a:endParaRPr>
+              </a:p>
+            </p:txBody>
+          </p:sp>
+          <p:sp>
+            <p:nvSpPr>
+              <p:cNvPr id="36" name="Oval 35">
+                <a:extLst>
+                  <a:ext uri="{FF2B5EF4-FFF2-40B4-BE49-F238E27FC236}">
+                    <a16:creationId xmlns:a16="http://schemas.microsoft.com/office/drawing/2014/main" id="{7C65F68D-D32D-6BD3-6883-C8C6592FFA58}"/>
+                  </a:ext>
+                </a:extLst>
+              </p:cNvPr>
+              <p:cNvSpPr/>
+              <p:nvPr/>
+            </p:nvSpPr>
+            <p:spPr>
+              <a:xfrm>
+                <a:off x="406400" y="50800"/>
+                <a:ext cx="114300" cy="115261"/>
+              </a:xfrm>
+              <a:prstGeom prst="ellipse">
+                <a:avLst/>
+              </a:prstGeom>
+              <a:solidFill>
+                <a:schemeClr val="accent4">
+                  <a:lumMod val="20000"/>
+                  <a:lumOff val="80000"/>
+                </a:schemeClr>
+              </a:solidFill>
+              <a:ln>
+                <a:solidFill>
+                  <a:schemeClr val="accent4">
+                    <a:lumMod val="60000"/>
+                    <a:lumOff val="40000"/>
+                  </a:schemeClr>
+                </a:solidFill>
+              </a:ln>
+            </p:spPr>
+            <p:style>
+              <a:lnRef idx="2">
+                <a:schemeClr val="accent1">
+                  <a:shade val="50000"/>
+                </a:schemeClr>
+              </a:lnRef>
+              <a:fillRef idx="1">
+                <a:schemeClr val="accent1"/>
+              </a:fillRef>
+              <a:effectRef idx="0">
+                <a:schemeClr val="accent1"/>
+              </a:effectRef>
+              <a:fontRef idx="minor">
+                <a:schemeClr val="lt1"/>
+              </a:fontRef>
+            </p:style>
+            <p:txBody>
+              <a:bodyPr rot="0" spcFirstLastPara="0" vert="horz" wrap="square" lIns="91440" tIns="45720" rIns="91440" bIns="45720" numCol="1" spcCol="0" rtlCol="0" fromWordArt="0" anchor="ctr" anchorCtr="0" forceAA="0" compatLnSpc="1">
+                <a:prstTxWarp prst="textNoShape">
+                  <a:avLst/>
+                </a:prstTxWarp>
+                <a:noAutofit/>
+              </a:bodyPr>
+              <a:lstStyle/>
+              <a:p>
+                <a:endParaRPr lang="en-US" dirty="0">
+                  <a:solidFill>
+                    <a:srgbClr val="0070C0"/>
+                  </a:solidFill>
+                </a:endParaRPr>
+              </a:p>
+            </p:txBody>
+          </p:sp>
+          <p:sp>
+            <p:nvSpPr>
+              <p:cNvPr id="37" name="Oval 36">
+                <a:extLst>
+                  <a:ext uri="{FF2B5EF4-FFF2-40B4-BE49-F238E27FC236}">
+                    <a16:creationId xmlns:a16="http://schemas.microsoft.com/office/drawing/2014/main" id="{527D0FFA-B11B-B889-2657-C69E7FF035B9}"/>
+                  </a:ext>
+                </a:extLst>
+              </p:cNvPr>
+              <p:cNvSpPr/>
+              <p:nvPr/>
+            </p:nvSpPr>
+            <p:spPr>
+              <a:xfrm>
+                <a:off x="825500" y="539750"/>
+                <a:ext cx="114300" cy="115261"/>
+              </a:xfrm>
+              <a:prstGeom prst="ellipse">
+                <a:avLst/>
+              </a:prstGeom>
+              <a:solidFill>
+                <a:schemeClr val="accent4">
+                  <a:lumMod val="20000"/>
+                  <a:lumOff val="80000"/>
+                </a:schemeClr>
+              </a:solidFill>
+              <a:ln>
+                <a:solidFill>
+                  <a:schemeClr val="accent4">
+                    <a:lumMod val="60000"/>
+                    <a:lumOff val="40000"/>
+                  </a:schemeClr>
+                </a:solidFill>
+              </a:ln>
+            </p:spPr>
+            <p:style>
+              <a:lnRef idx="2">
+                <a:schemeClr val="accent1">
+                  <a:shade val="50000"/>
+                </a:schemeClr>
+              </a:lnRef>
+              <a:fillRef idx="1">
+                <a:schemeClr val="accent1"/>
+              </a:fillRef>
+              <a:effectRef idx="0">
+                <a:schemeClr val="accent1"/>
+              </a:effectRef>
+              <a:fontRef idx="minor">
+                <a:schemeClr val="lt1"/>
+              </a:fontRef>
+            </p:style>
+            <p:txBody>
+              <a:bodyPr rot="0" spcFirstLastPara="0" vert="horz" wrap="square" lIns="91440" tIns="45720" rIns="91440" bIns="45720" numCol="1" spcCol="0" rtlCol="0" fromWordArt="0" anchor="ctr" anchorCtr="0" forceAA="0" compatLnSpc="1">
+                <a:prstTxWarp prst="textNoShape">
+                  <a:avLst/>
+                </a:prstTxWarp>
+                <a:noAutofit/>
+              </a:bodyPr>
+              <a:lstStyle/>
+              <a:p>
+                <a:endParaRPr lang="en-US" dirty="0">
+                  <a:solidFill>
+                    <a:srgbClr val="0070C0"/>
+                  </a:solidFill>
+                </a:endParaRPr>
+              </a:p>
+            </p:txBody>
+          </p:sp>
+          <p:sp>
+            <p:nvSpPr>
+              <p:cNvPr id="38" name="Oval 37">
+                <a:extLst>
+                  <a:ext uri="{FF2B5EF4-FFF2-40B4-BE49-F238E27FC236}">
+                    <a16:creationId xmlns:a16="http://schemas.microsoft.com/office/drawing/2014/main" id="{C1E0EFCC-3ABA-283A-C847-9A36894BB99C}"/>
+                  </a:ext>
+                </a:extLst>
+              </p:cNvPr>
+              <p:cNvSpPr/>
+              <p:nvPr/>
+            </p:nvSpPr>
+            <p:spPr>
+              <a:xfrm>
+                <a:off x="355600" y="1009650"/>
+                <a:ext cx="114300" cy="115261"/>
+              </a:xfrm>
+              <a:prstGeom prst="ellipse">
+                <a:avLst/>
+              </a:prstGeom>
+              <a:solidFill>
+                <a:schemeClr val="accent4">
+                  <a:lumMod val="20000"/>
+                  <a:lumOff val="80000"/>
+                </a:schemeClr>
+              </a:solidFill>
+              <a:ln>
+                <a:solidFill>
+                  <a:schemeClr val="accent4">
+                    <a:lumMod val="60000"/>
+                    <a:lumOff val="40000"/>
+                  </a:schemeClr>
+                </a:solidFill>
+              </a:ln>
+            </p:spPr>
+            <p:style>
+              <a:lnRef idx="2">
+                <a:schemeClr val="accent1">
+                  <a:shade val="50000"/>
+                </a:schemeClr>
+              </a:lnRef>
+              <a:fillRef idx="1">
+                <a:schemeClr val="accent1"/>
+              </a:fillRef>
+              <a:effectRef idx="0">
+                <a:schemeClr val="accent1"/>
+              </a:effectRef>
+              <a:fontRef idx="minor">
+                <a:schemeClr val="lt1"/>
+              </a:fontRef>
+            </p:style>
+            <p:txBody>
+              <a:bodyPr rot="0" spcFirstLastPara="0" vert="horz" wrap="square" lIns="91440" tIns="45720" rIns="91440" bIns="45720" numCol="1" spcCol="0" rtlCol="0" fromWordArt="0" anchor="ctr" anchorCtr="0" forceAA="0" compatLnSpc="1">
+                <a:prstTxWarp prst="textNoShape">
+                  <a:avLst/>
+                </a:prstTxWarp>
+                <a:noAutofit/>
+              </a:bodyPr>
+              <a:lstStyle/>
+              <a:p>
+                <a:endParaRPr lang="en-US" dirty="0">
+                  <a:solidFill>
+                    <a:srgbClr val="0070C0"/>
+                  </a:solidFill>
+                </a:endParaRPr>
+              </a:p>
+            </p:txBody>
+          </p:sp>
+        </p:grpSp>
+        <p:cxnSp>
+          <p:nvCxnSpPr>
+            <p:cNvPr id="19" name="Straight Arrow Connector 18">
+              <a:extLst>
+                <a:ext uri="{FF2B5EF4-FFF2-40B4-BE49-F238E27FC236}">
+                  <a16:creationId xmlns:a16="http://schemas.microsoft.com/office/drawing/2014/main" id="{70488C0B-5358-5158-73DD-50419C312F3D}"/>
+                </a:ext>
+              </a:extLst>
+            </p:cNvPr>
+            <p:cNvCxnSpPr>
+              <a:stCxn id="38" idx="7"/>
+              <a:endCxn id="37" idx="3"/>
+            </p:cNvCxnSpPr>
+            <p:nvPr/>
+          </p:nvCxnSpPr>
+          <p:spPr>
+            <a:xfrm flipV="1">
+              <a:off x="1679174" y="3524720"/>
+              <a:ext cx="397036" cy="369055"/>
+            </a:xfrm>
+            <a:prstGeom prst="straightConnector1">
+              <a:avLst/>
+            </a:prstGeom>
+            <a:ln w="12700">
+              <a:solidFill>
+                <a:schemeClr val="tx1"/>
+              </a:solidFill>
+              <a:tailEnd type="triangle" w="sm" len="med"/>
+            </a:ln>
+          </p:spPr>
+          <p:style>
+            <a:lnRef idx="1">
+              <a:schemeClr val="accent1"/>
+            </a:lnRef>
+            <a:fillRef idx="0">
+              <a:schemeClr val="accent1"/>
+            </a:fillRef>
+            <a:effectRef idx="0">
+              <a:schemeClr val="accent1"/>
+            </a:effectRef>
+            <a:fontRef idx="minor">
+              <a:schemeClr val="tx1"/>
+            </a:fontRef>
+          </p:style>
+        </p:cxnSp>
+        <p:cxnSp>
+          <p:nvCxnSpPr>
+            <p:cNvPr id="20" name="Straight Arrow Connector 19">
+              <a:extLst>
+                <a:ext uri="{FF2B5EF4-FFF2-40B4-BE49-F238E27FC236}">
+                  <a16:creationId xmlns:a16="http://schemas.microsoft.com/office/drawing/2014/main" id="{039DFD9A-CF8E-63E6-6802-7AB34D0D0565}"/>
+                </a:ext>
+              </a:extLst>
+            </p:cNvPr>
+            <p:cNvCxnSpPr>
+              <a:stCxn id="35" idx="4"/>
+            </p:cNvCxnSpPr>
+            <p:nvPr/>
+          </p:nvCxnSpPr>
+          <p:spPr>
+            <a:xfrm flipH="1">
+              <a:off x="1067707" y="3589254"/>
+              <a:ext cx="142557" cy="336976"/>
+            </a:xfrm>
+            <a:prstGeom prst="straightConnector1">
+              <a:avLst/>
+            </a:prstGeom>
+            <a:ln w="12700">
+              <a:solidFill>
+                <a:schemeClr val="tx1"/>
+              </a:solidFill>
+              <a:tailEnd type="triangle" w="sm" len="med"/>
+            </a:ln>
+          </p:spPr>
+          <p:style>
+            <a:lnRef idx="1">
+              <a:schemeClr val="accent1"/>
+            </a:lnRef>
+            <a:fillRef idx="0">
+              <a:schemeClr val="accent1"/>
+            </a:fillRef>
+            <a:effectRef idx="0">
+              <a:schemeClr val="accent1"/>
+            </a:effectRef>
+            <a:fontRef idx="minor">
+              <a:schemeClr val="tx1"/>
+            </a:fontRef>
+          </p:style>
+        </p:cxnSp>
+        <p:cxnSp>
+          <p:nvCxnSpPr>
+            <p:cNvPr id="21" name="Straight Arrow Connector 20">
+              <a:extLst>
+                <a:ext uri="{FF2B5EF4-FFF2-40B4-BE49-F238E27FC236}">
+                  <a16:creationId xmlns:a16="http://schemas.microsoft.com/office/drawing/2014/main" id="{AB7AB4DA-F303-2501-7600-F4C51FCD6009}"/>
+                </a:ext>
+              </a:extLst>
+            </p:cNvPr>
+            <p:cNvCxnSpPr>
+              <a:stCxn id="35" idx="6"/>
+              <a:endCxn id="34" idx="2"/>
+            </p:cNvCxnSpPr>
+            <p:nvPr/>
+          </p:nvCxnSpPr>
+          <p:spPr>
+            <a:xfrm flipV="1">
+              <a:off x="1268583" y="3437729"/>
+              <a:ext cx="323994" cy="96765"/>
+            </a:xfrm>
+            <a:prstGeom prst="straightConnector1">
+              <a:avLst/>
+            </a:prstGeom>
+            <a:ln w="12700">
+              <a:solidFill>
+                <a:schemeClr val="tx1"/>
+              </a:solidFill>
+              <a:tailEnd type="triangle" w="sm" len="med"/>
+            </a:ln>
+          </p:spPr>
+          <p:style>
+            <a:lnRef idx="1">
+              <a:schemeClr val="accent1"/>
+            </a:lnRef>
+            <a:fillRef idx="0">
+              <a:schemeClr val="accent1"/>
+            </a:fillRef>
+            <a:effectRef idx="0">
+              <a:schemeClr val="accent1"/>
+            </a:effectRef>
+            <a:fontRef idx="minor">
+              <a:schemeClr val="tx1"/>
+            </a:fontRef>
+          </p:style>
+        </p:cxnSp>
+        <p:cxnSp>
+          <p:nvCxnSpPr>
+            <p:cNvPr id="22" name="Straight Arrow Connector 21">
+              <a:extLst>
+                <a:ext uri="{FF2B5EF4-FFF2-40B4-BE49-F238E27FC236}">
+                  <a16:creationId xmlns:a16="http://schemas.microsoft.com/office/drawing/2014/main" id="{2D84153F-7DC3-B17C-7FAC-7372CB571638}"/>
+                </a:ext>
+              </a:extLst>
+            </p:cNvPr>
+            <p:cNvCxnSpPr>
+              <a:endCxn id="38" idx="3"/>
+            </p:cNvCxnSpPr>
+            <p:nvPr/>
+          </p:nvCxnSpPr>
+          <p:spPr>
+            <a:xfrm flipV="1">
+              <a:off x="1438071" y="3971246"/>
+              <a:ext cx="158164" cy="234873"/>
+            </a:xfrm>
+            <a:prstGeom prst="straightConnector1">
+              <a:avLst/>
+            </a:prstGeom>
+            <a:ln w="12700">
+              <a:solidFill>
+                <a:schemeClr val="tx1"/>
+              </a:solidFill>
+              <a:tailEnd type="triangle" w="sm" len="med"/>
+            </a:ln>
+          </p:spPr>
+          <p:style>
+            <a:lnRef idx="1">
+              <a:schemeClr val="accent1"/>
+            </a:lnRef>
+            <a:fillRef idx="0">
+              <a:schemeClr val="accent1"/>
+            </a:fillRef>
+            <a:effectRef idx="0">
+              <a:schemeClr val="accent1"/>
+            </a:effectRef>
+            <a:fontRef idx="minor">
+              <a:schemeClr val="tx1"/>
+            </a:fontRef>
+          </p:style>
+        </p:cxnSp>
+        <p:cxnSp>
+          <p:nvCxnSpPr>
+            <p:cNvPr id="23" name="Straight Arrow Connector 22">
+              <a:extLst>
+                <a:ext uri="{FF2B5EF4-FFF2-40B4-BE49-F238E27FC236}">
+                  <a16:creationId xmlns:a16="http://schemas.microsoft.com/office/drawing/2014/main" id="{46592C84-9145-455F-1638-93C5F2834F25}"/>
+                </a:ext>
+              </a:extLst>
+            </p:cNvPr>
+            <p:cNvCxnSpPr>
+              <a:stCxn id="38" idx="0"/>
+              <a:endCxn id="34" idx="4"/>
+            </p:cNvCxnSpPr>
+            <p:nvPr/>
+          </p:nvCxnSpPr>
+          <p:spPr>
+            <a:xfrm flipV="1">
+              <a:off x="1637936" y="3492489"/>
+              <a:ext cx="12960" cy="385247"/>
+            </a:xfrm>
+            <a:prstGeom prst="straightConnector1">
+              <a:avLst/>
+            </a:prstGeom>
+            <a:ln w="12700">
+              <a:solidFill>
+                <a:schemeClr val="tx1"/>
+              </a:solidFill>
+              <a:tailEnd type="triangle" w="sm" len="med"/>
+            </a:ln>
+          </p:spPr>
+          <p:style>
+            <a:lnRef idx="1">
+              <a:schemeClr val="accent1"/>
+            </a:lnRef>
+            <a:fillRef idx="0">
+              <a:schemeClr val="accent1"/>
+            </a:fillRef>
+            <a:effectRef idx="0">
+              <a:schemeClr val="accent1"/>
+            </a:effectRef>
+            <a:fontRef idx="minor">
+              <a:schemeClr val="tx1"/>
+            </a:fontRef>
+          </p:style>
+        </p:cxnSp>
+        <p:cxnSp>
+          <p:nvCxnSpPr>
+            <p:cNvPr id="24" name="Straight Arrow Connector 23">
+              <a:extLst>
+                <a:ext uri="{FF2B5EF4-FFF2-40B4-BE49-F238E27FC236}">
+                  <a16:creationId xmlns:a16="http://schemas.microsoft.com/office/drawing/2014/main" id="{7430C076-FC99-A882-1F77-687394D73CA0}"/>
+                </a:ext>
+              </a:extLst>
+            </p:cNvPr>
+            <p:cNvCxnSpPr>
+              <a:stCxn id="37" idx="2"/>
+              <a:endCxn id="34" idx="6"/>
+            </p:cNvCxnSpPr>
+            <p:nvPr/>
+          </p:nvCxnSpPr>
+          <p:spPr>
+            <a:xfrm flipH="1" flipV="1">
+              <a:off x="1709215" y="3437729"/>
+              <a:ext cx="349913" cy="48270"/>
+            </a:xfrm>
+            <a:prstGeom prst="straightConnector1">
+              <a:avLst/>
+            </a:prstGeom>
+            <a:ln w="12700">
+              <a:solidFill>
+                <a:schemeClr val="tx1"/>
+              </a:solidFill>
+              <a:tailEnd type="triangle" w="sm" len="med"/>
+            </a:ln>
+          </p:spPr>
+          <p:style>
+            <a:lnRef idx="1">
+              <a:schemeClr val="accent1"/>
+            </a:lnRef>
+            <a:fillRef idx="0">
+              <a:schemeClr val="accent1"/>
+            </a:fillRef>
+            <a:effectRef idx="0">
+              <a:schemeClr val="accent1"/>
+            </a:effectRef>
+            <a:fontRef idx="minor">
+              <a:schemeClr val="tx1"/>
+            </a:fontRef>
+          </p:style>
+        </p:cxnSp>
+        <p:cxnSp>
+          <p:nvCxnSpPr>
+            <p:cNvPr id="25" name="Straight Arrow Connector 24">
+              <a:extLst>
+                <a:ext uri="{FF2B5EF4-FFF2-40B4-BE49-F238E27FC236}">
+                  <a16:creationId xmlns:a16="http://schemas.microsoft.com/office/drawing/2014/main" id="{C2AD4C25-827F-DD6F-B4EC-B6DAEB77FB22}"/>
+                </a:ext>
+              </a:extLst>
+            </p:cNvPr>
+            <p:cNvCxnSpPr>
+              <a:stCxn id="34" idx="0"/>
+              <a:endCxn id="36" idx="4"/>
+            </p:cNvCxnSpPr>
+            <p:nvPr/>
+          </p:nvCxnSpPr>
+          <p:spPr>
+            <a:xfrm flipV="1">
+              <a:off x="1650896" y="3076161"/>
+              <a:ext cx="38879" cy="306807"/>
+            </a:xfrm>
+            <a:prstGeom prst="straightConnector1">
+              <a:avLst/>
+            </a:prstGeom>
+            <a:ln w="12700">
+              <a:solidFill>
+                <a:schemeClr val="tx1"/>
+              </a:solidFill>
+              <a:tailEnd type="triangle" w="sm" len="med"/>
+            </a:ln>
+          </p:spPr>
+          <p:style>
+            <a:lnRef idx="1">
+              <a:schemeClr val="accent1"/>
+            </a:lnRef>
+            <a:fillRef idx="0">
+              <a:schemeClr val="accent1"/>
+            </a:fillRef>
+            <a:effectRef idx="0">
+              <a:schemeClr val="accent1"/>
+            </a:effectRef>
+            <a:fontRef idx="minor">
+              <a:schemeClr val="tx1"/>
+            </a:fontRef>
+          </p:style>
+        </p:cxnSp>
+        <p:cxnSp>
+          <p:nvCxnSpPr>
+            <p:cNvPr id="26" name="Straight Arrow Connector 25">
+              <a:extLst>
+                <a:ext uri="{FF2B5EF4-FFF2-40B4-BE49-F238E27FC236}">
+                  <a16:creationId xmlns:a16="http://schemas.microsoft.com/office/drawing/2014/main" id="{495DD08B-0F6C-C70F-F0CE-C395B73BCDFD}"/>
+                </a:ext>
+              </a:extLst>
+            </p:cNvPr>
+            <p:cNvCxnSpPr>
+              <a:stCxn id="36" idx="6"/>
+            </p:cNvCxnSpPr>
+            <p:nvPr/>
+          </p:nvCxnSpPr>
+          <p:spPr>
+            <a:xfrm flipV="1">
+              <a:off x="1748093" y="2882501"/>
+              <a:ext cx="297091" cy="138948"/>
+            </a:xfrm>
+            <a:prstGeom prst="straightConnector1">
+              <a:avLst/>
+            </a:prstGeom>
+            <a:ln w="12700">
+              <a:solidFill>
+                <a:schemeClr val="tx1"/>
+              </a:solidFill>
+              <a:tailEnd type="triangle" w="sm" len="med"/>
+            </a:ln>
+          </p:spPr>
+          <p:style>
+            <a:lnRef idx="1">
+              <a:schemeClr val="accent1"/>
+            </a:lnRef>
+            <a:fillRef idx="0">
+              <a:schemeClr val="accent1"/>
+            </a:fillRef>
+            <a:effectRef idx="0">
+              <a:schemeClr val="accent1"/>
+            </a:effectRef>
+            <a:fontRef idx="minor">
+              <a:schemeClr val="tx1"/>
+            </a:fontRef>
+          </p:style>
+        </p:cxnSp>
+        <p:cxnSp>
+          <p:nvCxnSpPr>
+            <p:cNvPr id="27" name="Straight Arrow Connector 26">
+              <a:extLst>
+                <a:ext uri="{FF2B5EF4-FFF2-40B4-BE49-F238E27FC236}">
+                  <a16:creationId xmlns:a16="http://schemas.microsoft.com/office/drawing/2014/main" id="{0CA60051-F2F1-008A-5728-BBDEBFA7A5A1}"/>
+                </a:ext>
+              </a:extLst>
+            </p:cNvPr>
+            <p:cNvCxnSpPr>
+              <a:endCxn id="35" idx="1"/>
+            </p:cNvCxnSpPr>
+            <p:nvPr/>
+          </p:nvCxnSpPr>
+          <p:spPr>
+            <a:xfrm>
+              <a:off x="914408" y="3317395"/>
+              <a:ext cx="254618" cy="178377"/>
+            </a:xfrm>
+            <a:prstGeom prst="straightConnector1">
+              <a:avLst/>
+            </a:prstGeom>
+            <a:ln w="12700">
+              <a:solidFill>
+                <a:schemeClr val="tx1"/>
+              </a:solidFill>
+              <a:tailEnd type="triangle" w="sm" len="med"/>
+            </a:ln>
+          </p:spPr>
+          <p:style>
+            <a:lnRef idx="1">
+              <a:schemeClr val="accent1"/>
+            </a:lnRef>
+            <a:fillRef idx="0">
+              <a:schemeClr val="accent1"/>
+            </a:fillRef>
+            <a:effectRef idx="0">
+              <a:schemeClr val="accent1"/>
+            </a:effectRef>
+            <a:fontRef idx="minor">
+              <a:schemeClr val="tx1"/>
+            </a:fontRef>
+          </p:style>
+        </p:cxnSp>
+        <p:sp>
+          <p:nvSpPr>
+            <p:cNvPr id="28" name="Text Box 2">
+              <a:extLst>
+                <a:ext uri="{FF2B5EF4-FFF2-40B4-BE49-F238E27FC236}">
+                  <a16:creationId xmlns:a16="http://schemas.microsoft.com/office/drawing/2014/main" id="{316E2E9F-C8E1-B7F2-2FB1-06717F3D565C}"/>
+                </a:ext>
+              </a:extLst>
+            </p:cNvPr>
+            <p:cNvSpPr txBox="1">
+              <a:spLocks noChangeArrowheads="1"/>
+            </p:cNvSpPr>
+            <p:nvPr/>
+          </p:nvSpPr>
+          <p:spPr bwMode="auto">
+            <a:xfrm>
+              <a:off x="1341700" y="2830660"/>
+              <a:ext cx="406392" cy="281362"/>
+            </a:xfrm>
+            <a:prstGeom prst="rect">
+              <a:avLst/>
+            </a:prstGeom>
+            <a:noFill/>
+            <a:ln w="9525">
+              <a:noFill/>
+              <a:miter lim="800000"/>
+              <a:headEnd/>
+              <a:tailEnd/>
+            </a:ln>
+          </p:spPr>
+          <p:txBody>
+            <a:bodyPr rot="0" vert="horz" wrap="square" lIns="91440" tIns="45720" rIns="91440" bIns="45720" anchor="t" anchorCtr="0">
+              <a:noAutofit/>
+            </a:bodyPr>
+            <a:lstStyle/>
+            <a:p>
+              <a:pPr marL="0" marR="0">
+                <a:lnSpc>
+                  <a:spcPct val="107000"/>
+                </a:lnSpc>
+                <a:spcBef>
+                  <a:spcPts val="0"/>
+                </a:spcBef>
+                <a:spcAft>
+                  <a:spcPts val="800"/>
+                </a:spcAft>
+              </a:pPr>
+              <a:r>
+                <a:rPr lang="en-US" sz="1200" dirty="0">
+                  <a:solidFill>
+                    <a:srgbClr val="0070C0"/>
+                  </a:solidFill>
+                  <a:effectLst/>
+                  <a:latin typeface="Calibri" panose="020F0502020204030204" pitchFamily="34" charset="0"/>
+                  <a:ea typeface="DengXian" panose="02010600030101010101" pitchFamily="2" charset="-122"/>
+                  <a:cs typeface="Times New Roman" panose="02020603050405020304" pitchFamily="18" charset="0"/>
+                </a:rPr>
+                <a:t>S1</a:t>
+              </a:r>
+              <a:endParaRPr lang="en-US" sz="1100" dirty="0">
+                <a:solidFill>
+                  <a:srgbClr val="0070C0"/>
+                </a:solidFill>
+                <a:effectLst/>
+                <a:latin typeface="Calibri" panose="020F0502020204030204" pitchFamily="34" charset="0"/>
+                <a:ea typeface="DengXian" panose="02010600030101010101" pitchFamily="2" charset="-122"/>
+                <a:cs typeface="Times New Roman" panose="02020603050405020304" pitchFamily="18" charset="0"/>
+              </a:endParaRPr>
+            </a:p>
+          </p:txBody>
+        </p:sp>
+        <p:sp>
+          <p:nvSpPr>
+            <p:cNvPr id="29" name="Text Box 2">
+              <a:extLst>
+                <a:ext uri="{FF2B5EF4-FFF2-40B4-BE49-F238E27FC236}">
+                  <a16:creationId xmlns:a16="http://schemas.microsoft.com/office/drawing/2014/main" id="{5E7D06BE-6039-1BB0-F88D-01E1AD382640}"/>
+                </a:ext>
+              </a:extLst>
+            </p:cNvPr>
+            <p:cNvSpPr txBox="1">
+              <a:spLocks noChangeArrowheads="1"/>
+            </p:cNvSpPr>
+            <p:nvPr/>
+          </p:nvSpPr>
+          <p:spPr bwMode="auto">
+            <a:xfrm>
+              <a:off x="1149757" y="3556419"/>
+              <a:ext cx="406392" cy="281362"/>
+            </a:xfrm>
+            <a:prstGeom prst="rect">
+              <a:avLst/>
+            </a:prstGeom>
+            <a:noFill/>
+            <a:ln w="9525">
+              <a:noFill/>
+              <a:miter lim="800000"/>
+              <a:headEnd/>
+              <a:tailEnd/>
+            </a:ln>
+          </p:spPr>
+          <p:txBody>
+            <a:bodyPr rot="0" vert="horz" wrap="square" lIns="91440" tIns="45720" rIns="91440" bIns="45720" anchor="t" anchorCtr="0">
+              <a:noAutofit/>
+            </a:bodyPr>
+            <a:lstStyle/>
+            <a:p>
+              <a:pPr marL="0" marR="0">
+                <a:lnSpc>
+                  <a:spcPct val="107000"/>
+                </a:lnSpc>
+                <a:spcBef>
+                  <a:spcPts val="0"/>
+                </a:spcBef>
+                <a:spcAft>
+                  <a:spcPts val="800"/>
+                </a:spcAft>
+              </a:pPr>
+              <a:r>
+                <a:rPr lang="en-US" sz="1200" dirty="0">
+                  <a:solidFill>
+                    <a:srgbClr val="0070C0"/>
+                  </a:solidFill>
+                  <a:effectLst/>
+                  <a:latin typeface="Calibri" panose="020F0502020204030204" pitchFamily="34" charset="0"/>
+                  <a:ea typeface="DengXian" panose="02010600030101010101" pitchFamily="2" charset="-122"/>
+                  <a:cs typeface="Times New Roman" panose="02020603050405020304" pitchFamily="18" charset="0"/>
+                </a:rPr>
+                <a:t>S2</a:t>
+              </a:r>
+              <a:endParaRPr lang="en-US" sz="1100" dirty="0">
+                <a:solidFill>
+                  <a:srgbClr val="0070C0"/>
+                </a:solidFill>
+                <a:effectLst/>
+                <a:latin typeface="Calibri" panose="020F0502020204030204" pitchFamily="34" charset="0"/>
+                <a:ea typeface="DengXian" panose="02010600030101010101" pitchFamily="2" charset="-122"/>
+                <a:cs typeface="Times New Roman" panose="02020603050405020304" pitchFamily="18" charset="0"/>
+              </a:endParaRPr>
+            </a:p>
+          </p:txBody>
+        </p:sp>
+        <p:sp>
+          <p:nvSpPr>
+            <p:cNvPr id="30" name="Text Box 2">
+              <a:extLst>
+                <a:ext uri="{FF2B5EF4-FFF2-40B4-BE49-F238E27FC236}">
+                  <a16:creationId xmlns:a16="http://schemas.microsoft.com/office/drawing/2014/main" id="{9760F0C1-93CD-17B7-C0C9-52BDDB811BEA}"/>
+                </a:ext>
+              </a:extLst>
+            </p:cNvPr>
+            <p:cNvSpPr txBox="1">
+              <a:spLocks noChangeArrowheads="1"/>
+            </p:cNvSpPr>
+            <p:nvPr/>
+          </p:nvSpPr>
+          <p:spPr bwMode="auto">
+            <a:xfrm>
+              <a:off x="1679174" y="3106641"/>
+              <a:ext cx="406392" cy="281362"/>
+            </a:xfrm>
+            <a:prstGeom prst="rect">
+              <a:avLst/>
+            </a:prstGeom>
+            <a:noFill/>
+            <a:ln w="9525">
+              <a:noFill/>
+              <a:miter lim="800000"/>
+              <a:headEnd/>
+              <a:tailEnd/>
+            </a:ln>
+          </p:spPr>
+          <p:txBody>
+            <a:bodyPr rot="0" vert="horz" wrap="square" lIns="91440" tIns="45720" rIns="91440" bIns="45720" anchor="t" anchorCtr="0">
+              <a:noAutofit/>
+            </a:bodyPr>
+            <a:lstStyle/>
+            <a:p>
+              <a:pPr marL="0" marR="0">
+                <a:lnSpc>
+                  <a:spcPct val="107000"/>
+                </a:lnSpc>
+                <a:spcBef>
+                  <a:spcPts val="0"/>
+                </a:spcBef>
+                <a:spcAft>
+                  <a:spcPts val="800"/>
+                </a:spcAft>
+              </a:pPr>
+              <a:r>
+                <a:rPr lang="en-US" sz="1200" dirty="0">
+                  <a:solidFill>
+                    <a:srgbClr val="0070C0"/>
+                  </a:solidFill>
+                  <a:effectLst/>
+                  <a:latin typeface="Calibri" panose="020F0502020204030204" pitchFamily="34" charset="0"/>
+                  <a:ea typeface="DengXian" panose="02010600030101010101" pitchFamily="2" charset="-122"/>
+                  <a:cs typeface="Times New Roman" panose="02020603050405020304" pitchFamily="18" charset="0"/>
+                </a:rPr>
+                <a:t>S3</a:t>
+              </a:r>
+              <a:endParaRPr lang="en-US" sz="1100" dirty="0">
+                <a:solidFill>
+                  <a:srgbClr val="0070C0"/>
+                </a:solidFill>
+                <a:effectLst/>
+                <a:latin typeface="Calibri" panose="020F0502020204030204" pitchFamily="34" charset="0"/>
+                <a:ea typeface="DengXian" panose="02010600030101010101" pitchFamily="2" charset="-122"/>
+                <a:cs typeface="Times New Roman" panose="02020603050405020304" pitchFamily="18" charset="0"/>
+              </a:endParaRPr>
+            </a:p>
+          </p:txBody>
+        </p:sp>
+        <p:sp>
+          <p:nvSpPr>
+            <p:cNvPr id="31" name="Text Box 2">
+              <a:extLst>
+                <a:ext uri="{FF2B5EF4-FFF2-40B4-BE49-F238E27FC236}">
+                  <a16:creationId xmlns:a16="http://schemas.microsoft.com/office/drawing/2014/main" id="{27F0A3C5-A664-4BC7-9AA0-3C6EF2FA84AA}"/>
+                </a:ext>
+              </a:extLst>
+            </p:cNvPr>
+            <p:cNvSpPr txBox="1">
+              <a:spLocks noChangeArrowheads="1"/>
+            </p:cNvSpPr>
+            <p:nvPr/>
+          </p:nvSpPr>
+          <p:spPr bwMode="auto">
+            <a:xfrm>
+              <a:off x="1925502" y="3553096"/>
+              <a:ext cx="406392" cy="281362"/>
+            </a:xfrm>
+            <a:prstGeom prst="rect">
+              <a:avLst/>
+            </a:prstGeom>
+            <a:noFill/>
+            <a:ln w="9525">
+              <a:noFill/>
+              <a:miter lim="800000"/>
+              <a:headEnd/>
+              <a:tailEnd/>
+            </a:ln>
+          </p:spPr>
+          <p:txBody>
+            <a:bodyPr rot="0" vert="horz" wrap="square" lIns="91440" tIns="45720" rIns="91440" bIns="45720" anchor="t" anchorCtr="0">
+              <a:noAutofit/>
+            </a:bodyPr>
+            <a:lstStyle/>
+            <a:p>
+              <a:pPr marL="0" marR="0">
+                <a:lnSpc>
+                  <a:spcPct val="107000"/>
+                </a:lnSpc>
+                <a:spcBef>
+                  <a:spcPts val="0"/>
+                </a:spcBef>
+                <a:spcAft>
+                  <a:spcPts val="800"/>
+                </a:spcAft>
+              </a:pPr>
+              <a:r>
+                <a:rPr lang="en-US" sz="1200" dirty="0">
+                  <a:solidFill>
+                    <a:srgbClr val="0070C0"/>
+                  </a:solidFill>
+                  <a:effectLst/>
+                  <a:latin typeface="Calibri" panose="020F0502020204030204" pitchFamily="34" charset="0"/>
+                  <a:ea typeface="DengXian" panose="02010600030101010101" pitchFamily="2" charset="-122"/>
+                  <a:cs typeface="Times New Roman" panose="02020603050405020304" pitchFamily="18" charset="0"/>
+                </a:rPr>
+                <a:t>S4</a:t>
+              </a:r>
+              <a:endParaRPr lang="en-US" sz="1100" dirty="0">
+                <a:solidFill>
+                  <a:srgbClr val="0070C0"/>
+                </a:solidFill>
+                <a:effectLst/>
+                <a:latin typeface="Calibri" panose="020F0502020204030204" pitchFamily="34" charset="0"/>
+                <a:ea typeface="DengXian" panose="02010600030101010101" pitchFamily="2" charset="-122"/>
+                <a:cs typeface="Times New Roman" panose="02020603050405020304" pitchFamily="18" charset="0"/>
+              </a:endParaRPr>
+            </a:p>
+          </p:txBody>
+        </p:sp>
+        <p:sp>
+          <p:nvSpPr>
+            <p:cNvPr id="32" name="Text Box 2">
+              <a:extLst>
+                <a:ext uri="{FF2B5EF4-FFF2-40B4-BE49-F238E27FC236}">
+                  <a16:creationId xmlns:a16="http://schemas.microsoft.com/office/drawing/2014/main" id="{F35CACFB-C4A0-24D4-35ED-D7FAE9691DAE}"/>
+                </a:ext>
+              </a:extLst>
+            </p:cNvPr>
+            <p:cNvSpPr txBox="1">
+              <a:spLocks noChangeArrowheads="1"/>
+            </p:cNvSpPr>
+            <p:nvPr/>
+          </p:nvSpPr>
+          <p:spPr bwMode="auto">
+            <a:xfrm>
+              <a:off x="1231544" y="3832094"/>
+              <a:ext cx="406392" cy="281362"/>
+            </a:xfrm>
+            <a:prstGeom prst="rect">
+              <a:avLst/>
+            </a:prstGeom>
+            <a:noFill/>
+            <a:ln w="9525">
+              <a:noFill/>
+              <a:miter lim="800000"/>
+              <a:headEnd/>
+              <a:tailEnd/>
+            </a:ln>
+          </p:spPr>
+          <p:txBody>
+            <a:bodyPr rot="0" vert="horz" wrap="square" lIns="91440" tIns="45720" rIns="91440" bIns="45720" anchor="t" anchorCtr="0">
+              <a:noAutofit/>
+            </a:bodyPr>
+            <a:lstStyle/>
+            <a:p>
+              <a:pPr marL="0" marR="0">
+                <a:lnSpc>
+                  <a:spcPct val="107000"/>
+                </a:lnSpc>
+                <a:spcBef>
+                  <a:spcPts val="0"/>
+                </a:spcBef>
+                <a:spcAft>
+                  <a:spcPts val="800"/>
+                </a:spcAft>
+              </a:pPr>
+              <a:r>
+                <a:rPr lang="en-US" sz="1200" dirty="0">
+                  <a:solidFill>
+                    <a:srgbClr val="0070C0"/>
+                  </a:solidFill>
+                  <a:effectLst/>
+                  <a:latin typeface="Calibri" panose="020F0502020204030204" pitchFamily="34" charset="0"/>
+                  <a:ea typeface="DengXian" panose="02010600030101010101" pitchFamily="2" charset="-122"/>
+                  <a:cs typeface="Times New Roman" panose="02020603050405020304" pitchFamily="18" charset="0"/>
+                </a:rPr>
+                <a:t>S5</a:t>
+              </a:r>
+              <a:endParaRPr lang="en-US" sz="1100" dirty="0">
+                <a:solidFill>
+                  <a:srgbClr val="0070C0"/>
+                </a:solidFill>
+                <a:effectLst/>
+                <a:latin typeface="Calibri" panose="020F0502020204030204" pitchFamily="34" charset="0"/>
+                <a:ea typeface="DengXian" panose="02010600030101010101" pitchFamily="2" charset="-122"/>
+                <a:cs typeface="Times New Roman" panose="02020603050405020304" pitchFamily="18" charset="0"/>
+              </a:endParaRPr>
+            </a:p>
+          </p:txBody>
+        </p:sp>
+      </p:grpSp>
+      <p:sp>
+        <p:nvSpPr>
+          <p:cNvPr id="40" name="TextBox 39">
+            <a:extLst>
+              <a:ext uri="{FF2B5EF4-FFF2-40B4-BE49-F238E27FC236}">
+                <a16:creationId xmlns:a16="http://schemas.microsoft.com/office/drawing/2014/main" id="{5456C7A7-4E6A-B06D-A0A2-BF15EFB5DAA3}"/>
+              </a:ext>
+            </a:extLst>
+          </p:cNvPr>
+          <p:cNvSpPr txBox="1"/>
+          <p:nvPr/>
+        </p:nvSpPr>
+        <p:spPr>
+          <a:xfrm>
+            <a:off x="675527" y="1618381"/>
+            <a:ext cx="2444929" cy="369332"/>
+          </a:xfrm>
+          <a:prstGeom prst="rect">
+            <a:avLst/>
+          </a:prstGeom>
+          <a:noFill/>
+        </p:spPr>
+        <p:txBody>
+          <a:bodyPr wrap="square" rtlCol="0">
+            <a:spAutoFit/>
+          </a:bodyPr>
+          <a:lstStyle/>
+          <a:p>
+            <a:pPr algn="ctr"/>
+            <a:r>
+              <a:rPr lang="en-US" i="1" dirty="0"/>
+              <a:t>PDG from source code</a:t>
+            </a:r>
+          </a:p>
+        </p:txBody>
+      </p:sp>
+      <p:grpSp>
+        <p:nvGrpSpPr>
+          <p:cNvPr id="42" name="Group 41">
+            <a:extLst>
+              <a:ext uri="{FF2B5EF4-FFF2-40B4-BE49-F238E27FC236}">
+                <a16:creationId xmlns:a16="http://schemas.microsoft.com/office/drawing/2014/main" id="{1804871F-5D7F-08D7-BB92-4FD98B25DEAD}"/>
+              </a:ext>
+            </a:extLst>
+          </p:cNvPr>
+          <p:cNvGrpSpPr/>
+          <p:nvPr/>
+        </p:nvGrpSpPr>
+        <p:grpSpPr>
+          <a:xfrm>
+            <a:off x="1710415" y="2975044"/>
+            <a:ext cx="996684" cy="770954"/>
+            <a:chOff x="4543014" y="766424"/>
+            <a:chExt cx="1129027" cy="770954"/>
+          </a:xfrm>
+        </p:grpSpPr>
+        <p:sp>
+          <p:nvSpPr>
+            <p:cNvPr id="47" name="TextBox 46">
+              <a:extLst>
+                <a:ext uri="{FF2B5EF4-FFF2-40B4-BE49-F238E27FC236}">
+                  <a16:creationId xmlns:a16="http://schemas.microsoft.com/office/drawing/2014/main" id="{CB2ABDEA-8EFB-671E-DDA9-E05E4DBB08D3}"/>
+                </a:ext>
+              </a:extLst>
+            </p:cNvPr>
+            <p:cNvSpPr txBox="1"/>
+            <p:nvPr/>
+          </p:nvSpPr>
+          <p:spPr>
+            <a:xfrm>
+              <a:off x="4668610" y="766424"/>
+              <a:ext cx="927050" cy="369332"/>
+            </a:xfrm>
+            <a:prstGeom prst="rect">
+              <a:avLst/>
+            </a:prstGeom>
+            <a:noFill/>
+          </p:spPr>
+          <p:txBody>
+            <a:bodyPr wrap="none" rtlCol="0">
+              <a:spAutoFit/>
+            </a:bodyPr>
+            <a:lstStyle/>
+            <a:p>
+              <a:pPr algn="ctr"/>
+              <a:r>
+                <a:rPr lang="en-US" dirty="0"/>
+                <a:t>Training</a:t>
+              </a:r>
+            </a:p>
+          </p:txBody>
+        </p:sp>
+        <p:cxnSp>
+          <p:nvCxnSpPr>
+            <p:cNvPr id="56" name="Connector: Elbow 55">
+              <a:extLst>
+                <a:ext uri="{FF2B5EF4-FFF2-40B4-BE49-F238E27FC236}">
+                  <a16:creationId xmlns:a16="http://schemas.microsoft.com/office/drawing/2014/main" id="{4E71D239-9B1F-D65B-96B5-22186B5B1599}"/>
+                </a:ext>
+              </a:extLst>
+            </p:cNvPr>
+            <p:cNvCxnSpPr>
+              <a:cxnSpLocks/>
+            </p:cNvCxnSpPr>
+            <p:nvPr/>
+          </p:nvCxnSpPr>
+          <p:spPr>
+            <a:xfrm>
+              <a:off x="4596014" y="903489"/>
+              <a:ext cx="1057458" cy="181564"/>
+            </a:xfrm>
+            <a:prstGeom prst="bentConnector3">
+              <a:avLst>
+                <a:gd name="adj1" fmla="val -288"/>
+              </a:avLst>
+            </a:prstGeom>
+            <a:ln>
+              <a:tailEnd type="triangle"/>
+            </a:ln>
+          </p:spPr>
+          <p:style>
+            <a:lnRef idx="1">
+              <a:schemeClr val="dk1"/>
+            </a:lnRef>
+            <a:fillRef idx="0">
+              <a:schemeClr val="dk1"/>
+            </a:fillRef>
+            <a:effectRef idx="0">
+              <a:schemeClr val="dk1"/>
+            </a:effectRef>
+            <a:fontRef idx="minor">
+              <a:schemeClr val="tx1"/>
+            </a:fontRef>
+          </p:style>
+        </p:cxnSp>
+        <p:cxnSp>
+          <p:nvCxnSpPr>
+            <p:cNvPr id="58" name="Connector: Elbow 57">
+              <a:extLst>
+                <a:ext uri="{FF2B5EF4-FFF2-40B4-BE49-F238E27FC236}">
+                  <a16:creationId xmlns:a16="http://schemas.microsoft.com/office/drawing/2014/main" id="{DABB5391-7353-16E1-4208-6CA68FE555E5}"/>
+                </a:ext>
+              </a:extLst>
+            </p:cNvPr>
+            <p:cNvCxnSpPr>
+              <a:cxnSpLocks/>
+            </p:cNvCxnSpPr>
+            <p:nvPr/>
+          </p:nvCxnSpPr>
+          <p:spPr>
+            <a:xfrm flipV="1">
+              <a:off x="4595560" y="1240580"/>
+              <a:ext cx="1057458" cy="209625"/>
+            </a:xfrm>
+            <a:prstGeom prst="bentConnector3">
+              <a:avLst>
+                <a:gd name="adj1" fmla="val -1515"/>
+              </a:avLst>
+            </a:prstGeom>
+            <a:ln>
+              <a:prstDash val="dash"/>
+              <a:tailEnd type="triangle"/>
+            </a:ln>
+          </p:spPr>
+          <p:style>
+            <a:lnRef idx="1">
+              <a:schemeClr val="dk1"/>
+            </a:lnRef>
+            <a:fillRef idx="0">
+              <a:schemeClr val="dk1"/>
+            </a:fillRef>
+            <a:effectRef idx="0">
+              <a:schemeClr val="dk1"/>
+            </a:effectRef>
+            <a:fontRef idx="minor">
+              <a:schemeClr val="tx1"/>
+            </a:fontRef>
+          </p:style>
+        </p:cxnSp>
+        <p:sp>
+          <p:nvSpPr>
+            <p:cNvPr id="64" name="TextBox 63">
+              <a:extLst>
+                <a:ext uri="{FF2B5EF4-FFF2-40B4-BE49-F238E27FC236}">
+                  <a16:creationId xmlns:a16="http://schemas.microsoft.com/office/drawing/2014/main" id="{C9E08E32-9E3F-4118-6951-2D9E990E743B}"/>
+                </a:ext>
+              </a:extLst>
+            </p:cNvPr>
+            <p:cNvSpPr txBox="1"/>
+            <p:nvPr/>
+          </p:nvSpPr>
+          <p:spPr>
+            <a:xfrm>
+              <a:off x="4543014" y="1168046"/>
+              <a:ext cx="1129027" cy="369332"/>
+            </a:xfrm>
+            <a:prstGeom prst="rect">
+              <a:avLst/>
+            </a:prstGeom>
+            <a:noFill/>
+          </p:spPr>
+          <p:txBody>
+            <a:bodyPr wrap="none" rtlCol="0">
+              <a:spAutoFit/>
+            </a:bodyPr>
+            <a:lstStyle/>
+            <a:p>
+              <a:pPr algn="ctr"/>
+              <a:r>
+                <a:rPr lang="en-US" dirty="0"/>
+                <a:t>Predicting</a:t>
+              </a:r>
+            </a:p>
+          </p:txBody>
+        </p:sp>
+      </p:grpSp>
+      <p:grpSp>
+        <p:nvGrpSpPr>
+          <p:cNvPr id="69" name="Group 68">
+            <a:extLst>
+              <a:ext uri="{FF2B5EF4-FFF2-40B4-BE49-F238E27FC236}">
+                <a16:creationId xmlns:a16="http://schemas.microsoft.com/office/drawing/2014/main" id="{4F7D6099-EF1A-DF2F-A520-CC1DB6B02A6A}"/>
+              </a:ext>
+            </a:extLst>
+          </p:cNvPr>
+          <p:cNvGrpSpPr/>
+          <p:nvPr/>
+        </p:nvGrpSpPr>
+        <p:grpSpPr>
+          <a:xfrm>
+            <a:off x="6529652" y="2535251"/>
+            <a:ext cx="1513414" cy="1663700"/>
+            <a:chOff x="4930286" y="2611370"/>
+            <a:chExt cx="1561305" cy="1663700"/>
+          </a:xfrm>
+        </p:grpSpPr>
+        <p:sp>
+          <p:nvSpPr>
+            <p:cNvPr id="65" name="Rectangle: Rounded Corners 64">
+              <a:extLst>
+                <a:ext uri="{FF2B5EF4-FFF2-40B4-BE49-F238E27FC236}">
+                  <a16:creationId xmlns:a16="http://schemas.microsoft.com/office/drawing/2014/main" id="{27F41A77-DBB6-21DD-6834-B2F4379C8EDC}"/>
+                </a:ext>
+              </a:extLst>
+            </p:cNvPr>
+            <p:cNvSpPr/>
+            <p:nvPr/>
+          </p:nvSpPr>
+          <p:spPr>
+            <a:xfrm>
+              <a:off x="4930286" y="2611370"/>
+              <a:ext cx="1561305" cy="1663700"/>
+            </a:xfrm>
+            <a:prstGeom prst="roundRect">
+              <a:avLst/>
+            </a:prstGeom>
+            <a:noFill/>
+            <a:ln>
+              <a:solidFill>
+                <a:schemeClr val="accent1">
+                  <a:lumMod val="50000"/>
+                </a:schemeClr>
+              </a:solidFill>
+            </a:ln>
+          </p:spPr>
+          <p:style>
+            <a:lnRef idx="2">
+              <a:schemeClr val="accent1">
+                <a:shade val="50000"/>
+              </a:schemeClr>
+            </a:lnRef>
+            <a:fillRef idx="1">
+              <a:schemeClr val="accent1"/>
+            </a:fillRef>
+            <a:effectRef idx="0">
+              <a:schemeClr val="accent1"/>
+            </a:effectRef>
+            <a:fontRef idx="minor">
+              <a:schemeClr val="lt1"/>
+            </a:fontRef>
+          </p:style>
+          <p:txBody>
+            <a:bodyPr rot="0" spcFirstLastPara="0" vert="horz" wrap="square" lIns="91440" tIns="45720" rIns="91440" bIns="45720" numCol="1" spcCol="0" rtlCol="0" fromWordArt="0" anchor="ctr" anchorCtr="0" forceAA="0" compatLnSpc="1">
+              <a:prstTxWarp prst="textNoShape">
+                <a:avLst/>
+              </a:prstTxWarp>
+              <a:noAutofit/>
+            </a:bodyPr>
+            <a:lstStyle/>
+            <a:p>
+              <a:endParaRPr lang="en-US"/>
+            </a:p>
+          </p:txBody>
+        </p:sp>
+        <p:sp>
+          <p:nvSpPr>
+            <p:cNvPr id="66" name="Rectangle: Rounded Corners 65">
+              <a:extLst>
+                <a:ext uri="{FF2B5EF4-FFF2-40B4-BE49-F238E27FC236}">
+                  <a16:creationId xmlns:a16="http://schemas.microsoft.com/office/drawing/2014/main" id="{C5C4434A-ABEB-CB9B-C1A0-0758F62CFB73}"/>
+                </a:ext>
+              </a:extLst>
+            </p:cNvPr>
+            <p:cNvSpPr/>
+            <p:nvPr/>
+          </p:nvSpPr>
+          <p:spPr>
+            <a:xfrm>
+              <a:off x="5038928" y="2696206"/>
+              <a:ext cx="1266244" cy="304521"/>
+            </a:xfrm>
+            <a:prstGeom prst="roundRect">
+              <a:avLst>
+                <a:gd name="adj" fmla="val 0"/>
+              </a:avLst>
+            </a:prstGeom>
+            <a:noFill/>
+            <a:ln>
+              <a:solidFill>
+                <a:schemeClr val="tx1"/>
+              </a:solidFill>
+            </a:ln>
+          </p:spPr>
+          <p:style>
+            <a:lnRef idx="2">
+              <a:schemeClr val="accent1">
+                <a:shade val="50000"/>
+              </a:schemeClr>
+            </a:lnRef>
+            <a:fillRef idx="1">
+              <a:schemeClr val="accent1"/>
+            </a:fillRef>
+            <a:effectRef idx="0">
+              <a:schemeClr val="accent1"/>
+            </a:effectRef>
+            <a:fontRef idx="minor">
+              <a:schemeClr val="lt1"/>
+            </a:fontRef>
+          </p:style>
+          <p:txBody>
+            <a:bodyPr rot="0" spcFirstLastPara="0" vert="horz" wrap="square" lIns="45720" tIns="0" rIns="45720" bIns="0" numCol="1" spcCol="0" rtlCol="0" fromWordArt="0" anchor="ctr" anchorCtr="0" forceAA="0" compatLnSpc="1">
+              <a:prstTxWarp prst="textNoShape">
+                <a:avLst/>
+              </a:prstTxWarp>
+              <a:noAutofit/>
+            </a:bodyPr>
+            <a:lstStyle/>
+            <a:p>
+              <a:pPr marL="0" marR="0" algn="ctr">
+                <a:lnSpc>
+                  <a:spcPct val="107000"/>
+                </a:lnSpc>
+                <a:spcBef>
+                  <a:spcPts val="0"/>
+                </a:spcBef>
+                <a:spcAft>
+                  <a:spcPts val="800"/>
+                </a:spcAft>
+              </a:pPr>
+              <a:r>
+                <a:rPr lang="en-US" dirty="0">
+                  <a:solidFill>
+                    <a:srgbClr val="000000"/>
+                  </a:solidFill>
+                  <a:ea typeface="DengXian" panose="02010600030101010101" pitchFamily="2" charset="-122"/>
+                  <a:cs typeface="Times New Roman" panose="02020603050405020304" pitchFamily="18" charset="0"/>
+                </a:rPr>
+                <a:t>Classifier-E1</a:t>
+              </a:r>
+              <a:endParaRPr lang="en-US" dirty="0">
+                <a:effectLst/>
+                <a:ea typeface="DengXian" panose="02010600030101010101" pitchFamily="2" charset="-122"/>
+                <a:cs typeface="Times New Roman" panose="02020603050405020304" pitchFamily="18" charset="0"/>
+              </a:endParaRPr>
+            </a:p>
+          </p:txBody>
+        </p:sp>
+      </p:grpSp>
+      <p:sp>
+        <p:nvSpPr>
+          <p:cNvPr id="70" name="TextBox 69">
+            <a:extLst>
+              <a:ext uri="{FF2B5EF4-FFF2-40B4-BE49-F238E27FC236}">
+                <a16:creationId xmlns:a16="http://schemas.microsoft.com/office/drawing/2014/main" id="{1A999AB6-93A1-8A23-B58A-E9CE4F5071A7}"/>
+              </a:ext>
+            </a:extLst>
+          </p:cNvPr>
+          <p:cNvSpPr txBox="1"/>
+          <p:nvPr/>
+        </p:nvSpPr>
+        <p:spPr>
+          <a:xfrm>
+            <a:off x="8054753" y="2566147"/>
+            <a:ext cx="485519" cy="369332"/>
+          </a:xfrm>
+          <a:prstGeom prst="rect">
+            <a:avLst/>
+          </a:prstGeom>
+          <a:noFill/>
+        </p:spPr>
+        <p:txBody>
+          <a:bodyPr wrap="none" rtlCol="0">
+            <a:spAutoFit/>
+          </a:bodyPr>
+          <a:lstStyle/>
+          <a:p>
+            <a:pPr algn="ctr"/>
+            <a:r>
+              <a:rPr lang="en-US" dirty="0"/>
+              <a:t>Yes</a:t>
+            </a:r>
+          </a:p>
+        </p:txBody>
+      </p:sp>
+      <p:cxnSp>
+        <p:nvCxnSpPr>
+          <p:cNvPr id="71" name="Straight Arrow Connector 70">
+            <a:extLst>
+              <a:ext uri="{FF2B5EF4-FFF2-40B4-BE49-F238E27FC236}">
+                <a16:creationId xmlns:a16="http://schemas.microsoft.com/office/drawing/2014/main" id="{4CFFCCC3-B473-49B6-EA7B-A4D5C37D0384}"/>
+              </a:ext>
+            </a:extLst>
+          </p:cNvPr>
+          <p:cNvCxnSpPr>
+            <a:cxnSpLocks/>
+          </p:cNvCxnSpPr>
+          <p:nvPr/>
+        </p:nvCxnSpPr>
+        <p:spPr>
+          <a:xfrm>
+            <a:off x="7904536" y="2780455"/>
+            <a:ext cx="243840" cy="0"/>
+          </a:xfrm>
+          <a:prstGeom prst="straightConnector1">
+            <a:avLst/>
+          </a:prstGeom>
+          <a:ln w="12700">
+            <a:tailEnd type="triangle"/>
+          </a:ln>
+        </p:spPr>
+        <p:style>
+          <a:lnRef idx="1">
+            <a:schemeClr val="dk1"/>
+          </a:lnRef>
+          <a:fillRef idx="0">
+            <a:schemeClr val="dk1"/>
+          </a:fillRef>
+          <a:effectRef idx="0">
+            <a:schemeClr val="dk1"/>
+          </a:effectRef>
+          <a:fontRef idx="minor">
+            <a:schemeClr val="tx1"/>
+          </a:fontRef>
+        </p:style>
+      </p:cxnSp>
+      <p:cxnSp>
+        <p:nvCxnSpPr>
+          <p:cNvPr id="72" name="Straight Arrow Connector 71">
+            <a:extLst>
+              <a:ext uri="{FF2B5EF4-FFF2-40B4-BE49-F238E27FC236}">
+                <a16:creationId xmlns:a16="http://schemas.microsoft.com/office/drawing/2014/main" id="{206ECC40-DEE2-6C2C-4208-E7EF51C18CBF}"/>
+              </a:ext>
+            </a:extLst>
+          </p:cNvPr>
+          <p:cNvCxnSpPr>
+            <a:cxnSpLocks/>
+          </p:cNvCxnSpPr>
+          <p:nvPr/>
+        </p:nvCxnSpPr>
+        <p:spPr>
+          <a:xfrm>
+            <a:off x="7904536" y="3115107"/>
+            <a:ext cx="243840" cy="0"/>
+          </a:xfrm>
+          <a:prstGeom prst="straightConnector1">
+            <a:avLst/>
+          </a:prstGeom>
+          <a:ln w="12700">
+            <a:tailEnd type="triangle"/>
+          </a:ln>
+        </p:spPr>
+        <p:style>
+          <a:lnRef idx="1">
+            <a:schemeClr val="dk1"/>
+          </a:lnRef>
+          <a:fillRef idx="0">
+            <a:schemeClr val="dk1"/>
+          </a:fillRef>
+          <a:effectRef idx="0">
+            <a:schemeClr val="dk1"/>
+          </a:effectRef>
+          <a:fontRef idx="minor">
+            <a:schemeClr val="tx1"/>
+          </a:fontRef>
+        </p:style>
+      </p:cxnSp>
+      <p:sp>
+        <p:nvSpPr>
+          <p:cNvPr id="73" name="TextBox 72">
+            <a:extLst>
+              <a:ext uri="{FF2B5EF4-FFF2-40B4-BE49-F238E27FC236}">
+                <a16:creationId xmlns:a16="http://schemas.microsoft.com/office/drawing/2014/main" id="{ED532153-6942-1D48-F960-6B6F22C4922A}"/>
+              </a:ext>
+            </a:extLst>
+          </p:cNvPr>
+          <p:cNvSpPr txBox="1"/>
+          <p:nvPr/>
+        </p:nvSpPr>
+        <p:spPr>
+          <a:xfrm>
+            <a:off x="8069724" y="2910039"/>
+            <a:ext cx="455574" cy="369332"/>
+          </a:xfrm>
+          <a:prstGeom prst="rect">
+            <a:avLst/>
+          </a:prstGeom>
+          <a:noFill/>
+        </p:spPr>
+        <p:txBody>
+          <a:bodyPr wrap="none" rtlCol="0">
+            <a:spAutoFit/>
+          </a:bodyPr>
+          <a:lstStyle/>
+          <a:p>
+            <a:pPr algn="ctr"/>
+            <a:r>
+              <a:rPr lang="en-US" dirty="0"/>
+              <a:t>No</a:t>
+            </a:r>
+          </a:p>
+        </p:txBody>
+      </p:sp>
+      <p:sp>
+        <p:nvSpPr>
+          <p:cNvPr id="75" name="TextBox 74">
+            <a:extLst>
+              <a:ext uri="{FF2B5EF4-FFF2-40B4-BE49-F238E27FC236}">
+                <a16:creationId xmlns:a16="http://schemas.microsoft.com/office/drawing/2014/main" id="{2966E5C6-EC0A-A887-F4FF-4096B73D975A}"/>
+              </a:ext>
+            </a:extLst>
+          </p:cNvPr>
+          <p:cNvSpPr txBox="1"/>
+          <p:nvPr/>
+        </p:nvSpPr>
+        <p:spPr>
+          <a:xfrm>
+            <a:off x="8039781" y="3730140"/>
+            <a:ext cx="485519" cy="369332"/>
+          </a:xfrm>
+          <a:prstGeom prst="rect">
+            <a:avLst/>
+          </a:prstGeom>
+          <a:noFill/>
+        </p:spPr>
+        <p:txBody>
+          <a:bodyPr wrap="none" rtlCol="0">
+            <a:spAutoFit/>
+          </a:bodyPr>
+          <a:lstStyle/>
+          <a:p>
+            <a:pPr algn="ctr"/>
+            <a:r>
+              <a:rPr lang="en-US" dirty="0"/>
+              <a:t>Yes</a:t>
+            </a:r>
+          </a:p>
+        </p:txBody>
+      </p:sp>
+      <p:sp>
+        <p:nvSpPr>
+          <p:cNvPr id="76" name="Rectangle: Rounded Corners 75">
+            <a:extLst>
+              <a:ext uri="{FF2B5EF4-FFF2-40B4-BE49-F238E27FC236}">
+                <a16:creationId xmlns:a16="http://schemas.microsoft.com/office/drawing/2014/main" id="{E3365C50-33A7-6B31-5BC8-66CBB7A10D8E}"/>
+              </a:ext>
+            </a:extLst>
+          </p:cNvPr>
+          <p:cNvSpPr/>
+          <p:nvPr/>
+        </p:nvSpPr>
+        <p:spPr>
+          <a:xfrm>
+            <a:off x="6638292" y="2978098"/>
+            <a:ext cx="1266244" cy="304521"/>
+          </a:xfrm>
+          <a:prstGeom prst="roundRect">
+            <a:avLst>
+              <a:gd name="adj" fmla="val 0"/>
+            </a:avLst>
+          </a:prstGeom>
+          <a:noFill/>
+          <a:ln>
+            <a:solidFill>
+              <a:schemeClr val="tx1"/>
+            </a:solidFill>
+          </a:ln>
+        </p:spPr>
+        <p:style>
+          <a:lnRef idx="2">
+            <a:schemeClr val="accent1">
+              <a:shade val="50000"/>
+            </a:schemeClr>
+          </a:lnRef>
+          <a:fillRef idx="1">
+            <a:schemeClr val="accent1"/>
+          </a:fillRef>
+          <a:effectRef idx="0">
+            <a:schemeClr val="accent1"/>
+          </a:effectRef>
+          <a:fontRef idx="minor">
+            <a:schemeClr val="lt1"/>
+          </a:fontRef>
+        </p:style>
+        <p:txBody>
+          <a:bodyPr rot="0" spcFirstLastPara="0" vert="horz" wrap="square" lIns="45720" tIns="0" rIns="45720" bIns="0" numCol="1" spcCol="0" rtlCol="0" fromWordArt="0" anchor="ctr" anchorCtr="0" forceAA="0" compatLnSpc="1">
+            <a:prstTxWarp prst="textNoShape">
+              <a:avLst/>
+            </a:prstTxWarp>
+            <a:noAutofit/>
+          </a:bodyPr>
+          <a:lstStyle/>
+          <a:p>
+            <a:pPr marL="0" marR="0" algn="ctr">
+              <a:lnSpc>
+                <a:spcPct val="107000"/>
+              </a:lnSpc>
+              <a:spcBef>
+                <a:spcPts val="0"/>
+              </a:spcBef>
+              <a:spcAft>
+                <a:spcPts val="800"/>
+              </a:spcAft>
+            </a:pPr>
+            <a:r>
+              <a:rPr lang="en-US" dirty="0">
+                <a:solidFill>
+                  <a:srgbClr val="000000"/>
+                </a:solidFill>
+                <a:ea typeface="DengXian" panose="02010600030101010101" pitchFamily="2" charset="-122"/>
+                <a:cs typeface="Times New Roman" panose="02020603050405020304" pitchFamily="18" charset="0"/>
+              </a:rPr>
+              <a:t>Classifier-E2</a:t>
+            </a:r>
+            <a:endParaRPr lang="en-US" dirty="0">
+              <a:effectLst/>
+              <a:ea typeface="DengXian" panose="02010600030101010101" pitchFamily="2" charset="-122"/>
+              <a:cs typeface="Times New Roman" panose="02020603050405020304" pitchFamily="18" charset="0"/>
+            </a:endParaRPr>
+          </a:p>
+        </p:txBody>
+      </p:sp>
+      <p:sp>
+        <p:nvSpPr>
+          <p:cNvPr id="77" name="Rectangle: Rounded Corners 76">
+            <a:extLst>
+              <a:ext uri="{FF2B5EF4-FFF2-40B4-BE49-F238E27FC236}">
+                <a16:creationId xmlns:a16="http://schemas.microsoft.com/office/drawing/2014/main" id="{6CBBF0C1-9E04-FCCA-9E5D-DAAFFC6405D9}"/>
+              </a:ext>
+            </a:extLst>
+          </p:cNvPr>
+          <p:cNvSpPr/>
+          <p:nvPr/>
+        </p:nvSpPr>
+        <p:spPr>
+          <a:xfrm>
+            <a:off x="6623321" y="3771527"/>
+            <a:ext cx="1266244" cy="304521"/>
+          </a:xfrm>
+          <a:prstGeom prst="roundRect">
+            <a:avLst>
+              <a:gd name="adj" fmla="val 0"/>
+            </a:avLst>
+          </a:prstGeom>
+          <a:noFill/>
+          <a:ln>
+            <a:solidFill>
+              <a:schemeClr val="tx1"/>
+            </a:solidFill>
+          </a:ln>
+        </p:spPr>
+        <p:style>
+          <a:lnRef idx="2">
+            <a:schemeClr val="accent1">
+              <a:shade val="50000"/>
+            </a:schemeClr>
+          </a:lnRef>
+          <a:fillRef idx="1">
+            <a:schemeClr val="accent1"/>
+          </a:fillRef>
+          <a:effectRef idx="0">
+            <a:schemeClr val="accent1"/>
+          </a:effectRef>
+          <a:fontRef idx="minor">
+            <a:schemeClr val="lt1"/>
+          </a:fontRef>
+        </p:style>
+        <p:txBody>
+          <a:bodyPr rot="0" spcFirstLastPara="0" vert="horz" wrap="square" lIns="45720" tIns="0" rIns="45720" bIns="0" numCol="1" spcCol="0" rtlCol="0" fromWordArt="0" anchor="ctr" anchorCtr="0" forceAA="0" compatLnSpc="1">
+            <a:prstTxWarp prst="textNoShape">
+              <a:avLst/>
+            </a:prstTxWarp>
+            <a:noAutofit/>
+          </a:bodyPr>
+          <a:lstStyle/>
+          <a:p>
+            <a:pPr marL="0" marR="0" algn="ctr">
+              <a:lnSpc>
+                <a:spcPct val="107000"/>
+              </a:lnSpc>
+              <a:spcBef>
+                <a:spcPts val="0"/>
+              </a:spcBef>
+              <a:spcAft>
+                <a:spcPts val="800"/>
+              </a:spcAft>
+            </a:pPr>
+            <a:r>
+              <a:rPr lang="en-US" dirty="0">
+                <a:solidFill>
+                  <a:srgbClr val="000000"/>
+                </a:solidFill>
+                <a:ea typeface="DengXian" panose="02010600030101010101" pitchFamily="2" charset="-122"/>
+                <a:cs typeface="Times New Roman" panose="02020603050405020304" pitchFamily="18" charset="0"/>
+              </a:rPr>
+              <a:t>Classifier-En</a:t>
+            </a:r>
+            <a:endParaRPr lang="en-US" dirty="0">
+              <a:effectLst/>
+              <a:ea typeface="DengXian" panose="02010600030101010101" pitchFamily="2" charset="-122"/>
+              <a:cs typeface="Times New Roman" panose="02020603050405020304" pitchFamily="18" charset="0"/>
+            </a:endParaRPr>
+          </a:p>
+        </p:txBody>
+      </p:sp>
+      <p:sp>
+        <p:nvSpPr>
+          <p:cNvPr id="33" name="TextBox 32">
+            <a:extLst>
+              <a:ext uri="{FF2B5EF4-FFF2-40B4-BE49-F238E27FC236}">
+                <a16:creationId xmlns:a16="http://schemas.microsoft.com/office/drawing/2014/main" id="{C014F0DB-B836-C7AC-970A-04F3E7982D5E}"/>
+              </a:ext>
+            </a:extLst>
+          </p:cNvPr>
+          <p:cNvSpPr txBox="1"/>
+          <p:nvPr/>
+        </p:nvSpPr>
+        <p:spPr>
+          <a:xfrm>
+            <a:off x="2696971" y="2930895"/>
+            <a:ext cx="1622309" cy="923330"/>
+          </a:xfrm>
+          <a:prstGeom prst="rect">
+            <a:avLst/>
+          </a:prstGeom>
+          <a:gradFill flip="none" rotWithShape="1">
+            <a:gsLst>
+              <a:gs pos="0">
+                <a:schemeClr val="accent5">
+                  <a:lumMod val="67000"/>
+                </a:schemeClr>
+              </a:gs>
+              <a:gs pos="48000">
+                <a:schemeClr val="accent5">
+                  <a:lumMod val="97000"/>
+                  <a:lumOff val="3000"/>
+                </a:schemeClr>
+              </a:gs>
+              <a:gs pos="100000">
+                <a:schemeClr val="accent5">
+                  <a:lumMod val="60000"/>
+                  <a:lumOff val="40000"/>
+                </a:schemeClr>
+              </a:gs>
+            </a:gsLst>
+            <a:lin ang="16200000" scaled="1"/>
+            <a:tileRect/>
+          </a:gradFill>
+          <a:ln>
+            <a:noFill/>
+          </a:ln>
+        </p:spPr>
+        <p:style>
+          <a:lnRef idx="0">
+            <a:scrgbClr r="0" g="0" b="0"/>
+          </a:lnRef>
+          <a:fillRef idx="0">
+            <a:scrgbClr r="0" g="0" b="0"/>
+          </a:fillRef>
+          <a:effectRef idx="0">
+            <a:scrgbClr r="0" g="0" b="0"/>
+          </a:effectRef>
+          <a:fontRef idx="minor">
+            <a:schemeClr val="lt1"/>
+          </a:fontRef>
+        </p:style>
+        <p:txBody>
+          <a:bodyPr wrap="square" rtlCol="0">
+            <a:spAutoFit/>
+          </a:bodyPr>
+          <a:lstStyle/>
+          <a:p>
+            <a:pPr algn="ctr"/>
+            <a:r>
+              <a:rPr lang="en-US" dirty="0"/>
+              <a:t>Feature Vector Representation Generation</a:t>
+            </a:r>
+          </a:p>
+        </p:txBody>
+      </p:sp>
+      <p:grpSp>
+        <p:nvGrpSpPr>
+          <p:cNvPr id="44" name="Group 43">
+            <a:extLst>
+              <a:ext uri="{FF2B5EF4-FFF2-40B4-BE49-F238E27FC236}">
+                <a16:creationId xmlns:a16="http://schemas.microsoft.com/office/drawing/2014/main" id="{E57511CB-7A12-32C7-0BED-5783DE6D5DCD}"/>
+              </a:ext>
+            </a:extLst>
+          </p:cNvPr>
+          <p:cNvGrpSpPr/>
+          <p:nvPr/>
+        </p:nvGrpSpPr>
+        <p:grpSpPr>
+          <a:xfrm>
+            <a:off x="4409364" y="2867524"/>
+            <a:ext cx="982626" cy="904003"/>
+            <a:chOff x="7927995" y="3600627"/>
+            <a:chExt cx="982626" cy="904003"/>
+          </a:xfrm>
+        </p:grpSpPr>
+        <p:grpSp>
+          <p:nvGrpSpPr>
+            <p:cNvPr id="45" name="Group 44">
+              <a:extLst>
+                <a:ext uri="{FF2B5EF4-FFF2-40B4-BE49-F238E27FC236}">
+                  <a16:creationId xmlns:a16="http://schemas.microsoft.com/office/drawing/2014/main" id="{3CBC3677-EF2D-D68C-673C-072D32CEE625}"/>
+                </a:ext>
+              </a:extLst>
+            </p:cNvPr>
+            <p:cNvGrpSpPr/>
+            <p:nvPr/>
+          </p:nvGrpSpPr>
+          <p:grpSpPr>
+            <a:xfrm>
+              <a:off x="8070834" y="3827808"/>
+              <a:ext cx="601598" cy="496651"/>
+              <a:chOff x="355600" y="488950"/>
+              <a:chExt cx="584200" cy="635961"/>
+            </a:xfrm>
+          </p:grpSpPr>
+          <p:sp>
+            <p:nvSpPr>
+              <p:cNvPr id="54" name="Oval 53">
+                <a:extLst>
+                  <a:ext uri="{FF2B5EF4-FFF2-40B4-BE49-F238E27FC236}">
+                    <a16:creationId xmlns:a16="http://schemas.microsoft.com/office/drawing/2014/main" id="{73B1F6B7-DFD8-1AC2-CDC2-A93894761917}"/>
+                  </a:ext>
+                </a:extLst>
+              </p:cNvPr>
+              <p:cNvSpPr/>
+              <p:nvPr/>
+            </p:nvSpPr>
+            <p:spPr>
+              <a:xfrm>
+                <a:off x="368300" y="488950"/>
+                <a:ext cx="114300" cy="115261"/>
+              </a:xfrm>
+              <a:prstGeom prst="ellipse">
+                <a:avLst/>
+              </a:prstGeom>
+              <a:solidFill>
+                <a:schemeClr val="accent2">
+                  <a:lumMod val="60000"/>
+                  <a:lumOff val="40000"/>
+                </a:schemeClr>
+              </a:solidFill>
+              <a:ln>
+                <a:solidFill>
+                  <a:srgbClr val="C00000"/>
+                </a:solidFill>
+              </a:ln>
+            </p:spPr>
+            <p:style>
+              <a:lnRef idx="2">
+                <a:schemeClr val="accent1">
+                  <a:shade val="50000"/>
+                </a:schemeClr>
+              </a:lnRef>
+              <a:fillRef idx="1">
+                <a:schemeClr val="accent1"/>
+              </a:fillRef>
+              <a:effectRef idx="0">
+                <a:schemeClr val="accent1"/>
+              </a:effectRef>
+              <a:fontRef idx="minor">
+                <a:schemeClr val="lt1"/>
+              </a:fontRef>
+            </p:style>
+            <p:txBody>
+              <a:bodyPr rot="0" spcFirstLastPara="0" vert="horz" wrap="square" lIns="91440" tIns="45720" rIns="91440" bIns="45720" numCol="1" spcCol="0" rtlCol="0" fromWordArt="0" anchor="ctr" anchorCtr="0" forceAA="0" compatLnSpc="1">
+                <a:prstTxWarp prst="textNoShape">
+                  <a:avLst/>
+                </a:prstTxWarp>
+                <a:noAutofit/>
+              </a:bodyPr>
+              <a:lstStyle/>
+              <a:p>
+                <a:endParaRPr lang="en-US" dirty="0">
+                  <a:solidFill>
+                    <a:srgbClr val="0070C0"/>
+                  </a:solidFill>
+                </a:endParaRPr>
+              </a:p>
+            </p:txBody>
+          </p:sp>
+          <p:sp>
+            <p:nvSpPr>
+              <p:cNvPr id="55" name="Oval 54">
+                <a:extLst>
+                  <a:ext uri="{FF2B5EF4-FFF2-40B4-BE49-F238E27FC236}">
+                    <a16:creationId xmlns:a16="http://schemas.microsoft.com/office/drawing/2014/main" id="{3EC51463-F980-4D76-F9A4-2B61C596AD96}"/>
+                  </a:ext>
+                </a:extLst>
+              </p:cNvPr>
+              <p:cNvSpPr/>
+              <p:nvPr/>
+            </p:nvSpPr>
+            <p:spPr>
+              <a:xfrm>
+                <a:off x="825500" y="539750"/>
+                <a:ext cx="114300" cy="115261"/>
+              </a:xfrm>
+              <a:prstGeom prst="ellipse">
+                <a:avLst/>
+              </a:prstGeom>
+              <a:solidFill>
+                <a:schemeClr val="accent4">
+                  <a:lumMod val="20000"/>
+                  <a:lumOff val="80000"/>
+                </a:schemeClr>
+              </a:solidFill>
+              <a:ln>
+                <a:solidFill>
+                  <a:schemeClr val="accent4">
+                    <a:lumMod val="60000"/>
+                    <a:lumOff val="40000"/>
+                  </a:schemeClr>
+                </a:solidFill>
+              </a:ln>
+            </p:spPr>
+            <p:style>
+              <a:lnRef idx="2">
+                <a:schemeClr val="accent1">
+                  <a:shade val="50000"/>
+                </a:schemeClr>
+              </a:lnRef>
+              <a:fillRef idx="1">
+                <a:schemeClr val="accent1"/>
+              </a:fillRef>
+              <a:effectRef idx="0">
+                <a:schemeClr val="accent1"/>
+              </a:effectRef>
+              <a:fontRef idx="minor">
+                <a:schemeClr val="lt1"/>
+              </a:fontRef>
+            </p:style>
+            <p:txBody>
+              <a:bodyPr rot="0" spcFirstLastPara="0" vert="horz" wrap="square" lIns="91440" tIns="45720" rIns="91440" bIns="45720" numCol="1" spcCol="0" rtlCol="0" fromWordArt="0" anchor="ctr" anchorCtr="0" forceAA="0" compatLnSpc="1">
+                <a:prstTxWarp prst="textNoShape">
+                  <a:avLst/>
+                </a:prstTxWarp>
+                <a:noAutofit/>
+              </a:bodyPr>
+              <a:lstStyle/>
+              <a:p>
+                <a:endParaRPr lang="en-US" dirty="0">
+                  <a:solidFill>
+                    <a:srgbClr val="0070C0"/>
+                  </a:solidFill>
+                </a:endParaRPr>
+              </a:p>
+            </p:txBody>
+          </p:sp>
+          <p:sp>
+            <p:nvSpPr>
+              <p:cNvPr id="57" name="Oval 56">
+                <a:extLst>
+                  <a:ext uri="{FF2B5EF4-FFF2-40B4-BE49-F238E27FC236}">
+                    <a16:creationId xmlns:a16="http://schemas.microsoft.com/office/drawing/2014/main" id="{AD49FCA0-D341-0FDC-CACD-3153C82480C1}"/>
+                  </a:ext>
+                </a:extLst>
+              </p:cNvPr>
+              <p:cNvSpPr/>
+              <p:nvPr/>
+            </p:nvSpPr>
+            <p:spPr>
+              <a:xfrm>
+                <a:off x="355600" y="1009650"/>
+                <a:ext cx="114300" cy="115261"/>
+              </a:xfrm>
+              <a:prstGeom prst="ellipse">
+                <a:avLst/>
+              </a:prstGeom>
+              <a:solidFill>
+                <a:schemeClr val="accent4">
+                  <a:lumMod val="20000"/>
+                  <a:lumOff val="80000"/>
+                </a:schemeClr>
+              </a:solidFill>
+              <a:ln>
+                <a:solidFill>
+                  <a:schemeClr val="accent4">
+                    <a:lumMod val="60000"/>
+                    <a:lumOff val="40000"/>
+                  </a:schemeClr>
+                </a:solidFill>
+              </a:ln>
+            </p:spPr>
+            <p:style>
+              <a:lnRef idx="2">
+                <a:schemeClr val="accent1">
+                  <a:shade val="50000"/>
+                </a:schemeClr>
+              </a:lnRef>
+              <a:fillRef idx="1">
+                <a:schemeClr val="accent1"/>
+              </a:fillRef>
+              <a:effectRef idx="0">
+                <a:schemeClr val="accent1"/>
+              </a:effectRef>
+              <a:fontRef idx="minor">
+                <a:schemeClr val="lt1"/>
+              </a:fontRef>
+            </p:style>
+            <p:txBody>
+              <a:bodyPr rot="0" spcFirstLastPara="0" vert="horz" wrap="square" lIns="91440" tIns="45720" rIns="91440" bIns="45720" numCol="1" spcCol="0" rtlCol="0" fromWordArt="0" anchor="ctr" anchorCtr="0" forceAA="0" compatLnSpc="1">
+                <a:prstTxWarp prst="textNoShape">
+                  <a:avLst/>
+                </a:prstTxWarp>
+                <a:noAutofit/>
+              </a:bodyPr>
+              <a:lstStyle/>
+              <a:p>
+                <a:endParaRPr lang="en-US" dirty="0">
+                  <a:solidFill>
+                    <a:srgbClr val="0070C0"/>
+                  </a:solidFill>
+                </a:endParaRPr>
+              </a:p>
+            </p:txBody>
+          </p:sp>
+        </p:grpSp>
+        <p:cxnSp>
+          <p:nvCxnSpPr>
+            <p:cNvPr id="46" name="Straight Arrow Connector 45">
+              <a:extLst>
+                <a:ext uri="{FF2B5EF4-FFF2-40B4-BE49-F238E27FC236}">
+                  <a16:creationId xmlns:a16="http://schemas.microsoft.com/office/drawing/2014/main" id="{BF896366-A34A-493B-3396-66FF12246D15}"/>
+                </a:ext>
+              </a:extLst>
+            </p:cNvPr>
+            <p:cNvCxnSpPr>
+              <a:stCxn id="57" idx="7"/>
+              <a:endCxn id="55" idx="3"/>
+            </p:cNvCxnSpPr>
+            <p:nvPr/>
+          </p:nvCxnSpPr>
+          <p:spPr>
+            <a:xfrm flipV="1">
+              <a:off x="8171302" y="3944072"/>
+              <a:ext cx="400665" cy="303173"/>
+            </a:xfrm>
+            <a:prstGeom prst="straightConnector1">
+              <a:avLst/>
+            </a:prstGeom>
+            <a:ln w="12700">
+              <a:solidFill>
+                <a:schemeClr val="tx1"/>
+              </a:solidFill>
+              <a:tailEnd type="triangle" w="sm" len="med"/>
+            </a:ln>
+          </p:spPr>
+          <p:style>
+            <a:lnRef idx="1">
+              <a:schemeClr val="accent1"/>
+            </a:lnRef>
+            <a:fillRef idx="0">
+              <a:schemeClr val="accent1"/>
+            </a:fillRef>
+            <a:effectRef idx="0">
+              <a:schemeClr val="accent1"/>
+            </a:effectRef>
+            <a:fontRef idx="minor">
+              <a:schemeClr val="tx1"/>
+            </a:fontRef>
+          </p:style>
+        </p:cxnSp>
+        <p:cxnSp>
+          <p:nvCxnSpPr>
+            <p:cNvPr id="48" name="Straight Arrow Connector 47">
+              <a:extLst>
+                <a:ext uri="{FF2B5EF4-FFF2-40B4-BE49-F238E27FC236}">
+                  <a16:creationId xmlns:a16="http://schemas.microsoft.com/office/drawing/2014/main" id="{D9F900D0-BAD0-7951-5D3F-B151724AD2E5}"/>
+                </a:ext>
+              </a:extLst>
+            </p:cNvPr>
+            <p:cNvCxnSpPr>
+              <a:endCxn id="57" idx="3"/>
+            </p:cNvCxnSpPr>
+            <p:nvPr/>
+          </p:nvCxnSpPr>
+          <p:spPr>
+            <a:xfrm flipV="1">
+              <a:off x="7927995" y="4310887"/>
+              <a:ext cx="159610" cy="192944"/>
+            </a:xfrm>
+            <a:prstGeom prst="straightConnector1">
+              <a:avLst/>
+            </a:prstGeom>
+            <a:ln w="12700">
+              <a:solidFill>
+                <a:schemeClr val="tx1"/>
+              </a:solidFill>
+              <a:tailEnd type="triangle" w="sm" len="med"/>
+            </a:ln>
+          </p:spPr>
+          <p:style>
+            <a:lnRef idx="1">
+              <a:schemeClr val="accent1"/>
+            </a:lnRef>
+            <a:fillRef idx="0">
+              <a:schemeClr val="accent1"/>
+            </a:fillRef>
+            <a:effectRef idx="0">
+              <a:schemeClr val="accent1"/>
+            </a:effectRef>
+            <a:fontRef idx="minor">
+              <a:schemeClr val="tx1"/>
+            </a:fontRef>
+          </p:style>
+        </p:cxnSp>
+        <p:cxnSp>
+          <p:nvCxnSpPr>
+            <p:cNvPr id="49" name="Straight Arrow Connector 48">
+              <a:extLst>
+                <a:ext uri="{FF2B5EF4-FFF2-40B4-BE49-F238E27FC236}">
+                  <a16:creationId xmlns:a16="http://schemas.microsoft.com/office/drawing/2014/main" id="{B45EEAA6-4BCF-4249-E64B-E437360DDF15}"/>
+                </a:ext>
+              </a:extLst>
+            </p:cNvPr>
+            <p:cNvCxnSpPr>
+              <a:stCxn id="57" idx="0"/>
+              <a:endCxn id="54" idx="4"/>
+            </p:cNvCxnSpPr>
+            <p:nvPr/>
+          </p:nvCxnSpPr>
+          <p:spPr>
+            <a:xfrm flipV="1">
+              <a:off x="8129687" y="3917595"/>
+              <a:ext cx="13078" cy="316474"/>
+            </a:xfrm>
+            <a:prstGeom prst="straightConnector1">
+              <a:avLst/>
+            </a:prstGeom>
+            <a:ln w="12700">
+              <a:solidFill>
+                <a:schemeClr val="tx1"/>
+              </a:solidFill>
+              <a:tailEnd type="triangle" w="sm" len="med"/>
+            </a:ln>
+          </p:spPr>
+          <p:style>
+            <a:lnRef idx="1">
+              <a:schemeClr val="accent1"/>
+            </a:lnRef>
+            <a:fillRef idx="0">
+              <a:schemeClr val="accent1"/>
+            </a:fillRef>
+            <a:effectRef idx="0">
+              <a:schemeClr val="accent1"/>
+            </a:effectRef>
+            <a:fontRef idx="minor">
+              <a:schemeClr val="tx1"/>
+            </a:fontRef>
+          </p:style>
+        </p:cxnSp>
+        <p:cxnSp>
+          <p:nvCxnSpPr>
+            <p:cNvPr id="50" name="Straight Arrow Connector 49">
+              <a:extLst>
+                <a:ext uri="{FF2B5EF4-FFF2-40B4-BE49-F238E27FC236}">
+                  <a16:creationId xmlns:a16="http://schemas.microsoft.com/office/drawing/2014/main" id="{BD1145B6-7A9F-42CB-2046-AA280F1DC954}"/>
+                </a:ext>
+              </a:extLst>
+            </p:cNvPr>
+            <p:cNvCxnSpPr>
+              <a:stCxn id="55" idx="2"/>
+              <a:endCxn id="54" idx="6"/>
+            </p:cNvCxnSpPr>
+            <p:nvPr/>
+          </p:nvCxnSpPr>
+          <p:spPr>
+            <a:xfrm flipH="1" flipV="1">
+              <a:off x="8201617" y="3872611"/>
+              <a:ext cx="353111" cy="39653"/>
+            </a:xfrm>
+            <a:prstGeom prst="straightConnector1">
+              <a:avLst/>
+            </a:prstGeom>
+            <a:ln w="12700">
+              <a:solidFill>
+                <a:schemeClr val="tx1"/>
+              </a:solidFill>
+              <a:tailEnd type="triangle" w="sm" len="med"/>
+            </a:ln>
+          </p:spPr>
+          <p:style>
+            <a:lnRef idx="1">
+              <a:schemeClr val="accent1"/>
+            </a:lnRef>
+            <a:fillRef idx="0">
+              <a:schemeClr val="accent1"/>
+            </a:fillRef>
+            <a:effectRef idx="0">
+              <a:schemeClr val="accent1"/>
+            </a:effectRef>
+            <a:fontRef idx="minor">
+              <a:schemeClr val="tx1"/>
+            </a:fontRef>
+          </p:style>
+        </p:cxnSp>
+        <p:sp>
+          <p:nvSpPr>
+            <p:cNvPr id="51" name="Text Box 2">
+              <a:extLst>
+                <a:ext uri="{FF2B5EF4-FFF2-40B4-BE49-F238E27FC236}">
+                  <a16:creationId xmlns:a16="http://schemas.microsoft.com/office/drawing/2014/main" id="{F8EDE234-30FF-A306-98FB-22DFF553FE54}"/>
+                </a:ext>
+              </a:extLst>
+            </p:cNvPr>
+            <p:cNvSpPr txBox="1">
+              <a:spLocks noChangeArrowheads="1"/>
+            </p:cNvSpPr>
+            <p:nvPr/>
+          </p:nvSpPr>
+          <p:spPr bwMode="auto">
+            <a:xfrm>
+              <a:off x="8171302" y="3600627"/>
+              <a:ext cx="410107" cy="231134"/>
+            </a:xfrm>
+            <a:prstGeom prst="rect">
+              <a:avLst/>
+            </a:prstGeom>
+            <a:noFill/>
+            <a:ln w="9525">
+              <a:noFill/>
+              <a:miter lim="800000"/>
+              <a:headEnd/>
+              <a:tailEnd/>
+            </a:ln>
+          </p:spPr>
+          <p:txBody>
+            <a:bodyPr rot="0" vert="horz" wrap="square" lIns="91440" tIns="45720" rIns="91440" bIns="45720" anchor="t" anchorCtr="0">
+              <a:noAutofit/>
+            </a:bodyPr>
+            <a:lstStyle/>
+            <a:p>
+              <a:pPr marL="0" marR="0">
+                <a:lnSpc>
+                  <a:spcPct val="107000"/>
+                </a:lnSpc>
+                <a:spcBef>
+                  <a:spcPts val="0"/>
+                </a:spcBef>
+                <a:spcAft>
+                  <a:spcPts val="800"/>
+                </a:spcAft>
+              </a:pPr>
+              <a:r>
+                <a:rPr lang="en-US" sz="1200" dirty="0">
+                  <a:solidFill>
+                    <a:srgbClr val="0070C0"/>
+                  </a:solidFill>
+                  <a:effectLst/>
+                  <a:latin typeface="Calibri" panose="020F0502020204030204" pitchFamily="34" charset="0"/>
+                  <a:ea typeface="DengXian" panose="02010600030101010101" pitchFamily="2" charset="-122"/>
+                  <a:cs typeface="Times New Roman" panose="02020603050405020304" pitchFamily="18" charset="0"/>
+                </a:rPr>
+                <a:t>V3</a:t>
+              </a:r>
+              <a:endParaRPr lang="en-US" sz="1100" dirty="0">
+                <a:solidFill>
+                  <a:srgbClr val="0070C0"/>
+                </a:solidFill>
+                <a:effectLst/>
+                <a:latin typeface="Calibri" panose="020F0502020204030204" pitchFamily="34" charset="0"/>
+                <a:ea typeface="DengXian" panose="02010600030101010101" pitchFamily="2" charset="-122"/>
+                <a:cs typeface="Times New Roman" panose="02020603050405020304" pitchFamily="18" charset="0"/>
+              </a:endParaRPr>
+            </a:p>
+          </p:txBody>
+        </p:sp>
+        <p:sp>
+          <p:nvSpPr>
+            <p:cNvPr id="52" name="Text Box 2">
+              <a:extLst>
+                <a:ext uri="{FF2B5EF4-FFF2-40B4-BE49-F238E27FC236}">
+                  <a16:creationId xmlns:a16="http://schemas.microsoft.com/office/drawing/2014/main" id="{E211E4CC-EF03-9B8F-32FC-15C82BEE2F7C}"/>
+                </a:ext>
+              </a:extLst>
+            </p:cNvPr>
+            <p:cNvSpPr txBox="1">
+              <a:spLocks noChangeArrowheads="1"/>
+            </p:cNvSpPr>
+            <p:nvPr/>
+          </p:nvSpPr>
+          <p:spPr bwMode="auto">
+            <a:xfrm>
+              <a:off x="8500514" y="3625609"/>
+              <a:ext cx="410107" cy="231134"/>
+            </a:xfrm>
+            <a:prstGeom prst="rect">
+              <a:avLst/>
+            </a:prstGeom>
+            <a:noFill/>
+            <a:ln w="9525">
+              <a:noFill/>
+              <a:miter lim="800000"/>
+              <a:headEnd/>
+              <a:tailEnd/>
+            </a:ln>
+          </p:spPr>
+          <p:txBody>
+            <a:bodyPr rot="0" vert="horz" wrap="square" lIns="91440" tIns="45720" rIns="91440" bIns="45720" anchor="t" anchorCtr="0">
+              <a:noAutofit/>
+            </a:bodyPr>
+            <a:lstStyle/>
+            <a:p>
+              <a:pPr marL="0" marR="0">
+                <a:lnSpc>
+                  <a:spcPct val="107000"/>
+                </a:lnSpc>
+                <a:spcBef>
+                  <a:spcPts val="0"/>
+                </a:spcBef>
+                <a:spcAft>
+                  <a:spcPts val="800"/>
+                </a:spcAft>
+              </a:pPr>
+              <a:r>
+                <a:rPr lang="en-US" sz="1200" dirty="0">
+                  <a:solidFill>
+                    <a:srgbClr val="0070C0"/>
+                  </a:solidFill>
+                  <a:effectLst/>
+                  <a:latin typeface="Calibri" panose="020F0502020204030204" pitchFamily="34" charset="0"/>
+                  <a:ea typeface="DengXian" panose="02010600030101010101" pitchFamily="2" charset="-122"/>
+                  <a:cs typeface="Times New Roman" panose="02020603050405020304" pitchFamily="18" charset="0"/>
+                </a:rPr>
+                <a:t>V4</a:t>
+              </a:r>
+              <a:endParaRPr lang="en-US" sz="1100" dirty="0">
+                <a:solidFill>
+                  <a:srgbClr val="0070C0"/>
+                </a:solidFill>
+                <a:effectLst/>
+                <a:latin typeface="Calibri" panose="020F0502020204030204" pitchFamily="34" charset="0"/>
+                <a:ea typeface="DengXian" panose="02010600030101010101" pitchFamily="2" charset="-122"/>
+                <a:cs typeface="Times New Roman" panose="02020603050405020304" pitchFamily="18" charset="0"/>
+              </a:endParaRPr>
+            </a:p>
+          </p:txBody>
+        </p:sp>
+        <p:sp>
+          <p:nvSpPr>
+            <p:cNvPr id="53" name="Text Box 2">
+              <a:extLst>
+                <a:ext uri="{FF2B5EF4-FFF2-40B4-BE49-F238E27FC236}">
+                  <a16:creationId xmlns:a16="http://schemas.microsoft.com/office/drawing/2014/main" id="{FC7AF492-FD60-3D60-917D-979F03E0980D}"/>
+                </a:ext>
+              </a:extLst>
+            </p:cNvPr>
+            <p:cNvSpPr txBox="1">
+              <a:spLocks noChangeArrowheads="1"/>
+            </p:cNvSpPr>
+            <p:nvPr/>
+          </p:nvSpPr>
+          <p:spPr bwMode="auto">
+            <a:xfrm>
+              <a:off x="8093647" y="4273496"/>
+              <a:ext cx="410107" cy="231134"/>
+            </a:xfrm>
+            <a:prstGeom prst="rect">
+              <a:avLst/>
+            </a:prstGeom>
+            <a:noFill/>
+            <a:ln w="9525">
+              <a:noFill/>
+              <a:miter lim="800000"/>
+              <a:headEnd/>
+              <a:tailEnd/>
+            </a:ln>
+          </p:spPr>
+          <p:txBody>
+            <a:bodyPr rot="0" vert="horz" wrap="square" lIns="91440" tIns="45720" rIns="91440" bIns="45720" anchor="t" anchorCtr="0">
+              <a:noAutofit/>
+            </a:bodyPr>
+            <a:lstStyle/>
+            <a:p>
+              <a:pPr marL="0" marR="0">
+                <a:lnSpc>
+                  <a:spcPct val="107000"/>
+                </a:lnSpc>
+                <a:spcBef>
+                  <a:spcPts val="0"/>
+                </a:spcBef>
+                <a:spcAft>
+                  <a:spcPts val="800"/>
+                </a:spcAft>
+              </a:pPr>
+              <a:r>
+                <a:rPr lang="en-US" sz="1200" dirty="0">
+                  <a:solidFill>
+                    <a:srgbClr val="0070C0"/>
+                  </a:solidFill>
+                  <a:effectLst/>
+                  <a:latin typeface="Calibri" panose="020F0502020204030204" pitchFamily="34" charset="0"/>
+                  <a:ea typeface="DengXian" panose="02010600030101010101" pitchFamily="2" charset="-122"/>
+                  <a:cs typeface="Times New Roman" panose="02020603050405020304" pitchFamily="18" charset="0"/>
+                </a:rPr>
+                <a:t>V5</a:t>
+              </a:r>
+              <a:endParaRPr lang="en-US" sz="1100" dirty="0">
+                <a:solidFill>
+                  <a:srgbClr val="0070C0"/>
+                </a:solidFill>
+                <a:effectLst/>
+                <a:latin typeface="Calibri" panose="020F0502020204030204" pitchFamily="34" charset="0"/>
+                <a:ea typeface="DengXian" panose="02010600030101010101" pitchFamily="2" charset="-122"/>
+                <a:cs typeface="Times New Roman" panose="02020603050405020304" pitchFamily="18" charset="0"/>
+              </a:endParaRPr>
+            </a:p>
+          </p:txBody>
+        </p:sp>
+      </p:grpSp>
+      <p:cxnSp>
+        <p:nvCxnSpPr>
+          <p:cNvPr id="59" name="Straight Arrow Connector 58">
+            <a:extLst>
+              <a:ext uri="{FF2B5EF4-FFF2-40B4-BE49-F238E27FC236}">
+                <a16:creationId xmlns:a16="http://schemas.microsoft.com/office/drawing/2014/main" id="{EB8A2C3A-F795-C0FE-BE84-DE92DF21B93A}"/>
+              </a:ext>
+            </a:extLst>
+          </p:cNvPr>
+          <p:cNvCxnSpPr>
+            <a:cxnSpLocks/>
+          </p:cNvCxnSpPr>
+          <p:nvPr/>
+        </p:nvCxnSpPr>
+        <p:spPr>
+          <a:xfrm>
+            <a:off x="4317622" y="3395912"/>
+            <a:ext cx="188961" cy="0"/>
+          </a:xfrm>
+          <a:prstGeom prst="straightConnector1">
+            <a:avLst/>
+          </a:prstGeom>
+          <a:ln w="12700">
+            <a:tailEnd type="triangle"/>
+          </a:ln>
+        </p:spPr>
+        <p:style>
+          <a:lnRef idx="1">
+            <a:schemeClr val="dk1"/>
+          </a:lnRef>
+          <a:fillRef idx="0">
+            <a:schemeClr val="dk1"/>
+          </a:fillRef>
+          <a:effectRef idx="0">
+            <a:schemeClr val="dk1"/>
+          </a:effectRef>
+          <a:fontRef idx="minor">
+            <a:schemeClr val="tx1"/>
+          </a:fontRef>
+        </p:style>
+      </p:cxnSp>
+      <p:cxnSp>
+        <p:nvCxnSpPr>
+          <p:cNvPr id="61" name="Straight Arrow Connector 60">
+            <a:extLst>
+              <a:ext uri="{FF2B5EF4-FFF2-40B4-BE49-F238E27FC236}">
+                <a16:creationId xmlns:a16="http://schemas.microsoft.com/office/drawing/2014/main" id="{AF184929-70C2-0BDC-C11C-DDE6195767B8}"/>
+              </a:ext>
+            </a:extLst>
+          </p:cNvPr>
+          <p:cNvCxnSpPr>
+            <a:cxnSpLocks/>
+          </p:cNvCxnSpPr>
+          <p:nvPr/>
+        </p:nvCxnSpPr>
+        <p:spPr>
+          <a:xfrm>
+            <a:off x="5036453" y="3403423"/>
+            <a:ext cx="188961" cy="0"/>
+          </a:xfrm>
+          <a:prstGeom prst="straightConnector1">
+            <a:avLst/>
+          </a:prstGeom>
+          <a:ln w="12700">
+            <a:tailEnd type="triangle"/>
+          </a:ln>
+        </p:spPr>
+        <p:style>
+          <a:lnRef idx="1">
+            <a:schemeClr val="dk1"/>
+          </a:lnRef>
+          <a:fillRef idx="0">
+            <a:schemeClr val="dk1"/>
+          </a:fillRef>
+          <a:effectRef idx="0">
+            <a:schemeClr val="dk1"/>
+          </a:effectRef>
+          <a:fontRef idx="minor">
+            <a:schemeClr val="tx1"/>
+          </a:fontRef>
+        </p:style>
+      </p:cxnSp>
+      <p:cxnSp>
+        <p:nvCxnSpPr>
+          <p:cNvPr id="67" name="Straight Arrow Connector 66">
+            <a:extLst>
+              <a:ext uri="{FF2B5EF4-FFF2-40B4-BE49-F238E27FC236}">
+                <a16:creationId xmlns:a16="http://schemas.microsoft.com/office/drawing/2014/main" id="{DEE6ED0B-6471-B067-1BEE-82275E575D9F}"/>
+              </a:ext>
+            </a:extLst>
+          </p:cNvPr>
+          <p:cNvCxnSpPr>
+            <a:cxnSpLocks/>
+          </p:cNvCxnSpPr>
+          <p:nvPr/>
+        </p:nvCxnSpPr>
+        <p:spPr>
+          <a:xfrm>
+            <a:off x="7889565" y="3913874"/>
+            <a:ext cx="243840" cy="0"/>
+          </a:xfrm>
+          <a:prstGeom prst="straightConnector1">
+            <a:avLst/>
+          </a:prstGeom>
+          <a:ln w="12700">
+            <a:tailEnd type="triangle"/>
+          </a:ln>
+        </p:spPr>
+        <p:style>
+          <a:lnRef idx="1">
+            <a:schemeClr val="dk1"/>
+          </a:lnRef>
+          <a:fillRef idx="0">
+            <a:schemeClr val="dk1"/>
+          </a:fillRef>
+          <a:effectRef idx="0">
+            <a:schemeClr val="dk1"/>
+          </a:effectRef>
+          <a:fontRef idx="minor">
+            <a:schemeClr val="tx1"/>
+          </a:fontRef>
+        </p:style>
+      </p:cxnSp>
+    </p:spTree>
+    <p:extLst>
+      <p:ext uri="{BB962C8B-B14F-4D97-AF65-F5344CB8AC3E}">
+        <p14:creationId xmlns:p14="http://schemas.microsoft.com/office/powerpoint/2010/main" val="1728621476"/>
+      </p:ext>
+    </p:extLst>
+  </p:cSld>
+  <p:clrMapOvr>
+    <a:masterClrMapping/>
+  </p:clrMapOvr>
+</p:sld>
+</file>
+
 <file path=ppt/theme/theme1.xml><?xml version="1.0" encoding="utf-8"?>
 <a:theme xmlns:a="http://schemas.openxmlformats.org/drawingml/2006/main" name="Office Theme">
   <a:themeElements>

</xml_diff>

<commit_message>
fixing the figures 5-7
</commit_message>
<xml_diff>
--- a/figures.pptx
+++ b/figures.pptx
@@ -10,6 +10,7 @@
     <p:sldId id="267" r:id="rId4"/>
     <p:sldId id="268" r:id="rId5"/>
     <p:sldId id="269" r:id="rId6"/>
+    <p:sldId id="270" r:id="rId7"/>
   </p:sldIdLst>
   <p:sldSz cx="12192000" cy="6858000"/>
   <p:notesSz cx="6858000" cy="9144000"/>
@@ -263,7 +264,7 @@
           <a:p>
             <a:fld id="{3B59329A-BA38-4FE8-9E62-5F36CCE25C86}" type="datetimeFigureOut">
               <a:rPr lang="en-US" smtClean="0"/>
-              <a:t>3/19/2023</a:t>
+              <a:t>3/22/2023</a:t>
             </a:fld>
             <a:endParaRPr lang="en-US"/>
           </a:p>
@@ -461,7 +462,7 @@
           <a:p>
             <a:fld id="{3B59329A-BA38-4FE8-9E62-5F36CCE25C86}" type="datetimeFigureOut">
               <a:rPr lang="en-US" smtClean="0"/>
-              <a:t>3/19/2023</a:t>
+              <a:t>3/22/2023</a:t>
             </a:fld>
             <a:endParaRPr lang="en-US"/>
           </a:p>
@@ -669,7 +670,7 @@
           <a:p>
             <a:fld id="{3B59329A-BA38-4FE8-9E62-5F36CCE25C86}" type="datetimeFigureOut">
               <a:rPr lang="en-US" smtClean="0"/>
-              <a:t>3/19/2023</a:t>
+              <a:t>3/22/2023</a:t>
             </a:fld>
             <a:endParaRPr lang="en-US"/>
           </a:p>
@@ -867,7 +868,7 @@
           <a:p>
             <a:fld id="{3B59329A-BA38-4FE8-9E62-5F36CCE25C86}" type="datetimeFigureOut">
               <a:rPr lang="en-US" smtClean="0"/>
-              <a:t>3/19/2023</a:t>
+              <a:t>3/22/2023</a:t>
             </a:fld>
             <a:endParaRPr lang="en-US"/>
           </a:p>
@@ -1142,7 +1143,7 @@
           <a:p>
             <a:fld id="{3B59329A-BA38-4FE8-9E62-5F36CCE25C86}" type="datetimeFigureOut">
               <a:rPr lang="en-US" smtClean="0"/>
-              <a:t>3/19/2023</a:t>
+              <a:t>3/22/2023</a:t>
             </a:fld>
             <a:endParaRPr lang="en-US"/>
           </a:p>
@@ -1407,7 +1408,7 @@
           <a:p>
             <a:fld id="{3B59329A-BA38-4FE8-9E62-5F36CCE25C86}" type="datetimeFigureOut">
               <a:rPr lang="en-US" smtClean="0"/>
-              <a:t>3/19/2023</a:t>
+              <a:t>3/22/2023</a:t>
             </a:fld>
             <a:endParaRPr lang="en-US"/>
           </a:p>
@@ -1819,7 +1820,7 @@
           <a:p>
             <a:fld id="{3B59329A-BA38-4FE8-9E62-5F36CCE25C86}" type="datetimeFigureOut">
               <a:rPr lang="en-US" smtClean="0"/>
-              <a:t>3/19/2023</a:t>
+              <a:t>3/22/2023</a:t>
             </a:fld>
             <a:endParaRPr lang="en-US"/>
           </a:p>
@@ -1960,7 +1961,7 @@
           <a:p>
             <a:fld id="{3B59329A-BA38-4FE8-9E62-5F36CCE25C86}" type="datetimeFigureOut">
               <a:rPr lang="en-US" smtClean="0"/>
-              <a:t>3/19/2023</a:t>
+              <a:t>3/22/2023</a:t>
             </a:fld>
             <a:endParaRPr lang="en-US"/>
           </a:p>
@@ -2073,7 +2074,7 @@
           <a:p>
             <a:fld id="{3B59329A-BA38-4FE8-9E62-5F36CCE25C86}" type="datetimeFigureOut">
               <a:rPr lang="en-US" smtClean="0"/>
-              <a:t>3/19/2023</a:t>
+              <a:t>3/22/2023</a:t>
             </a:fld>
             <a:endParaRPr lang="en-US"/>
           </a:p>
@@ -2384,7 +2385,7 @@
           <a:p>
             <a:fld id="{3B59329A-BA38-4FE8-9E62-5F36CCE25C86}" type="datetimeFigureOut">
               <a:rPr lang="en-US" smtClean="0"/>
-              <a:t>3/19/2023</a:t>
+              <a:t>3/22/2023</a:t>
             </a:fld>
             <a:endParaRPr lang="en-US"/>
           </a:p>
@@ -2672,7 +2673,7 @@
           <a:p>
             <a:fld id="{3B59329A-BA38-4FE8-9E62-5F36CCE25C86}" type="datetimeFigureOut">
               <a:rPr lang="en-US" smtClean="0"/>
-              <a:t>3/19/2023</a:t>
+              <a:t>3/22/2023</a:t>
             </a:fld>
             <a:endParaRPr lang="en-US"/>
           </a:p>
@@ -2913,7 +2914,7 @@
           <a:p>
             <a:fld id="{3B59329A-BA38-4FE8-9E62-5F36CCE25C86}" type="datetimeFigureOut">
               <a:rPr lang="en-US" smtClean="0"/>
-              <a:t>3/19/2023</a:t>
+              <a:t>3/22/2023</a:t>
             </a:fld>
             <a:endParaRPr lang="en-US"/>
           </a:p>
@@ -3387,8 +3388,8 @@
         </p:nvSpPr>
         <p:spPr>
           <a:xfrm>
-            <a:off x="2494483" y="3052568"/>
-            <a:ext cx="759294" cy="646331"/>
+            <a:off x="2437882" y="3185092"/>
+            <a:ext cx="816581" cy="369332"/>
           </a:xfrm>
           <a:prstGeom prst="rect">
             <a:avLst/>
@@ -3458,14 +3459,15 @@
             </a:extLst>
           </p:cNvPr>
           <p:cNvCxnSpPr>
+            <a:cxnSpLocks/>
             <a:stCxn id="24" idx="3"/>
           </p:cNvCxnSpPr>
           <p:nvPr/>
         </p:nvCxnSpPr>
         <p:spPr>
           <a:xfrm flipV="1">
-            <a:off x="3253777" y="2995482"/>
-            <a:ext cx="329864" cy="380252"/>
+            <a:off x="3254463" y="3128006"/>
+            <a:ext cx="329864" cy="241752"/>
           </a:xfrm>
           <a:prstGeom prst="straightConnector1">
             <a:avLst/>
@@ -3544,7 +3546,7 @@
         </p:nvSpPr>
         <p:spPr>
           <a:xfrm>
-            <a:off x="3408851" y="2660786"/>
+            <a:off x="3348182" y="2775116"/>
             <a:ext cx="455574" cy="369332"/>
           </a:xfrm>
           <a:prstGeom prst="rect">
@@ -3616,7 +3618,7 @@
         </p:nvGrpSpPr>
         <p:grpSpPr>
           <a:xfrm>
-            <a:off x="922368" y="2823939"/>
+            <a:off x="873103" y="2830901"/>
             <a:ext cx="1580075" cy="1375459"/>
             <a:chOff x="914408" y="2830660"/>
             <a:chExt cx="1580075" cy="1375459"/>
@@ -4429,7 +4431,7 @@
                 </a:spcAft>
               </a:pPr>
               <a:r>
-                <a:rPr lang="en-US" sz="1200" dirty="0">
+                <a:rPr lang="en-US" sz="1600" dirty="0">
                   <a:solidFill>
                     <a:srgbClr val="0070C0"/>
                   </a:solidFill>
@@ -4440,15 +4442,6 @@
                 </a:rPr>
                 <a:t>S1</a:t>
               </a:r>
-              <a:endParaRPr lang="en-US" sz="1100" dirty="0">
-                <a:solidFill>
-                  <a:srgbClr val="0070C0"/>
-                </a:solidFill>
-                <a:effectLst/>
-                <a:latin typeface="Calibri" panose="020F0502020204030204" pitchFamily="34" charset="0"/>
-                <a:ea typeface="DengXian" panose="02010600030101010101" pitchFamily="2" charset="-122"/>
-                <a:cs typeface="Times New Roman" panose="02020603050405020304" pitchFamily="18" charset="0"/>
-              </a:endParaRPr>
             </a:p>
           </p:txBody>
         </p:sp>
@@ -4500,7 +4493,7 @@
                 </a:spcAft>
               </a:pPr>
               <a:r>
-                <a:rPr lang="en-US" sz="1200" dirty="0">
+                <a:rPr lang="en-US" sz="1600" dirty="0">
                   <a:solidFill>
                     <a:srgbClr val="0070C0"/>
                   </a:solidFill>
@@ -4511,15 +4504,6 @@
                 </a:rPr>
                 <a:t>S2</a:t>
               </a:r>
-              <a:endParaRPr lang="en-US" sz="1100" dirty="0">
-                <a:solidFill>
-                  <a:srgbClr val="0070C0"/>
-                </a:solidFill>
-                <a:effectLst/>
-                <a:latin typeface="Calibri" panose="020F0502020204030204" pitchFamily="34" charset="0"/>
-                <a:ea typeface="DengXian" panose="02010600030101010101" pitchFamily="2" charset="-122"/>
-                <a:cs typeface="Times New Roman" panose="02020603050405020304" pitchFamily="18" charset="0"/>
-              </a:endParaRPr>
             </a:p>
           </p:txBody>
         </p:sp>
@@ -4571,7 +4555,7 @@
                 </a:spcAft>
               </a:pPr>
               <a:r>
-                <a:rPr lang="en-US" sz="1200" dirty="0">
+                <a:rPr lang="en-US" sz="1600" dirty="0">
                   <a:solidFill>
                     <a:srgbClr val="0070C0"/>
                   </a:solidFill>
@@ -4582,15 +4566,6 @@
                 </a:rPr>
                 <a:t>S3</a:t>
               </a:r>
-              <a:endParaRPr lang="en-US" sz="1100" dirty="0">
-                <a:solidFill>
-                  <a:srgbClr val="0070C0"/>
-                </a:solidFill>
-                <a:effectLst/>
-                <a:latin typeface="Calibri" panose="020F0502020204030204" pitchFamily="34" charset="0"/>
-                <a:ea typeface="DengXian" panose="02010600030101010101" pitchFamily="2" charset="-122"/>
-                <a:cs typeface="Times New Roman" panose="02020603050405020304" pitchFamily="18" charset="0"/>
-              </a:endParaRPr>
             </a:p>
           </p:txBody>
         </p:sp>
@@ -4642,7 +4617,7 @@
                 </a:spcAft>
               </a:pPr>
               <a:r>
-                <a:rPr lang="en-US" sz="1200" dirty="0">
+                <a:rPr lang="en-US" sz="1600" dirty="0">
                   <a:solidFill>
                     <a:srgbClr val="0070C0"/>
                   </a:solidFill>
@@ -4653,15 +4628,6 @@
                 </a:rPr>
                 <a:t>S4</a:t>
               </a:r>
-              <a:endParaRPr lang="en-US" sz="1100" dirty="0">
-                <a:solidFill>
-                  <a:srgbClr val="0070C0"/>
-                </a:solidFill>
-                <a:effectLst/>
-                <a:latin typeface="Calibri" panose="020F0502020204030204" pitchFamily="34" charset="0"/>
-                <a:ea typeface="DengXian" panose="02010600030101010101" pitchFamily="2" charset="-122"/>
-                <a:cs typeface="Times New Roman" panose="02020603050405020304" pitchFamily="18" charset="0"/>
-              </a:endParaRPr>
             </a:p>
           </p:txBody>
         </p:sp>
@@ -4713,7 +4679,7 @@
                 </a:spcAft>
               </a:pPr>
               <a:r>
-                <a:rPr lang="en-US" sz="1200" dirty="0">
+                <a:rPr lang="en-US" sz="1600" dirty="0">
                   <a:solidFill>
                     <a:srgbClr val="0070C0"/>
                   </a:solidFill>
@@ -4724,15 +4690,6 @@
                 </a:rPr>
                 <a:t>S5</a:t>
               </a:r>
-              <a:endParaRPr lang="en-US" sz="1100" dirty="0">
-                <a:solidFill>
-                  <a:srgbClr val="0070C0"/>
-                </a:solidFill>
-                <a:effectLst/>
-                <a:latin typeface="Calibri" panose="020F0502020204030204" pitchFamily="34" charset="0"/>
-                <a:ea typeface="DengXian" panose="02010600030101010101" pitchFamily="2" charset="-122"/>
-                <a:cs typeface="Times New Roman" panose="02020603050405020304" pitchFamily="18" charset="0"/>
-              </a:endParaRPr>
             </a:p>
           </p:txBody>
         </p:sp>
@@ -4794,7 +4751,7 @@
         </p:nvCxnSpPr>
         <p:spPr>
           <a:xfrm>
-            <a:off x="668259" y="3470122"/>
+            <a:off x="604723" y="3475823"/>
             <a:ext cx="365209" cy="0"/>
           </a:xfrm>
           <a:prstGeom prst="straightConnector1">
@@ -5851,7 +5808,7 @@
                 </a:spcAft>
               </a:pPr>
               <a:r>
-                <a:rPr lang="en-US" sz="1200" dirty="0">
+                <a:rPr lang="en-US" sz="1600" dirty="0">
                   <a:solidFill>
                     <a:srgbClr val="0070C0"/>
                   </a:solidFill>
@@ -5862,15 +5819,6 @@
                 </a:rPr>
                 <a:t>S1</a:t>
               </a:r>
-              <a:endParaRPr lang="en-US" sz="1100" dirty="0">
-                <a:solidFill>
-                  <a:srgbClr val="0070C0"/>
-                </a:solidFill>
-                <a:effectLst/>
-                <a:latin typeface="Calibri" panose="020F0502020204030204" pitchFamily="34" charset="0"/>
-                <a:ea typeface="DengXian" panose="02010600030101010101" pitchFamily="2" charset="-122"/>
-                <a:cs typeface="Times New Roman" panose="02020603050405020304" pitchFamily="18" charset="0"/>
-              </a:endParaRPr>
             </a:p>
           </p:txBody>
         </p:sp>
@@ -5922,7 +5870,7 @@
                 </a:spcAft>
               </a:pPr>
               <a:r>
-                <a:rPr lang="en-US" sz="1200" dirty="0">
+                <a:rPr lang="en-US" sz="1600" dirty="0">
                   <a:solidFill>
                     <a:srgbClr val="0070C0"/>
                   </a:solidFill>
@@ -5933,15 +5881,6 @@
                 </a:rPr>
                 <a:t>S2</a:t>
               </a:r>
-              <a:endParaRPr lang="en-US" sz="1100" dirty="0">
-                <a:solidFill>
-                  <a:srgbClr val="0070C0"/>
-                </a:solidFill>
-                <a:effectLst/>
-                <a:latin typeface="Calibri" panose="020F0502020204030204" pitchFamily="34" charset="0"/>
-                <a:ea typeface="DengXian" panose="02010600030101010101" pitchFamily="2" charset="-122"/>
-                <a:cs typeface="Times New Roman" panose="02020603050405020304" pitchFamily="18" charset="0"/>
-              </a:endParaRPr>
             </a:p>
           </p:txBody>
         </p:sp>
@@ -5993,7 +5932,7 @@
                 </a:spcAft>
               </a:pPr>
               <a:r>
-                <a:rPr lang="en-US" sz="1200" dirty="0">
+                <a:rPr lang="en-US" sz="1600" dirty="0">
                   <a:solidFill>
                     <a:srgbClr val="0070C0"/>
                   </a:solidFill>
@@ -6004,15 +5943,6 @@
                 </a:rPr>
                 <a:t>S3</a:t>
               </a:r>
-              <a:endParaRPr lang="en-US" sz="1100" dirty="0">
-                <a:solidFill>
-                  <a:srgbClr val="0070C0"/>
-                </a:solidFill>
-                <a:effectLst/>
-                <a:latin typeface="Calibri" panose="020F0502020204030204" pitchFamily="34" charset="0"/>
-                <a:ea typeface="DengXian" panose="02010600030101010101" pitchFamily="2" charset="-122"/>
-                <a:cs typeface="Times New Roman" panose="02020603050405020304" pitchFamily="18" charset="0"/>
-              </a:endParaRPr>
             </a:p>
           </p:txBody>
         </p:sp>
@@ -6064,7 +5994,7 @@
                 </a:spcAft>
               </a:pPr>
               <a:r>
-                <a:rPr lang="en-US" sz="1200" dirty="0">
+                <a:rPr lang="en-US" sz="1600" dirty="0">
                   <a:solidFill>
                     <a:srgbClr val="0070C0"/>
                   </a:solidFill>
@@ -6075,15 +6005,6 @@
                 </a:rPr>
                 <a:t>S4</a:t>
               </a:r>
-              <a:endParaRPr lang="en-US" sz="1100" dirty="0">
-                <a:solidFill>
-                  <a:srgbClr val="0070C0"/>
-                </a:solidFill>
-                <a:effectLst/>
-                <a:latin typeface="Calibri" panose="020F0502020204030204" pitchFamily="34" charset="0"/>
-                <a:ea typeface="DengXian" panose="02010600030101010101" pitchFamily="2" charset="-122"/>
-                <a:cs typeface="Times New Roman" panose="02020603050405020304" pitchFamily="18" charset="0"/>
-              </a:endParaRPr>
             </a:p>
           </p:txBody>
         </p:sp>
@@ -6135,7 +6056,7 @@
                 </a:spcAft>
               </a:pPr>
               <a:r>
-                <a:rPr lang="en-US" sz="1200" dirty="0">
+                <a:rPr lang="en-US" sz="1600" dirty="0">
                   <a:solidFill>
                     <a:srgbClr val="0070C0"/>
                   </a:solidFill>
@@ -6146,15 +6067,6 @@
                 </a:rPr>
                 <a:t>S5</a:t>
               </a:r>
-              <a:endParaRPr lang="en-US" sz="1100" dirty="0">
-                <a:solidFill>
-                  <a:srgbClr val="0070C0"/>
-                </a:solidFill>
-                <a:effectLst/>
-                <a:latin typeface="Calibri" panose="020F0502020204030204" pitchFamily="34" charset="0"/>
-                <a:ea typeface="DengXian" panose="02010600030101010101" pitchFamily="2" charset="-122"/>
-                <a:cs typeface="Times New Roman" panose="02020603050405020304" pitchFamily="18" charset="0"/>
-              </a:endParaRPr>
             </a:p>
           </p:txBody>
         </p:sp>
@@ -6256,8 +6168,8 @@
         </p:nvSpPr>
         <p:spPr>
           <a:xfrm>
-            <a:off x="6145897" y="2780718"/>
-            <a:ext cx="1271006" cy="1200329"/>
+            <a:off x="5905705" y="2731901"/>
+            <a:ext cx="1498748" cy="923330"/>
           </a:xfrm>
           <a:prstGeom prst="rect">
             <a:avLst/>
@@ -6340,49 +6252,8 @@
         </p:nvCxnSpPr>
         <p:spPr>
           <a:xfrm>
-            <a:off x="5660134" y="3081196"/>
-            <a:ext cx="485763" cy="0"/>
-          </a:xfrm>
-          <a:prstGeom prst="straightConnector1">
-            <a:avLst/>
-          </a:prstGeom>
-          <a:ln w="12700">
-            <a:tailEnd type="triangle"/>
-          </a:ln>
-        </p:spPr>
-        <p:style>
-          <a:lnRef idx="1">
-            <a:schemeClr val="dk1"/>
-          </a:lnRef>
-          <a:fillRef idx="0">
-            <a:schemeClr val="dk1"/>
-          </a:fillRef>
-          <a:effectRef idx="0">
-            <a:schemeClr val="dk1"/>
-          </a:effectRef>
-          <a:fontRef idx="minor">
-            <a:schemeClr val="tx1"/>
-          </a:fontRef>
-        </p:style>
-      </p:cxnSp>
-      <p:cxnSp>
-        <p:nvCxnSpPr>
-          <p:cNvPr id="77" name="Straight Arrow Connector 76">
-            <a:extLst>
-              <a:ext uri="{FF2B5EF4-FFF2-40B4-BE49-F238E27FC236}">
-                <a16:creationId xmlns:a16="http://schemas.microsoft.com/office/drawing/2014/main" id="{FC96423B-283D-96EC-C9FF-3FCA0B268795}"/>
-              </a:ext>
-            </a:extLst>
-          </p:cNvPr>
-          <p:cNvCxnSpPr>
-            <a:cxnSpLocks/>
-          </p:cNvCxnSpPr>
-          <p:nvPr/>
-        </p:nvCxnSpPr>
-        <p:spPr>
-          <a:xfrm>
-            <a:off x="5660134" y="3698899"/>
-            <a:ext cx="485763" cy="0"/>
+            <a:off x="5579836" y="2983225"/>
+            <a:ext cx="336689" cy="3518"/>
           </a:xfrm>
           <a:prstGeom prst="straightConnector1">
             <a:avLst/>
@@ -6420,7 +6291,7 @@
         </p:nvGrpSpPr>
         <p:grpSpPr>
           <a:xfrm>
-            <a:off x="7660545" y="2980792"/>
+            <a:off x="7665281" y="2864148"/>
             <a:ext cx="901993" cy="903204"/>
             <a:chOff x="7927995" y="3600627"/>
             <a:chExt cx="901993" cy="903204"/>
@@ -6875,7 +6746,7 @@
                 </a:spcAft>
               </a:pPr>
               <a:r>
-                <a:rPr lang="en-US" sz="1200" dirty="0">
+                <a:rPr lang="en-US" sz="1600" dirty="0">
                   <a:solidFill>
                     <a:srgbClr val="0070C0"/>
                   </a:solidFill>
@@ -6886,15 +6757,6 @@
                 </a:rPr>
                 <a:t>S3</a:t>
               </a:r>
-              <a:endParaRPr lang="en-US" sz="1100" dirty="0">
-                <a:solidFill>
-                  <a:srgbClr val="0070C0"/>
-                </a:solidFill>
-                <a:effectLst/>
-                <a:latin typeface="Calibri" panose="020F0502020204030204" pitchFamily="34" charset="0"/>
-                <a:ea typeface="DengXian" panose="02010600030101010101" pitchFamily="2" charset="-122"/>
-                <a:cs typeface="Times New Roman" panose="02020603050405020304" pitchFamily="18" charset="0"/>
-              </a:endParaRPr>
             </a:p>
           </p:txBody>
         </p:sp>
@@ -6946,7 +6808,7 @@
                 </a:spcAft>
               </a:pPr>
               <a:r>
-                <a:rPr lang="en-US" sz="1200" dirty="0">
+                <a:rPr lang="en-US" sz="1600" dirty="0">
                   <a:solidFill>
                     <a:srgbClr val="0070C0"/>
                   </a:solidFill>
@@ -6957,15 +6819,6 @@
                 </a:rPr>
                 <a:t>S4</a:t>
               </a:r>
-              <a:endParaRPr lang="en-US" sz="1100" dirty="0">
-                <a:solidFill>
-                  <a:srgbClr val="0070C0"/>
-                </a:solidFill>
-                <a:effectLst/>
-                <a:latin typeface="Calibri" panose="020F0502020204030204" pitchFamily="34" charset="0"/>
-                <a:ea typeface="DengXian" panose="02010600030101010101" pitchFamily="2" charset="-122"/>
-                <a:cs typeface="Times New Roman" panose="02020603050405020304" pitchFamily="18" charset="0"/>
-              </a:endParaRPr>
             </a:p>
           </p:txBody>
         </p:sp>
@@ -7017,7 +6870,7 @@
                 </a:spcAft>
               </a:pPr>
               <a:r>
-                <a:rPr lang="en-US" sz="1200" dirty="0">
+                <a:rPr lang="en-US" sz="1600" dirty="0">
                   <a:solidFill>
                     <a:srgbClr val="0070C0"/>
                   </a:solidFill>
@@ -7028,15 +6881,6 @@
                 </a:rPr>
                 <a:t>S5</a:t>
               </a:r>
-              <a:endParaRPr lang="en-US" sz="1100" dirty="0">
-                <a:solidFill>
-                  <a:srgbClr val="0070C0"/>
-                </a:solidFill>
-                <a:effectLst/>
-                <a:latin typeface="Calibri" panose="020F0502020204030204" pitchFamily="34" charset="0"/>
-                <a:ea typeface="DengXian" panose="02010600030101010101" pitchFamily="2" charset="-122"/>
-                <a:cs typeface="Times New Roman" panose="02020603050405020304" pitchFamily="18" charset="0"/>
-              </a:endParaRPr>
             </a:p>
           </p:txBody>
         </p:sp>
@@ -7057,7 +6901,7 @@
         </p:nvCxnSpPr>
         <p:spPr>
           <a:xfrm>
-            <a:off x="7402359" y="3362395"/>
+            <a:off x="7396721" y="3204690"/>
             <a:ext cx="371940" cy="1362"/>
           </a:xfrm>
           <a:prstGeom prst="straightConnector1">
@@ -7348,8 +7192,8 @@
         </p:nvSpPr>
         <p:spPr bwMode="auto">
           <a:xfrm>
-            <a:off x="10592083" y="2885312"/>
-            <a:ext cx="353112" cy="895947"/>
+            <a:off x="10592083" y="2839994"/>
+            <a:ext cx="459557" cy="1041158"/>
           </a:xfrm>
           <a:prstGeom prst="rect">
             <a:avLst/>
@@ -7382,7 +7226,7 @@
               </a:spcAft>
             </a:pPr>
             <a:r>
-              <a:rPr lang="en-US" sz="1200" dirty="0">
+              <a:rPr lang="en-US" sz="1600" dirty="0">
                 <a:solidFill>
                   <a:srgbClr val="0070C0"/>
                 </a:solidFill>
@@ -7407,7 +7251,7 @@
               </a:spcAft>
             </a:pPr>
             <a:r>
-              <a:rPr lang="en-US" sz="1200" dirty="0">
+              <a:rPr lang="en-US" sz="1600" dirty="0">
                 <a:solidFill>
                   <a:srgbClr val="0070C0"/>
                 </a:solidFill>
@@ -7431,7 +7275,7 @@
               </a:spcAft>
             </a:pPr>
             <a:r>
-              <a:rPr lang="en-US" sz="1100" dirty="0">
+              <a:rPr lang="en-US" sz="1600" dirty="0">
                 <a:solidFill>
                   <a:srgbClr val="0070C0"/>
                 </a:solidFill>
@@ -7441,7 +7285,7 @@
               </a:rPr>
               <a:t>E3</a:t>
             </a:r>
-            <a:endParaRPr lang="en-US" sz="1100" dirty="0">
+            <a:endParaRPr lang="en-US" sz="1600" dirty="0">
               <a:solidFill>
                 <a:srgbClr val="0070C0"/>
               </a:solidFill>
@@ -7609,7 +7453,7 @@
         </p:nvSpPr>
         <p:spPr>
           <a:xfrm>
-            <a:off x="7465588" y="2394519"/>
+            <a:off x="7459950" y="2236814"/>
             <a:ext cx="1056763" cy="646331"/>
           </a:xfrm>
           <a:prstGeom prst="rect">
@@ -7674,6 +7518,47 @@
           </a:p>
         </p:txBody>
       </p:sp>
+      <p:cxnSp>
+        <p:nvCxnSpPr>
+          <p:cNvPr id="35" name="Straight Arrow Connector 34">
+            <a:extLst>
+              <a:ext uri="{FF2B5EF4-FFF2-40B4-BE49-F238E27FC236}">
+                <a16:creationId xmlns:a16="http://schemas.microsoft.com/office/drawing/2014/main" id="{369E59CE-ACEF-B48A-182E-5FA39A79B4C3}"/>
+              </a:ext>
+            </a:extLst>
+          </p:cNvPr>
+          <p:cNvCxnSpPr>
+            <a:cxnSpLocks/>
+          </p:cNvCxnSpPr>
+          <p:nvPr/>
+        </p:nvCxnSpPr>
+        <p:spPr>
+          <a:xfrm>
+            <a:off x="5587993" y="3450452"/>
+            <a:ext cx="336689" cy="3518"/>
+          </a:xfrm>
+          <a:prstGeom prst="straightConnector1">
+            <a:avLst/>
+          </a:prstGeom>
+          <a:ln w="12700">
+            <a:tailEnd type="triangle"/>
+          </a:ln>
+        </p:spPr>
+        <p:style>
+          <a:lnRef idx="1">
+            <a:schemeClr val="dk1"/>
+          </a:lnRef>
+          <a:fillRef idx="0">
+            <a:schemeClr val="dk1"/>
+          </a:fillRef>
+          <a:effectRef idx="0">
+            <a:schemeClr val="dk1"/>
+          </a:effectRef>
+          <a:fontRef idx="minor">
+            <a:schemeClr val="tx1"/>
+          </a:fontRef>
+        </p:style>
+      </p:cxnSp>
     </p:spTree>
     <p:extLst>
       <p:ext uri="{BB962C8B-B14F-4D97-AF65-F5344CB8AC3E}">
@@ -10965,9 +10850,9 @@
         <p:grpSpPr>
           <a:xfrm>
             <a:off x="414855" y="2556699"/>
-            <a:ext cx="1417486" cy="1744602"/>
+            <a:ext cx="1465550" cy="1776221"/>
             <a:chOff x="199354" y="2518592"/>
-            <a:chExt cx="1417486" cy="1744602"/>
+            <a:chExt cx="1465550" cy="1776221"/>
           </a:xfrm>
         </p:grpSpPr>
         <p:grpSp>
@@ -10984,10 +10869,10 @@
           </p:nvGrpSpPr>
           <p:grpSpPr>
             <a:xfrm>
-              <a:off x="199354" y="2887735"/>
-              <a:ext cx="1417486" cy="1375459"/>
-              <a:chOff x="914408" y="2830660"/>
-              <a:chExt cx="1417486" cy="1375459"/>
+              <a:off x="199354" y="2887734"/>
+              <a:ext cx="1465550" cy="1407079"/>
+              <a:chOff x="914408" y="2830659"/>
+              <a:chExt cx="1465550" cy="1407079"/>
             </a:xfrm>
           </p:grpSpPr>
           <p:grpSp>
@@ -11765,8 +11650,8 @@
             </p:nvSpPr>
             <p:spPr bwMode="auto">
               <a:xfrm>
-                <a:off x="1341700" y="2830660"/>
-                <a:ext cx="406392" cy="281362"/>
+                <a:off x="1221141" y="2830659"/>
+                <a:ext cx="526951" cy="399247"/>
               </a:xfrm>
               <a:prstGeom prst="rect">
                 <a:avLst/>
@@ -11797,7 +11682,7 @@
                   </a:spcAft>
                 </a:pPr>
                 <a:r>
-                  <a:rPr lang="en-US" sz="1600" dirty="0">
+                  <a:rPr lang="en-US" sz="2000" dirty="0">
                     <a:solidFill>
                       <a:srgbClr val="0070C0"/>
                     </a:solidFill>
@@ -11827,8 +11712,8 @@
             </p:nvSpPr>
             <p:spPr bwMode="auto">
               <a:xfrm>
-                <a:off x="1149757" y="3556419"/>
-                <a:ext cx="406392" cy="281362"/>
+                <a:off x="1149756" y="3556419"/>
+                <a:ext cx="481699" cy="362724"/>
               </a:xfrm>
               <a:prstGeom prst="rect">
                 <a:avLst/>
@@ -11859,7 +11744,7 @@
                   </a:spcAft>
                 </a:pPr>
                 <a:r>
-                  <a:rPr lang="en-US" sz="1600" dirty="0">
+                  <a:rPr lang="en-US" sz="2000" dirty="0">
                     <a:solidFill>
                       <a:srgbClr val="0070C0"/>
                     </a:solidFill>
@@ -11890,7 +11775,7 @@
             <p:spPr bwMode="auto">
               <a:xfrm>
                 <a:off x="1679174" y="3106641"/>
-                <a:ext cx="406392" cy="281362"/>
+                <a:ext cx="518550" cy="281362"/>
               </a:xfrm>
               <a:prstGeom prst="rect">
                 <a:avLst/>
@@ -11921,7 +11806,7 @@
                   </a:spcAft>
                 </a:pPr>
                 <a:r>
-                  <a:rPr lang="en-US" sz="1600" dirty="0">
+                  <a:rPr lang="en-US" sz="2000" dirty="0">
                     <a:solidFill>
                       <a:srgbClr val="0070C0"/>
                     </a:solidFill>
@@ -11951,8 +11836,8 @@
             </p:nvSpPr>
             <p:spPr bwMode="auto">
               <a:xfrm>
-                <a:off x="1925502" y="3553096"/>
-                <a:ext cx="406392" cy="281362"/>
+                <a:off x="1925501" y="3553095"/>
+                <a:ext cx="454457" cy="340679"/>
               </a:xfrm>
               <a:prstGeom prst="rect">
                 <a:avLst/>
@@ -11983,7 +11868,7 @@
                   </a:spcAft>
                 </a:pPr>
                 <a:r>
-                  <a:rPr lang="en-US" sz="1600" dirty="0">
+                  <a:rPr lang="en-US" sz="2000" dirty="0">
                     <a:solidFill>
                       <a:srgbClr val="0070C0"/>
                     </a:solidFill>
@@ -12013,8 +11898,8 @@
             </p:nvSpPr>
             <p:spPr bwMode="auto">
               <a:xfrm>
-                <a:off x="1640935" y="3897060"/>
-                <a:ext cx="406392" cy="281362"/>
+                <a:off x="1640934" y="3897060"/>
+                <a:ext cx="512135" cy="340678"/>
               </a:xfrm>
               <a:prstGeom prst="rect">
                 <a:avLst/>
@@ -12045,7 +11930,7 @@
                   </a:spcAft>
                 </a:pPr>
                 <a:r>
-                  <a:rPr lang="en-US" sz="1600" dirty="0">
+                  <a:rPr lang="en-US" sz="2000" dirty="0">
                     <a:solidFill>
                       <a:srgbClr val="0070C0"/>
                     </a:solidFill>
@@ -12306,9 +12191,9 @@
         <p:grpSpPr>
           <a:xfrm>
             <a:off x="4133942" y="2529002"/>
-            <a:ext cx="1417486" cy="1744602"/>
+            <a:ext cx="1478312" cy="1785733"/>
             <a:chOff x="199354" y="2518592"/>
-            <a:chExt cx="1417486" cy="1744602"/>
+            <a:chExt cx="1478312" cy="1785733"/>
           </a:xfrm>
         </p:grpSpPr>
         <p:grpSp>
@@ -12326,9 +12211,9 @@
           <p:grpSpPr>
             <a:xfrm>
               <a:off x="199354" y="2887735"/>
-              <a:ext cx="1417486" cy="1375459"/>
+              <a:ext cx="1478312" cy="1416590"/>
               <a:chOff x="914408" y="2830660"/>
-              <a:chExt cx="1417486" cy="1375459"/>
+              <a:chExt cx="1478312" cy="1416590"/>
             </a:xfrm>
           </p:grpSpPr>
           <p:grpSp>
@@ -13106,8 +12991,8 @@
             </p:nvSpPr>
             <p:spPr bwMode="auto">
               <a:xfrm>
-                <a:off x="1341700" y="2830660"/>
-                <a:ext cx="406392" cy="281362"/>
+                <a:off x="1221141" y="2830660"/>
+                <a:ext cx="526951" cy="369072"/>
               </a:xfrm>
               <a:prstGeom prst="rect">
                 <a:avLst/>
@@ -13138,7 +13023,7 @@
                   </a:spcAft>
                 </a:pPr>
                 <a:r>
-                  <a:rPr lang="en-US" sz="1600" dirty="0">
+                  <a:rPr lang="en-US" sz="2000" dirty="0">
                     <a:solidFill>
                       <a:srgbClr val="00B050"/>
                     </a:solidFill>
@@ -13168,8 +13053,8 @@
             </p:nvSpPr>
             <p:spPr bwMode="auto">
               <a:xfrm>
-                <a:off x="1149757" y="3556419"/>
-                <a:ext cx="406392" cy="281362"/>
+                <a:off x="1149757" y="3556418"/>
+                <a:ext cx="466408" cy="373097"/>
               </a:xfrm>
               <a:prstGeom prst="rect">
                 <a:avLst/>
@@ -13200,7 +13085,7 @@
                   </a:spcAft>
                 </a:pPr>
                 <a:r>
-                  <a:rPr lang="en-US" sz="1600" dirty="0">
+                  <a:rPr lang="en-US" sz="2000" dirty="0">
                     <a:solidFill>
                       <a:srgbClr val="00B050"/>
                     </a:solidFill>
@@ -13231,7 +13116,7 @@
             <p:spPr bwMode="auto">
               <a:xfrm>
                 <a:off x="1679174" y="3106641"/>
-                <a:ext cx="406392" cy="281362"/>
+                <a:ext cx="488544" cy="289358"/>
               </a:xfrm>
               <a:prstGeom prst="rect">
                 <a:avLst/>
@@ -13262,7 +13147,7 @@
                   </a:spcAft>
                 </a:pPr>
                 <a:r>
-                  <a:rPr lang="en-US" sz="1600" dirty="0">
+                  <a:rPr lang="en-US" sz="2000" dirty="0">
                     <a:solidFill>
                       <a:srgbClr val="00B050"/>
                     </a:solidFill>
@@ -13292,8 +13177,8 @@
             </p:nvSpPr>
             <p:spPr bwMode="auto">
               <a:xfrm>
-                <a:off x="1925502" y="3553096"/>
-                <a:ext cx="406392" cy="281362"/>
+                <a:off x="1925501" y="3553095"/>
+                <a:ext cx="467219" cy="368369"/>
               </a:xfrm>
               <a:prstGeom prst="rect">
                 <a:avLst/>
@@ -13324,7 +13209,7 @@
                   </a:spcAft>
                 </a:pPr>
                 <a:r>
-                  <a:rPr lang="en-US" sz="1600" dirty="0">
+                  <a:rPr lang="en-US" sz="2000" dirty="0">
                     <a:solidFill>
                       <a:srgbClr val="00B050"/>
                     </a:solidFill>
@@ -13355,7 +13240,7 @@
             <p:spPr bwMode="auto">
               <a:xfrm>
                 <a:off x="1640935" y="3897060"/>
-                <a:ext cx="406392" cy="281362"/>
+                <a:ext cx="485180" cy="350190"/>
               </a:xfrm>
               <a:prstGeom prst="rect">
                 <a:avLst/>
@@ -13386,7 +13271,7 @@
                   </a:spcAft>
                 </a:pPr>
                 <a:r>
-                  <a:rPr lang="en-US" sz="1600" dirty="0">
+                  <a:rPr lang="en-US" sz="2000" dirty="0">
                     <a:solidFill>
                       <a:srgbClr val="00B050"/>
                     </a:solidFill>
@@ -13819,8 +13704,8 @@
         </p:nvSpPr>
         <p:spPr bwMode="auto">
           <a:xfrm>
-            <a:off x="6096335" y="2381910"/>
-            <a:ext cx="1168471" cy="688137"/>
+            <a:off x="5864558" y="2370776"/>
+            <a:ext cx="1299113" cy="837152"/>
           </a:xfrm>
           <a:prstGeom prst="rect">
             <a:avLst/>
@@ -13851,7 +13736,7 @@
               </a:spcAft>
             </a:pPr>
             <a:r>
-              <a:rPr lang="en-US" sz="1600" dirty="0">
+              <a:rPr lang="en-US" sz="2000" dirty="0">
                 <a:effectLst/>
                 <a:latin typeface="Calibri" panose="020F0502020204030204" pitchFamily="34" charset="0"/>
                 <a:ea typeface="DengXian" panose="02010600030101010101" pitchFamily="2" charset="-122"/>
@@ -13879,7 +13764,7 @@
         <p:spPr bwMode="auto">
           <a:xfrm>
             <a:off x="7216725" y="2381910"/>
-            <a:ext cx="1168471" cy="294183"/>
+            <a:ext cx="1168471" cy="344710"/>
           </a:xfrm>
           <a:prstGeom prst="rect">
             <a:avLst/>
@@ -13910,14 +13795,14 @@
               </a:spcAft>
             </a:pPr>
             <a:r>
-              <a:rPr lang="en-US" sz="1600" dirty="0">
+              <a:rPr lang="en-US" sz="2000" dirty="0">
                 <a:latin typeface="Calibri" panose="020F0502020204030204" pitchFamily="34" charset="0"/>
                 <a:ea typeface="DengXian" panose="02010600030101010101" pitchFamily="2" charset="-122"/>
                 <a:cs typeface="Times New Roman" panose="02020603050405020304" pitchFamily="18" charset="0"/>
               </a:rPr>
               <a:t>Classifier</a:t>
             </a:r>
-            <a:endParaRPr lang="en-US" sz="1600" dirty="0">
+            <a:endParaRPr lang="en-US" sz="2000" dirty="0">
               <a:effectLst/>
               <a:latin typeface="Calibri" panose="020F0502020204030204" pitchFamily="34" charset="0"/>
               <a:ea typeface="DengXian" panose="02010600030101010101" pitchFamily="2" charset="-122"/>
@@ -13940,8 +13825,8 @@
         </p:nvSpPr>
         <p:spPr>
           <a:xfrm>
-            <a:off x="7964300" y="3196406"/>
-            <a:ext cx="741952" cy="646331"/>
+            <a:off x="7951075" y="3161886"/>
+            <a:ext cx="741952" cy="707886"/>
           </a:xfrm>
           <a:prstGeom prst="rect">
             <a:avLst/>
@@ -13956,15 +13841,143 @@
           <a:p>
             <a:pPr algn="ctr"/>
             <a:r>
-              <a:rPr lang="en-US" dirty="0"/>
+              <a:rPr lang="en-US" sz="2000" dirty="0"/>
               <a:t>Yes</a:t>
             </a:r>
           </a:p>
           <a:p>
             <a:pPr algn="ctr"/>
             <a:r>
-              <a:rPr lang="en-US" dirty="0"/>
+              <a:rPr lang="en-US" sz="2000" dirty="0"/>
               <a:t>No</a:t>
+            </a:r>
+          </a:p>
+        </p:txBody>
+      </p:sp>
+      <p:sp>
+        <p:nvSpPr>
+          <p:cNvPr id="2" name="Text Box 2">
+            <a:extLst>
+              <a:ext uri="{FF2B5EF4-FFF2-40B4-BE49-F238E27FC236}">
+                <a16:creationId xmlns:a16="http://schemas.microsoft.com/office/drawing/2014/main" id="{B56DC1A6-80EB-C0CA-7B7B-951C47BA5A9E}"/>
+              </a:ext>
+            </a:extLst>
+          </p:cNvPr>
+          <p:cNvSpPr txBox="1">
+            <a:spLocks noChangeArrowheads="1"/>
+          </p:cNvSpPr>
+          <p:nvPr/>
+        </p:nvSpPr>
+        <p:spPr bwMode="auto">
+          <a:xfrm>
+            <a:off x="7301367" y="3146229"/>
+            <a:ext cx="406392" cy="281362"/>
+          </a:xfrm>
+          <a:prstGeom prst="rect">
+            <a:avLst/>
+          </a:prstGeom>
+          <a:noFill/>
+          <a:ln w="9525">
+            <a:noFill/>
+            <a:miter lim="800000"/>
+            <a:headEnd/>
+            <a:tailEnd/>
+          </a:ln>
+        </p:spPr>
+        <p:txBody>
+          <a:bodyPr rot="0" vert="horz" wrap="square" lIns="91440" tIns="45720" rIns="91440" bIns="45720" anchor="t" anchorCtr="0">
+            <a:noAutofit/>
+          </a:bodyPr>
+          <a:lstStyle/>
+          <a:p>
+            <a:pPr marL="0" marR="0">
+              <a:lnSpc>
+                <a:spcPct val="107000"/>
+              </a:lnSpc>
+              <a:spcBef>
+                <a:spcPts val="0"/>
+              </a:spcBef>
+              <a:spcAft>
+                <a:spcPts val="800"/>
+              </a:spcAft>
+            </a:pPr>
+            <a:r>
+              <a:rPr lang="en-US" sz="2000" dirty="0">
+                <a:solidFill>
+                  <a:schemeClr val="accent2">
+                    <a:lumMod val="75000"/>
+                  </a:schemeClr>
+                </a:solidFill>
+                <a:effectLst/>
+                <a:latin typeface="Calibri" panose="020F0502020204030204" pitchFamily="34" charset="0"/>
+                <a:ea typeface="DengXian" panose="02010600030101010101" pitchFamily="2" charset="-122"/>
+                <a:cs typeface="Times New Roman" panose="02020603050405020304" pitchFamily="18" charset="0"/>
+              </a:rPr>
+              <a:t>V</a:t>
+            </a:r>
+          </a:p>
+        </p:txBody>
+      </p:sp>
+      <p:sp>
+        <p:nvSpPr>
+          <p:cNvPr id="3" name="Text Box 2">
+            <a:extLst>
+              <a:ext uri="{FF2B5EF4-FFF2-40B4-BE49-F238E27FC236}">
+                <a16:creationId xmlns:a16="http://schemas.microsoft.com/office/drawing/2014/main" id="{372E46C7-8831-AEF8-1C4E-7A6A3A11F153}"/>
+              </a:ext>
+            </a:extLst>
+          </p:cNvPr>
+          <p:cNvSpPr txBox="1">
+            <a:spLocks noChangeArrowheads="1"/>
+          </p:cNvSpPr>
+          <p:nvPr/>
+        </p:nvSpPr>
+        <p:spPr bwMode="auto">
+          <a:xfrm>
+            <a:off x="7410564" y="3252978"/>
+            <a:ext cx="406392" cy="281362"/>
+          </a:xfrm>
+          <a:prstGeom prst="rect">
+            <a:avLst/>
+          </a:prstGeom>
+          <a:noFill/>
+          <a:ln w="9525">
+            <a:noFill/>
+            <a:miter lim="800000"/>
+            <a:headEnd/>
+            <a:tailEnd/>
+          </a:ln>
+        </p:spPr>
+        <p:txBody>
+          <a:bodyPr rot="0" vert="horz" wrap="square" lIns="91440" tIns="45720" rIns="91440" bIns="45720" anchor="t" anchorCtr="0">
+            <a:noAutofit/>
+          </a:bodyPr>
+          <a:lstStyle/>
+          <a:p>
+            <a:pPr marL="0" marR="0">
+              <a:lnSpc>
+                <a:spcPct val="107000"/>
+              </a:lnSpc>
+              <a:spcBef>
+                <a:spcPts val="0"/>
+              </a:spcBef>
+              <a:spcAft>
+                <a:spcPts val="800"/>
+              </a:spcAft>
+            </a:pPr>
+            <a:r>
+              <a:rPr lang="en-US" sz="1600" i="1" dirty="0">
+                <a:solidFill>
+                  <a:schemeClr val="accent2">
+                    <a:lumMod val="75000"/>
+                  </a:schemeClr>
+                </a:solidFill>
+                <a:effectLst/>
+                <a:latin typeface="Calibri" panose="020F0502020204030204" pitchFamily="34" charset="0"/>
+                <a:ea typeface="DengXian" panose="02010600030101010101" pitchFamily="2" charset="-122"/>
+                <a:cs typeface="Times New Roman" panose="02020603050405020304" pitchFamily="18" charset="0"/>
+              </a:rPr>
+              <a:t>C</a:t>
             </a:r>
           </a:p>
         </p:txBody>
@@ -22604,6 +22617,3252 @@
 </p:sld>
 </file>
 
+<file path=ppt/slides/slide6.xml><?xml version="1.0" encoding="utf-8"?>
+<p:sld xmlns:a="http://schemas.openxmlformats.org/drawingml/2006/main" xmlns:r="http://schemas.openxmlformats.org/officeDocument/2006/relationships" xmlns:p="http://schemas.openxmlformats.org/presentationml/2006/main">
+  <p:cSld>
+    <p:spTree>
+      <p:nvGrpSpPr>
+        <p:cNvPr id="1" name=""/>
+        <p:cNvGrpSpPr/>
+        <p:nvPr/>
+      </p:nvGrpSpPr>
+      <p:grpSpPr>
+        <a:xfrm>
+          <a:off x="0" y="0"/>
+          <a:ext cx="0" cy="0"/>
+          <a:chOff x="0" y="0"/>
+          <a:chExt cx="0" cy="0"/>
+        </a:xfrm>
+      </p:grpSpPr>
+      <p:sp>
+        <p:nvSpPr>
+          <p:cNvPr id="2" name="Rectangle: Rounded Corners 1">
+            <a:extLst>
+              <a:ext uri="{FF2B5EF4-FFF2-40B4-BE49-F238E27FC236}">
+                <a16:creationId xmlns:a16="http://schemas.microsoft.com/office/drawing/2014/main" id="{9B540B48-058D-6381-80D9-0F2DE0AA9911}"/>
+              </a:ext>
+            </a:extLst>
+          </p:cNvPr>
+          <p:cNvSpPr/>
+          <p:nvPr/>
+        </p:nvSpPr>
+        <p:spPr>
+          <a:xfrm>
+            <a:off x="-85241" y="2523563"/>
+            <a:ext cx="1262352" cy="628650"/>
+          </a:xfrm>
+          <a:prstGeom prst="roundRect">
+            <a:avLst>
+              <a:gd name="adj" fmla="val 6131"/>
+            </a:avLst>
+          </a:prstGeom>
+          <a:noFill/>
+          <a:ln w="0">
+            <a:solidFill>
+              <a:schemeClr val="bg1"/>
+            </a:solidFill>
+            <a:prstDash val="dashDot"/>
+          </a:ln>
+        </p:spPr>
+        <p:style>
+          <a:lnRef idx="2">
+            <a:schemeClr val="accent1">
+              <a:shade val="50000"/>
+            </a:schemeClr>
+          </a:lnRef>
+          <a:fillRef idx="1">
+            <a:schemeClr val="accent1"/>
+          </a:fillRef>
+          <a:effectRef idx="0">
+            <a:schemeClr val="accent1"/>
+          </a:effectRef>
+          <a:fontRef idx="minor">
+            <a:schemeClr val="lt1"/>
+          </a:fontRef>
+        </p:style>
+        <p:txBody>
+          <a:bodyPr rot="0" spcFirstLastPara="0" vert="horz" wrap="square" lIns="45720" tIns="0" rIns="45720" bIns="0" numCol="1" spcCol="0" rtlCol="0" fromWordArt="0" anchor="ctr" anchorCtr="0" forceAA="0" compatLnSpc="1">
+            <a:prstTxWarp prst="textNoShape">
+              <a:avLst/>
+            </a:prstTxWarp>
+            <a:noAutofit/>
+          </a:bodyPr>
+          <a:lstStyle/>
+          <a:p>
+            <a:pPr marL="0" marR="0" algn="ctr">
+              <a:lnSpc>
+                <a:spcPct val="80000"/>
+              </a:lnSpc>
+              <a:spcBef>
+                <a:spcPts val="0"/>
+              </a:spcBef>
+              <a:spcAft>
+                <a:spcPts val="0"/>
+              </a:spcAft>
+            </a:pPr>
+            <a:r>
+              <a:rPr lang="en-US" sz="1400" b="1" dirty="0">
+                <a:solidFill>
+                  <a:srgbClr val="000000"/>
+                </a:solidFill>
+                <a:effectLst/>
+                <a:ea typeface="DengXian" panose="02010600030101010101" pitchFamily="2" charset="-122"/>
+                <a:cs typeface="Times New Roman" panose="02020603050405020304" pitchFamily="18" charset="0"/>
+              </a:rPr>
+              <a:t> </a:t>
+            </a:r>
+            <a:r>
+              <a:rPr lang="en-US" sz="2000" b="1" dirty="0">
+                <a:solidFill>
+                  <a:srgbClr val="000000"/>
+                </a:solidFill>
+                <a:effectLst/>
+                <a:ea typeface="DengXian" panose="02010600030101010101" pitchFamily="2" charset="-122"/>
+                <a:cs typeface="Times New Roman" panose="02020603050405020304" pitchFamily="18" charset="0"/>
+              </a:rPr>
+              <a:t>Statement</a:t>
+            </a:r>
+            <a:endParaRPr lang="en-US" sz="2000" dirty="0">
+              <a:effectLst/>
+              <a:ea typeface="DengXian" panose="02010600030101010101" pitchFamily="2" charset="-122"/>
+              <a:cs typeface="Times New Roman" panose="02020603050405020304" pitchFamily="18" charset="0"/>
+            </a:endParaRPr>
+          </a:p>
+        </p:txBody>
+      </p:sp>
+      <p:sp>
+        <p:nvSpPr>
+          <p:cNvPr id="3" name="Rectangle: Rounded Corners 2">
+            <a:extLst>
+              <a:ext uri="{FF2B5EF4-FFF2-40B4-BE49-F238E27FC236}">
+                <a16:creationId xmlns:a16="http://schemas.microsoft.com/office/drawing/2014/main" id="{42322201-9B0E-D620-2244-EAB827AD250B}"/>
+              </a:ext>
+            </a:extLst>
+          </p:cNvPr>
+          <p:cNvSpPr/>
+          <p:nvPr/>
+        </p:nvSpPr>
+        <p:spPr>
+          <a:xfrm>
+            <a:off x="1274134" y="1896889"/>
+            <a:ext cx="1730935" cy="640958"/>
+          </a:xfrm>
+          <a:prstGeom prst="roundRect">
+            <a:avLst>
+              <a:gd name="adj" fmla="val 6131"/>
+            </a:avLst>
+          </a:prstGeom>
+          <a:noFill/>
+          <a:ln>
+            <a:solidFill>
+              <a:schemeClr val="tx1"/>
+            </a:solidFill>
+            <a:prstDash val="dashDot"/>
+          </a:ln>
+        </p:spPr>
+        <p:style>
+          <a:lnRef idx="2">
+            <a:schemeClr val="accent1">
+              <a:shade val="50000"/>
+            </a:schemeClr>
+          </a:lnRef>
+          <a:fillRef idx="1">
+            <a:schemeClr val="accent1"/>
+          </a:fillRef>
+          <a:effectRef idx="0">
+            <a:schemeClr val="accent1"/>
+          </a:effectRef>
+          <a:fontRef idx="minor">
+            <a:schemeClr val="lt1"/>
+          </a:fontRef>
+        </p:style>
+        <p:txBody>
+          <a:bodyPr rot="0" spcFirstLastPara="0" vert="horz" wrap="square" lIns="45720" tIns="0" rIns="45720" bIns="0" numCol="1" spcCol="0" rtlCol="0" fromWordArt="0" anchor="ctr" anchorCtr="0" forceAA="0" compatLnSpc="1">
+            <a:prstTxWarp prst="textNoShape">
+              <a:avLst/>
+            </a:prstTxWarp>
+            <a:noAutofit/>
+          </a:bodyPr>
+          <a:lstStyle/>
+          <a:p>
+            <a:pPr marL="0" marR="0" algn="ctr">
+              <a:lnSpc>
+                <a:spcPct val="80000"/>
+              </a:lnSpc>
+              <a:spcBef>
+                <a:spcPts val="0"/>
+              </a:spcBef>
+              <a:spcAft>
+                <a:spcPts val="0"/>
+              </a:spcAft>
+            </a:pPr>
+            <a:r>
+              <a:rPr lang="en-US" sz="1100" dirty="0">
+                <a:solidFill>
+                  <a:srgbClr val="000000"/>
+                </a:solidFill>
+                <a:latin typeface="Courier New" panose="02070309020205020404" pitchFamily="49" charset="0"/>
+                <a:ea typeface="DengXian" panose="02010600030101010101" pitchFamily="2" charset="-122"/>
+                <a:cs typeface="Times New Roman" panose="02020603050405020304" pitchFamily="18" charset="0"/>
+              </a:rPr>
+              <a:t>f</a:t>
+            </a:r>
+            <a:r>
+              <a:rPr lang="en-US" sz="1100" dirty="0">
+                <a:solidFill>
+                  <a:srgbClr val="000000"/>
+                </a:solidFill>
+                <a:effectLst/>
+                <a:latin typeface="Courier New" panose="02070309020205020404" pitchFamily="49" charset="0"/>
+                <a:ea typeface="DengXian" panose="02010600030101010101" pitchFamily="2" charset="-122"/>
+                <a:cs typeface="Times New Roman" panose="02020603050405020304" pitchFamily="18" charset="0"/>
+              </a:rPr>
+              <a:t>inal Field </a:t>
+            </a:r>
+            <a:r>
+              <a:rPr lang="en-US" sz="1100" dirty="0" err="1">
+                <a:solidFill>
+                  <a:srgbClr val="000000"/>
+                </a:solidFill>
+                <a:effectLst/>
+                <a:latin typeface="Courier New" panose="02070309020205020404" pitchFamily="49" charset="0"/>
+                <a:ea typeface="DengXian" panose="02010600030101010101" pitchFamily="2" charset="-122"/>
+                <a:cs typeface="Times New Roman" panose="02020603050405020304" pitchFamily="18" charset="0"/>
+              </a:rPr>
+              <a:t>usr</a:t>
+            </a:r>
+            <a:r>
+              <a:rPr lang="en-US" sz="1100" dirty="0">
+                <a:solidFill>
+                  <a:srgbClr val="000000"/>
+                </a:solidFill>
+                <a:effectLst/>
+                <a:latin typeface="Courier New" panose="02070309020205020404" pitchFamily="49" charset="0"/>
+                <a:ea typeface="DengXian" panose="02010600030101010101" pitchFamily="2" charset="-122"/>
+                <a:cs typeface="Times New Roman" panose="02020603050405020304" pitchFamily="18" charset="0"/>
+              </a:rPr>
+              <a:t> Paths Field Class Loader class get Declared Field …</a:t>
+            </a:r>
+            <a:endParaRPr lang="en-US" sz="1100" dirty="0">
+              <a:effectLst/>
+              <a:ea typeface="DengXian" panose="02010600030101010101" pitchFamily="2" charset="-122"/>
+              <a:cs typeface="Times New Roman" panose="02020603050405020304" pitchFamily="18" charset="0"/>
+            </a:endParaRPr>
+          </a:p>
+        </p:txBody>
+      </p:sp>
+      <p:sp>
+        <p:nvSpPr>
+          <p:cNvPr id="4" name="Text Box 2">
+            <a:extLst>
+              <a:ext uri="{FF2B5EF4-FFF2-40B4-BE49-F238E27FC236}">
+                <a16:creationId xmlns:a16="http://schemas.microsoft.com/office/drawing/2014/main" id="{116B7468-8575-6823-1839-22F33EC327F4}"/>
+              </a:ext>
+            </a:extLst>
+          </p:cNvPr>
+          <p:cNvSpPr txBox="1">
+            <a:spLocks noChangeArrowheads="1"/>
+          </p:cNvSpPr>
+          <p:nvPr/>
+        </p:nvSpPr>
+        <p:spPr bwMode="auto">
+          <a:xfrm>
+            <a:off x="836894" y="1602234"/>
+            <a:ext cx="2712323" cy="344710"/>
+          </a:xfrm>
+          <a:prstGeom prst="rect">
+            <a:avLst/>
+          </a:prstGeom>
+          <a:noFill/>
+          <a:ln w="9525">
+            <a:noFill/>
+            <a:miter lim="800000"/>
+            <a:headEnd/>
+            <a:tailEnd/>
+          </a:ln>
+        </p:spPr>
+        <p:txBody>
+          <a:bodyPr rot="0" vert="horz" wrap="square" lIns="91440" tIns="45720" rIns="91440" bIns="45720" anchor="t" anchorCtr="0">
+            <a:spAutoFit/>
+          </a:bodyPr>
+          <a:lstStyle/>
+          <a:p>
+            <a:pPr marL="0" marR="0" algn="ctr">
+              <a:lnSpc>
+                <a:spcPct val="80000"/>
+              </a:lnSpc>
+              <a:spcBef>
+                <a:spcPts val="0"/>
+              </a:spcBef>
+              <a:spcAft>
+                <a:spcPts val="0"/>
+              </a:spcAft>
+            </a:pPr>
+            <a:r>
+              <a:rPr lang="en-US" sz="2000" dirty="0">
+                <a:effectLst/>
+                <a:ea typeface="DengXian" panose="02010600030101010101" pitchFamily="2" charset="-122"/>
+                <a:cs typeface="Times New Roman" panose="02020603050405020304" pitchFamily="18" charset="0"/>
+              </a:rPr>
+              <a:t>Sequence of sub-tokens</a:t>
+            </a:r>
+          </a:p>
+        </p:txBody>
+      </p:sp>
+      <p:grpSp>
+        <p:nvGrpSpPr>
+          <p:cNvPr id="6" name="Group 5">
+            <a:extLst>
+              <a:ext uri="{FF2B5EF4-FFF2-40B4-BE49-F238E27FC236}">
+                <a16:creationId xmlns:a16="http://schemas.microsoft.com/office/drawing/2014/main" id="{C83ECBC5-EBC0-FD25-D02A-D950E4F3F13E}"/>
+              </a:ext>
+            </a:extLst>
+          </p:cNvPr>
+          <p:cNvGrpSpPr/>
+          <p:nvPr/>
+        </p:nvGrpSpPr>
+        <p:grpSpPr>
+          <a:xfrm>
+            <a:off x="1486634" y="2878594"/>
+            <a:ext cx="1268098" cy="908052"/>
+            <a:chOff x="0" y="0"/>
+            <a:chExt cx="1269216" cy="908834"/>
+          </a:xfrm>
+        </p:grpSpPr>
+        <p:sp>
+          <p:nvSpPr>
+            <p:cNvPr id="7" name="Oval 6">
+              <a:extLst>
+                <a:ext uri="{FF2B5EF4-FFF2-40B4-BE49-F238E27FC236}">
+                  <a16:creationId xmlns:a16="http://schemas.microsoft.com/office/drawing/2014/main" id="{98902349-076A-2C59-7FAD-6D1A95EFC01F}"/>
+                </a:ext>
+              </a:extLst>
+            </p:cNvPr>
+            <p:cNvSpPr/>
+            <p:nvPr/>
+          </p:nvSpPr>
+          <p:spPr>
+            <a:xfrm>
+              <a:off x="407911" y="0"/>
+              <a:ext cx="106868" cy="106808"/>
+            </a:xfrm>
+            <a:prstGeom prst="ellipse">
+              <a:avLst/>
+            </a:prstGeom>
+            <a:solidFill>
+              <a:schemeClr val="accent2">
+                <a:lumMod val="60000"/>
+                <a:lumOff val="40000"/>
+              </a:schemeClr>
+            </a:solidFill>
+            <a:ln>
+              <a:solidFill>
+                <a:schemeClr val="accent2">
+                  <a:lumMod val="75000"/>
+                </a:schemeClr>
+              </a:solidFill>
+            </a:ln>
+          </p:spPr>
+          <p:style>
+            <a:lnRef idx="2">
+              <a:schemeClr val="accent1">
+                <a:shade val="50000"/>
+              </a:schemeClr>
+            </a:lnRef>
+            <a:fillRef idx="1">
+              <a:schemeClr val="accent1"/>
+            </a:fillRef>
+            <a:effectRef idx="0">
+              <a:schemeClr val="accent1"/>
+            </a:effectRef>
+            <a:fontRef idx="minor">
+              <a:schemeClr val="lt1"/>
+            </a:fontRef>
+          </p:style>
+          <p:txBody>
+            <a:bodyPr rot="0" spcFirstLastPara="0" vert="horz" wrap="square" lIns="91440" tIns="45720" rIns="91440" bIns="45720" numCol="1" spcCol="0" rtlCol="0" fromWordArt="0" anchor="ctr" anchorCtr="0" forceAA="0" compatLnSpc="1">
+              <a:prstTxWarp prst="textNoShape">
+                <a:avLst/>
+              </a:prstTxWarp>
+              <a:noAutofit/>
+            </a:bodyPr>
+            <a:lstStyle/>
+            <a:p>
+              <a:endParaRPr lang="en-US"/>
+            </a:p>
+          </p:txBody>
+        </p:sp>
+        <p:sp>
+          <p:nvSpPr>
+            <p:cNvPr id="8" name="Oval 7">
+              <a:extLst>
+                <a:ext uri="{FF2B5EF4-FFF2-40B4-BE49-F238E27FC236}">
+                  <a16:creationId xmlns:a16="http://schemas.microsoft.com/office/drawing/2014/main" id="{E82C9D80-AD13-5D9E-9967-EF8A8FF57575}"/>
+                </a:ext>
+              </a:extLst>
+            </p:cNvPr>
+            <p:cNvSpPr/>
+            <p:nvPr/>
+          </p:nvSpPr>
+          <p:spPr>
+            <a:xfrm>
+              <a:off x="0" y="258343"/>
+              <a:ext cx="106670" cy="106610"/>
+            </a:xfrm>
+            <a:prstGeom prst="ellipse">
+              <a:avLst/>
+            </a:prstGeom>
+            <a:solidFill>
+              <a:schemeClr val="accent2">
+                <a:lumMod val="60000"/>
+                <a:lumOff val="40000"/>
+              </a:schemeClr>
+            </a:solidFill>
+            <a:ln>
+              <a:solidFill>
+                <a:schemeClr val="accent2">
+                  <a:lumMod val="75000"/>
+                </a:schemeClr>
+              </a:solidFill>
+            </a:ln>
+          </p:spPr>
+          <p:style>
+            <a:lnRef idx="2">
+              <a:schemeClr val="accent1">
+                <a:shade val="50000"/>
+              </a:schemeClr>
+            </a:lnRef>
+            <a:fillRef idx="1">
+              <a:schemeClr val="accent1"/>
+            </a:fillRef>
+            <a:effectRef idx="0">
+              <a:schemeClr val="accent1"/>
+            </a:effectRef>
+            <a:fontRef idx="minor">
+              <a:schemeClr val="lt1"/>
+            </a:fontRef>
+          </p:style>
+          <p:txBody>
+            <a:bodyPr rot="0" spcFirstLastPara="0" vert="horz" wrap="square" lIns="91440" tIns="45720" rIns="91440" bIns="45720" numCol="1" spcCol="0" rtlCol="0" fromWordArt="0" anchor="ctr" anchorCtr="0" forceAA="0" compatLnSpc="1">
+              <a:prstTxWarp prst="textNoShape">
+                <a:avLst/>
+              </a:prstTxWarp>
+              <a:noAutofit/>
+            </a:bodyPr>
+            <a:lstStyle/>
+            <a:p>
+              <a:endParaRPr lang="en-US"/>
+            </a:p>
+          </p:txBody>
+        </p:sp>
+        <p:sp>
+          <p:nvSpPr>
+            <p:cNvPr id="9" name="Oval 8">
+              <a:extLst>
+                <a:ext uri="{FF2B5EF4-FFF2-40B4-BE49-F238E27FC236}">
+                  <a16:creationId xmlns:a16="http://schemas.microsoft.com/office/drawing/2014/main" id="{5C9F569B-5B3C-3FD4-D2CA-4E7AAD405867}"/>
+                </a:ext>
+              </a:extLst>
+            </p:cNvPr>
+            <p:cNvSpPr/>
+            <p:nvPr/>
+          </p:nvSpPr>
+          <p:spPr>
+            <a:xfrm>
+              <a:off x="271941" y="258343"/>
+              <a:ext cx="106670" cy="106610"/>
+            </a:xfrm>
+            <a:prstGeom prst="ellipse">
+              <a:avLst/>
+            </a:prstGeom>
+            <a:solidFill>
+              <a:schemeClr val="accent2">
+                <a:lumMod val="60000"/>
+                <a:lumOff val="40000"/>
+              </a:schemeClr>
+            </a:solidFill>
+            <a:ln>
+              <a:solidFill>
+                <a:schemeClr val="accent2">
+                  <a:lumMod val="75000"/>
+                </a:schemeClr>
+              </a:solidFill>
+            </a:ln>
+          </p:spPr>
+          <p:style>
+            <a:lnRef idx="2">
+              <a:schemeClr val="accent1">
+                <a:shade val="50000"/>
+              </a:schemeClr>
+            </a:lnRef>
+            <a:fillRef idx="1">
+              <a:schemeClr val="accent1"/>
+            </a:fillRef>
+            <a:effectRef idx="0">
+              <a:schemeClr val="accent1"/>
+            </a:effectRef>
+            <a:fontRef idx="minor">
+              <a:schemeClr val="lt1"/>
+            </a:fontRef>
+          </p:style>
+          <p:txBody>
+            <a:bodyPr rot="0" spcFirstLastPara="0" vert="horz" wrap="square" lIns="91440" tIns="45720" rIns="91440" bIns="45720" numCol="1" spcCol="0" rtlCol="0" fromWordArt="0" anchor="ctr" anchorCtr="0" forceAA="0" compatLnSpc="1">
+              <a:prstTxWarp prst="textNoShape">
+                <a:avLst/>
+              </a:prstTxWarp>
+              <a:noAutofit/>
+            </a:bodyPr>
+            <a:lstStyle/>
+            <a:p>
+              <a:endParaRPr lang="en-US"/>
+            </a:p>
+          </p:txBody>
+        </p:sp>
+        <p:sp>
+          <p:nvSpPr>
+            <p:cNvPr id="10" name="Oval 9">
+              <a:extLst>
+                <a:ext uri="{FF2B5EF4-FFF2-40B4-BE49-F238E27FC236}">
+                  <a16:creationId xmlns:a16="http://schemas.microsoft.com/office/drawing/2014/main" id="{2A42F9B5-F69F-B8C8-9DD5-F6643F3C1D71}"/>
+                </a:ext>
+              </a:extLst>
+            </p:cNvPr>
+            <p:cNvSpPr/>
+            <p:nvPr/>
+          </p:nvSpPr>
+          <p:spPr>
+            <a:xfrm>
+              <a:off x="513288" y="258343"/>
+              <a:ext cx="106670" cy="106610"/>
+            </a:xfrm>
+            <a:prstGeom prst="ellipse">
+              <a:avLst/>
+            </a:prstGeom>
+            <a:solidFill>
+              <a:schemeClr val="accent2">
+                <a:lumMod val="60000"/>
+                <a:lumOff val="40000"/>
+              </a:schemeClr>
+            </a:solidFill>
+            <a:ln>
+              <a:solidFill>
+                <a:schemeClr val="accent2">
+                  <a:lumMod val="75000"/>
+                </a:schemeClr>
+              </a:solidFill>
+            </a:ln>
+          </p:spPr>
+          <p:style>
+            <a:lnRef idx="2">
+              <a:schemeClr val="accent1">
+                <a:shade val="50000"/>
+              </a:schemeClr>
+            </a:lnRef>
+            <a:fillRef idx="1">
+              <a:schemeClr val="accent1"/>
+            </a:fillRef>
+            <a:effectRef idx="0">
+              <a:schemeClr val="accent1"/>
+            </a:effectRef>
+            <a:fontRef idx="minor">
+              <a:schemeClr val="lt1"/>
+            </a:fontRef>
+          </p:style>
+          <p:txBody>
+            <a:bodyPr rot="0" spcFirstLastPara="0" vert="horz" wrap="square" lIns="91440" tIns="45720" rIns="91440" bIns="45720" numCol="1" spcCol="0" rtlCol="0" fromWordArt="0" anchor="ctr" anchorCtr="0" forceAA="0" compatLnSpc="1">
+              <a:prstTxWarp prst="textNoShape">
+                <a:avLst/>
+              </a:prstTxWarp>
+              <a:noAutofit/>
+            </a:bodyPr>
+            <a:lstStyle/>
+            <a:p>
+              <a:endParaRPr lang="en-US"/>
+            </a:p>
+          </p:txBody>
+        </p:sp>
+        <p:sp>
+          <p:nvSpPr>
+            <p:cNvPr id="11" name="Oval 10">
+              <a:extLst>
+                <a:ext uri="{FF2B5EF4-FFF2-40B4-BE49-F238E27FC236}">
+                  <a16:creationId xmlns:a16="http://schemas.microsoft.com/office/drawing/2014/main" id="{8019BCAF-CEF9-5046-C3EE-5851D042B643}"/>
+                </a:ext>
+              </a:extLst>
+            </p:cNvPr>
+            <p:cNvSpPr/>
+            <p:nvPr/>
+          </p:nvSpPr>
+          <p:spPr>
+            <a:xfrm>
+              <a:off x="785228" y="258343"/>
+              <a:ext cx="106670" cy="106610"/>
+            </a:xfrm>
+            <a:prstGeom prst="ellipse">
+              <a:avLst/>
+            </a:prstGeom>
+            <a:solidFill>
+              <a:schemeClr val="accent2">
+                <a:lumMod val="60000"/>
+                <a:lumOff val="40000"/>
+              </a:schemeClr>
+            </a:solidFill>
+            <a:ln>
+              <a:solidFill>
+                <a:schemeClr val="accent2">
+                  <a:lumMod val="75000"/>
+                </a:schemeClr>
+              </a:solidFill>
+            </a:ln>
+          </p:spPr>
+          <p:style>
+            <a:lnRef idx="2">
+              <a:schemeClr val="accent1">
+                <a:shade val="50000"/>
+              </a:schemeClr>
+            </a:lnRef>
+            <a:fillRef idx="1">
+              <a:schemeClr val="accent1"/>
+            </a:fillRef>
+            <a:effectRef idx="0">
+              <a:schemeClr val="accent1"/>
+            </a:effectRef>
+            <a:fontRef idx="minor">
+              <a:schemeClr val="lt1"/>
+            </a:fontRef>
+          </p:style>
+          <p:txBody>
+            <a:bodyPr rot="0" spcFirstLastPara="0" vert="horz" wrap="square" lIns="91440" tIns="45720" rIns="91440" bIns="45720" numCol="1" spcCol="0" rtlCol="0" fromWordArt="0" anchor="ctr" anchorCtr="0" forceAA="0" compatLnSpc="1">
+              <a:prstTxWarp prst="textNoShape">
+                <a:avLst/>
+              </a:prstTxWarp>
+              <a:noAutofit/>
+            </a:bodyPr>
+            <a:lstStyle/>
+            <a:p>
+              <a:endParaRPr lang="en-US"/>
+            </a:p>
+          </p:txBody>
+        </p:sp>
+        <p:sp>
+          <p:nvSpPr>
+            <p:cNvPr id="12" name="Oval 11">
+              <a:extLst>
+                <a:ext uri="{FF2B5EF4-FFF2-40B4-BE49-F238E27FC236}">
+                  <a16:creationId xmlns:a16="http://schemas.microsoft.com/office/drawing/2014/main" id="{9C364652-C794-2DC8-8384-E8398148778E}"/>
+                </a:ext>
+              </a:extLst>
+            </p:cNvPr>
+            <p:cNvSpPr/>
+            <p:nvPr/>
+          </p:nvSpPr>
+          <p:spPr>
+            <a:xfrm>
+              <a:off x="618665" y="523485"/>
+              <a:ext cx="106670" cy="106610"/>
+            </a:xfrm>
+            <a:prstGeom prst="ellipse">
+              <a:avLst/>
+            </a:prstGeom>
+            <a:solidFill>
+              <a:schemeClr val="accent2">
+                <a:lumMod val="60000"/>
+                <a:lumOff val="40000"/>
+              </a:schemeClr>
+            </a:solidFill>
+            <a:ln>
+              <a:solidFill>
+                <a:schemeClr val="accent2">
+                  <a:lumMod val="75000"/>
+                </a:schemeClr>
+              </a:solidFill>
+            </a:ln>
+          </p:spPr>
+          <p:style>
+            <a:lnRef idx="2">
+              <a:schemeClr val="accent1">
+                <a:shade val="50000"/>
+              </a:schemeClr>
+            </a:lnRef>
+            <a:fillRef idx="1">
+              <a:schemeClr val="accent1"/>
+            </a:fillRef>
+            <a:effectRef idx="0">
+              <a:schemeClr val="accent1"/>
+            </a:effectRef>
+            <a:fontRef idx="minor">
+              <a:schemeClr val="lt1"/>
+            </a:fontRef>
+          </p:style>
+          <p:txBody>
+            <a:bodyPr rot="0" spcFirstLastPara="0" vert="horz" wrap="square" lIns="91440" tIns="45720" rIns="91440" bIns="45720" numCol="1" spcCol="0" rtlCol="0" fromWordArt="0" anchor="ctr" anchorCtr="0" forceAA="0" compatLnSpc="1">
+              <a:prstTxWarp prst="textNoShape">
+                <a:avLst/>
+              </a:prstTxWarp>
+              <a:noAutofit/>
+            </a:bodyPr>
+            <a:lstStyle/>
+            <a:p>
+              <a:endParaRPr lang="en-US"/>
+            </a:p>
+          </p:txBody>
+        </p:sp>
+        <p:sp>
+          <p:nvSpPr>
+            <p:cNvPr id="13" name="Oval 12">
+              <a:extLst>
+                <a:ext uri="{FF2B5EF4-FFF2-40B4-BE49-F238E27FC236}">
+                  <a16:creationId xmlns:a16="http://schemas.microsoft.com/office/drawing/2014/main" id="{33DA3F1D-36AD-47F7-BA4D-CFA437AE522E}"/>
+                </a:ext>
+              </a:extLst>
+            </p:cNvPr>
+            <p:cNvSpPr/>
+            <p:nvPr/>
+          </p:nvSpPr>
+          <p:spPr>
+            <a:xfrm>
+              <a:off x="951792" y="523485"/>
+              <a:ext cx="106670" cy="106610"/>
+            </a:xfrm>
+            <a:prstGeom prst="ellipse">
+              <a:avLst/>
+            </a:prstGeom>
+            <a:solidFill>
+              <a:schemeClr val="accent2">
+                <a:lumMod val="60000"/>
+                <a:lumOff val="40000"/>
+              </a:schemeClr>
+            </a:solidFill>
+            <a:ln>
+              <a:solidFill>
+                <a:schemeClr val="accent2">
+                  <a:lumMod val="75000"/>
+                </a:schemeClr>
+              </a:solidFill>
+            </a:ln>
+          </p:spPr>
+          <p:style>
+            <a:lnRef idx="2">
+              <a:schemeClr val="accent1">
+                <a:shade val="50000"/>
+              </a:schemeClr>
+            </a:lnRef>
+            <a:fillRef idx="1">
+              <a:schemeClr val="accent1"/>
+            </a:fillRef>
+            <a:effectRef idx="0">
+              <a:schemeClr val="accent1"/>
+            </a:effectRef>
+            <a:fontRef idx="minor">
+              <a:schemeClr val="lt1"/>
+            </a:fontRef>
+          </p:style>
+          <p:txBody>
+            <a:bodyPr rot="0" spcFirstLastPara="0" vert="horz" wrap="square" lIns="91440" tIns="45720" rIns="91440" bIns="45720" numCol="1" spcCol="0" rtlCol="0" fromWordArt="0" anchor="ctr" anchorCtr="0" forceAA="0" compatLnSpc="1">
+              <a:prstTxWarp prst="textNoShape">
+                <a:avLst/>
+              </a:prstTxWarp>
+              <a:noAutofit/>
+            </a:bodyPr>
+            <a:lstStyle/>
+            <a:p>
+              <a:endParaRPr lang="en-US"/>
+            </a:p>
+          </p:txBody>
+        </p:sp>
+        <p:sp>
+          <p:nvSpPr>
+            <p:cNvPr id="14" name="Oval 13">
+              <a:extLst>
+                <a:ext uri="{FF2B5EF4-FFF2-40B4-BE49-F238E27FC236}">
+                  <a16:creationId xmlns:a16="http://schemas.microsoft.com/office/drawing/2014/main" id="{A80D610A-D31D-4A1C-D8E4-82B225BDC7CB}"/>
+                </a:ext>
+              </a:extLst>
+            </p:cNvPr>
+            <p:cNvSpPr/>
+            <p:nvPr/>
+          </p:nvSpPr>
+          <p:spPr>
+            <a:xfrm>
+              <a:off x="441903" y="792027"/>
+              <a:ext cx="106670" cy="106610"/>
+            </a:xfrm>
+            <a:prstGeom prst="ellipse">
+              <a:avLst/>
+            </a:prstGeom>
+            <a:solidFill>
+              <a:schemeClr val="accent2">
+                <a:lumMod val="60000"/>
+                <a:lumOff val="40000"/>
+              </a:schemeClr>
+            </a:solidFill>
+            <a:ln>
+              <a:solidFill>
+                <a:schemeClr val="accent2">
+                  <a:lumMod val="75000"/>
+                </a:schemeClr>
+              </a:solidFill>
+            </a:ln>
+          </p:spPr>
+          <p:style>
+            <a:lnRef idx="2">
+              <a:schemeClr val="accent1">
+                <a:shade val="50000"/>
+              </a:schemeClr>
+            </a:lnRef>
+            <a:fillRef idx="1">
+              <a:schemeClr val="accent1"/>
+            </a:fillRef>
+            <a:effectRef idx="0">
+              <a:schemeClr val="accent1"/>
+            </a:effectRef>
+            <a:fontRef idx="minor">
+              <a:schemeClr val="lt1"/>
+            </a:fontRef>
+          </p:style>
+          <p:txBody>
+            <a:bodyPr rot="0" spcFirstLastPara="0" vert="horz" wrap="square" lIns="91440" tIns="45720" rIns="91440" bIns="45720" numCol="1" spcCol="0" rtlCol="0" fromWordArt="0" anchor="ctr" anchorCtr="0" forceAA="0" compatLnSpc="1">
+              <a:prstTxWarp prst="textNoShape">
+                <a:avLst/>
+              </a:prstTxWarp>
+              <a:noAutofit/>
+            </a:bodyPr>
+            <a:lstStyle/>
+            <a:p>
+              <a:endParaRPr lang="en-US"/>
+            </a:p>
+          </p:txBody>
+        </p:sp>
+        <p:sp>
+          <p:nvSpPr>
+            <p:cNvPr id="15" name="Oval 14">
+              <a:extLst>
+                <a:ext uri="{FF2B5EF4-FFF2-40B4-BE49-F238E27FC236}">
+                  <a16:creationId xmlns:a16="http://schemas.microsoft.com/office/drawing/2014/main" id="{BF30210F-F8E9-9897-524D-836FB971251F}"/>
+                </a:ext>
+              </a:extLst>
+            </p:cNvPr>
+            <p:cNvSpPr/>
+            <p:nvPr/>
+          </p:nvSpPr>
+          <p:spPr>
+            <a:xfrm>
+              <a:off x="679851" y="792027"/>
+              <a:ext cx="106670" cy="106610"/>
+            </a:xfrm>
+            <a:prstGeom prst="ellipse">
+              <a:avLst/>
+            </a:prstGeom>
+            <a:solidFill>
+              <a:schemeClr val="accent2">
+                <a:lumMod val="60000"/>
+                <a:lumOff val="40000"/>
+              </a:schemeClr>
+            </a:solidFill>
+            <a:ln>
+              <a:solidFill>
+                <a:schemeClr val="accent2">
+                  <a:lumMod val="75000"/>
+                </a:schemeClr>
+              </a:solidFill>
+            </a:ln>
+          </p:spPr>
+          <p:style>
+            <a:lnRef idx="2">
+              <a:schemeClr val="accent1">
+                <a:shade val="50000"/>
+              </a:schemeClr>
+            </a:lnRef>
+            <a:fillRef idx="1">
+              <a:schemeClr val="accent1"/>
+            </a:fillRef>
+            <a:effectRef idx="0">
+              <a:schemeClr val="accent1"/>
+            </a:effectRef>
+            <a:fontRef idx="minor">
+              <a:schemeClr val="lt1"/>
+            </a:fontRef>
+          </p:style>
+          <p:txBody>
+            <a:bodyPr rot="0" spcFirstLastPara="0" vert="horz" wrap="square" lIns="91440" tIns="45720" rIns="91440" bIns="45720" numCol="1" spcCol="0" rtlCol="0" fromWordArt="0" anchor="ctr" anchorCtr="0" forceAA="0" compatLnSpc="1">
+              <a:prstTxWarp prst="textNoShape">
+                <a:avLst/>
+              </a:prstTxWarp>
+              <a:noAutofit/>
+            </a:bodyPr>
+            <a:lstStyle/>
+            <a:p>
+              <a:endParaRPr lang="en-US"/>
+            </a:p>
+          </p:txBody>
+        </p:sp>
+        <p:sp>
+          <p:nvSpPr>
+            <p:cNvPr id="16" name="Oval 15">
+              <a:extLst>
+                <a:ext uri="{FF2B5EF4-FFF2-40B4-BE49-F238E27FC236}">
+                  <a16:creationId xmlns:a16="http://schemas.microsoft.com/office/drawing/2014/main" id="{19F3DF03-8EEC-6178-6549-E20A13AB87A1}"/>
+                </a:ext>
+              </a:extLst>
+            </p:cNvPr>
+            <p:cNvSpPr/>
+            <p:nvPr/>
+          </p:nvSpPr>
+          <p:spPr>
+            <a:xfrm>
+              <a:off x="924598" y="802224"/>
+              <a:ext cx="106670" cy="106610"/>
+            </a:xfrm>
+            <a:prstGeom prst="ellipse">
+              <a:avLst/>
+            </a:prstGeom>
+            <a:solidFill>
+              <a:schemeClr val="accent2">
+                <a:lumMod val="60000"/>
+                <a:lumOff val="40000"/>
+              </a:schemeClr>
+            </a:solidFill>
+            <a:ln>
+              <a:solidFill>
+                <a:schemeClr val="accent2">
+                  <a:lumMod val="75000"/>
+                </a:schemeClr>
+              </a:solidFill>
+            </a:ln>
+          </p:spPr>
+          <p:style>
+            <a:lnRef idx="2">
+              <a:schemeClr val="accent1">
+                <a:shade val="50000"/>
+              </a:schemeClr>
+            </a:lnRef>
+            <a:fillRef idx="1">
+              <a:schemeClr val="accent1"/>
+            </a:fillRef>
+            <a:effectRef idx="0">
+              <a:schemeClr val="accent1"/>
+            </a:effectRef>
+            <a:fontRef idx="minor">
+              <a:schemeClr val="lt1"/>
+            </a:fontRef>
+          </p:style>
+          <p:txBody>
+            <a:bodyPr rot="0" spcFirstLastPara="0" vert="horz" wrap="square" lIns="91440" tIns="45720" rIns="91440" bIns="45720" numCol="1" spcCol="0" rtlCol="0" fromWordArt="0" anchor="ctr" anchorCtr="0" forceAA="0" compatLnSpc="1">
+              <a:prstTxWarp prst="textNoShape">
+                <a:avLst/>
+              </a:prstTxWarp>
+              <a:noAutofit/>
+            </a:bodyPr>
+            <a:lstStyle/>
+            <a:p>
+              <a:endParaRPr lang="en-US"/>
+            </a:p>
+          </p:txBody>
+        </p:sp>
+        <p:sp>
+          <p:nvSpPr>
+            <p:cNvPr id="17" name="Oval 16">
+              <a:extLst>
+                <a:ext uri="{FF2B5EF4-FFF2-40B4-BE49-F238E27FC236}">
+                  <a16:creationId xmlns:a16="http://schemas.microsoft.com/office/drawing/2014/main" id="{D949EB07-D387-A495-7717-94B85D219032}"/>
+                </a:ext>
+              </a:extLst>
+            </p:cNvPr>
+            <p:cNvSpPr/>
+            <p:nvPr/>
+          </p:nvSpPr>
+          <p:spPr>
+            <a:xfrm>
+              <a:off x="1162546" y="795426"/>
+              <a:ext cx="106670" cy="106610"/>
+            </a:xfrm>
+            <a:prstGeom prst="ellipse">
+              <a:avLst/>
+            </a:prstGeom>
+            <a:solidFill>
+              <a:schemeClr val="accent2">
+                <a:lumMod val="60000"/>
+                <a:lumOff val="40000"/>
+              </a:schemeClr>
+            </a:solidFill>
+            <a:ln>
+              <a:solidFill>
+                <a:schemeClr val="accent2">
+                  <a:lumMod val="75000"/>
+                </a:schemeClr>
+              </a:solidFill>
+            </a:ln>
+          </p:spPr>
+          <p:style>
+            <a:lnRef idx="2">
+              <a:schemeClr val="accent1">
+                <a:shade val="50000"/>
+              </a:schemeClr>
+            </a:lnRef>
+            <a:fillRef idx="1">
+              <a:schemeClr val="accent1"/>
+            </a:fillRef>
+            <a:effectRef idx="0">
+              <a:schemeClr val="accent1"/>
+            </a:effectRef>
+            <a:fontRef idx="minor">
+              <a:schemeClr val="lt1"/>
+            </a:fontRef>
+          </p:style>
+          <p:txBody>
+            <a:bodyPr rot="0" spcFirstLastPara="0" vert="horz" wrap="square" lIns="91440" tIns="45720" rIns="91440" bIns="45720" numCol="1" spcCol="0" rtlCol="0" fromWordArt="0" anchor="ctr" anchorCtr="0" forceAA="0" compatLnSpc="1">
+              <a:prstTxWarp prst="textNoShape">
+                <a:avLst/>
+              </a:prstTxWarp>
+              <a:noAutofit/>
+            </a:bodyPr>
+            <a:lstStyle/>
+            <a:p>
+              <a:endParaRPr lang="en-US"/>
+            </a:p>
+          </p:txBody>
+        </p:sp>
+        <p:cxnSp>
+          <p:nvCxnSpPr>
+            <p:cNvPr id="18" name="Straight Arrow Connector 17">
+              <a:extLst>
+                <a:ext uri="{FF2B5EF4-FFF2-40B4-BE49-F238E27FC236}">
+                  <a16:creationId xmlns:a16="http://schemas.microsoft.com/office/drawing/2014/main" id="{BB073CAA-165F-8702-847D-FB3E2D5BCE63}"/>
+                </a:ext>
+              </a:extLst>
+            </p:cNvPr>
+            <p:cNvCxnSpPr/>
+            <p:nvPr/>
+          </p:nvCxnSpPr>
+          <p:spPr>
+            <a:xfrm flipH="1">
+              <a:off x="91780" y="91780"/>
+              <a:ext cx="332235" cy="183357"/>
+            </a:xfrm>
+            <a:prstGeom prst="straightConnector1">
+              <a:avLst/>
+            </a:prstGeom>
+            <a:ln w="12700">
+              <a:tailEnd type="triangle" w="sm" len="med"/>
+            </a:ln>
+          </p:spPr>
+          <p:style>
+            <a:lnRef idx="1">
+              <a:schemeClr val="accent1"/>
+            </a:lnRef>
+            <a:fillRef idx="0">
+              <a:schemeClr val="accent1"/>
+            </a:fillRef>
+            <a:effectRef idx="0">
+              <a:schemeClr val="accent1"/>
+            </a:effectRef>
+            <a:fontRef idx="minor">
+              <a:schemeClr val="tx1"/>
+            </a:fontRef>
+          </p:style>
+        </p:cxnSp>
+        <p:cxnSp>
+          <p:nvCxnSpPr>
+            <p:cNvPr id="19" name="Straight Arrow Connector 18">
+              <a:extLst>
+                <a:ext uri="{FF2B5EF4-FFF2-40B4-BE49-F238E27FC236}">
+                  <a16:creationId xmlns:a16="http://schemas.microsoft.com/office/drawing/2014/main" id="{85B8FAD4-B107-C6D3-99BD-37A867EEBFE1}"/>
+                </a:ext>
+              </a:extLst>
+            </p:cNvPr>
+            <p:cNvCxnSpPr/>
+            <p:nvPr/>
+          </p:nvCxnSpPr>
+          <p:spPr>
+            <a:xfrm flipH="1">
+              <a:off x="322929" y="91780"/>
+              <a:ext cx="99463" cy="167744"/>
+            </a:xfrm>
+            <a:prstGeom prst="straightConnector1">
+              <a:avLst/>
+            </a:prstGeom>
+            <a:ln w="12700">
+              <a:tailEnd type="triangle" w="sm" len="med"/>
+            </a:ln>
+          </p:spPr>
+          <p:style>
+            <a:lnRef idx="1">
+              <a:schemeClr val="accent1"/>
+            </a:lnRef>
+            <a:fillRef idx="0">
+              <a:schemeClr val="accent1"/>
+            </a:fillRef>
+            <a:effectRef idx="0">
+              <a:schemeClr val="accent1"/>
+            </a:effectRef>
+            <a:fontRef idx="minor">
+              <a:schemeClr val="tx1"/>
+            </a:fontRef>
+          </p:style>
+        </p:cxnSp>
+        <p:cxnSp>
+          <p:nvCxnSpPr>
+            <p:cNvPr id="20" name="Straight Arrow Connector 19">
+              <a:extLst>
+                <a:ext uri="{FF2B5EF4-FFF2-40B4-BE49-F238E27FC236}">
+                  <a16:creationId xmlns:a16="http://schemas.microsoft.com/office/drawing/2014/main" id="{70206908-E529-F846-DC0A-1D610B81410D}"/>
+                </a:ext>
+              </a:extLst>
+            </p:cNvPr>
+            <p:cNvCxnSpPr/>
+            <p:nvPr/>
+          </p:nvCxnSpPr>
+          <p:spPr>
+            <a:xfrm>
+              <a:off x="499691" y="91780"/>
+              <a:ext cx="68788" cy="167744"/>
+            </a:xfrm>
+            <a:prstGeom prst="straightConnector1">
+              <a:avLst/>
+            </a:prstGeom>
+            <a:ln w="12700">
+              <a:tailEnd type="triangle" w="sm" len="med"/>
+            </a:ln>
+          </p:spPr>
+          <p:style>
+            <a:lnRef idx="1">
+              <a:schemeClr val="accent1"/>
+            </a:lnRef>
+            <a:fillRef idx="0">
+              <a:schemeClr val="accent1"/>
+            </a:fillRef>
+            <a:effectRef idx="0">
+              <a:schemeClr val="accent1"/>
+            </a:effectRef>
+            <a:fontRef idx="minor">
+              <a:schemeClr val="tx1"/>
+            </a:fontRef>
+          </p:style>
+        </p:cxnSp>
+        <p:cxnSp>
+          <p:nvCxnSpPr>
+            <p:cNvPr id="21" name="Straight Arrow Connector 20">
+              <a:extLst>
+                <a:ext uri="{FF2B5EF4-FFF2-40B4-BE49-F238E27FC236}">
+                  <a16:creationId xmlns:a16="http://schemas.microsoft.com/office/drawing/2014/main" id="{9684E2EF-903D-5FF5-C869-07FDA76F6F94}"/>
+                </a:ext>
+              </a:extLst>
+            </p:cNvPr>
+            <p:cNvCxnSpPr/>
+            <p:nvPr/>
+          </p:nvCxnSpPr>
+          <p:spPr>
+            <a:xfrm>
+              <a:off x="499691" y="91780"/>
+              <a:ext cx="301559" cy="183357"/>
+            </a:xfrm>
+            <a:prstGeom prst="straightConnector1">
+              <a:avLst/>
+            </a:prstGeom>
+            <a:ln w="12700">
+              <a:tailEnd type="triangle" w="sm" len="med"/>
+            </a:ln>
+          </p:spPr>
+          <p:style>
+            <a:lnRef idx="1">
+              <a:schemeClr val="accent1"/>
+            </a:lnRef>
+            <a:fillRef idx="0">
+              <a:schemeClr val="accent1"/>
+            </a:fillRef>
+            <a:effectRef idx="0">
+              <a:schemeClr val="accent1"/>
+            </a:effectRef>
+            <a:fontRef idx="minor">
+              <a:schemeClr val="tx1"/>
+            </a:fontRef>
+          </p:style>
+        </p:cxnSp>
+        <p:cxnSp>
+          <p:nvCxnSpPr>
+            <p:cNvPr id="22" name="Straight Arrow Connector 21">
+              <a:extLst>
+                <a:ext uri="{FF2B5EF4-FFF2-40B4-BE49-F238E27FC236}">
+                  <a16:creationId xmlns:a16="http://schemas.microsoft.com/office/drawing/2014/main" id="{84DAECD0-17C0-3F16-1CF8-B5F3F5664434}"/>
+                </a:ext>
+              </a:extLst>
+            </p:cNvPr>
+            <p:cNvCxnSpPr/>
+            <p:nvPr/>
+          </p:nvCxnSpPr>
+          <p:spPr>
+            <a:xfrm flipH="1">
+              <a:off x="669654" y="350123"/>
+              <a:ext cx="129862" cy="171721"/>
+            </a:xfrm>
+            <a:prstGeom prst="straightConnector1">
+              <a:avLst/>
+            </a:prstGeom>
+            <a:ln w="12700">
+              <a:tailEnd type="triangle" w="sm" len="med"/>
+            </a:ln>
+          </p:spPr>
+          <p:style>
+            <a:lnRef idx="1">
+              <a:schemeClr val="accent1"/>
+            </a:lnRef>
+            <a:fillRef idx="0">
+              <a:schemeClr val="accent1"/>
+            </a:fillRef>
+            <a:effectRef idx="0">
+              <a:schemeClr val="accent1"/>
+            </a:effectRef>
+            <a:fontRef idx="minor">
+              <a:schemeClr val="tx1"/>
+            </a:fontRef>
+          </p:style>
+        </p:cxnSp>
+        <p:cxnSp>
+          <p:nvCxnSpPr>
+            <p:cNvPr id="23" name="Straight Arrow Connector 22">
+              <a:extLst>
+                <a:ext uri="{FF2B5EF4-FFF2-40B4-BE49-F238E27FC236}">
+                  <a16:creationId xmlns:a16="http://schemas.microsoft.com/office/drawing/2014/main" id="{DD85F0C4-3330-36C7-43C5-6B815268A885}"/>
+                </a:ext>
+              </a:extLst>
+            </p:cNvPr>
+            <p:cNvCxnSpPr/>
+            <p:nvPr/>
+          </p:nvCxnSpPr>
+          <p:spPr>
+            <a:xfrm flipH="1">
+              <a:off x="496291" y="611866"/>
+              <a:ext cx="137530" cy="179336"/>
+            </a:xfrm>
+            <a:prstGeom prst="straightConnector1">
+              <a:avLst/>
+            </a:prstGeom>
+            <a:ln w="12700">
+              <a:tailEnd type="triangle" w="sm" len="med"/>
+            </a:ln>
+          </p:spPr>
+          <p:style>
+            <a:lnRef idx="1">
+              <a:schemeClr val="accent1"/>
+            </a:lnRef>
+            <a:fillRef idx="0">
+              <a:schemeClr val="accent1"/>
+            </a:fillRef>
+            <a:effectRef idx="0">
+              <a:schemeClr val="accent1"/>
+            </a:effectRef>
+            <a:fontRef idx="minor">
+              <a:schemeClr val="tx1"/>
+            </a:fontRef>
+          </p:style>
+        </p:cxnSp>
+        <p:cxnSp>
+          <p:nvCxnSpPr>
+            <p:cNvPr id="24" name="Straight Arrow Connector 23">
+              <a:extLst>
+                <a:ext uri="{FF2B5EF4-FFF2-40B4-BE49-F238E27FC236}">
+                  <a16:creationId xmlns:a16="http://schemas.microsoft.com/office/drawing/2014/main" id="{B1947CC6-AD4B-4CDD-B01E-B9B558332A23}"/>
+                </a:ext>
+              </a:extLst>
+            </p:cNvPr>
+            <p:cNvCxnSpPr/>
+            <p:nvPr/>
+          </p:nvCxnSpPr>
+          <p:spPr>
+            <a:xfrm>
+              <a:off x="877008" y="350123"/>
+              <a:ext cx="129911" cy="171721"/>
+            </a:xfrm>
+            <a:prstGeom prst="straightConnector1">
+              <a:avLst/>
+            </a:prstGeom>
+            <a:ln w="12700">
+              <a:tailEnd type="triangle" w="sm" len="med"/>
+            </a:ln>
+          </p:spPr>
+          <p:style>
+            <a:lnRef idx="1">
+              <a:schemeClr val="accent1"/>
+            </a:lnRef>
+            <a:fillRef idx="0">
+              <a:schemeClr val="accent1"/>
+            </a:fillRef>
+            <a:effectRef idx="0">
+              <a:schemeClr val="accent1"/>
+            </a:effectRef>
+            <a:fontRef idx="minor">
+              <a:schemeClr val="tx1"/>
+            </a:fontRef>
+          </p:style>
+        </p:cxnSp>
+        <p:cxnSp>
+          <p:nvCxnSpPr>
+            <p:cNvPr id="25" name="Straight Arrow Connector 24">
+              <a:extLst>
+                <a:ext uri="{FF2B5EF4-FFF2-40B4-BE49-F238E27FC236}">
+                  <a16:creationId xmlns:a16="http://schemas.microsoft.com/office/drawing/2014/main" id="{CDB32854-1D55-7F70-F6E9-66CAF6558C3D}"/>
+                </a:ext>
+              </a:extLst>
+            </p:cNvPr>
+            <p:cNvCxnSpPr/>
+            <p:nvPr/>
+          </p:nvCxnSpPr>
+          <p:spPr>
+            <a:xfrm>
+              <a:off x="707045" y="611866"/>
+              <a:ext cx="23241" cy="179336"/>
+            </a:xfrm>
+            <a:prstGeom prst="straightConnector1">
+              <a:avLst/>
+            </a:prstGeom>
+            <a:ln w="12700">
+              <a:tailEnd type="triangle" w="sm" len="med"/>
+            </a:ln>
+          </p:spPr>
+          <p:style>
+            <a:lnRef idx="1">
+              <a:schemeClr val="accent1"/>
+            </a:lnRef>
+            <a:fillRef idx="0">
+              <a:schemeClr val="accent1"/>
+            </a:fillRef>
+            <a:effectRef idx="0">
+              <a:schemeClr val="accent1"/>
+            </a:effectRef>
+            <a:fontRef idx="minor">
+              <a:schemeClr val="tx1"/>
+            </a:fontRef>
+          </p:style>
+        </p:cxnSp>
+        <p:cxnSp>
+          <p:nvCxnSpPr>
+            <p:cNvPr id="26" name="Straight Arrow Connector 25">
+              <a:extLst>
+                <a:ext uri="{FF2B5EF4-FFF2-40B4-BE49-F238E27FC236}">
+                  <a16:creationId xmlns:a16="http://schemas.microsoft.com/office/drawing/2014/main" id="{C9228884-E5CE-9218-148E-F9934243954B}"/>
+                </a:ext>
+              </a:extLst>
+            </p:cNvPr>
+            <p:cNvCxnSpPr/>
+            <p:nvPr/>
+          </p:nvCxnSpPr>
+          <p:spPr>
+            <a:xfrm flipH="1">
+              <a:off x="978986" y="628862"/>
+              <a:ext cx="26668" cy="171338"/>
+            </a:xfrm>
+            <a:prstGeom prst="straightConnector1">
+              <a:avLst/>
+            </a:prstGeom>
+            <a:ln w="12700">
+              <a:tailEnd type="triangle" w="sm" len="med"/>
+            </a:ln>
+          </p:spPr>
+          <p:style>
+            <a:lnRef idx="1">
+              <a:schemeClr val="accent1"/>
+            </a:lnRef>
+            <a:fillRef idx="0">
+              <a:schemeClr val="accent1"/>
+            </a:fillRef>
+            <a:effectRef idx="0">
+              <a:schemeClr val="accent1"/>
+            </a:effectRef>
+            <a:fontRef idx="minor">
+              <a:schemeClr val="tx1"/>
+            </a:fontRef>
+          </p:style>
+        </p:cxnSp>
+        <p:cxnSp>
+          <p:nvCxnSpPr>
+            <p:cNvPr id="27" name="Straight Arrow Connector 26">
+              <a:extLst>
+                <a:ext uri="{FF2B5EF4-FFF2-40B4-BE49-F238E27FC236}">
+                  <a16:creationId xmlns:a16="http://schemas.microsoft.com/office/drawing/2014/main" id="{659B8CAE-0D8C-1187-1BD7-DAE7E8B0D0C6}"/>
+                </a:ext>
+              </a:extLst>
+            </p:cNvPr>
+            <p:cNvCxnSpPr/>
+            <p:nvPr/>
+          </p:nvCxnSpPr>
+          <p:spPr>
+            <a:xfrm>
+              <a:off x="1043572" y="611866"/>
+              <a:ext cx="173701" cy="183143"/>
+            </a:xfrm>
+            <a:prstGeom prst="straightConnector1">
+              <a:avLst/>
+            </a:prstGeom>
+            <a:ln w="12700">
+              <a:tailEnd type="triangle" w="sm" len="med"/>
+            </a:ln>
+          </p:spPr>
+          <p:style>
+            <a:lnRef idx="1">
+              <a:schemeClr val="accent1"/>
+            </a:lnRef>
+            <a:fillRef idx="0">
+              <a:schemeClr val="accent1"/>
+            </a:fillRef>
+            <a:effectRef idx="0">
+              <a:schemeClr val="accent1"/>
+            </a:effectRef>
+            <a:fontRef idx="minor">
+              <a:schemeClr val="tx1"/>
+            </a:fontRef>
+          </p:style>
+        </p:cxnSp>
+      </p:grpSp>
+      <p:sp>
+        <p:nvSpPr>
+          <p:cNvPr id="28" name="Text Box 2">
+            <a:extLst>
+              <a:ext uri="{FF2B5EF4-FFF2-40B4-BE49-F238E27FC236}">
+                <a16:creationId xmlns:a16="http://schemas.microsoft.com/office/drawing/2014/main" id="{1551B803-4827-5E2F-D2B2-ACC90ACA908C}"/>
+              </a:ext>
+            </a:extLst>
+          </p:cNvPr>
+          <p:cNvSpPr txBox="1">
+            <a:spLocks noChangeArrowheads="1"/>
+          </p:cNvSpPr>
+          <p:nvPr/>
+        </p:nvSpPr>
+        <p:spPr bwMode="auto">
+          <a:xfrm>
+            <a:off x="1986475" y="2698402"/>
+            <a:ext cx="1437332" cy="407035"/>
+          </a:xfrm>
+          <a:prstGeom prst="rect">
+            <a:avLst/>
+          </a:prstGeom>
+          <a:noFill/>
+          <a:ln w="9525">
+            <a:noFill/>
+            <a:miter lim="800000"/>
+            <a:headEnd/>
+            <a:tailEnd/>
+          </a:ln>
+        </p:spPr>
+        <p:txBody>
+          <a:bodyPr rot="0" vert="horz" wrap="square" lIns="91440" tIns="45720" rIns="91440" bIns="45720" anchor="t" anchorCtr="0">
+            <a:spAutoFit/>
+          </a:bodyPr>
+          <a:lstStyle/>
+          <a:p>
+            <a:pPr marL="0" marR="0">
+              <a:lnSpc>
+                <a:spcPct val="107000"/>
+              </a:lnSpc>
+              <a:spcBef>
+                <a:spcPts val="0"/>
+              </a:spcBef>
+              <a:spcAft>
+                <a:spcPts val="800"/>
+              </a:spcAft>
+            </a:pPr>
+            <a:r>
+              <a:rPr lang="en-US" sz="2000" dirty="0">
+                <a:effectLst/>
+                <a:ea typeface="DengXian" panose="02010600030101010101" pitchFamily="2" charset="-122"/>
+                <a:cs typeface="Times New Roman" panose="02020603050405020304" pitchFamily="18" charset="0"/>
+              </a:rPr>
+              <a:t>AST subtree</a:t>
+            </a:r>
+          </a:p>
+        </p:txBody>
+      </p:sp>
+      <p:cxnSp>
+        <p:nvCxnSpPr>
+          <p:cNvPr id="30" name="Straight Arrow Connector 29">
+            <a:extLst>
+              <a:ext uri="{FF2B5EF4-FFF2-40B4-BE49-F238E27FC236}">
+                <a16:creationId xmlns:a16="http://schemas.microsoft.com/office/drawing/2014/main" id="{42788FF5-AF69-5805-F107-E8521A6AA3B8}"/>
+              </a:ext>
+            </a:extLst>
+          </p:cNvPr>
+          <p:cNvCxnSpPr>
+            <a:cxnSpLocks/>
+            <a:stCxn id="2" idx="3"/>
+            <a:endCxn id="3" idx="1"/>
+          </p:cNvCxnSpPr>
+          <p:nvPr/>
+        </p:nvCxnSpPr>
+        <p:spPr>
+          <a:xfrm flipV="1">
+            <a:off x="1177111" y="2217368"/>
+            <a:ext cx="97023" cy="620520"/>
+          </a:xfrm>
+          <a:prstGeom prst="straightConnector1">
+            <a:avLst/>
+          </a:prstGeom>
+          <a:ln>
+            <a:tailEnd type="triangle"/>
+          </a:ln>
+        </p:spPr>
+        <p:style>
+          <a:lnRef idx="1">
+            <a:schemeClr val="dk1"/>
+          </a:lnRef>
+          <a:fillRef idx="0">
+            <a:schemeClr val="dk1"/>
+          </a:fillRef>
+          <a:effectRef idx="0">
+            <a:schemeClr val="dk1"/>
+          </a:effectRef>
+          <a:fontRef idx="minor">
+            <a:schemeClr val="tx1"/>
+          </a:fontRef>
+        </p:style>
+      </p:cxnSp>
+      <p:cxnSp>
+        <p:nvCxnSpPr>
+          <p:cNvPr id="31" name="Straight Arrow Connector 30">
+            <a:extLst>
+              <a:ext uri="{FF2B5EF4-FFF2-40B4-BE49-F238E27FC236}">
+                <a16:creationId xmlns:a16="http://schemas.microsoft.com/office/drawing/2014/main" id="{7A9BF418-7ABD-A0D5-78B0-EFC08F7CDE9C}"/>
+              </a:ext>
+            </a:extLst>
+          </p:cNvPr>
+          <p:cNvCxnSpPr>
+            <a:cxnSpLocks/>
+            <a:stCxn id="2" idx="3"/>
+          </p:cNvCxnSpPr>
+          <p:nvPr/>
+        </p:nvCxnSpPr>
+        <p:spPr>
+          <a:xfrm>
+            <a:off x="1177111" y="2837888"/>
+            <a:ext cx="95435" cy="507086"/>
+          </a:xfrm>
+          <a:prstGeom prst="straightConnector1">
+            <a:avLst/>
+          </a:prstGeom>
+          <a:ln>
+            <a:tailEnd type="triangle"/>
+          </a:ln>
+        </p:spPr>
+        <p:style>
+          <a:lnRef idx="1">
+            <a:schemeClr val="dk1"/>
+          </a:lnRef>
+          <a:fillRef idx="0">
+            <a:schemeClr val="dk1"/>
+          </a:fillRef>
+          <a:effectRef idx="0">
+            <a:schemeClr val="dk1"/>
+          </a:effectRef>
+          <a:fontRef idx="minor">
+            <a:schemeClr val="tx1"/>
+          </a:fontRef>
+        </p:style>
+      </p:cxnSp>
+      <p:sp>
+        <p:nvSpPr>
+          <p:cNvPr id="35" name="Rectangle: Rounded Corners 34">
+            <a:extLst>
+              <a:ext uri="{FF2B5EF4-FFF2-40B4-BE49-F238E27FC236}">
+                <a16:creationId xmlns:a16="http://schemas.microsoft.com/office/drawing/2014/main" id="{C9FD52B3-D3C9-0B06-DDDB-FD1155340315}"/>
+              </a:ext>
+            </a:extLst>
+          </p:cNvPr>
+          <p:cNvSpPr/>
+          <p:nvPr/>
+        </p:nvSpPr>
+        <p:spPr>
+          <a:xfrm>
+            <a:off x="3237878" y="2033197"/>
+            <a:ext cx="1312244" cy="361136"/>
+          </a:xfrm>
+          <a:prstGeom prst="roundRect">
+            <a:avLst>
+              <a:gd name="adj" fmla="val 8320"/>
+            </a:avLst>
+          </a:prstGeom>
+          <a:solidFill>
+            <a:schemeClr val="accent6">
+              <a:lumMod val="20000"/>
+              <a:lumOff val="80000"/>
+            </a:schemeClr>
+          </a:solidFill>
+          <a:ln>
+            <a:solidFill>
+              <a:schemeClr val="accent6">
+                <a:lumMod val="75000"/>
+              </a:schemeClr>
+            </a:solidFill>
+          </a:ln>
+        </p:spPr>
+        <p:style>
+          <a:lnRef idx="2">
+            <a:schemeClr val="accent1">
+              <a:shade val="50000"/>
+            </a:schemeClr>
+          </a:lnRef>
+          <a:fillRef idx="1">
+            <a:schemeClr val="accent1"/>
+          </a:fillRef>
+          <a:effectRef idx="0">
+            <a:schemeClr val="accent1"/>
+          </a:effectRef>
+          <a:fontRef idx="minor">
+            <a:schemeClr val="lt1"/>
+          </a:fontRef>
+        </p:style>
+        <p:txBody>
+          <a:bodyPr rot="0" spcFirstLastPara="0" vert="horz" wrap="square" lIns="45720" tIns="0" rIns="45720" bIns="0" numCol="1" spcCol="0" rtlCol="0" fromWordArt="0" anchor="ctr" anchorCtr="0" forceAA="0" compatLnSpc="1">
+            <a:prstTxWarp prst="textNoShape">
+              <a:avLst/>
+            </a:prstTxWarp>
+            <a:noAutofit/>
+          </a:bodyPr>
+          <a:lstStyle/>
+          <a:p>
+            <a:pPr marL="0" marR="0" algn="ctr">
+              <a:lnSpc>
+                <a:spcPct val="107000"/>
+              </a:lnSpc>
+              <a:spcBef>
+                <a:spcPts val="0"/>
+              </a:spcBef>
+              <a:spcAft>
+                <a:spcPts val="800"/>
+              </a:spcAft>
+            </a:pPr>
+            <a:r>
+              <a:rPr lang="en-US" sz="2000" dirty="0">
+                <a:solidFill>
+                  <a:srgbClr val="000000"/>
+                </a:solidFill>
+                <a:effectLst/>
+                <a:ea typeface="DengXian" panose="02010600030101010101" pitchFamily="2" charset="-122"/>
+                <a:cs typeface="Times New Roman" panose="02020603050405020304" pitchFamily="18" charset="0"/>
+              </a:rPr>
+              <a:t>Embedding</a:t>
+            </a:r>
+            <a:endParaRPr lang="en-US" sz="2000" dirty="0">
+              <a:effectLst/>
+              <a:ea typeface="DengXian" panose="02010600030101010101" pitchFamily="2" charset="-122"/>
+              <a:cs typeface="Times New Roman" panose="02020603050405020304" pitchFamily="18" charset="0"/>
+            </a:endParaRPr>
+          </a:p>
+        </p:txBody>
+      </p:sp>
+      <p:sp>
+        <p:nvSpPr>
+          <p:cNvPr id="36" name="Rectangle: Rounded Corners 35">
+            <a:extLst>
+              <a:ext uri="{FF2B5EF4-FFF2-40B4-BE49-F238E27FC236}">
+                <a16:creationId xmlns:a16="http://schemas.microsoft.com/office/drawing/2014/main" id="{36E169F0-D820-607D-DF95-FD4A7AEF9036}"/>
+              </a:ext>
+            </a:extLst>
+          </p:cNvPr>
+          <p:cNvSpPr/>
+          <p:nvPr/>
+        </p:nvSpPr>
+        <p:spPr>
+          <a:xfrm>
+            <a:off x="4763705" y="2053524"/>
+            <a:ext cx="723591" cy="340809"/>
+          </a:xfrm>
+          <a:prstGeom prst="roundRect">
+            <a:avLst>
+              <a:gd name="adj" fmla="val 8320"/>
+            </a:avLst>
+          </a:prstGeom>
+          <a:solidFill>
+            <a:schemeClr val="accent5">
+              <a:lumMod val="20000"/>
+              <a:lumOff val="80000"/>
+            </a:schemeClr>
+          </a:solidFill>
+          <a:ln>
+            <a:solidFill>
+              <a:schemeClr val="accent5">
+                <a:lumMod val="50000"/>
+              </a:schemeClr>
+            </a:solidFill>
+          </a:ln>
+        </p:spPr>
+        <p:style>
+          <a:lnRef idx="2">
+            <a:schemeClr val="accent1">
+              <a:shade val="50000"/>
+            </a:schemeClr>
+          </a:lnRef>
+          <a:fillRef idx="1">
+            <a:schemeClr val="accent1"/>
+          </a:fillRef>
+          <a:effectRef idx="0">
+            <a:schemeClr val="accent1"/>
+          </a:effectRef>
+          <a:fontRef idx="minor">
+            <a:schemeClr val="lt1"/>
+          </a:fontRef>
+        </p:style>
+        <p:txBody>
+          <a:bodyPr rot="0" spcFirstLastPara="0" vert="horz" wrap="square" lIns="45720" tIns="0" rIns="45720" bIns="0" numCol="1" spcCol="0" rtlCol="0" fromWordArt="0" anchor="ctr" anchorCtr="0" forceAA="0" compatLnSpc="1">
+            <a:prstTxWarp prst="textNoShape">
+              <a:avLst/>
+            </a:prstTxWarp>
+            <a:noAutofit/>
+          </a:bodyPr>
+          <a:lstStyle/>
+          <a:p>
+            <a:pPr marL="0" marR="0" algn="ctr">
+              <a:lnSpc>
+                <a:spcPct val="80000"/>
+              </a:lnSpc>
+              <a:spcBef>
+                <a:spcPts val="0"/>
+              </a:spcBef>
+              <a:spcAft>
+                <a:spcPts val="0"/>
+              </a:spcAft>
+            </a:pPr>
+            <a:r>
+              <a:rPr lang="en-US" sz="2000" dirty="0">
+                <a:solidFill>
+                  <a:srgbClr val="000000"/>
+                </a:solidFill>
+                <a:effectLst/>
+                <a:ea typeface="DengXian" panose="02010600030101010101" pitchFamily="2" charset="-122"/>
+                <a:cs typeface="Times New Roman" panose="02020603050405020304" pitchFamily="18" charset="0"/>
+              </a:rPr>
+              <a:t>GRU</a:t>
+            </a:r>
+            <a:endParaRPr lang="en-US" sz="2000" dirty="0">
+              <a:effectLst/>
+              <a:ea typeface="DengXian" panose="02010600030101010101" pitchFamily="2" charset="-122"/>
+              <a:cs typeface="Times New Roman" panose="02020603050405020304" pitchFamily="18" charset="0"/>
+            </a:endParaRPr>
+          </a:p>
+        </p:txBody>
+      </p:sp>
+      <p:sp>
+        <p:nvSpPr>
+          <p:cNvPr id="37" name="Rectangle: Rounded Corners 36">
+            <a:extLst>
+              <a:ext uri="{FF2B5EF4-FFF2-40B4-BE49-F238E27FC236}">
+                <a16:creationId xmlns:a16="http://schemas.microsoft.com/office/drawing/2014/main" id="{C4C790D1-0521-37DF-7723-8FD334C1F862}"/>
+              </a:ext>
+            </a:extLst>
+          </p:cNvPr>
+          <p:cNvSpPr/>
+          <p:nvPr/>
+        </p:nvSpPr>
+        <p:spPr>
+          <a:xfrm>
+            <a:off x="3374015" y="3136715"/>
+            <a:ext cx="1912118" cy="336563"/>
+          </a:xfrm>
+          <a:prstGeom prst="roundRect">
+            <a:avLst>
+              <a:gd name="adj" fmla="val 8320"/>
+            </a:avLst>
+          </a:prstGeom>
+          <a:solidFill>
+            <a:schemeClr val="accent2">
+              <a:lumMod val="40000"/>
+              <a:lumOff val="60000"/>
+            </a:schemeClr>
+          </a:solidFill>
+          <a:ln>
+            <a:solidFill>
+              <a:schemeClr val="accent2">
+                <a:lumMod val="75000"/>
+              </a:schemeClr>
+            </a:solidFill>
+          </a:ln>
+        </p:spPr>
+        <p:style>
+          <a:lnRef idx="2">
+            <a:schemeClr val="accent1">
+              <a:shade val="50000"/>
+            </a:schemeClr>
+          </a:lnRef>
+          <a:fillRef idx="1">
+            <a:schemeClr val="accent1"/>
+          </a:fillRef>
+          <a:effectRef idx="0">
+            <a:schemeClr val="accent1"/>
+          </a:effectRef>
+          <a:fontRef idx="minor">
+            <a:schemeClr val="lt1"/>
+          </a:fontRef>
+        </p:style>
+        <p:txBody>
+          <a:bodyPr rot="0" spcFirstLastPara="0" vert="horz" wrap="square" lIns="0" tIns="0" rIns="0" bIns="0" numCol="1" spcCol="0" rtlCol="0" fromWordArt="0" anchor="ctr" anchorCtr="0" forceAA="0" compatLnSpc="1">
+            <a:prstTxWarp prst="textNoShape">
+              <a:avLst/>
+            </a:prstTxWarp>
+            <a:noAutofit/>
+          </a:bodyPr>
+          <a:lstStyle/>
+          <a:p>
+            <a:pPr marL="0" marR="0" algn="ctr">
+              <a:lnSpc>
+                <a:spcPct val="80000"/>
+              </a:lnSpc>
+              <a:spcBef>
+                <a:spcPts val="0"/>
+              </a:spcBef>
+              <a:spcAft>
+                <a:spcPts val="0"/>
+              </a:spcAft>
+            </a:pPr>
+            <a:r>
+              <a:rPr lang="en-US" sz="2000" dirty="0">
+                <a:solidFill>
+                  <a:srgbClr val="000000"/>
+                </a:solidFill>
+                <a:effectLst/>
+                <a:ea typeface="DengXian" panose="02010600030101010101" pitchFamily="2" charset="-122"/>
+                <a:cs typeface="Times New Roman" panose="02020603050405020304" pitchFamily="18" charset="0"/>
+              </a:rPr>
+              <a:t>Tree-LSTM</a:t>
+            </a:r>
+            <a:endParaRPr lang="en-US" sz="2000" dirty="0">
+              <a:effectLst/>
+              <a:ea typeface="DengXian" panose="02010600030101010101" pitchFamily="2" charset="-122"/>
+              <a:cs typeface="Times New Roman" panose="02020603050405020304" pitchFamily="18" charset="0"/>
+            </a:endParaRPr>
+          </a:p>
+        </p:txBody>
+      </p:sp>
+      <p:grpSp>
+        <p:nvGrpSpPr>
+          <p:cNvPr id="57" name="Group 56">
+            <a:extLst>
+              <a:ext uri="{FF2B5EF4-FFF2-40B4-BE49-F238E27FC236}">
+                <a16:creationId xmlns:a16="http://schemas.microsoft.com/office/drawing/2014/main" id="{A6C1E1DF-3508-D695-521C-C63350351DC3}"/>
+              </a:ext>
+            </a:extLst>
+          </p:cNvPr>
+          <p:cNvGrpSpPr/>
+          <p:nvPr/>
+        </p:nvGrpSpPr>
+        <p:grpSpPr>
+          <a:xfrm>
+            <a:off x="5774962" y="2096355"/>
+            <a:ext cx="814467" cy="265168"/>
+            <a:chOff x="5741749" y="2055514"/>
+            <a:chExt cx="711079" cy="217448"/>
+          </a:xfrm>
+        </p:grpSpPr>
+        <p:sp>
+          <p:nvSpPr>
+            <p:cNvPr id="39" name="Rectangle: Rounded Corners 38">
+              <a:extLst>
+                <a:ext uri="{FF2B5EF4-FFF2-40B4-BE49-F238E27FC236}">
+                  <a16:creationId xmlns:a16="http://schemas.microsoft.com/office/drawing/2014/main" id="{3C804CFA-D173-5657-10B0-82B8C92CD130}"/>
+                </a:ext>
+              </a:extLst>
+            </p:cNvPr>
+            <p:cNvSpPr/>
+            <p:nvPr/>
+          </p:nvSpPr>
+          <p:spPr>
+            <a:xfrm>
+              <a:off x="5741749" y="2055514"/>
+              <a:ext cx="711079" cy="217448"/>
+            </a:xfrm>
+            <a:prstGeom prst="roundRect">
+              <a:avLst/>
+            </a:prstGeom>
+            <a:noFill/>
+            <a:ln>
+              <a:solidFill>
+                <a:schemeClr val="tx1"/>
+              </a:solidFill>
+            </a:ln>
+          </p:spPr>
+          <p:style>
+            <a:lnRef idx="2">
+              <a:schemeClr val="accent1">
+                <a:shade val="50000"/>
+              </a:schemeClr>
+            </a:lnRef>
+            <a:fillRef idx="1">
+              <a:schemeClr val="accent1"/>
+            </a:fillRef>
+            <a:effectRef idx="0">
+              <a:schemeClr val="accent1"/>
+            </a:effectRef>
+            <a:fontRef idx="minor">
+              <a:schemeClr val="lt1"/>
+            </a:fontRef>
+          </p:style>
+          <p:txBody>
+            <a:bodyPr rot="0" spcFirstLastPara="0" vert="horz" wrap="square" lIns="91440" tIns="45720" rIns="91440" bIns="45720" numCol="1" spcCol="0" rtlCol="0" fromWordArt="0" anchor="ctr" anchorCtr="0" forceAA="0" compatLnSpc="1">
+              <a:prstTxWarp prst="textNoShape">
+                <a:avLst/>
+              </a:prstTxWarp>
+              <a:noAutofit/>
+            </a:bodyPr>
+            <a:lstStyle/>
+            <a:p>
+              <a:endParaRPr lang="en-US"/>
+            </a:p>
+          </p:txBody>
+        </p:sp>
+        <p:sp>
+          <p:nvSpPr>
+            <p:cNvPr id="40" name="Oval 39">
+              <a:extLst>
+                <a:ext uri="{FF2B5EF4-FFF2-40B4-BE49-F238E27FC236}">
+                  <a16:creationId xmlns:a16="http://schemas.microsoft.com/office/drawing/2014/main" id="{09A57C9C-7238-1798-D36E-33F2A71B6647}"/>
+                </a:ext>
+              </a:extLst>
+            </p:cNvPr>
+            <p:cNvSpPr/>
+            <p:nvPr/>
+          </p:nvSpPr>
+          <p:spPr>
+            <a:xfrm>
+              <a:off x="5822203" y="2102336"/>
+              <a:ext cx="134597" cy="137514"/>
+            </a:xfrm>
+            <a:prstGeom prst="ellipse">
+              <a:avLst/>
+            </a:prstGeom>
+            <a:solidFill>
+              <a:srgbClr val="92D050"/>
+            </a:solidFill>
+            <a:ln>
+              <a:solidFill>
+                <a:schemeClr val="accent6">
+                  <a:lumMod val="75000"/>
+                </a:schemeClr>
+              </a:solidFill>
+            </a:ln>
+          </p:spPr>
+          <p:style>
+            <a:lnRef idx="2">
+              <a:schemeClr val="accent1">
+                <a:shade val="50000"/>
+              </a:schemeClr>
+            </a:lnRef>
+            <a:fillRef idx="1">
+              <a:schemeClr val="accent1"/>
+            </a:fillRef>
+            <a:effectRef idx="0">
+              <a:schemeClr val="accent1"/>
+            </a:effectRef>
+            <a:fontRef idx="minor">
+              <a:schemeClr val="lt1"/>
+            </a:fontRef>
+          </p:style>
+          <p:txBody>
+            <a:bodyPr rot="0" spcFirstLastPara="0" vert="horz" wrap="square" lIns="91440" tIns="45720" rIns="91440" bIns="45720" numCol="1" spcCol="0" rtlCol="0" fromWordArt="0" anchor="ctr" anchorCtr="0" forceAA="0" compatLnSpc="1">
+              <a:prstTxWarp prst="textNoShape">
+                <a:avLst/>
+              </a:prstTxWarp>
+              <a:noAutofit/>
+            </a:bodyPr>
+            <a:lstStyle/>
+            <a:p>
+              <a:endParaRPr lang="en-US"/>
+            </a:p>
+          </p:txBody>
+        </p:sp>
+        <p:sp>
+          <p:nvSpPr>
+            <p:cNvPr id="41" name="Oval 40">
+              <a:extLst>
+                <a:ext uri="{FF2B5EF4-FFF2-40B4-BE49-F238E27FC236}">
+                  <a16:creationId xmlns:a16="http://schemas.microsoft.com/office/drawing/2014/main" id="{9B16C198-35EA-5BD6-9587-89FB4859B40E}"/>
+                </a:ext>
+              </a:extLst>
+            </p:cNvPr>
+            <p:cNvSpPr/>
+            <p:nvPr/>
+          </p:nvSpPr>
+          <p:spPr>
+            <a:xfrm>
+              <a:off x="6034307" y="2102336"/>
+              <a:ext cx="134597" cy="137514"/>
+            </a:xfrm>
+            <a:prstGeom prst="ellipse">
+              <a:avLst/>
+            </a:prstGeom>
+            <a:solidFill>
+              <a:srgbClr val="92D050"/>
+            </a:solidFill>
+            <a:ln>
+              <a:solidFill>
+                <a:schemeClr val="accent6">
+                  <a:lumMod val="75000"/>
+                </a:schemeClr>
+              </a:solidFill>
+            </a:ln>
+          </p:spPr>
+          <p:style>
+            <a:lnRef idx="2">
+              <a:schemeClr val="accent1">
+                <a:shade val="50000"/>
+              </a:schemeClr>
+            </a:lnRef>
+            <a:fillRef idx="1">
+              <a:schemeClr val="accent1"/>
+            </a:fillRef>
+            <a:effectRef idx="0">
+              <a:schemeClr val="accent1"/>
+            </a:effectRef>
+            <a:fontRef idx="minor">
+              <a:schemeClr val="lt1"/>
+            </a:fontRef>
+          </p:style>
+          <p:txBody>
+            <a:bodyPr rot="0" spcFirstLastPara="0" vert="horz" wrap="square" lIns="91440" tIns="45720" rIns="91440" bIns="45720" numCol="1" spcCol="0" rtlCol="0" fromWordArt="0" anchor="ctr" anchorCtr="0" forceAA="0" compatLnSpc="1">
+              <a:prstTxWarp prst="textNoShape">
+                <a:avLst/>
+              </a:prstTxWarp>
+              <a:noAutofit/>
+            </a:bodyPr>
+            <a:lstStyle/>
+            <a:p>
+              <a:endParaRPr lang="en-US"/>
+            </a:p>
+          </p:txBody>
+        </p:sp>
+        <p:sp>
+          <p:nvSpPr>
+            <p:cNvPr id="42" name="Oval 41">
+              <a:extLst>
+                <a:ext uri="{FF2B5EF4-FFF2-40B4-BE49-F238E27FC236}">
+                  <a16:creationId xmlns:a16="http://schemas.microsoft.com/office/drawing/2014/main" id="{21646110-5E81-19E0-DDCC-D33C8D9C0861}"/>
+                </a:ext>
+              </a:extLst>
+            </p:cNvPr>
+            <p:cNvSpPr/>
+            <p:nvPr/>
+          </p:nvSpPr>
+          <p:spPr>
+            <a:xfrm>
+              <a:off x="6246412" y="2102336"/>
+              <a:ext cx="134597" cy="137514"/>
+            </a:xfrm>
+            <a:prstGeom prst="ellipse">
+              <a:avLst/>
+            </a:prstGeom>
+            <a:solidFill>
+              <a:srgbClr val="92D050"/>
+            </a:solidFill>
+            <a:ln>
+              <a:solidFill>
+                <a:schemeClr val="accent6">
+                  <a:lumMod val="75000"/>
+                </a:schemeClr>
+              </a:solidFill>
+            </a:ln>
+          </p:spPr>
+          <p:style>
+            <a:lnRef idx="2">
+              <a:schemeClr val="accent1">
+                <a:shade val="50000"/>
+              </a:schemeClr>
+            </a:lnRef>
+            <a:fillRef idx="1">
+              <a:schemeClr val="accent1"/>
+            </a:fillRef>
+            <a:effectRef idx="0">
+              <a:schemeClr val="accent1"/>
+            </a:effectRef>
+            <a:fontRef idx="minor">
+              <a:schemeClr val="lt1"/>
+            </a:fontRef>
+          </p:style>
+          <p:txBody>
+            <a:bodyPr rot="0" spcFirstLastPara="0" vert="horz" wrap="square" lIns="91440" tIns="45720" rIns="91440" bIns="45720" numCol="1" spcCol="0" rtlCol="0" fromWordArt="0" anchor="ctr" anchorCtr="0" forceAA="0" compatLnSpc="1">
+              <a:prstTxWarp prst="textNoShape">
+                <a:avLst/>
+              </a:prstTxWarp>
+              <a:noAutofit/>
+            </a:bodyPr>
+            <a:lstStyle/>
+            <a:p>
+              <a:endParaRPr lang="en-US"/>
+            </a:p>
+          </p:txBody>
+        </p:sp>
+      </p:grpSp>
+      <p:grpSp>
+        <p:nvGrpSpPr>
+          <p:cNvPr id="56" name="Group 55">
+            <a:extLst>
+              <a:ext uri="{FF2B5EF4-FFF2-40B4-BE49-F238E27FC236}">
+                <a16:creationId xmlns:a16="http://schemas.microsoft.com/office/drawing/2014/main" id="{6DEEEB23-144B-5227-DDD8-532517E8F070}"/>
+              </a:ext>
+            </a:extLst>
+          </p:cNvPr>
+          <p:cNvGrpSpPr/>
+          <p:nvPr/>
+        </p:nvGrpSpPr>
+        <p:grpSpPr>
+          <a:xfrm>
+            <a:off x="5779089" y="3136715"/>
+            <a:ext cx="810340" cy="273119"/>
+            <a:chOff x="5734436" y="2929228"/>
+            <a:chExt cx="711079" cy="217448"/>
+          </a:xfrm>
+        </p:grpSpPr>
+        <p:sp>
+          <p:nvSpPr>
+            <p:cNvPr id="43" name="Rectangle: Rounded Corners 42">
+              <a:extLst>
+                <a:ext uri="{FF2B5EF4-FFF2-40B4-BE49-F238E27FC236}">
+                  <a16:creationId xmlns:a16="http://schemas.microsoft.com/office/drawing/2014/main" id="{271A69D1-45BF-449F-46F2-3F85C1F40535}"/>
+                </a:ext>
+              </a:extLst>
+            </p:cNvPr>
+            <p:cNvSpPr/>
+            <p:nvPr/>
+          </p:nvSpPr>
+          <p:spPr>
+            <a:xfrm>
+              <a:off x="5734436" y="2929228"/>
+              <a:ext cx="711079" cy="217448"/>
+            </a:xfrm>
+            <a:prstGeom prst="roundRect">
+              <a:avLst/>
+            </a:prstGeom>
+            <a:noFill/>
+            <a:ln>
+              <a:solidFill>
+                <a:schemeClr val="tx1"/>
+              </a:solidFill>
+            </a:ln>
+          </p:spPr>
+          <p:style>
+            <a:lnRef idx="2">
+              <a:schemeClr val="accent1">
+                <a:shade val="50000"/>
+              </a:schemeClr>
+            </a:lnRef>
+            <a:fillRef idx="1">
+              <a:schemeClr val="accent1"/>
+            </a:fillRef>
+            <a:effectRef idx="0">
+              <a:schemeClr val="accent1"/>
+            </a:effectRef>
+            <a:fontRef idx="minor">
+              <a:schemeClr val="lt1"/>
+            </a:fontRef>
+          </p:style>
+          <p:txBody>
+            <a:bodyPr rot="0" spcFirstLastPara="0" vert="horz" wrap="square" lIns="91440" tIns="45720" rIns="91440" bIns="45720" numCol="1" spcCol="0" rtlCol="0" fromWordArt="0" anchor="ctr" anchorCtr="0" forceAA="0" compatLnSpc="1">
+              <a:prstTxWarp prst="textNoShape">
+                <a:avLst/>
+              </a:prstTxWarp>
+              <a:noAutofit/>
+            </a:bodyPr>
+            <a:lstStyle/>
+            <a:p>
+              <a:endParaRPr lang="en-US"/>
+            </a:p>
+          </p:txBody>
+        </p:sp>
+        <p:sp>
+          <p:nvSpPr>
+            <p:cNvPr id="44" name="Oval 43">
+              <a:extLst>
+                <a:ext uri="{FF2B5EF4-FFF2-40B4-BE49-F238E27FC236}">
+                  <a16:creationId xmlns:a16="http://schemas.microsoft.com/office/drawing/2014/main" id="{41662F24-26CB-7350-1865-5BDF8FBB8379}"/>
+                </a:ext>
+              </a:extLst>
+            </p:cNvPr>
+            <p:cNvSpPr/>
+            <p:nvPr/>
+          </p:nvSpPr>
+          <p:spPr>
+            <a:xfrm>
+              <a:off x="5790397" y="2965808"/>
+              <a:ext cx="134597" cy="137514"/>
+            </a:xfrm>
+            <a:prstGeom prst="ellipse">
+              <a:avLst/>
+            </a:prstGeom>
+            <a:solidFill>
+              <a:srgbClr val="92D050"/>
+            </a:solidFill>
+            <a:ln>
+              <a:solidFill>
+                <a:schemeClr val="accent6">
+                  <a:lumMod val="75000"/>
+                </a:schemeClr>
+              </a:solidFill>
+            </a:ln>
+          </p:spPr>
+          <p:style>
+            <a:lnRef idx="2">
+              <a:schemeClr val="accent1">
+                <a:shade val="50000"/>
+              </a:schemeClr>
+            </a:lnRef>
+            <a:fillRef idx="1">
+              <a:schemeClr val="accent1"/>
+            </a:fillRef>
+            <a:effectRef idx="0">
+              <a:schemeClr val="accent1"/>
+            </a:effectRef>
+            <a:fontRef idx="minor">
+              <a:schemeClr val="lt1"/>
+            </a:fontRef>
+          </p:style>
+          <p:txBody>
+            <a:bodyPr rot="0" spcFirstLastPara="0" vert="horz" wrap="square" lIns="91440" tIns="45720" rIns="91440" bIns="45720" numCol="1" spcCol="0" rtlCol="0" fromWordArt="0" anchor="ctr" anchorCtr="0" forceAA="0" compatLnSpc="1">
+              <a:prstTxWarp prst="textNoShape">
+                <a:avLst/>
+              </a:prstTxWarp>
+              <a:noAutofit/>
+            </a:bodyPr>
+            <a:lstStyle/>
+            <a:p>
+              <a:endParaRPr lang="en-US"/>
+            </a:p>
+          </p:txBody>
+        </p:sp>
+        <p:sp>
+          <p:nvSpPr>
+            <p:cNvPr id="45" name="Oval 44">
+              <a:extLst>
+                <a:ext uri="{FF2B5EF4-FFF2-40B4-BE49-F238E27FC236}">
+                  <a16:creationId xmlns:a16="http://schemas.microsoft.com/office/drawing/2014/main" id="{B5F492F8-881B-0C70-91D9-F6454CA7C27F}"/>
+                </a:ext>
+              </a:extLst>
+            </p:cNvPr>
+            <p:cNvSpPr/>
+            <p:nvPr/>
+          </p:nvSpPr>
+          <p:spPr>
+            <a:xfrm>
+              <a:off x="6012282" y="2965808"/>
+              <a:ext cx="134597" cy="137514"/>
+            </a:xfrm>
+            <a:prstGeom prst="ellipse">
+              <a:avLst/>
+            </a:prstGeom>
+            <a:solidFill>
+              <a:srgbClr val="92D050"/>
+            </a:solidFill>
+            <a:ln>
+              <a:solidFill>
+                <a:schemeClr val="accent6">
+                  <a:lumMod val="75000"/>
+                </a:schemeClr>
+              </a:solidFill>
+            </a:ln>
+          </p:spPr>
+          <p:style>
+            <a:lnRef idx="2">
+              <a:schemeClr val="accent1">
+                <a:shade val="50000"/>
+              </a:schemeClr>
+            </a:lnRef>
+            <a:fillRef idx="1">
+              <a:schemeClr val="accent1"/>
+            </a:fillRef>
+            <a:effectRef idx="0">
+              <a:schemeClr val="accent1"/>
+            </a:effectRef>
+            <a:fontRef idx="minor">
+              <a:schemeClr val="lt1"/>
+            </a:fontRef>
+          </p:style>
+          <p:txBody>
+            <a:bodyPr rot="0" spcFirstLastPara="0" vert="horz" wrap="square" lIns="91440" tIns="45720" rIns="91440" bIns="45720" numCol="1" spcCol="0" rtlCol="0" fromWordArt="0" anchor="ctr" anchorCtr="0" forceAA="0" compatLnSpc="1">
+              <a:prstTxWarp prst="textNoShape">
+                <a:avLst/>
+              </a:prstTxWarp>
+              <a:noAutofit/>
+            </a:bodyPr>
+            <a:lstStyle/>
+            <a:p>
+              <a:endParaRPr lang="en-US"/>
+            </a:p>
+          </p:txBody>
+        </p:sp>
+        <p:sp>
+          <p:nvSpPr>
+            <p:cNvPr id="46" name="Oval 45">
+              <a:extLst>
+                <a:ext uri="{FF2B5EF4-FFF2-40B4-BE49-F238E27FC236}">
+                  <a16:creationId xmlns:a16="http://schemas.microsoft.com/office/drawing/2014/main" id="{A800874C-CB42-3520-33C8-E719DD3FE481}"/>
+                </a:ext>
+              </a:extLst>
+            </p:cNvPr>
+            <p:cNvSpPr/>
+            <p:nvPr/>
+          </p:nvSpPr>
+          <p:spPr>
+            <a:xfrm>
+              <a:off x="6253726" y="2970930"/>
+              <a:ext cx="134597" cy="137514"/>
+            </a:xfrm>
+            <a:prstGeom prst="ellipse">
+              <a:avLst/>
+            </a:prstGeom>
+            <a:solidFill>
+              <a:srgbClr val="92D050"/>
+            </a:solidFill>
+            <a:ln>
+              <a:solidFill>
+                <a:schemeClr val="accent6">
+                  <a:lumMod val="75000"/>
+                </a:schemeClr>
+              </a:solidFill>
+            </a:ln>
+          </p:spPr>
+          <p:style>
+            <a:lnRef idx="2">
+              <a:schemeClr val="accent1">
+                <a:shade val="50000"/>
+              </a:schemeClr>
+            </a:lnRef>
+            <a:fillRef idx="1">
+              <a:schemeClr val="accent1"/>
+            </a:fillRef>
+            <a:effectRef idx="0">
+              <a:schemeClr val="accent1"/>
+            </a:effectRef>
+            <a:fontRef idx="minor">
+              <a:schemeClr val="lt1"/>
+            </a:fontRef>
+          </p:style>
+          <p:txBody>
+            <a:bodyPr rot="0" spcFirstLastPara="0" vert="horz" wrap="square" lIns="91440" tIns="45720" rIns="91440" bIns="45720" numCol="1" spcCol="0" rtlCol="0" fromWordArt="0" anchor="ctr" anchorCtr="0" forceAA="0" compatLnSpc="1">
+              <a:prstTxWarp prst="textNoShape">
+                <a:avLst/>
+              </a:prstTxWarp>
+              <a:noAutofit/>
+            </a:bodyPr>
+            <a:lstStyle/>
+            <a:p>
+              <a:endParaRPr lang="en-US"/>
+            </a:p>
+          </p:txBody>
+        </p:sp>
+      </p:grpSp>
+      <p:sp>
+        <p:nvSpPr>
+          <p:cNvPr id="55" name="Rectangle 54">
+            <a:extLst>
+              <a:ext uri="{FF2B5EF4-FFF2-40B4-BE49-F238E27FC236}">
+                <a16:creationId xmlns:a16="http://schemas.microsoft.com/office/drawing/2014/main" id="{8A7FE949-0EF3-C3EB-48E0-A24C848FDC5B}"/>
+              </a:ext>
+            </a:extLst>
+          </p:cNvPr>
+          <p:cNvSpPr/>
+          <p:nvPr/>
+        </p:nvSpPr>
+        <p:spPr>
+          <a:xfrm>
+            <a:off x="5729297" y="1983941"/>
+            <a:ext cx="936850" cy="1522974"/>
+          </a:xfrm>
+          <a:prstGeom prst="rect">
+            <a:avLst/>
+          </a:prstGeom>
+          <a:noFill/>
+          <a:ln>
+            <a:solidFill>
+              <a:schemeClr val="tx1"/>
+            </a:solidFill>
+            <a:prstDash val="dashDot"/>
+          </a:ln>
+        </p:spPr>
+        <p:style>
+          <a:lnRef idx="2">
+            <a:schemeClr val="accent1">
+              <a:shade val="50000"/>
+            </a:schemeClr>
+          </a:lnRef>
+          <a:fillRef idx="1">
+            <a:schemeClr val="accent1"/>
+          </a:fillRef>
+          <a:effectRef idx="0">
+            <a:schemeClr val="accent1"/>
+          </a:effectRef>
+          <a:fontRef idx="minor">
+            <a:schemeClr val="lt1"/>
+          </a:fontRef>
+        </p:style>
+        <p:txBody>
+          <a:bodyPr rot="0" spcFirstLastPara="0" vert="horz" wrap="square" lIns="91440" tIns="45720" rIns="91440" bIns="45720" numCol="1" spcCol="0" rtlCol="0" fromWordArt="0" anchor="ctr" anchorCtr="0" forceAA="0" compatLnSpc="1">
+            <a:prstTxWarp prst="textNoShape">
+              <a:avLst/>
+            </a:prstTxWarp>
+            <a:noAutofit/>
+          </a:bodyPr>
+          <a:lstStyle/>
+          <a:p>
+            <a:endParaRPr lang="en-US"/>
+          </a:p>
+        </p:txBody>
+      </p:sp>
+      <p:sp>
+        <p:nvSpPr>
+          <p:cNvPr id="58" name="Text Box 2">
+            <a:extLst>
+              <a:ext uri="{FF2B5EF4-FFF2-40B4-BE49-F238E27FC236}">
+                <a16:creationId xmlns:a16="http://schemas.microsoft.com/office/drawing/2014/main" id="{C59B56F7-AE89-4810-9148-395477797450}"/>
+              </a:ext>
+            </a:extLst>
+          </p:cNvPr>
+          <p:cNvSpPr txBox="1">
+            <a:spLocks noChangeArrowheads="1"/>
+          </p:cNvSpPr>
+          <p:nvPr/>
+        </p:nvSpPr>
+        <p:spPr bwMode="auto">
+          <a:xfrm rot="5400000">
+            <a:off x="6722255" y="2545573"/>
+            <a:ext cx="483870" cy="395605"/>
+          </a:xfrm>
+          <a:prstGeom prst="rect">
+            <a:avLst/>
+          </a:prstGeom>
+          <a:noFill/>
+          <a:ln w="9525">
+            <a:noFill/>
+            <a:miter lim="800000"/>
+            <a:headEnd/>
+            <a:tailEnd/>
+          </a:ln>
+        </p:spPr>
+        <p:txBody>
+          <a:bodyPr rot="0" vert="horz" wrap="square" lIns="91440" tIns="45720" rIns="91440" bIns="45720" anchor="t" anchorCtr="0">
+            <a:noAutofit/>
+          </a:bodyPr>
+          <a:lstStyle/>
+          <a:p>
+            <a:pPr marL="0" marR="0">
+              <a:lnSpc>
+                <a:spcPct val="107000"/>
+              </a:lnSpc>
+              <a:spcBef>
+                <a:spcPts val="0"/>
+              </a:spcBef>
+              <a:spcAft>
+                <a:spcPts val="800"/>
+              </a:spcAft>
+            </a:pPr>
+            <a:r>
+              <a:rPr lang="zh-CN" sz="2000" dirty="0">
+                <a:effectLst/>
+                <a:latin typeface="Calibri" panose="020F0502020204030204" pitchFamily="34" charset="0"/>
+                <a:ea typeface="DengXian" panose="02010600030101010101" pitchFamily="2" charset="-122"/>
+                <a:cs typeface="Times New Roman" panose="02020603050405020304" pitchFamily="18" charset="0"/>
+              </a:rPr>
+              <a:t>⊕</a:t>
+            </a:r>
+            <a:endParaRPr lang="en-US" sz="1100" dirty="0">
+              <a:effectLst/>
+              <a:latin typeface="Calibri" panose="020F0502020204030204" pitchFamily="34" charset="0"/>
+              <a:ea typeface="DengXian" panose="02010600030101010101" pitchFamily="2" charset="-122"/>
+              <a:cs typeface="Times New Roman" panose="02020603050405020304" pitchFamily="18" charset="0"/>
+            </a:endParaRPr>
+          </a:p>
+        </p:txBody>
+      </p:sp>
+      <p:grpSp>
+        <p:nvGrpSpPr>
+          <p:cNvPr id="90" name="Group 89">
+            <a:extLst>
+              <a:ext uri="{FF2B5EF4-FFF2-40B4-BE49-F238E27FC236}">
+                <a16:creationId xmlns:a16="http://schemas.microsoft.com/office/drawing/2014/main" id="{076C143A-CC29-CB24-BEFE-14B6A4493DCD}"/>
+              </a:ext>
+            </a:extLst>
+          </p:cNvPr>
+          <p:cNvGrpSpPr/>
+          <p:nvPr/>
+        </p:nvGrpSpPr>
+        <p:grpSpPr>
+          <a:xfrm>
+            <a:off x="7301919" y="2609927"/>
+            <a:ext cx="883538" cy="284623"/>
+            <a:chOff x="7336413" y="2605343"/>
+            <a:chExt cx="711200" cy="203835"/>
+          </a:xfrm>
+        </p:grpSpPr>
+        <p:sp>
+          <p:nvSpPr>
+            <p:cNvPr id="61" name="Oval 60">
+              <a:extLst>
+                <a:ext uri="{FF2B5EF4-FFF2-40B4-BE49-F238E27FC236}">
+                  <a16:creationId xmlns:a16="http://schemas.microsoft.com/office/drawing/2014/main" id="{CA7B06BC-613B-EA09-4686-154D501C9A5D}"/>
+                </a:ext>
+              </a:extLst>
+            </p:cNvPr>
+            <p:cNvSpPr/>
+            <p:nvPr/>
+          </p:nvSpPr>
+          <p:spPr>
+            <a:xfrm>
+              <a:off x="7412613" y="2643873"/>
+              <a:ext cx="134620" cy="128905"/>
+            </a:xfrm>
+            <a:prstGeom prst="ellipse">
+              <a:avLst/>
+            </a:prstGeom>
+            <a:solidFill>
+              <a:schemeClr val="accent5">
+                <a:lumMod val="40000"/>
+                <a:lumOff val="60000"/>
+              </a:schemeClr>
+            </a:solidFill>
+            <a:ln>
+              <a:solidFill>
+                <a:schemeClr val="accent5">
+                  <a:lumMod val="75000"/>
+                </a:schemeClr>
+              </a:solidFill>
+            </a:ln>
+          </p:spPr>
+          <p:style>
+            <a:lnRef idx="2">
+              <a:schemeClr val="accent1">
+                <a:shade val="50000"/>
+              </a:schemeClr>
+            </a:lnRef>
+            <a:fillRef idx="1">
+              <a:schemeClr val="accent1"/>
+            </a:fillRef>
+            <a:effectRef idx="0">
+              <a:schemeClr val="accent1"/>
+            </a:effectRef>
+            <a:fontRef idx="minor">
+              <a:schemeClr val="lt1"/>
+            </a:fontRef>
+          </p:style>
+          <p:txBody>
+            <a:bodyPr rot="0" spcFirstLastPara="0" vert="horz" wrap="square" lIns="91440" tIns="45720" rIns="91440" bIns="45720" numCol="1" spcCol="0" rtlCol="0" fromWordArt="0" anchor="ctr" anchorCtr="0" forceAA="0" compatLnSpc="1">
+              <a:prstTxWarp prst="textNoShape">
+                <a:avLst/>
+              </a:prstTxWarp>
+              <a:noAutofit/>
+            </a:bodyPr>
+            <a:lstStyle/>
+            <a:p>
+              <a:endParaRPr lang="en-US"/>
+            </a:p>
+          </p:txBody>
+        </p:sp>
+        <p:sp>
+          <p:nvSpPr>
+            <p:cNvPr id="62" name="Oval 61">
+              <a:extLst>
+                <a:ext uri="{FF2B5EF4-FFF2-40B4-BE49-F238E27FC236}">
+                  <a16:creationId xmlns:a16="http://schemas.microsoft.com/office/drawing/2014/main" id="{248B633D-E59B-6F55-15EE-D28C0002E42A}"/>
+                </a:ext>
+              </a:extLst>
+            </p:cNvPr>
+            <p:cNvSpPr/>
+            <p:nvPr/>
+          </p:nvSpPr>
+          <p:spPr>
+            <a:xfrm>
+              <a:off x="7624703" y="2643873"/>
+              <a:ext cx="134620" cy="128905"/>
+            </a:xfrm>
+            <a:prstGeom prst="ellipse">
+              <a:avLst/>
+            </a:prstGeom>
+            <a:solidFill>
+              <a:schemeClr val="accent5">
+                <a:lumMod val="40000"/>
+                <a:lumOff val="60000"/>
+              </a:schemeClr>
+            </a:solidFill>
+            <a:ln>
+              <a:solidFill>
+                <a:schemeClr val="accent5">
+                  <a:lumMod val="75000"/>
+                </a:schemeClr>
+              </a:solidFill>
+            </a:ln>
+          </p:spPr>
+          <p:style>
+            <a:lnRef idx="2">
+              <a:schemeClr val="accent1">
+                <a:shade val="50000"/>
+              </a:schemeClr>
+            </a:lnRef>
+            <a:fillRef idx="1">
+              <a:schemeClr val="accent1"/>
+            </a:fillRef>
+            <a:effectRef idx="0">
+              <a:schemeClr val="accent1"/>
+            </a:effectRef>
+            <a:fontRef idx="minor">
+              <a:schemeClr val="lt1"/>
+            </a:fontRef>
+          </p:style>
+          <p:txBody>
+            <a:bodyPr rot="0" spcFirstLastPara="0" vert="horz" wrap="square" lIns="91440" tIns="45720" rIns="91440" bIns="45720" numCol="1" spcCol="0" rtlCol="0" fromWordArt="0" anchor="ctr" anchorCtr="0" forceAA="0" compatLnSpc="1">
+              <a:prstTxWarp prst="textNoShape">
+                <a:avLst/>
+              </a:prstTxWarp>
+              <a:noAutofit/>
+            </a:bodyPr>
+            <a:lstStyle/>
+            <a:p>
+              <a:endParaRPr lang="en-US"/>
+            </a:p>
+          </p:txBody>
+        </p:sp>
+        <p:sp>
+          <p:nvSpPr>
+            <p:cNvPr id="63" name="Oval 62">
+              <a:extLst>
+                <a:ext uri="{FF2B5EF4-FFF2-40B4-BE49-F238E27FC236}">
+                  <a16:creationId xmlns:a16="http://schemas.microsoft.com/office/drawing/2014/main" id="{27B8827E-BC12-B800-82A8-14E0614060AA}"/>
+                </a:ext>
+              </a:extLst>
+            </p:cNvPr>
+            <p:cNvSpPr/>
+            <p:nvPr/>
+          </p:nvSpPr>
+          <p:spPr>
+            <a:xfrm>
+              <a:off x="7837428" y="2643873"/>
+              <a:ext cx="134620" cy="128905"/>
+            </a:xfrm>
+            <a:prstGeom prst="ellipse">
+              <a:avLst/>
+            </a:prstGeom>
+            <a:solidFill>
+              <a:schemeClr val="accent5">
+                <a:lumMod val="40000"/>
+                <a:lumOff val="60000"/>
+              </a:schemeClr>
+            </a:solidFill>
+            <a:ln>
+              <a:solidFill>
+                <a:schemeClr val="accent5">
+                  <a:lumMod val="75000"/>
+                </a:schemeClr>
+              </a:solidFill>
+            </a:ln>
+          </p:spPr>
+          <p:style>
+            <a:lnRef idx="2">
+              <a:schemeClr val="accent1">
+                <a:shade val="50000"/>
+              </a:schemeClr>
+            </a:lnRef>
+            <a:fillRef idx="1">
+              <a:schemeClr val="accent1"/>
+            </a:fillRef>
+            <a:effectRef idx="0">
+              <a:schemeClr val="accent1"/>
+            </a:effectRef>
+            <a:fontRef idx="minor">
+              <a:schemeClr val="lt1"/>
+            </a:fontRef>
+          </p:style>
+          <p:txBody>
+            <a:bodyPr rot="0" spcFirstLastPara="0" vert="horz" wrap="square" lIns="91440" tIns="45720" rIns="91440" bIns="45720" numCol="1" spcCol="0" rtlCol="0" fromWordArt="0" anchor="ctr" anchorCtr="0" forceAA="0" compatLnSpc="1">
+              <a:prstTxWarp prst="textNoShape">
+                <a:avLst/>
+              </a:prstTxWarp>
+              <a:noAutofit/>
+            </a:bodyPr>
+            <a:lstStyle/>
+            <a:p>
+              <a:endParaRPr lang="en-US"/>
+            </a:p>
+          </p:txBody>
+        </p:sp>
+        <p:sp>
+          <p:nvSpPr>
+            <p:cNvPr id="64" name="Rectangle: Rounded Corners 63">
+              <a:extLst>
+                <a:ext uri="{FF2B5EF4-FFF2-40B4-BE49-F238E27FC236}">
+                  <a16:creationId xmlns:a16="http://schemas.microsoft.com/office/drawing/2014/main" id="{A2E3535E-3BF1-0195-2596-67555A879BED}"/>
+                </a:ext>
+              </a:extLst>
+            </p:cNvPr>
+            <p:cNvSpPr/>
+            <p:nvPr/>
+          </p:nvSpPr>
+          <p:spPr>
+            <a:xfrm>
+              <a:off x="7336413" y="2605343"/>
+              <a:ext cx="711200" cy="203835"/>
+            </a:xfrm>
+            <a:prstGeom prst="roundRect">
+              <a:avLst/>
+            </a:prstGeom>
+            <a:noFill/>
+            <a:ln>
+              <a:solidFill>
+                <a:schemeClr val="tx1"/>
+              </a:solidFill>
+            </a:ln>
+          </p:spPr>
+          <p:style>
+            <a:lnRef idx="2">
+              <a:schemeClr val="accent1">
+                <a:shade val="50000"/>
+              </a:schemeClr>
+            </a:lnRef>
+            <a:fillRef idx="1">
+              <a:schemeClr val="accent1"/>
+            </a:fillRef>
+            <a:effectRef idx="0">
+              <a:schemeClr val="accent1"/>
+            </a:effectRef>
+            <a:fontRef idx="minor">
+              <a:schemeClr val="lt1"/>
+            </a:fontRef>
+          </p:style>
+          <p:txBody>
+            <a:bodyPr rot="0" spcFirstLastPara="0" vert="horz" wrap="square" lIns="91440" tIns="45720" rIns="91440" bIns="45720" numCol="1" spcCol="0" rtlCol="0" fromWordArt="0" anchor="ctr" anchorCtr="0" forceAA="0" compatLnSpc="1">
+              <a:prstTxWarp prst="textNoShape">
+                <a:avLst/>
+              </a:prstTxWarp>
+              <a:noAutofit/>
+            </a:bodyPr>
+            <a:lstStyle/>
+            <a:p>
+              <a:endParaRPr lang="en-US"/>
+            </a:p>
+          </p:txBody>
+        </p:sp>
+      </p:grpSp>
+      <p:cxnSp>
+        <p:nvCxnSpPr>
+          <p:cNvPr id="66" name="Straight Arrow Connector 65">
+            <a:extLst>
+              <a:ext uri="{FF2B5EF4-FFF2-40B4-BE49-F238E27FC236}">
+                <a16:creationId xmlns:a16="http://schemas.microsoft.com/office/drawing/2014/main" id="{9FC41651-8582-1FD5-0F6B-1E65B014EE04}"/>
+              </a:ext>
+            </a:extLst>
+          </p:cNvPr>
+          <p:cNvCxnSpPr>
+            <a:cxnSpLocks/>
+            <a:stCxn id="3" idx="3"/>
+            <a:endCxn id="35" idx="1"/>
+          </p:cNvCxnSpPr>
+          <p:nvPr/>
+        </p:nvCxnSpPr>
+        <p:spPr>
+          <a:xfrm flipV="1">
+            <a:off x="3005069" y="2213765"/>
+            <a:ext cx="232809" cy="3603"/>
+          </a:xfrm>
+          <a:prstGeom prst="straightConnector1">
+            <a:avLst/>
+          </a:prstGeom>
+          <a:ln>
+            <a:tailEnd type="triangle"/>
+          </a:ln>
+        </p:spPr>
+        <p:style>
+          <a:lnRef idx="1">
+            <a:schemeClr val="dk1"/>
+          </a:lnRef>
+          <a:fillRef idx="0">
+            <a:schemeClr val="dk1"/>
+          </a:fillRef>
+          <a:effectRef idx="0">
+            <a:schemeClr val="dk1"/>
+          </a:effectRef>
+          <a:fontRef idx="minor">
+            <a:schemeClr val="tx1"/>
+          </a:fontRef>
+        </p:style>
+      </p:cxnSp>
+      <p:cxnSp>
+        <p:nvCxnSpPr>
+          <p:cNvPr id="69" name="Straight Arrow Connector 68">
+            <a:extLst>
+              <a:ext uri="{FF2B5EF4-FFF2-40B4-BE49-F238E27FC236}">
+                <a16:creationId xmlns:a16="http://schemas.microsoft.com/office/drawing/2014/main" id="{3271D8DB-E88C-3B3C-DC6B-5F97081065C0}"/>
+              </a:ext>
+            </a:extLst>
+          </p:cNvPr>
+          <p:cNvCxnSpPr>
+            <a:cxnSpLocks/>
+            <a:stCxn id="35" idx="3"/>
+            <a:endCxn id="36" idx="1"/>
+          </p:cNvCxnSpPr>
+          <p:nvPr/>
+        </p:nvCxnSpPr>
+        <p:spPr>
+          <a:xfrm>
+            <a:off x="4550122" y="2213765"/>
+            <a:ext cx="213583" cy="10164"/>
+          </a:xfrm>
+          <a:prstGeom prst="straightConnector1">
+            <a:avLst/>
+          </a:prstGeom>
+          <a:ln>
+            <a:tailEnd type="triangle"/>
+          </a:ln>
+        </p:spPr>
+        <p:style>
+          <a:lnRef idx="1">
+            <a:schemeClr val="dk1"/>
+          </a:lnRef>
+          <a:fillRef idx="0">
+            <a:schemeClr val="dk1"/>
+          </a:fillRef>
+          <a:effectRef idx="0">
+            <a:schemeClr val="dk1"/>
+          </a:effectRef>
+          <a:fontRef idx="minor">
+            <a:schemeClr val="tx1"/>
+          </a:fontRef>
+        </p:style>
+      </p:cxnSp>
+      <p:cxnSp>
+        <p:nvCxnSpPr>
+          <p:cNvPr id="71" name="Straight Arrow Connector 70">
+            <a:extLst>
+              <a:ext uri="{FF2B5EF4-FFF2-40B4-BE49-F238E27FC236}">
+                <a16:creationId xmlns:a16="http://schemas.microsoft.com/office/drawing/2014/main" id="{8DB61F68-D046-D8A1-9711-CCA20D406486}"/>
+              </a:ext>
+            </a:extLst>
+          </p:cNvPr>
+          <p:cNvCxnSpPr>
+            <a:cxnSpLocks/>
+            <a:stCxn id="36" idx="3"/>
+          </p:cNvCxnSpPr>
+          <p:nvPr/>
+        </p:nvCxnSpPr>
+        <p:spPr>
+          <a:xfrm flipV="1">
+            <a:off x="5487296" y="2217367"/>
+            <a:ext cx="273531" cy="6562"/>
+          </a:xfrm>
+          <a:prstGeom prst="straightConnector1">
+            <a:avLst/>
+          </a:prstGeom>
+          <a:ln>
+            <a:tailEnd type="triangle"/>
+          </a:ln>
+        </p:spPr>
+        <p:style>
+          <a:lnRef idx="1">
+            <a:schemeClr val="dk1"/>
+          </a:lnRef>
+          <a:fillRef idx="0">
+            <a:schemeClr val="dk1"/>
+          </a:fillRef>
+          <a:effectRef idx="0">
+            <a:schemeClr val="dk1"/>
+          </a:effectRef>
+          <a:fontRef idx="minor">
+            <a:schemeClr val="tx1"/>
+          </a:fontRef>
+        </p:style>
+      </p:cxnSp>
+      <p:cxnSp>
+        <p:nvCxnSpPr>
+          <p:cNvPr id="74" name="Straight Arrow Connector 73">
+            <a:extLst>
+              <a:ext uri="{FF2B5EF4-FFF2-40B4-BE49-F238E27FC236}">
+                <a16:creationId xmlns:a16="http://schemas.microsoft.com/office/drawing/2014/main" id="{A26C3B05-A40E-4F44-E99C-454A31E675BE}"/>
+              </a:ext>
+            </a:extLst>
+          </p:cNvPr>
+          <p:cNvCxnSpPr>
+            <a:cxnSpLocks/>
+            <a:endCxn id="37" idx="1"/>
+          </p:cNvCxnSpPr>
+          <p:nvPr/>
+        </p:nvCxnSpPr>
+        <p:spPr>
+          <a:xfrm>
+            <a:off x="2984974" y="3304997"/>
+            <a:ext cx="389041" cy="0"/>
+          </a:xfrm>
+          <a:prstGeom prst="straightConnector1">
+            <a:avLst/>
+          </a:prstGeom>
+          <a:ln>
+            <a:tailEnd type="triangle"/>
+          </a:ln>
+        </p:spPr>
+        <p:style>
+          <a:lnRef idx="1">
+            <a:schemeClr val="dk1"/>
+          </a:lnRef>
+          <a:fillRef idx="0">
+            <a:schemeClr val="dk1"/>
+          </a:fillRef>
+          <a:effectRef idx="0">
+            <a:schemeClr val="dk1"/>
+          </a:effectRef>
+          <a:fontRef idx="minor">
+            <a:schemeClr val="tx1"/>
+          </a:fontRef>
+        </p:style>
+      </p:cxnSp>
+      <p:cxnSp>
+        <p:nvCxnSpPr>
+          <p:cNvPr id="82" name="Straight Connector 81">
+            <a:extLst>
+              <a:ext uri="{FF2B5EF4-FFF2-40B4-BE49-F238E27FC236}">
+                <a16:creationId xmlns:a16="http://schemas.microsoft.com/office/drawing/2014/main" id="{26E8309D-5565-B5EA-A1F1-CD7E2B13E6B9}"/>
+              </a:ext>
+            </a:extLst>
+          </p:cNvPr>
+          <p:cNvCxnSpPr>
+            <a:stCxn id="58" idx="2"/>
+            <a:endCxn id="58" idx="2"/>
+          </p:cNvCxnSpPr>
+          <p:nvPr/>
+        </p:nvCxnSpPr>
+        <p:spPr>
+          <a:xfrm>
+            <a:off x="6766388" y="2743376"/>
+            <a:ext cx="0" cy="0"/>
+          </a:xfrm>
+          <a:prstGeom prst="line">
+            <a:avLst/>
+          </a:prstGeom>
+        </p:spPr>
+        <p:style>
+          <a:lnRef idx="1">
+            <a:schemeClr val="dk1"/>
+          </a:lnRef>
+          <a:fillRef idx="0">
+            <a:schemeClr val="dk1"/>
+          </a:fillRef>
+          <a:effectRef idx="0">
+            <a:schemeClr val="dk1"/>
+          </a:effectRef>
+          <a:fontRef idx="minor">
+            <a:schemeClr val="tx1"/>
+          </a:fontRef>
+        </p:style>
+      </p:cxnSp>
+      <p:cxnSp>
+        <p:nvCxnSpPr>
+          <p:cNvPr id="85" name="Straight Connector 84">
+            <a:extLst>
+              <a:ext uri="{FF2B5EF4-FFF2-40B4-BE49-F238E27FC236}">
+                <a16:creationId xmlns:a16="http://schemas.microsoft.com/office/drawing/2014/main" id="{2CC3D04E-0B93-CBE1-5AFA-2C45751F3574}"/>
+              </a:ext>
+            </a:extLst>
+          </p:cNvPr>
+          <p:cNvCxnSpPr>
+            <a:cxnSpLocks/>
+            <a:stCxn id="55" idx="3"/>
+            <a:endCxn id="58" idx="2"/>
+          </p:cNvCxnSpPr>
+          <p:nvPr/>
+        </p:nvCxnSpPr>
+        <p:spPr>
+          <a:xfrm flipV="1">
+            <a:off x="6666147" y="2743376"/>
+            <a:ext cx="100241" cy="2052"/>
+          </a:xfrm>
+          <a:prstGeom prst="line">
+            <a:avLst/>
+          </a:prstGeom>
+        </p:spPr>
+        <p:style>
+          <a:lnRef idx="1">
+            <a:schemeClr val="dk1"/>
+          </a:lnRef>
+          <a:fillRef idx="0">
+            <a:schemeClr val="dk1"/>
+          </a:fillRef>
+          <a:effectRef idx="0">
+            <a:schemeClr val="dk1"/>
+          </a:effectRef>
+          <a:fontRef idx="minor">
+            <a:schemeClr val="tx1"/>
+          </a:fontRef>
+        </p:style>
+      </p:cxnSp>
+      <p:cxnSp>
+        <p:nvCxnSpPr>
+          <p:cNvPr id="94" name="Straight Arrow Connector 93">
+            <a:extLst>
+              <a:ext uri="{FF2B5EF4-FFF2-40B4-BE49-F238E27FC236}">
+                <a16:creationId xmlns:a16="http://schemas.microsoft.com/office/drawing/2014/main" id="{A24DE53B-1996-3FBD-B70D-AD75E0C54318}"/>
+              </a:ext>
+            </a:extLst>
+          </p:cNvPr>
+          <p:cNvCxnSpPr>
+            <a:cxnSpLocks/>
+            <a:stCxn id="58" idx="0"/>
+            <a:endCxn id="64" idx="1"/>
+          </p:cNvCxnSpPr>
+          <p:nvPr/>
+        </p:nvCxnSpPr>
+        <p:spPr>
+          <a:xfrm>
+            <a:off x="7161993" y="2743376"/>
+            <a:ext cx="139926" cy="8863"/>
+          </a:xfrm>
+          <a:prstGeom prst="straightConnector1">
+            <a:avLst/>
+          </a:prstGeom>
+          <a:ln>
+            <a:tailEnd type="triangle"/>
+          </a:ln>
+        </p:spPr>
+        <p:style>
+          <a:lnRef idx="1">
+            <a:schemeClr val="dk1"/>
+          </a:lnRef>
+          <a:fillRef idx="0">
+            <a:schemeClr val="dk1"/>
+          </a:fillRef>
+          <a:effectRef idx="0">
+            <a:schemeClr val="dk1"/>
+          </a:effectRef>
+          <a:fontRef idx="minor">
+            <a:schemeClr val="tx1"/>
+          </a:fontRef>
+        </p:style>
+      </p:cxnSp>
+      <p:sp>
+        <p:nvSpPr>
+          <p:cNvPr id="97" name="Text Box 513">
+            <a:extLst>
+              <a:ext uri="{FF2B5EF4-FFF2-40B4-BE49-F238E27FC236}">
+                <a16:creationId xmlns:a16="http://schemas.microsoft.com/office/drawing/2014/main" id="{9D3A9BD5-FD97-C860-CCB3-692D60472669}"/>
+              </a:ext>
+            </a:extLst>
+          </p:cNvPr>
+          <p:cNvSpPr txBox="1"/>
+          <p:nvPr/>
+        </p:nvSpPr>
+        <p:spPr>
+          <a:xfrm>
+            <a:off x="5177793" y="1548661"/>
+            <a:ext cx="1886864" cy="278130"/>
+          </a:xfrm>
+          <a:prstGeom prst="rect">
+            <a:avLst/>
+          </a:prstGeom>
+          <a:noFill/>
+          <a:ln w="6350">
+            <a:noFill/>
+          </a:ln>
+        </p:spPr>
+        <p:txBody>
+          <a:bodyPr rot="0" spcFirstLastPara="0" vert="horz" wrap="square" lIns="91440" tIns="45720" rIns="91440" bIns="45720" numCol="1" spcCol="0" rtlCol="0" fromWordArt="0" anchor="t" anchorCtr="0" forceAA="0" compatLnSpc="1">
+            <a:prstTxWarp prst="textNoShape">
+              <a:avLst/>
+            </a:prstTxWarp>
+            <a:noAutofit/>
+          </a:bodyPr>
+          <a:lstStyle/>
+          <a:p>
+            <a:pPr marL="0" marR="0" algn="ctr">
+              <a:lnSpc>
+                <a:spcPct val="107000"/>
+              </a:lnSpc>
+              <a:spcBef>
+                <a:spcPts val="0"/>
+              </a:spcBef>
+              <a:spcAft>
+                <a:spcPts val="800"/>
+              </a:spcAft>
+            </a:pPr>
+            <a:r>
+              <a:rPr lang="en-US" sz="2000" dirty="0">
+                <a:effectLst/>
+                <a:latin typeface="Calibri" panose="020F0502020204030204" pitchFamily="34" charset="0"/>
+                <a:ea typeface="DengXian" panose="02010600030101010101" pitchFamily="2" charset="-122"/>
+                <a:cs typeface="Times New Roman" panose="02020603050405020304" pitchFamily="18" charset="0"/>
+              </a:rPr>
+              <a:t>Feature Vectors</a:t>
+            </a:r>
+          </a:p>
+        </p:txBody>
+      </p:sp>
+      <p:sp>
+        <p:nvSpPr>
+          <p:cNvPr id="98" name="Rectangle: Rounded Corners 97">
+            <a:extLst>
+              <a:ext uri="{FF2B5EF4-FFF2-40B4-BE49-F238E27FC236}">
+                <a16:creationId xmlns:a16="http://schemas.microsoft.com/office/drawing/2014/main" id="{1FA54A89-5628-0879-EEF9-E10AB888A153}"/>
+              </a:ext>
+            </a:extLst>
+          </p:cNvPr>
+          <p:cNvSpPr/>
+          <p:nvPr/>
+        </p:nvSpPr>
+        <p:spPr>
+          <a:xfrm>
+            <a:off x="6913073" y="1860090"/>
+            <a:ext cx="1412875" cy="660400"/>
+          </a:xfrm>
+          <a:prstGeom prst="roundRect">
+            <a:avLst>
+              <a:gd name="adj" fmla="val 8320"/>
+            </a:avLst>
+          </a:prstGeom>
+          <a:noFill/>
+          <a:ln>
+            <a:noFill/>
+          </a:ln>
+        </p:spPr>
+        <p:style>
+          <a:lnRef idx="2">
+            <a:schemeClr val="accent1">
+              <a:shade val="50000"/>
+            </a:schemeClr>
+          </a:lnRef>
+          <a:fillRef idx="1">
+            <a:schemeClr val="accent1"/>
+          </a:fillRef>
+          <a:effectRef idx="0">
+            <a:schemeClr val="accent1"/>
+          </a:effectRef>
+          <a:fontRef idx="minor">
+            <a:schemeClr val="lt1"/>
+          </a:fontRef>
+        </p:style>
+        <p:txBody>
+          <a:bodyPr rot="0" spcFirstLastPara="0" vert="horz" wrap="square" lIns="45720" tIns="0" rIns="45720" bIns="0" numCol="1" spcCol="0" rtlCol="0" fromWordArt="0" anchor="ctr" anchorCtr="0" forceAA="0" compatLnSpc="1">
+            <a:prstTxWarp prst="textNoShape">
+              <a:avLst/>
+            </a:prstTxWarp>
+            <a:noAutofit/>
+          </a:bodyPr>
+          <a:lstStyle/>
+          <a:p>
+            <a:pPr marL="0" marR="0" algn="ctr">
+              <a:lnSpc>
+                <a:spcPct val="80000"/>
+              </a:lnSpc>
+              <a:spcBef>
+                <a:spcPts val="0"/>
+              </a:spcBef>
+              <a:spcAft>
+                <a:spcPts val="0"/>
+              </a:spcAft>
+            </a:pPr>
+            <a:r>
+              <a:rPr lang="en-US" sz="2000" dirty="0">
+                <a:solidFill>
+                  <a:srgbClr val="000000"/>
+                </a:solidFill>
+                <a:effectLst/>
+                <a:ea typeface="DengXian" panose="02010600030101010101" pitchFamily="2" charset="-122"/>
+                <a:cs typeface="Times New Roman" panose="02020603050405020304" pitchFamily="18" charset="0"/>
+              </a:rPr>
+              <a:t>Statement</a:t>
+            </a:r>
+          </a:p>
+          <a:p>
+            <a:pPr marL="0" marR="0" algn="ctr">
+              <a:lnSpc>
+                <a:spcPct val="80000"/>
+              </a:lnSpc>
+              <a:spcBef>
+                <a:spcPts val="0"/>
+              </a:spcBef>
+              <a:spcAft>
+                <a:spcPts val="0"/>
+              </a:spcAft>
+            </a:pPr>
+            <a:r>
+              <a:rPr lang="en-US" sz="2000" dirty="0">
+                <a:solidFill>
+                  <a:srgbClr val="000000"/>
+                </a:solidFill>
+                <a:ea typeface="DengXian" panose="02010600030101010101" pitchFamily="2" charset="-122"/>
+                <a:cs typeface="Times New Roman" panose="02020603050405020304" pitchFamily="18" charset="0"/>
+              </a:rPr>
+              <a:t>Feature</a:t>
+            </a:r>
+          </a:p>
+          <a:p>
+            <a:pPr marL="0" marR="0" algn="ctr">
+              <a:lnSpc>
+                <a:spcPct val="80000"/>
+              </a:lnSpc>
+              <a:spcBef>
+                <a:spcPts val="0"/>
+              </a:spcBef>
+              <a:spcAft>
+                <a:spcPts val="0"/>
+              </a:spcAft>
+            </a:pPr>
+            <a:r>
+              <a:rPr lang="en-US" sz="2000" dirty="0">
+                <a:solidFill>
+                  <a:srgbClr val="000000"/>
+                </a:solidFill>
+                <a:effectLst/>
+                <a:ea typeface="DengXian" panose="02010600030101010101" pitchFamily="2" charset="-122"/>
+                <a:cs typeface="Times New Roman" panose="02020603050405020304" pitchFamily="18" charset="0"/>
+              </a:rPr>
+              <a:t>Vector</a:t>
+            </a:r>
+            <a:endParaRPr lang="en-US" sz="2000" dirty="0">
+              <a:effectLst/>
+              <a:ea typeface="DengXian" panose="02010600030101010101" pitchFamily="2" charset="-122"/>
+              <a:cs typeface="Times New Roman" panose="02020603050405020304" pitchFamily="18" charset="0"/>
+            </a:endParaRPr>
+          </a:p>
+        </p:txBody>
+      </p:sp>
+      <p:cxnSp>
+        <p:nvCxnSpPr>
+          <p:cNvPr id="86" name="Straight Arrow Connector 85">
+            <a:extLst>
+              <a:ext uri="{FF2B5EF4-FFF2-40B4-BE49-F238E27FC236}">
+                <a16:creationId xmlns:a16="http://schemas.microsoft.com/office/drawing/2014/main" id="{8A3FBC20-4B6C-0B3F-84BF-7985CA1EBBD6}"/>
+              </a:ext>
+            </a:extLst>
+          </p:cNvPr>
+          <p:cNvCxnSpPr>
+            <a:cxnSpLocks/>
+          </p:cNvCxnSpPr>
+          <p:nvPr/>
+        </p:nvCxnSpPr>
+        <p:spPr>
+          <a:xfrm>
+            <a:off x="5286133" y="3290774"/>
+            <a:ext cx="443164" cy="0"/>
+          </a:xfrm>
+          <a:prstGeom prst="straightConnector1">
+            <a:avLst/>
+          </a:prstGeom>
+          <a:ln>
+            <a:tailEnd type="triangle"/>
+          </a:ln>
+        </p:spPr>
+        <p:style>
+          <a:lnRef idx="1">
+            <a:schemeClr val="dk1"/>
+          </a:lnRef>
+          <a:fillRef idx="0">
+            <a:schemeClr val="dk1"/>
+          </a:fillRef>
+          <a:effectRef idx="0">
+            <a:schemeClr val="dk1"/>
+          </a:effectRef>
+          <a:fontRef idx="minor">
+            <a:schemeClr val="tx1"/>
+          </a:fontRef>
+        </p:style>
+      </p:cxnSp>
+    </p:spTree>
+    <p:extLst>
+      <p:ext uri="{BB962C8B-B14F-4D97-AF65-F5344CB8AC3E}">
+        <p14:creationId xmlns:p14="http://schemas.microsoft.com/office/powerpoint/2010/main" val="2824749328"/>
+      </p:ext>
+    </p:extLst>
+  </p:cSld>
+  <p:clrMapOvr>
+    <a:masterClrMapping/>
+  </p:clrMapOvr>
+</p:sld>
+</file>
+
 <file path=ppt/theme/theme1.xml><?xml version="1.0" encoding="utf-8"?>
 <a:theme xmlns:a="http://schemas.openxmlformats.org/drawingml/2006/main" name="Office Theme">
   <a:themeElements>

</xml_diff>

<commit_message>
revision of the technical sections
</commit_message>
<xml_diff>
--- a/figures.pptx
+++ b/figures.pptx
@@ -11,6 +11,7 @@
     <p:sldId id="268" r:id="rId5"/>
     <p:sldId id="269" r:id="rId6"/>
     <p:sldId id="270" r:id="rId7"/>
+    <p:sldId id="271" r:id="rId8"/>
   </p:sldIdLst>
   <p:sldSz cx="12192000" cy="6858000"/>
   <p:notesSz cx="6858000" cy="9144000"/>
@@ -264,7 +265,7 @@
           <a:p>
             <a:fld id="{3B59329A-BA38-4FE8-9E62-5F36CCE25C86}" type="datetimeFigureOut">
               <a:rPr lang="en-US" smtClean="0"/>
-              <a:t>3/22/2023</a:t>
+              <a:t>3/23/2023</a:t>
             </a:fld>
             <a:endParaRPr lang="en-US"/>
           </a:p>
@@ -462,7 +463,7 @@
           <a:p>
             <a:fld id="{3B59329A-BA38-4FE8-9E62-5F36CCE25C86}" type="datetimeFigureOut">
               <a:rPr lang="en-US" smtClean="0"/>
-              <a:t>3/22/2023</a:t>
+              <a:t>3/23/2023</a:t>
             </a:fld>
             <a:endParaRPr lang="en-US"/>
           </a:p>
@@ -670,7 +671,7 @@
           <a:p>
             <a:fld id="{3B59329A-BA38-4FE8-9E62-5F36CCE25C86}" type="datetimeFigureOut">
               <a:rPr lang="en-US" smtClean="0"/>
-              <a:t>3/22/2023</a:t>
+              <a:t>3/23/2023</a:t>
             </a:fld>
             <a:endParaRPr lang="en-US"/>
           </a:p>
@@ -868,7 +869,7 @@
           <a:p>
             <a:fld id="{3B59329A-BA38-4FE8-9E62-5F36CCE25C86}" type="datetimeFigureOut">
               <a:rPr lang="en-US" smtClean="0"/>
-              <a:t>3/22/2023</a:t>
+              <a:t>3/23/2023</a:t>
             </a:fld>
             <a:endParaRPr lang="en-US"/>
           </a:p>
@@ -1143,7 +1144,7 @@
           <a:p>
             <a:fld id="{3B59329A-BA38-4FE8-9E62-5F36CCE25C86}" type="datetimeFigureOut">
               <a:rPr lang="en-US" smtClean="0"/>
-              <a:t>3/22/2023</a:t>
+              <a:t>3/23/2023</a:t>
             </a:fld>
             <a:endParaRPr lang="en-US"/>
           </a:p>
@@ -1408,7 +1409,7 @@
           <a:p>
             <a:fld id="{3B59329A-BA38-4FE8-9E62-5F36CCE25C86}" type="datetimeFigureOut">
               <a:rPr lang="en-US" smtClean="0"/>
-              <a:t>3/22/2023</a:t>
+              <a:t>3/23/2023</a:t>
             </a:fld>
             <a:endParaRPr lang="en-US"/>
           </a:p>
@@ -1820,7 +1821,7 @@
           <a:p>
             <a:fld id="{3B59329A-BA38-4FE8-9E62-5F36CCE25C86}" type="datetimeFigureOut">
               <a:rPr lang="en-US" smtClean="0"/>
-              <a:t>3/22/2023</a:t>
+              <a:t>3/23/2023</a:t>
             </a:fld>
             <a:endParaRPr lang="en-US"/>
           </a:p>
@@ -1961,7 +1962,7 @@
           <a:p>
             <a:fld id="{3B59329A-BA38-4FE8-9E62-5F36CCE25C86}" type="datetimeFigureOut">
               <a:rPr lang="en-US" smtClean="0"/>
-              <a:t>3/22/2023</a:t>
+              <a:t>3/23/2023</a:t>
             </a:fld>
             <a:endParaRPr lang="en-US"/>
           </a:p>
@@ -2074,7 +2075,7 @@
           <a:p>
             <a:fld id="{3B59329A-BA38-4FE8-9E62-5F36CCE25C86}" type="datetimeFigureOut">
               <a:rPr lang="en-US" smtClean="0"/>
-              <a:t>3/22/2023</a:t>
+              <a:t>3/23/2023</a:t>
             </a:fld>
             <a:endParaRPr lang="en-US"/>
           </a:p>
@@ -2385,7 +2386,7 @@
           <a:p>
             <a:fld id="{3B59329A-BA38-4FE8-9E62-5F36CCE25C86}" type="datetimeFigureOut">
               <a:rPr lang="en-US" smtClean="0"/>
-              <a:t>3/22/2023</a:t>
+              <a:t>3/23/2023</a:t>
             </a:fld>
             <a:endParaRPr lang="en-US"/>
           </a:p>
@@ -2673,7 +2674,7 @@
           <a:p>
             <a:fld id="{3B59329A-BA38-4FE8-9E62-5F36CCE25C86}" type="datetimeFigureOut">
               <a:rPr lang="en-US" smtClean="0"/>
-              <a:t>3/22/2023</a:t>
+              <a:t>3/23/2023</a:t>
             </a:fld>
             <a:endParaRPr lang="en-US"/>
           </a:p>
@@ -2914,7 +2915,7 @@
           <a:p>
             <a:fld id="{3B59329A-BA38-4FE8-9E62-5F36CCE25C86}" type="datetimeFigureOut">
               <a:rPr lang="en-US" smtClean="0"/>
-              <a:t>3/22/2023</a:t>
+              <a:t>3/23/2023</a:t>
             </a:fld>
             <a:endParaRPr lang="en-US"/>
           </a:p>
@@ -25863,6 +25864,3418 @@
 </p:sld>
 </file>
 
+<file path=ppt/slides/slide7.xml><?xml version="1.0" encoding="utf-8"?>
+<p:sld xmlns:a="http://schemas.openxmlformats.org/drawingml/2006/main" xmlns:r="http://schemas.openxmlformats.org/officeDocument/2006/relationships" xmlns:p="http://schemas.openxmlformats.org/presentationml/2006/main">
+  <p:cSld>
+    <p:spTree>
+      <p:nvGrpSpPr>
+        <p:cNvPr id="1" name=""/>
+        <p:cNvGrpSpPr/>
+        <p:nvPr/>
+      </p:nvGrpSpPr>
+      <p:grpSpPr>
+        <a:xfrm>
+          <a:off x="0" y="0"/>
+          <a:ext cx="0" cy="0"/>
+          <a:chOff x="0" y="0"/>
+          <a:chExt cx="0" cy="0"/>
+        </a:xfrm>
+      </p:grpSpPr>
+      <p:grpSp>
+        <p:nvGrpSpPr>
+          <p:cNvPr id="2" name="Group 1">
+            <a:extLst>
+              <a:ext uri="{FF2B5EF4-FFF2-40B4-BE49-F238E27FC236}">
+                <a16:creationId xmlns:a16="http://schemas.microsoft.com/office/drawing/2014/main" id="{B5B3E00E-36AD-1B99-670E-ACC3DFACD001}"/>
+              </a:ext>
+            </a:extLst>
+          </p:cNvPr>
+          <p:cNvGrpSpPr/>
+          <p:nvPr/>
+        </p:nvGrpSpPr>
+        <p:grpSpPr>
+          <a:xfrm>
+            <a:off x="1375905" y="4364140"/>
+            <a:ext cx="1138945" cy="903204"/>
+            <a:chOff x="7691043" y="3600627"/>
+            <a:chExt cx="1138945" cy="903204"/>
+          </a:xfrm>
+        </p:grpSpPr>
+        <p:grpSp>
+          <p:nvGrpSpPr>
+            <p:cNvPr id="3" name="Group 2">
+              <a:extLst>
+                <a:ext uri="{FF2B5EF4-FFF2-40B4-BE49-F238E27FC236}">
+                  <a16:creationId xmlns:a16="http://schemas.microsoft.com/office/drawing/2014/main" id="{43FD067E-5B6F-F0D9-1784-F0B95CCDE00A}"/>
+                </a:ext>
+              </a:extLst>
+            </p:cNvPr>
+            <p:cNvGrpSpPr/>
+            <p:nvPr/>
+          </p:nvGrpSpPr>
+          <p:grpSpPr>
+            <a:xfrm>
+              <a:off x="8070834" y="3827808"/>
+              <a:ext cx="601598" cy="496651"/>
+              <a:chOff x="355600" y="488950"/>
+              <a:chExt cx="584200" cy="635961"/>
+            </a:xfrm>
+          </p:grpSpPr>
+          <p:sp>
+            <p:nvSpPr>
+              <p:cNvPr id="11" name="Oval 10">
+                <a:extLst>
+                  <a:ext uri="{FF2B5EF4-FFF2-40B4-BE49-F238E27FC236}">
+                    <a16:creationId xmlns:a16="http://schemas.microsoft.com/office/drawing/2014/main" id="{E5600EDD-EA64-16AD-E06E-323D1D4EAB05}"/>
+                  </a:ext>
+                </a:extLst>
+              </p:cNvPr>
+              <p:cNvSpPr/>
+              <p:nvPr/>
+            </p:nvSpPr>
+            <p:spPr>
+              <a:xfrm>
+                <a:off x="368300" y="488950"/>
+                <a:ext cx="114300" cy="115261"/>
+              </a:xfrm>
+              <a:prstGeom prst="ellipse">
+                <a:avLst/>
+              </a:prstGeom>
+              <a:solidFill>
+                <a:schemeClr val="accent2">
+                  <a:lumMod val="60000"/>
+                  <a:lumOff val="40000"/>
+                </a:schemeClr>
+              </a:solidFill>
+              <a:ln>
+                <a:solidFill>
+                  <a:srgbClr val="C00000"/>
+                </a:solidFill>
+              </a:ln>
+            </p:spPr>
+            <p:style>
+              <a:lnRef idx="2">
+                <a:schemeClr val="accent1">
+                  <a:shade val="50000"/>
+                </a:schemeClr>
+              </a:lnRef>
+              <a:fillRef idx="1">
+                <a:schemeClr val="accent1"/>
+              </a:fillRef>
+              <a:effectRef idx="0">
+                <a:schemeClr val="accent1"/>
+              </a:effectRef>
+              <a:fontRef idx="minor">
+                <a:schemeClr val="lt1"/>
+              </a:fontRef>
+            </p:style>
+            <p:txBody>
+              <a:bodyPr rot="0" spcFirstLastPara="0" vert="horz" wrap="square" lIns="91440" tIns="45720" rIns="91440" bIns="45720" numCol="1" spcCol="0" rtlCol="0" fromWordArt="0" anchor="ctr" anchorCtr="0" forceAA="0" compatLnSpc="1">
+                <a:prstTxWarp prst="textNoShape">
+                  <a:avLst/>
+                </a:prstTxWarp>
+                <a:noAutofit/>
+              </a:bodyPr>
+              <a:lstStyle/>
+              <a:p>
+                <a:endParaRPr lang="en-US" dirty="0">
+                  <a:solidFill>
+                    <a:srgbClr val="0070C0"/>
+                  </a:solidFill>
+                </a:endParaRPr>
+              </a:p>
+            </p:txBody>
+          </p:sp>
+          <p:sp>
+            <p:nvSpPr>
+              <p:cNvPr id="12" name="Oval 11">
+                <a:extLst>
+                  <a:ext uri="{FF2B5EF4-FFF2-40B4-BE49-F238E27FC236}">
+                    <a16:creationId xmlns:a16="http://schemas.microsoft.com/office/drawing/2014/main" id="{F995D46B-A09D-3E01-C6F6-D14D0A41043A}"/>
+                  </a:ext>
+                </a:extLst>
+              </p:cNvPr>
+              <p:cNvSpPr/>
+              <p:nvPr/>
+            </p:nvSpPr>
+            <p:spPr>
+              <a:xfrm>
+                <a:off x="825500" y="539750"/>
+                <a:ext cx="114300" cy="115261"/>
+              </a:xfrm>
+              <a:prstGeom prst="ellipse">
+                <a:avLst/>
+              </a:prstGeom>
+              <a:solidFill>
+                <a:schemeClr val="accent4">
+                  <a:lumMod val="20000"/>
+                  <a:lumOff val="80000"/>
+                </a:schemeClr>
+              </a:solidFill>
+              <a:ln>
+                <a:solidFill>
+                  <a:schemeClr val="accent4">
+                    <a:lumMod val="60000"/>
+                    <a:lumOff val="40000"/>
+                  </a:schemeClr>
+                </a:solidFill>
+              </a:ln>
+            </p:spPr>
+            <p:style>
+              <a:lnRef idx="2">
+                <a:schemeClr val="accent1">
+                  <a:shade val="50000"/>
+                </a:schemeClr>
+              </a:lnRef>
+              <a:fillRef idx="1">
+                <a:schemeClr val="accent1"/>
+              </a:fillRef>
+              <a:effectRef idx="0">
+                <a:schemeClr val="accent1"/>
+              </a:effectRef>
+              <a:fontRef idx="minor">
+                <a:schemeClr val="lt1"/>
+              </a:fontRef>
+            </p:style>
+            <p:txBody>
+              <a:bodyPr rot="0" spcFirstLastPara="0" vert="horz" wrap="square" lIns="91440" tIns="45720" rIns="91440" bIns="45720" numCol="1" spcCol="0" rtlCol="0" fromWordArt="0" anchor="ctr" anchorCtr="0" forceAA="0" compatLnSpc="1">
+                <a:prstTxWarp prst="textNoShape">
+                  <a:avLst/>
+                </a:prstTxWarp>
+                <a:noAutofit/>
+              </a:bodyPr>
+              <a:lstStyle/>
+              <a:p>
+                <a:endParaRPr lang="en-US" dirty="0">
+                  <a:solidFill>
+                    <a:srgbClr val="0070C0"/>
+                  </a:solidFill>
+                </a:endParaRPr>
+              </a:p>
+            </p:txBody>
+          </p:sp>
+          <p:sp>
+            <p:nvSpPr>
+              <p:cNvPr id="13" name="Oval 12">
+                <a:extLst>
+                  <a:ext uri="{FF2B5EF4-FFF2-40B4-BE49-F238E27FC236}">
+                    <a16:creationId xmlns:a16="http://schemas.microsoft.com/office/drawing/2014/main" id="{D381A1B5-BFDA-D7FF-8205-C39DED23AB09}"/>
+                  </a:ext>
+                </a:extLst>
+              </p:cNvPr>
+              <p:cNvSpPr/>
+              <p:nvPr/>
+            </p:nvSpPr>
+            <p:spPr>
+              <a:xfrm>
+                <a:off x="355600" y="1009650"/>
+                <a:ext cx="114300" cy="115261"/>
+              </a:xfrm>
+              <a:prstGeom prst="ellipse">
+                <a:avLst/>
+              </a:prstGeom>
+              <a:solidFill>
+                <a:schemeClr val="accent4">
+                  <a:lumMod val="20000"/>
+                  <a:lumOff val="80000"/>
+                </a:schemeClr>
+              </a:solidFill>
+              <a:ln>
+                <a:solidFill>
+                  <a:schemeClr val="accent4">
+                    <a:lumMod val="60000"/>
+                    <a:lumOff val="40000"/>
+                  </a:schemeClr>
+                </a:solidFill>
+              </a:ln>
+            </p:spPr>
+            <p:style>
+              <a:lnRef idx="2">
+                <a:schemeClr val="accent1">
+                  <a:shade val="50000"/>
+                </a:schemeClr>
+              </a:lnRef>
+              <a:fillRef idx="1">
+                <a:schemeClr val="accent1"/>
+              </a:fillRef>
+              <a:effectRef idx="0">
+                <a:schemeClr val="accent1"/>
+              </a:effectRef>
+              <a:fontRef idx="minor">
+                <a:schemeClr val="lt1"/>
+              </a:fontRef>
+            </p:style>
+            <p:txBody>
+              <a:bodyPr rot="0" spcFirstLastPara="0" vert="horz" wrap="square" lIns="91440" tIns="45720" rIns="91440" bIns="45720" numCol="1" spcCol="0" rtlCol="0" fromWordArt="0" anchor="ctr" anchorCtr="0" forceAA="0" compatLnSpc="1">
+                <a:prstTxWarp prst="textNoShape">
+                  <a:avLst/>
+                </a:prstTxWarp>
+                <a:noAutofit/>
+              </a:bodyPr>
+              <a:lstStyle/>
+              <a:p>
+                <a:endParaRPr lang="en-US" dirty="0">
+                  <a:solidFill>
+                    <a:srgbClr val="0070C0"/>
+                  </a:solidFill>
+                </a:endParaRPr>
+              </a:p>
+            </p:txBody>
+          </p:sp>
+        </p:grpSp>
+        <p:cxnSp>
+          <p:nvCxnSpPr>
+            <p:cNvPr id="4" name="Straight Arrow Connector 3">
+              <a:extLst>
+                <a:ext uri="{FF2B5EF4-FFF2-40B4-BE49-F238E27FC236}">
+                  <a16:creationId xmlns:a16="http://schemas.microsoft.com/office/drawing/2014/main" id="{0A6DE654-C333-BF74-1E0B-8EA674ABCD47}"/>
+                </a:ext>
+              </a:extLst>
+            </p:cNvPr>
+            <p:cNvCxnSpPr>
+              <a:stCxn id="13" idx="7"/>
+              <a:endCxn id="12" idx="3"/>
+            </p:cNvCxnSpPr>
+            <p:nvPr/>
+          </p:nvCxnSpPr>
+          <p:spPr>
+            <a:xfrm flipV="1">
+              <a:off x="8171302" y="3944072"/>
+              <a:ext cx="400665" cy="303173"/>
+            </a:xfrm>
+            <a:prstGeom prst="straightConnector1">
+              <a:avLst/>
+            </a:prstGeom>
+            <a:ln w="12700">
+              <a:solidFill>
+                <a:schemeClr val="tx1"/>
+              </a:solidFill>
+              <a:tailEnd type="triangle" w="sm" len="med"/>
+            </a:ln>
+          </p:spPr>
+          <p:style>
+            <a:lnRef idx="1">
+              <a:schemeClr val="accent1"/>
+            </a:lnRef>
+            <a:fillRef idx="0">
+              <a:schemeClr val="accent1"/>
+            </a:fillRef>
+            <a:effectRef idx="0">
+              <a:schemeClr val="accent1"/>
+            </a:effectRef>
+            <a:fontRef idx="minor">
+              <a:schemeClr val="tx1"/>
+            </a:fontRef>
+          </p:style>
+        </p:cxnSp>
+        <p:cxnSp>
+          <p:nvCxnSpPr>
+            <p:cNvPr id="5" name="Straight Arrow Connector 4">
+              <a:extLst>
+                <a:ext uri="{FF2B5EF4-FFF2-40B4-BE49-F238E27FC236}">
+                  <a16:creationId xmlns:a16="http://schemas.microsoft.com/office/drawing/2014/main" id="{15CA0A79-4F7C-AFA2-0226-E20E31837FA7}"/>
+                </a:ext>
+              </a:extLst>
+            </p:cNvPr>
+            <p:cNvCxnSpPr>
+              <a:endCxn id="13" idx="3"/>
+            </p:cNvCxnSpPr>
+            <p:nvPr/>
+          </p:nvCxnSpPr>
+          <p:spPr>
+            <a:xfrm flipV="1">
+              <a:off x="7927995" y="4310887"/>
+              <a:ext cx="159610" cy="192944"/>
+            </a:xfrm>
+            <a:prstGeom prst="straightConnector1">
+              <a:avLst/>
+            </a:prstGeom>
+            <a:ln w="12700">
+              <a:solidFill>
+                <a:schemeClr val="tx1"/>
+              </a:solidFill>
+              <a:tailEnd type="triangle" w="sm" len="med"/>
+            </a:ln>
+          </p:spPr>
+          <p:style>
+            <a:lnRef idx="1">
+              <a:schemeClr val="accent1"/>
+            </a:lnRef>
+            <a:fillRef idx="0">
+              <a:schemeClr val="accent1"/>
+            </a:fillRef>
+            <a:effectRef idx="0">
+              <a:schemeClr val="accent1"/>
+            </a:effectRef>
+            <a:fontRef idx="minor">
+              <a:schemeClr val="tx1"/>
+            </a:fontRef>
+          </p:style>
+        </p:cxnSp>
+        <p:cxnSp>
+          <p:nvCxnSpPr>
+            <p:cNvPr id="6" name="Straight Arrow Connector 5">
+              <a:extLst>
+                <a:ext uri="{FF2B5EF4-FFF2-40B4-BE49-F238E27FC236}">
+                  <a16:creationId xmlns:a16="http://schemas.microsoft.com/office/drawing/2014/main" id="{9EC6DED2-AAE5-BED7-D0D4-3EA678D446CF}"/>
+                </a:ext>
+              </a:extLst>
+            </p:cNvPr>
+            <p:cNvCxnSpPr>
+              <a:stCxn id="13" idx="0"/>
+              <a:endCxn id="11" idx="4"/>
+            </p:cNvCxnSpPr>
+            <p:nvPr/>
+          </p:nvCxnSpPr>
+          <p:spPr>
+            <a:xfrm flipV="1">
+              <a:off x="8129687" y="3917595"/>
+              <a:ext cx="13078" cy="316474"/>
+            </a:xfrm>
+            <a:prstGeom prst="straightConnector1">
+              <a:avLst/>
+            </a:prstGeom>
+            <a:ln w="12700">
+              <a:solidFill>
+                <a:schemeClr val="tx1"/>
+              </a:solidFill>
+              <a:tailEnd type="triangle" w="sm" len="med"/>
+            </a:ln>
+          </p:spPr>
+          <p:style>
+            <a:lnRef idx="1">
+              <a:schemeClr val="accent1"/>
+            </a:lnRef>
+            <a:fillRef idx="0">
+              <a:schemeClr val="accent1"/>
+            </a:fillRef>
+            <a:effectRef idx="0">
+              <a:schemeClr val="accent1"/>
+            </a:effectRef>
+            <a:fontRef idx="minor">
+              <a:schemeClr val="tx1"/>
+            </a:fontRef>
+          </p:style>
+        </p:cxnSp>
+        <p:cxnSp>
+          <p:nvCxnSpPr>
+            <p:cNvPr id="7" name="Straight Arrow Connector 6">
+              <a:extLst>
+                <a:ext uri="{FF2B5EF4-FFF2-40B4-BE49-F238E27FC236}">
+                  <a16:creationId xmlns:a16="http://schemas.microsoft.com/office/drawing/2014/main" id="{A965939C-B653-11EB-BF38-CC9FB4FE4AA7}"/>
+                </a:ext>
+              </a:extLst>
+            </p:cNvPr>
+            <p:cNvCxnSpPr>
+              <a:stCxn id="12" idx="2"/>
+              <a:endCxn id="11" idx="6"/>
+            </p:cNvCxnSpPr>
+            <p:nvPr/>
+          </p:nvCxnSpPr>
+          <p:spPr>
+            <a:xfrm flipH="1" flipV="1">
+              <a:off x="8201617" y="3872611"/>
+              <a:ext cx="353111" cy="39653"/>
+            </a:xfrm>
+            <a:prstGeom prst="straightConnector1">
+              <a:avLst/>
+            </a:prstGeom>
+            <a:ln w="12700">
+              <a:solidFill>
+                <a:schemeClr val="tx1"/>
+              </a:solidFill>
+              <a:tailEnd type="triangle" w="sm" len="med"/>
+            </a:ln>
+          </p:spPr>
+          <p:style>
+            <a:lnRef idx="1">
+              <a:schemeClr val="accent1"/>
+            </a:lnRef>
+            <a:fillRef idx="0">
+              <a:schemeClr val="accent1"/>
+            </a:fillRef>
+            <a:effectRef idx="0">
+              <a:schemeClr val="accent1"/>
+            </a:effectRef>
+            <a:fontRef idx="minor">
+              <a:schemeClr val="tx1"/>
+            </a:fontRef>
+          </p:style>
+        </p:cxnSp>
+        <p:sp>
+          <p:nvSpPr>
+            <p:cNvPr id="8" name="Text Box 2">
+              <a:extLst>
+                <a:ext uri="{FF2B5EF4-FFF2-40B4-BE49-F238E27FC236}">
+                  <a16:creationId xmlns:a16="http://schemas.microsoft.com/office/drawing/2014/main" id="{7FCD0976-8022-365E-039C-BBACC3B553C2}"/>
+                </a:ext>
+              </a:extLst>
+            </p:cNvPr>
+            <p:cNvSpPr txBox="1">
+              <a:spLocks noChangeArrowheads="1"/>
+            </p:cNvSpPr>
+            <p:nvPr/>
+          </p:nvSpPr>
+          <p:spPr bwMode="auto">
+            <a:xfrm>
+              <a:off x="8171302" y="3600627"/>
+              <a:ext cx="410107" cy="231134"/>
+            </a:xfrm>
+            <a:prstGeom prst="rect">
+              <a:avLst/>
+            </a:prstGeom>
+            <a:noFill/>
+            <a:ln w="9525">
+              <a:noFill/>
+              <a:miter lim="800000"/>
+              <a:headEnd/>
+              <a:tailEnd/>
+            </a:ln>
+          </p:spPr>
+          <p:txBody>
+            <a:bodyPr rot="0" vert="horz" wrap="square" lIns="91440" tIns="45720" rIns="91440" bIns="45720" anchor="t" anchorCtr="0">
+              <a:noAutofit/>
+            </a:bodyPr>
+            <a:lstStyle/>
+            <a:p>
+              <a:pPr marL="0" marR="0">
+                <a:lnSpc>
+                  <a:spcPct val="107000"/>
+                </a:lnSpc>
+                <a:spcBef>
+                  <a:spcPts val="0"/>
+                </a:spcBef>
+                <a:spcAft>
+                  <a:spcPts val="800"/>
+                </a:spcAft>
+              </a:pPr>
+              <a:r>
+                <a:rPr lang="en-US" sz="1600" dirty="0">
+                  <a:solidFill>
+                    <a:srgbClr val="0070C0"/>
+                  </a:solidFill>
+                  <a:effectLst/>
+                  <a:latin typeface="Calibri" panose="020F0502020204030204" pitchFamily="34" charset="0"/>
+                  <a:ea typeface="DengXian" panose="02010600030101010101" pitchFamily="2" charset="-122"/>
+                  <a:cs typeface="Times New Roman" panose="02020603050405020304" pitchFamily="18" charset="0"/>
+                </a:rPr>
+                <a:t>S3</a:t>
+              </a:r>
+            </a:p>
+          </p:txBody>
+        </p:sp>
+        <p:sp>
+          <p:nvSpPr>
+            <p:cNvPr id="9" name="Text Box 2">
+              <a:extLst>
+                <a:ext uri="{FF2B5EF4-FFF2-40B4-BE49-F238E27FC236}">
+                  <a16:creationId xmlns:a16="http://schemas.microsoft.com/office/drawing/2014/main" id="{C8868525-A16D-29BB-0D20-CA12758993E6}"/>
+                </a:ext>
+              </a:extLst>
+            </p:cNvPr>
+            <p:cNvSpPr txBox="1">
+              <a:spLocks noChangeArrowheads="1"/>
+            </p:cNvSpPr>
+            <p:nvPr/>
+          </p:nvSpPr>
+          <p:spPr bwMode="auto">
+            <a:xfrm>
+              <a:off x="8419881" y="3967383"/>
+              <a:ext cx="410107" cy="231134"/>
+            </a:xfrm>
+            <a:prstGeom prst="rect">
+              <a:avLst/>
+            </a:prstGeom>
+            <a:noFill/>
+            <a:ln w="9525">
+              <a:noFill/>
+              <a:miter lim="800000"/>
+              <a:headEnd/>
+              <a:tailEnd/>
+            </a:ln>
+          </p:spPr>
+          <p:txBody>
+            <a:bodyPr rot="0" vert="horz" wrap="square" lIns="91440" tIns="45720" rIns="91440" bIns="45720" anchor="t" anchorCtr="0">
+              <a:noAutofit/>
+            </a:bodyPr>
+            <a:lstStyle/>
+            <a:p>
+              <a:pPr marL="0" marR="0">
+                <a:lnSpc>
+                  <a:spcPct val="107000"/>
+                </a:lnSpc>
+                <a:spcBef>
+                  <a:spcPts val="0"/>
+                </a:spcBef>
+                <a:spcAft>
+                  <a:spcPts val="800"/>
+                </a:spcAft>
+              </a:pPr>
+              <a:r>
+                <a:rPr lang="en-US" sz="1600" dirty="0">
+                  <a:solidFill>
+                    <a:srgbClr val="0070C0"/>
+                  </a:solidFill>
+                  <a:effectLst/>
+                  <a:latin typeface="Calibri" panose="020F0502020204030204" pitchFamily="34" charset="0"/>
+                  <a:ea typeface="DengXian" panose="02010600030101010101" pitchFamily="2" charset="-122"/>
+                  <a:cs typeface="Times New Roman" panose="02020603050405020304" pitchFamily="18" charset="0"/>
+                </a:rPr>
+                <a:t>S4</a:t>
+              </a:r>
+            </a:p>
+          </p:txBody>
+        </p:sp>
+        <p:sp>
+          <p:nvSpPr>
+            <p:cNvPr id="10" name="Text Box 2">
+              <a:extLst>
+                <a:ext uri="{FF2B5EF4-FFF2-40B4-BE49-F238E27FC236}">
+                  <a16:creationId xmlns:a16="http://schemas.microsoft.com/office/drawing/2014/main" id="{A9CCBF9D-1911-3007-3CCA-9D4147C8FAFC}"/>
+                </a:ext>
+              </a:extLst>
+            </p:cNvPr>
+            <p:cNvSpPr txBox="1">
+              <a:spLocks noChangeArrowheads="1"/>
+            </p:cNvSpPr>
+            <p:nvPr/>
+          </p:nvSpPr>
+          <p:spPr bwMode="auto">
+            <a:xfrm>
+              <a:off x="7691043" y="4191197"/>
+              <a:ext cx="410107" cy="231134"/>
+            </a:xfrm>
+            <a:prstGeom prst="rect">
+              <a:avLst/>
+            </a:prstGeom>
+            <a:noFill/>
+            <a:ln w="9525">
+              <a:noFill/>
+              <a:miter lim="800000"/>
+              <a:headEnd/>
+              <a:tailEnd/>
+            </a:ln>
+          </p:spPr>
+          <p:txBody>
+            <a:bodyPr rot="0" vert="horz" wrap="square" lIns="91440" tIns="45720" rIns="91440" bIns="45720" anchor="t" anchorCtr="0">
+              <a:noAutofit/>
+            </a:bodyPr>
+            <a:lstStyle/>
+            <a:p>
+              <a:pPr marL="0" marR="0">
+                <a:lnSpc>
+                  <a:spcPct val="107000"/>
+                </a:lnSpc>
+                <a:spcBef>
+                  <a:spcPts val="0"/>
+                </a:spcBef>
+                <a:spcAft>
+                  <a:spcPts val="800"/>
+                </a:spcAft>
+              </a:pPr>
+              <a:r>
+                <a:rPr lang="en-US" sz="1600" dirty="0">
+                  <a:solidFill>
+                    <a:srgbClr val="0070C0"/>
+                  </a:solidFill>
+                  <a:effectLst/>
+                  <a:latin typeface="Calibri" panose="020F0502020204030204" pitchFamily="34" charset="0"/>
+                  <a:ea typeface="DengXian" panose="02010600030101010101" pitchFamily="2" charset="-122"/>
+                  <a:cs typeface="Times New Roman" panose="02020603050405020304" pitchFamily="18" charset="0"/>
+                </a:rPr>
+                <a:t>S5</a:t>
+              </a:r>
+            </a:p>
+          </p:txBody>
+        </p:sp>
+      </p:grpSp>
+      <p:cxnSp>
+        <p:nvCxnSpPr>
+          <p:cNvPr id="14" name="Straight Arrow Connector 13">
+            <a:extLst>
+              <a:ext uri="{FF2B5EF4-FFF2-40B4-BE49-F238E27FC236}">
+                <a16:creationId xmlns:a16="http://schemas.microsoft.com/office/drawing/2014/main" id="{1AA3B3B6-8F4B-817A-A44B-D7EAC7BCE28D}"/>
+              </a:ext>
+            </a:extLst>
+          </p:cNvPr>
+          <p:cNvCxnSpPr>
+            <a:cxnSpLocks/>
+          </p:cNvCxnSpPr>
+          <p:nvPr/>
+        </p:nvCxnSpPr>
+        <p:spPr>
+          <a:xfrm>
+            <a:off x="6141968" y="3398804"/>
+            <a:ext cx="371940" cy="1362"/>
+          </a:xfrm>
+          <a:prstGeom prst="straightConnector1">
+            <a:avLst/>
+          </a:prstGeom>
+          <a:ln w="12700">
+            <a:tailEnd type="triangle"/>
+          </a:ln>
+        </p:spPr>
+        <p:style>
+          <a:lnRef idx="1">
+            <a:schemeClr val="dk1"/>
+          </a:lnRef>
+          <a:fillRef idx="0">
+            <a:schemeClr val="dk1"/>
+          </a:fillRef>
+          <a:effectRef idx="0">
+            <a:schemeClr val="dk1"/>
+          </a:effectRef>
+          <a:fontRef idx="minor">
+            <a:schemeClr val="tx1"/>
+          </a:fontRef>
+        </p:style>
+      </p:cxnSp>
+      <p:sp>
+        <p:nvSpPr>
+          <p:cNvPr id="15" name="TextBox 14">
+            <a:extLst>
+              <a:ext uri="{FF2B5EF4-FFF2-40B4-BE49-F238E27FC236}">
+                <a16:creationId xmlns:a16="http://schemas.microsoft.com/office/drawing/2014/main" id="{0B028F61-D399-8C9E-24A9-8A3F354F7CED}"/>
+              </a:ext>
+            </a:extLst>
+          </p:cNvPr>
+          <p:cNvSpPr txBox="1"/>
+          <p:nvPr/>
+        </p:nvSpPr>
+        <p:spPr>
+          <a:xfrm>
+            <a:off x="767507" y="3795095"/>
+            <a:ext cx="2444929" cy="707886"/>
+          </a:xfrm>
+          <a:prstGeom prst="rect">
+            <a:avLst/>
+          </a:prstGeom>
+          <a:noFill/>
+        </p:spPr>
+        <p:txBody>
+          <a:bodyPr wrap="square" rtlCol="0">
+            <a:spAutoFit/>
+          </a:bodyPr>
+          <a:lstStyle/>
+          <a:p>
+            <a:pPr algn="ctr"/>
+            <a:r>
+              <a:rPr lang="en-US" sz="2000" i="1" dirty="0"/>
+              <a:t>PDG subgraph from </a:t>
+            </a:r>
+            <a:r>
+              <a:rPr lang="en-US" sz="2000" i="1" dirty="0" err="1">
+                <a:latin typeface="Courier New" panose="02070309020205020404" pitchFamily="49" charset="0"/>
+                <a:cs typeface="Courier New" panose="02070309020205020404" pitchFamily="49" charset="0"/>
+              </a:rPr>
+              <a:t>GNNExplainer</a:t>
+            </a:r>
+            <a:endParaRPr lang="en-US" sz="2000" i="1" dirty="0">
+              <a:latin typeface="Courier New" panose="02070309020205020404" pitchFamily="49" charset="0"/>
+              <a:cs typeface="Courier New" panose="02070309020205020404" pitchFamily="49" charset="0"/>
+            </a:endParaRPr>
+          </a:p>
+        </p:txBody>
+      </p:sp>
+      <p:sp>
+        <p:nvSpPr>
+          <p:cNvPr id="16" name="TextBox 15">
+            <a:extLst>
+              <a:ext uri="{FF2B5EF4-FFF2-40B4-BE49-F238E27FC236}">
+                <a16:creationId xmlns:a16="http://schemas.microsoft.com/office/drawing/2014/main" id="{E635067D-EC04-BB3E-2B5F-5CB7422D7B02}"/>
+              </a:ext>
+            </a:extLst>
+          </p:cNvPr>
+          <p:cNvSpPr txBox="1"/>
+          <p:nvPr/>
+        </p:nvSpPr>
+        <p:spPr>
+          <a:xfrm>
+            <a:off x="5225414" y="3212337"/>
+            <a:ext cx="927049" cy="369332"/>
+          </a:xfrm>
+          <a:prstGeom prst="rect">
+            <a:avLst/>
+          </a:prstGeom>
+          <a:gradFill flip="none" rotWithShape="1">
+            <a:gsLst>
+              <a:gs pos="0">
+                <a:schemeClr val="accent5">
+                  <a:lumMod val="67000"/>
+                </a:schemeClr>
+              </a:gs>
+              <a:gs pos="48000">
+                <a:schemeClr val="accent5">
+                  <a:lumMod val="97000"/>
+                  <a:lumOff val="3000"/>
+                </a:schemeClr>
+              </a:gs>
+              <a:gs pos="100000">
+                <a:schemeClr val="accent5">
+                  <a:lumMod val="60000"/>
+                  <a:lumOff val="40000"/>
+                </a:schemeClr>
+              </a:gs>
+            </a:gsLst>
+            <a:lin ang="16200000" scaled="1"/>
+            <a:tileRect/>
+          </a:gradFill>
+          <a:ln>
+            <a:noFill/>
+          </a:ln>
+        </p:spPr>
+        <p:style>
+          <a:lnRef idx="0">
+            <a:scrgbClr r="0" g="0" b="0"/>
+          </a:lnRef>
+          <a:fillRef idx="0">
+            <a:scrgbClr r="0" g="0" b="0"/>
+          </a:fillRef>
+          <a:effectRef idx="0">
+            <a:scrgbClr r="0" g="0" b="0"/>
+          </a:effectRef>
+          <a:fontRef idx="minor">
+            <a:schemeClr val="lt1"/>
+          </a:fontRef>
+        </p:style>
+        <p:txBody>
+          <a:bodyPr wrap="square" rtlCol="0">
+            <a:spAutoFit/>
+          </a:bodyPr>
+          <a:lstStyle/>
+          <a:p>
+            <a:pPr algn="ctr"/>
+            <a:r>
+              <a:rPr lang="en-US" dirty="0"/>
+              <a:t>R-GCN</a:t>
+            </a:r>
+          </a:p>
+        </p:txBody>
+      </p:sp>
+      <p:grpSp>
+        <p:nvGrpSpPr>
+          <p:cNvPr id="17" name="Group 16">
+            <a:extLst>
+              <a:ext uri="{FF2B5EF4-FFF2-40B4-BE49-F238E27FC236}">
+                <a16:creationId xmlns:a16="http://schemas.microsoft.com/office/drawing/2014/main" id="{F1B3F5D3-87BA-0B02-1DB3-F519A02EAAC5}"/>
+              </a:ext>
+            </a:extLst>
+          </p:cNvPr>
+          <p:cNvGrpSpPr/>
+          <p:nvPr/>
+        </p:nvGrpSpPr>
+        <p:grpSpPr>
+          <a:xfrm>
+            <a:off x="1017104" y="1873422"/>
+            <a:ext cx="1417486" cy="1375459"/>
+            <a:chOff x="914408" y="2830660"/>
+            <a:chExt cx="1417486" cy="1375459"/>
+          </a:xfrm>
+        </p:grpSpPr>
+        <p:grpSp>
+          <p:nvGrpSpPr>
+            <p:cNvPr id="18" name="Group 17">
+              <a:extLst>
+                <a:ext uri="{FF2B5EF4-FFF2-40B4-BE49-F238E27FC236}">
+                  <a16:creationId xmlns:a16="http://schemas.microsoft.com/office/drawing/2014/main" id="{9811A882-5880-522B-62F2-C3BFCCD4CF96}"/>
+                </a:ext>
+              </a:extLst>
+            </p:cNvPr>
+            <p:cNvGrpSpPr/>
+            <p:nvPr/>
+          </p:nvGrpSpPr>
+          <p:grpSpPr>
+            <a:xfrm>
+              <a:off x="1151945" y="2966663"/>
+              <a:ext cx="1023821" cy="1021105"/>
+              <a:chOff x="-63500" y="50800"/>
+              <a:chExt cx="1003300" cy="1074111"/>
+            </a:xfrm>
+          </p:grpSpPr>
+          <p:sp>
+            <p:nvSpPr>
+              <p:cNvPr id="34" name="Oval 33">
+                <a:extLst>
+                  <a:ext uri="{FF2B5EF4-FFF2-40B4-BE49-F238E27FC236}">
+                    <a16:creationId xmlns:a16="http://schemas.microsoft.com/office/drawing/2014/main" id="{D01FFA17-B20B-2AAE-D31A-24FAF8341770}"/>
+                  </a:ext>
+                </a:extLst>
+              </p:cNvPr>
+              <p:cNvSpPr/>
+              <p:nvPr/>
+            </p:nvSpPr>
+            <p:spPr>
+              <a:xfrm>
+                <a:off x="368300" y="488950"/>
+                <a:ext cx="114300" cy="115261"/>
+              </a:xfrm>
+              <a:prstGeom prst="ellipse">
+                <a:avLst/>
+              </a:prstGeom>
+              <a:solidFill>
+                <a:schemeClr val="accent2">
+                  <a:lumMod val="60000"/>
+                  <a:lumOff val="40000"/>
+                </a:schemeClr>
+              </a:solidFill>
+              <a:ln>
+                <a:solidFill>
+                  <a:srgbClr val="C00000"/>
+                </a:solidFill>
+              </a:ln>
+            </p:spPr>
+            <p:style>
+              <a:lnRef idx="2">
+                <a:schemeClr val="accent1">
+                  <a:shade val="50000"/>
+                </a:schemeClr>
+              </a:lnRef>
+              <a:fillRef idx="1">
+                <a:schemeClr val="accent1"/>
+              </a:fillRef>
+              <a:effectRef idx="0">
+                <a:schemeClr val="accent1"/>
+              </a:effectRef>
+              <a:fontRef idx="minor">
+                <a:schemeClr val="lt1"/>
+              </a:fontRef>
+            </p:style>
+            <p:txBody>
+              <a:bodyPr rot="0" spcFirstLastPara="0" vert="horz" wrap="square" lIns="91440" tIns="45720" rIns="91440" bIns="45720" numCol="1" spcCol="0" rtlCol="0" fromWordArt="0" anchor="ctr" anchorCtr="0" forceAA="0" compatLnSpc="1">
+                <a:prstTxWarp prst="textNoShape">
+                  <a:avLst/>
+                </a:prstTxWarp>
+                <a:noAutofit/>
+              </a:bodyPr>
+              <a:lstStyle/>
+              <a:p>
+                <a:endParaRPr lang="en-US" dirty="0">
+                  <a:solidFill>
+                    <a:srgbClr val="0070C0"/>
+                  </a:solidFill>
+                </a:endParaRPr>
+              </a:p>
+            </p:txBody>
+          </p:sp>
+          <p:sp>
+            <p:nvSpPr>
+              <p:cNvPr id="35" name="Oval 34">
+                <a:extLst>
+                  <a:ext uri="{FF2B5EF4-FFF2-40B4-BE49-F238E27FC236}">
+                    <a16:creationId xmlns:a16="http://schemas.microsoft.com/office/drawing/2014/main" id="{BB9DDECC-488E-DA94-8737-C40868D8CC31}"/>
+                  </a:ext>
+                </a:extLst>
+              </p:cNvPr>
+              <p:cNvSpPr/>
+              <p:nvPr/>
+            </p:nvSpPr>
+            <p:spPr>
+              <a:xfrm>
+                <a:off x="-63500" y="590786"/>
+                <a:ext cx="114300" cy="115261"/>
+              </a:xfrm>
+              <a:prstGeom prst="ellipse">
+                <a:avLst/>
+              </a:prstGeom>
+              <a:solidFill>
+                <a:schemeClr val="accent4">
+                  <a:lumMod val="20000"/>
+                  <a:lumOff val="80000"/>
+                </a:schemeClr>
+              </a:solidFill>
+              <a:ln>
+                <a:solidFill>
+                  <a:schemeClr val="accent4">
+                    <a:lumMod val="60000"/>
+                    <a:lumOff val="40000"/>
+                  </a:schemeClr>
+                </a:solidFill>
+              </a:ln>
+            </p:spPr>
+            <p:style>
+              <a:lnRef idx="2">
+                <a:schemeClr val="accent1">
+                  <a:shade val="50000"/>
+                </a:schemeClr>
+              </a:lnRef>
+              <a:fillRef idx="1">
+                <a:schemeClr val="accent1"/>
+              </a:fillRef>
+              <a:effectRef idx="0">
+                <a:schemeClr val="accent1"/>
+              </a:effectRef>
+              <a:fontRef idx="minor">
+                <a:schemeClr val="lt1"/>
+              </a:fontRef>
+            </p:style>
+            <p:txBody>
+              <a:bodyPr rot="0" spcFirstLastPara="0" vert="horz" wrap="square" lIns="91440" tIns="45720" rIns="91440" bIns="45720" numCol="1" spcCol="0" rtlCol="0" fromWordArt="0" anchor="ctr" anchorCtr="0" forceAA="0" compatLnSpc="1">
+                <a:prstTxWarp prst="textNoShape">
+                  <a:avLst/>
+                </a:prstTxWarp>
+                <a:noAutofit/>
+              </a:bodyPr>
+              <a:lstStyle/>
+              <a:p>
+                <a:endParaRPr lang="en-US" dirty="0">
+                  <a:solidFill>
+                    <a:srgbClr val="0070C0"/>
+                  </a:solidFill>
+                </a:endParaRPr>
+              </a:p>
+            </p:txBody>
+          </p:sp>
+          <p:sp>
+            <p:nvSpPr>
+              <p:cNvPr id="36" name="Oval 35">
+                <a:extLst>
+                  <a:ext uri="{FF2B5EF4-FFF2-40B4-BE49-F238E27FC236}">
+                    <a16:creationId xmlns:a16="http://schemas.microsoft.com/office/drawing/2014/main" id="{7C65F68D-D32D-6BD3-6883-C8C6592FFA58}"/>
+                  </a:ext>
+                </a:extLst>
+              </p:cNvPr>
+              <p:cNvSpPr/>
+              <p:nvPr/>
+            </p:nvSpPr>
+            <p:spPr>
+              <a:xfrm>
+                <a:off x="406400" y="50800"/>
+                <a:ext cx="114300" cy="115261"/>
+              </a:xfrm>
+              <a:prstGeom prst="ellipse">
+                <a:avLst/>
+              </a:prstGeom>
+              <a:solidFill>
+                <a:schemeClr val="accent4">
+                  <a:lumMod val="20000"/>
+                  <a:lumOff val="80000"/>
+                </a:schemeClr>
+              </a:solidFill>
+              <a:ln>
+                <a:solidFill>
+                  <a:schemeClr val="accent4">
+                    <a:lumMod val="60000"/>
+                    <a:lumOff val="40000"/>
+                  </a:schemeClr>
+                </a:solidFill>
+              </a:ln>
+            </p:spPr>
+            <p:style>
+              <a:lnRef idx="2">
+                <a:schemeClr val="accent1">
+                  <a:shade val="50000"/>
+                </a:schemeClr>
+              </a:lnRef>
+              <a:fillRef idx="1">
+                <a:schemeClr val="accent1"/>
+              </a:fillRef>
+              <a:effectRef idx="0">
+                <a:schemeClr val="accent1"/>
+              </a:effectRef>
+              <a:fontRef idx="minor">
+                <a:schemeClr val="lt1"/>
+              </a:fontRef>
+            </p:style>
+            <p:txBody>
+              <a:bodyPr rot="0" spcFirstLastPara="0" vert="horz" wrap="square" lIns="91440" tIns="45720" rIns="91440" bIns="45720" numCol="1" spcCol="0" rtlCol="0" fromWordArt="0" anchor="ctr" anchorCtr="0" forceAA="0" compatLnSpc="1">
+                <a:prstTxWarp prst="textNoShape">
+                  <a:avLst/>
+                </a:prstTxWarp>
+                <a:noAutofit/>
+              </a:bodyPr>
+              <a:lstStyle/>
+              <a:p>
+                <a:endParaRPr lang="en-US" dirty="0">
+                  <a:solidFill>
+                    <a:srgbClr val="0070C0"/>
+                  </a:solidFill>
+                </a:endParaRPr>
+              </a:p>
+            </p:txBody>
+          </p:sp>
+          <p:sp>
+            <p:nvSpPr>
+              <p:cNvPr id="37" name="Oval 36">
+                <a:extLst>
+                  <a:ext uri="{FF2B5EF4-FFF2-40B4-BE49-F238E27FC236}">
+                    <a16:creationId xmlns:a16="http://schemas.microsoft.com/office/drawing/2014/main" id="{527D0FFA-B11B-B889-2657-C69E7FF035B9}"/>
+                  </a:ext>
+                </a:extLst>
+              </p:cNvPr>
+              <p:cNvSpPr/>
+              <p:nvPr/>
+            </p:nvSpPr>
+            <p:spPr>
+              <a:xfrm>
+                <a:off x="825500" y="539750"/>
+                <a:ext cx="114300" cy="115261"/>
+              </a:xfrm>
+              <a:prstGeom prst="ellipse">
+                <a:avLst/>
+              </a:prstGeom>
+              <a:solidFill>
+                <a:schemeClr val="accent4">
+                  <a:lumMod val="20000"/>
+                  <a:lumOff val="80000"/>
+                </a:schemeClr>
+              </a:solidFill>
+              <a:ln>
+                <a:solidFill>
+                  <a:schemeClr val="accent4">
+                    <a:lumMod val="60000"/>
+                    <a:lumOff val="40000"/>
+                  </a:schemeClr>
+                </a:solidFill>
+              </a:ln>
+            </p:spPr>
+            <p:style>
+              <a:lnRef idx="2">
+                <a:schemeClr val="accent1">
+                  <a:shade val="50000"/>
+                </a:schemeClr>
+              </a:lnRef>
+              <a:fillRef idx="1">
+                <a:schemeClr val="accent1"/>
+              </a:fillRef>
+              <a:effectRef idx="0">
+                <a:schemeClr val="accent1"/>
+              </a:effectRef>
+              <a:fontRef idx="minor">
+                <a:schemeClr val="lt1"/>
+              </a:fontRef>
+            </p:style>
+            <p:txBody>
+              <a:bodyPr rot="0" spcFirstLastPara="0" vert="horz" wrap="square" lIns="91440" tIns="45720" rIns="91440" bIns="45720" numCol="1" spcCol="0" rtlCol="0" fromWordArt="0" anchor="ctr" anchorCtr="0" forceAA="0" compatLnSpc="1">
+                <a:prstTxWarp prst="textNoShape">
+                  <a:avLst/>
+                </a:prstTxWarp>
+                <a:noAutofit/>
+              </a:bodyPr>
+              <a:lstStyle/>
+              <a:p>
+                <a:endParaRPr lang="en-US" dirty="0">
+                  <a:solidFill>
+                    <a:srgbClr val="0070C0"/>
+                  </a:solidFill>
+                </a:endParaRPr>
+              </a:p>
+            </p:txBody>
+          </p:sp>
+          <p:sp>
+            <p:nvSpPr>
+              <p:cNvPr id="38" name="Oval 37">
+                <a:extLst>
+                  <a:ext uri="{FF2B5EF4-FFF2-40B4-BE49-F238E27FC236}">
+                    <a16:creationId xmlns:a16="http://schemas.microsoft.com/office/drawing/2014/main" id="{C1E0EFCC-3ABA-283A-C847-9A36894BB99C}"/>
+                  </a:ext>
+                </a:extLst>
+              </p:cNvPr>
+              <p:cNvSpPr/>
+              <p:nvPr/>
+            </p:nvSpPr>
+            <p:spPr>
+              <a:xfrm>
+                <a:off x="355600" y="1009650"/>
+                <a:ext cx="114300" cy="115261"/>
+              </a:xfrm>
+              <a:prstGeom prst="ellipse">
+                <a:avLst/>
+              </a:prstGeom>
+              <a:solidFill>
+                <a:schemeClr val="accent4">
+                  <a:lumMod val="20000"/>
+                  <a:lumOff val="80000"/>
+                </a:schemeClr>
+              </a:solidFill>
+              <a:ln>
+                <a:solidFill>
+                  <a:schemeClr val="accent4">
+                    <a:lumMod val="60000"/>
+                    <a:lumOff val="40000"/>
+                  </a:schemeClr>
+                </a:solidFill>
+              </a:ln>
+            </p:spPr>
+            <p:style>
+              <a:lnRef idx="2">
+                <a:schemeClr val="accent1">
+                  <a:shade val="50000"/>
+                </a:schemeClr>
+              </a:lnRef>
+              <a:fillRef idx="1">
+                <a:schemeClr val="accent1"/>
+              </a:fillRef>
+              <a:effectRef idx="0">
+                <a:schemeClr val="accent1"/>
+              </a:effectRef>
+              <a:fontRef idx="minor">
+                <a:schemeClr val="lt1"/>
+              </a:fontRef>
+            </p:style>
+            <p:txBody>
+              <a:bodyPr rot="0" spcFirstLastPara="0" vert="horz" wrap="square" lIns="91440" tIns="45720" rIns="91440" bIns="45720" numCol="1" spcCol="0" rtlCol="0" fromWordArt="0" anchor="ctr" anchorCtr="0" forceAA="0" compatLnSpc="1">
+                <a:prstTxWarp prst="textNoShape">
+                  <a:avLst/>
+                </a:prstTxWarp>
+                <a:noAutofit/>
+              </a:bodyPr>
+              <a:lstStyle/>
+              <a:p>
+                <a:endParaRPr lang="en-US" dirty="0">
+                  <a:solidFill>
+                    <a:srgbClr val="0070C0"/>
+                  </a:solidFill>
+                </a:endParaRPr>
+              </a:p>
+            </p:txBody>
+          </p:sp>
+        </p:grpSp>
+        <p:cxnSp>
+          <p:nvCxnSpPr>
+            <p:cNvPr id="19" name="Straight Arrow Connector 18">
+              <a:extLst>
+                <a:ext uri="{FF2B5EF4-FFF2-40B4-BE49-F238E27FC236}">
+                  <a16:creationId xmlns:a16="http://schemas.microsoft.com/office/drawing/2014/main" id="{70488C0B-5358-5158-73DD-50419C312F3D}"/>
+                </a:ext>
+              </a:extLst>
+            </p:cNvPr>
+            <p:cNvCxnSpPr>
+              <a:stCxn id="38" idx="7"/>
+              <a:endCxn id="37" idx="3"/>
+            </p:cNvCxnSpPr>
+            <p:nvPr/>
+          </p:nvCxnSpPr>
+          <p:spPr>
+            <a:xfrm flipV="1">
+              <a:off x="1679174" y="3524720"/>
+              <a:ext cx="397036" cy="369055"/>
+            </a:xfrm>
+            <a:prstGeom prst="straightConnector1">
+              <a:avLst/>
+            </a:prstGeom>
+            <a:ln w="12700">
+              <a:solidFill>
+                <a:schemeClr val="tx1"/>
+              </a:solidFill>
+              <a:tailEnd type="triangle" w="sm" len="med"/>
+            </a:ln>
+          </p:spPr>
+          <p:style>
+            <a:lnRef idx="1">
+              <a:schemeClr val="accent1"/>
+            </a:lnRef>
+            <a:fillRef idx="0">
+              <a:schemeClr val="accent1"/>
+            </a:fillRef>
+            <a:effectRef idx="0">
+              <a:schemeClr val="accent1"/>
+            </a:effectRef>
+            <a:fontRef idx="minor">
+              <a:schemeClr val="tx1"/>
+            </a:fontRef>
+          </p:style>
+        </p:cxnSp>
+        <p:cxnSp>
+          <p:nvCxnSpPr>
+            <p:cNvPr id="20" name="Straight Arrow Connector 19">
+              <a:extLst>
+                <a:ext uri="{FF2B5EF4-FFF2-40B4-BE49-F238E27FC236}">
+                  <a16:creationId xmlns:a16="http://schemas.microsoft.com/office/drawing/2014/main" id="{039DFD9A-CF8E-63E6-6802-7AB34D0D0565}"/>
+                </a:ext>
+              </a:extLst>
+            </p:cNvPr>
+            <p:cNvCxnSpPr>
+              <a:stCxn id="35" idx="4"/>
+            </p:cNvCxnSpPr>
+            <p:nvPr/>
+          </p:nvCxnSpPr>
+          <p:spPr>
+            <a:xfrm flipH="1">
+              <a:off x="1067707" y="3589254"/>
+              <a:ext cx="142557" cy="336976"/>
+            </a:xfrm>
+            <a:prstGeom prst="straightConnector1">
+              <a:avLst/>
+            </a:prstGeom>
+            <a:ln w="12700">
+              <a:solidFill>
+                <a:schemeClr val="tx1"/>
+              </a:solidFill>
+              <a:tailEnd type="triangle" w="sm" len="med"/>
+            </a:ln>
+          </p:spPr>
+          <p:style>
+            <a:lnRef idx="1">
+              <a:schemeClr val="accent1"/>
+            </a:lnRef>
+            <a:fillRef idx="0">
+              <a:schemeClr val="accent1"/>
+            </a:fillRef>
+            <a:effectRef idx="0">
+              <a:schemeClr val="accent1"/>
+            </a:effectRef>
+            <a:fontRef idx="minor">
+              <a:schemeClr val="tx1"/>
+            </a:fontRef>
+          </p:style>
+        </p:cxnSp>
+        <p:cxnSp>
+          <p:nvCxnSpPr>
+            <p:cNvPr id="21" name="Straight Arrow Connector 20">
+              <a:extLst>
+                <a:ext uri="{FF2B5EF4-FFF2-40B4-BE49-F238E27FC236}">
+                  <a16:creationId xmlns:a16="http://schemas.microsoft.com/office/drawing/2014/main" id="{AB7AB4DA-F303-2501-7600-F4C51FCD6009}"/>
+                </a:ext>
+              </a:extLst>
+            </p:cNvPr>
+            <p:cNvCxnSpPr>
+              <a:stCxn id="35" idx="6"/>
+              <a:endCxn id="34" idx="2"/>
+            </p:cNvCxnSpPr>
+            <p:nvPr/>
+          </p:nvCxnSpPr>
+          <p:spPr>
+            <a:xfrm flipV="1">
+              <a:off x="1268583" y="3437729"/>
+              <a:ext cx="323994" cy="96765"/>
+            </a:xfrm>
+            <a:prstGeom prst="straightConnector1">
+              <a:avLst/>
+            </a:prstGeom>
+            <a:ln w="12700">
+              <a:solidFill>
+                <a:schemeClr val="tx1"/>
+              </a:solidFill>
+              <a:tailEnd type="triangle" w="sm" len="med"/>
+            </a:ln>
+          </p:spPr>
+          <p:style>
+            <a:lnRef idx="1">
+              <a:schemeClr val="accent1"/>
+            </a:lnRef>
+            <a:fillRef idx="0">
+              <a:schemeClr val="accent1"/>
+            </a:fillRef>
+            <a:effectRef idx="0">
+              <a:schemeClr val="accent1"/>
+            </a:effectRef>
+            <a:fontRef idx="minor">
+              <a:schemeClr val="tx1"/>
+            </a:fontRef>
+          </p:style>
+        </p:cxnSp>
+        <p:cxnSp>
+          <p:nvCxnSpPr>
+            <p:cNvPr id="22" name="Straight Arrow Connector 21">
+              <a:extLst>
+                <a:ext uri="{FF2B5EF4-FFF2-40B4-BE49-F238E27FC236}">
+                  <a16:creationId xmlns:a16="http://schemas.microsoft.com/office/drawing/2014/main" id="{2D84153F-7DC3-B17C-7FAC-7372CB571638}"/>
+                </a:ext>
+              </a:extLst>
+            </p:cNvPr>
+            <p:cNvCxnSpPr>
+              <a:endCxn id="38" idx="3"/>
+            </p:cNvCxnSpPr>
+            <p:nvPr/>
+          </p:nvCxnSpPr>
+          <p:spPr>
+            <a:xfrm flipV="1">
+              <a:off x="1438071" y="3971246"/>
+              <a:ext cx="158164" cy="234873"/>
+            </a:xfrm>
+            <a:prstGeom prst="straightConnector1">
+              <a:avLst/>
+            </a:prstGeom>
+            <a:ln w="12700">
+              <a:solidFill>
+                <a:schemeClr val="tx1"/>
+              </a:solidFill>
+              <a:tailEnd type="triangle" w="sm" len="med"/>
+            </a:ln>
+          </p:spPr>
+          <p:style>
+            <a:lnRef idx="1">
+              <a:schemeClr val="accent1"/>
+            </a:lnRef>
+            <a:fillRef idx="0">
+              <a:schemeClr val="accent1"/>
+            </a:fillRef>
+            <a:effectRef idx="0">
+              <a:schemeClr val="accent1"/>
+            </a:effectRef>
+            <a:fontRef idx="minor">
+              <a:schemeClr val="tx1"/>
+            </a:fontRef>
+          </p:style>
+        </p:cxnSp>
+        <p:cxnSp>
+          <p:nvCxnSpPr>
+            <p:cNvPr id="23" name="Straight Arrow Connector 22">
+              <a:extLst>
+                <a:ext uri="{FF2B5EF4-FFF2-40B4-BE49-F238E27FC236}">
+                  <a16:creationId xmlns:a16="http://schemas.microsoft.com/office/drawing/2014/main" id="{46592C84-9145-455F-1638-93C5F2834F25}"/>
+                </a:ext>
+              </a:extLst>
+            </p:cNvPr>
+            <p:cNvCxnSpPr>
+              <a:stCxn id="38" idx="0"/>
+              <a:endCxn id="34" idx="4"/>
+            </p:cNvCxnSpPr>
+            <p:nvPr/>
+          </p:nvCxnSpPr>
+          <p:spPr>
+            <a:xfrm flipV="1">
+              <a:off x="1637936" y="3492489"/>
+              <a:ext cx="12960" cy="385247"/>
+            </a:xfrm>
+            <a:prstGeom prst="straightConnector1">
+              <a:avLst/>
+            </a:prstGeom>
+            <a:ln w="12700">
+              <a:solidFill>
+                <a:schemeClr val="tx1"/>
+              </a:solidFill>
+              <a:tailEnd type="triangle" w="sm" len="med"/>
+            </a:ln>
+          </p:spPr>
+          <p:style>
+            <a:lnRef idx="1">
+              <a:schemeClr val="accent1"/>
+            </a:lnRef>
+            <a:fillRef idx="0">
+              <a:schemeClr val="accent1"/>
+            </a:fillRef>
+            <a:effectRef idx="0">
+              <a:schemeClr val="accent1"/>
+            </a:effectRef>
+            <a:fontRef idx="minor">
+              <a:schemeClr val="tx1"/>
+            </a:fontRef>
+          </p:style>
+        </p:cxnSp>
+        <p:cxnSp>
+          <p:nvCxnSpPr>
+            <p:cNvPr id="24" name="Straight Arrow Connector 23">
+              <a:extLst>
+                <a:ext uri="{FF2B5EF4-FFF2-40B4-BE49-F238E27FC236}">
+                  <a16:creationId xmlns:a16="http://schemas.microsoft.com/office/drawing/2014/main" id="{7430C076-FC99-A882-1F77-687394D73CA0}"/>
+                </a:ext>
+              </a:extLst>
+            </p:cNvPr>
+            <p:cNvCxnSpPr>
+              <a:stCxn id="37" idx="2"/>
+              <a:endCxn id="34" idx="6"/>
+            </p:cNvCxnSpPr>
+            <p:nvPr/>
+          </p:nvCxnSpPr>
+          <p:spPr>
+            <a:xfrm flipH="1" flipV="1">
+              <a:off x="1709215" y="3437729"/>
+              <a:ext cx="349913" cy="48270"/>
+            </a:xfrm>
+            <a:prstGeom prst="straightConnector1">
+              <a:avLst/>
+            </a:prstGeom>
+            <a:ln w="12700">
+              <a:solidFill>
+                <a:schemeClr val="tx1"/>
+              </a:solidFill>
+              <a:tailEnd type="triangle" w="sm" len="med"/>
+            </a:ln>
+          </p:spPr>
+          <p:style>
+            <a:lnRef idx="1">
+              <a:schemeClr val="accent1"/>
+            </a:lnRef>
+            <a:fillRef idx="0">
+              <a:schemeClr val="accent1"/>
+            </a:fillRef>
+            <a:effectRef idx="0">
+              <a:schemeClr val="accent1"/>
+            </a:effectRef>
+            <a:fontRef idx="minor">
+              <a:schemeClr val="tx1"/>
+            </a:fontRef>
+          </p:style>
+        </p:cxnSp>
+        <p:cxnSp>
+          <p:nvCxnSpPr>
+            <p:cNvPr id="25" name="Straight Arrow Connector 24">
+              <a:extLst>
+                <a:ext uri="{FF2B5EF4-FFF2-40B4-BE49-F238E27FC236}">
+                  <a16:creationId xmlns:a16="http://schemas.microsoft.com/office/drawing/2014/main" id="{C2AD4C25-827F-DD6F-B4EC-B6DAEB77FB22}"/>
+                </a:ext>
+              </a:extLst>
+            </p:cNvPr>
+            <p:cNvCxnSpPr>
+              <a:stCxn id="34" idx="0"/>
+              <a:endCxn id="36" idx="4"/>
+            </p:cNvCxnSpPr>
+            <p:nvPr/>
+          </p:nvCxnSpPr>
+          <p:spPr>
+            <a:xfrm flipV="1">
+              <a:off x="1650896" y="3076161"/>
+              <a:ext cx="38879" cy="306807"/>
+            </a:xfrm>
+            <a:prstGeom prst="straightConnector1">
+              <a:avLst/>
+            </a:prstGeom>
+            <a:ln w="12700">
+              <a:solidFill>
+                <a:schemeClr val="tx1"/>
+              </a:solidFill>
+              <a:tailEnd type="triangle" w="sm" len="med"/>
+            </a:ln>
+          </p:spPr>
+          <p:style>
+            <a:lnRef idx="1">
+              <a:schemeClr val="accent1"/>
+            </a:lnRef>
+            <a:fillRef idx="0">
+              <a:schemeClr val="accent1"/>
+            </a:fillRef>
+            <a:effectRef idx="0">
+              <a:schemeClr val="accent1"/>
+            </a:effectRef>
+            <a:fontRef idx="minor">
+              <a:schemeClr val="tx1"/>
+            </a:fontRef>
+          </p:style>
+        </p:cxnSp>
+        <p:cxnSp>
+          <p:nvCxnSpPr>
+            <p:cNvPr id="26" name="Straight Arrow Connector 25">
+              <a:extLst>
+                <a:ext uri="{FF2B5EF4-FFF2-40B4-BE49-F238E27FC236}">
+                  <a16:creationId xmlns:a16="http://schemas.microsoft.com/office/drawing/2014/main" id="{495DD08B-0F6C-C70F-F0CE-C395B73BCDFD}"/>
+                </a:ext>
+              </a:extLst>
+            </p:cNvPr>
+            <p:cNvCxnSpPr>
+              <a:stCxn id="36" idx="6"/>
+            </p:cNvCxnSpPr>
+            <p:nvPr/>
+          </p:nvCxnSpPr>
+          <p:spPr>
+            <a:xfrm flipV="1">
+              <a:off x="1748093" y="2882501"/>
+              <a:ext cx="297091" cy="138948"/>
+            </a:xfrm>
+            <a:prstGeom prst="straightConnector1">
+              <a:avLst/>
+            </a:prstGeom>
+            <a:ln w="12700">
+              <a:solidFill>
+                <a:schemeClr val="tx1"/>
+              </a:solidFill>
+              <a:tailEnd type="triangle" w="sm" len="med"/>
+            </a:ln>
+          </p:spPr>
+          <p:style>
+            <a:lnRef idx="1">
+              <a:schemeClr val="accent1"/>
+            </a:lnRef>
+            <a:fillRef idx="0">
+              <a:schemeClr val="accent1"/>
+            </a:fillRef>
+            <a:effectRef idx="0">
+              <a:schemeClr val="accent1"/>
+            </a:effectRef>
+            <a:fontRef idx="minor">
+              <a:schemeClr val="tx1"/>
+            </a:fontRef>
+          </p:style>
+        </p:cxnSp>
+        <p:cxnSp>
+          <p:nvCxnSpPr>
+            <p:cNvPr id="27" name="Straight Arrow Connector 26">
+              <a:extLst>
+                <a:ext uri="{FF2B5EF4-FFF2-40B4-BE49-F238E27FC236}">
+                  <a16:creationId xmlns:a16="http://schemas.microsoft.com/office/drawing/2014/main" id="{0CA60051-F2F1-008A-5728-BBDEBFA7A5A1}"/>
+                </a:ext>
+              </a:extLst>
+            </p:cNvPr>
+            <p:cNvCxnSpPr>
+              <a:endCxn id="35" idx="1"/>
+            </p:cNvCxnSpPr>
+            <p:nvPr/>
+          </p:nvCxnSpPr>
+          <p:spPr>
+            <a:xfrm>
+              <a:off x="914408" y="3317395"/>
+              <a:ext cx="254618" cy="178377"/>
+            </a:xfrm>
+            <a:prstGeom prst="straightConnector1">
+              <a:avLst/>
+            </a:prstGeom>
+            <a:ln w="12700">
+              <a:solidFill>
+                <a:schemeClr val="tx1"/>
+              </a:solidFill>
+              <a:tailEnd type="triangle" w="sm" len="med"/>
+            </a:ln>
+          </p:spPr>
+          <p:style>
+            <a:lnRef idx="1">
+              <a:schemeClr val="accent1"/>
+            </a:lnRef>
+            <a:fillRef idx="0">
+              <a:schemeClr val="accent1"/>
+            </a:fillRef>
+            <a:effectRef idx="0">
+              <a:schemeClr val="accent1"/>
+            </a:effectRef>
+            <a:fontRef idx="minor">
+              <a:schemeClr val="tx1"/>
+            </a:fontRef>
+          </p:style>
+        </p:cxnSp>
+        <p:sp>
+          <p:nvSpPr>
+            <p:cNvPr id="28" name="Text Box 2">
+              <a:extLst>
+                <a:ext uri="{FF2B5EF4-FFF2-40B4-BE49-F238E27FC236}">
+                  <a16:creationId xmlns:a16="http://schemas.microsoft.com/office/drawing/2014/main" id="{316E2E9F-C8E1-B7F2-2FB1-06717F3D565C}"/>
+                </a:ext>
+              </a:extLst>
+            </p:cNvPr>
+            <p:cNvSpPr txBox="1">
+              <a:spLocks noChangeArrowheads="1"/>
+            </p:cNvSpPr>
+            <p:nvPr/>
+          </p:nvSpPr>
+          <p:spPr bwMode="auto">
+            <a:xfrm>
+              <a:off x="1341700" y="2830660"/>
+              <a:ext cx="406392" cy="281362"/>
+            </a:xfrm>
+            <a:prstGeom prst="rect">
+              <a:avLst/>
+            </a:prstGeom>
+            <a:noFill/>
+            <a:ln w="9525">
+              <a:noFill/>
+              <a:miter lim="800000"/>
+              <a:headEnd/>
+              <a:tailEnd/>
+            </a:ln>
+          </p:spPr>
+          <p:txBody>
+            <a:bodyPr rot="0" vert="horz" wrap="square" lIns="91440" tIns="45720" rIns="91440" bIns="45720" anchor="t" anchorCtr="0">
+              <a:noAutofit/>
+            </a:bodyPr>
+            <a:lstStyle/>
+            <a:p>
+              <a:pPr marL="0" marR="0">
+                <a:lnSpc>
+                  <a:spcPct val="107000"/>
+                </a:lnSpc>
+                <a:spcBef>
+                  <a:spcPts val="0"/>
+                </a:spcBef>
+                <a:spcAft>
+                  <a:spcPts val="800"/>
+                </a:spcAft>
+              </a:pPr>
+              <a:r>
+                <a:rPr lang="en-US" sz="1600" dirty="0">
+                  <a:solidFill>
+                    <a:srgbClr val="0070C0"/>
+                  </a:solidFill>
+                  <a:effectLst/>
+                  <a:latin typeface="Calibri" panose="020F0502020204030204" pitchFamily="34" charset="0"/>
+                  <a:ea typeface="DengXian" panose="02010600030101010101" pitchFamily="2" charset="-122"/>
+                  <a:cs typeface="Times New Roman" panose="02020603050405020304" pitchFamily="18" charset="0"/>
+                </a:rPr>
+                <a:t>S1</a:t>
+              </a:r>
+            </a:p>
+          </p:txBody>
+        </p:sp>
+        <p:sp>
+          <p:nvSpPr>
+            <p:cNvPr id="29" name="Text Box 2">
+              <a:extLst>
+                <a:ext uri="{FF2B5EF4-FFF2-40B4-BE49-F238E27FC236}">
+                  <a16:creationId xmlns:a16="http://schemas.microsoft.com/office/drawing/2014/main" id="{5E7D06BE-6039-1BB0-F88D-01E1AD382640}"/>
+                </a:ext>
+              </a:extLst>
+            </p:cNvPr>
+            <p:cNvSpPr txBox="1">
+              <a:spLocks noChangeArrowheads="1"/>
+            </p:cNvSpPr>
+            <p:nvPr/>
+          </p:nvSpPr>
+          <p:spPr bwMode="auto">
+            <a:xfrm>
+              <a:off x="1149757" y="3556419"/>
+              <a:ext cx="406392" cy="281362"/>
+            </a:xfrm>
+            <a:prstGeom prst="rect">
+              <a:avLst/>
+            </a:prstGeom>
+            <a:noFill/>
+            <a:ln w="9525">
+              <a:noFill/>
+              <a:miter lim="800000"/>
+              <a:headEnd/>
+              <a:tailEnd/>
+            </a:ln>
+          </p:spPr>
+          <p:txBody>
+            <a:bodyPr rot="0" vert="horz" wrap="square" lIns="91440" tIns="45720" rIns="91440" bIns="45720" anchor="t" anchorCtr="0">
+              <a:noAutofit/>
+            </a:bodyPr>
+            <a:lstStyle/>
+            <a:p>
+              <a:pPr marL="0" marR="0">
+                <a:lnSpc>
+                  <a:spcPct val="107000"/>
+                </a:lnSpc>
+                <a:spcBef>
+                  <a:spcPts val="0"/>
+                </a:spcBef>
+                <a:spcAft>
+                  <a:spcPts val="800"/>
+                </a:spcAft>
+              </a:pPr>
+              <a:r>
+                <a:rPr lang="en-US" sz="1600" dirty="0">
+                  <a:solidFill>
+                    <a:srgbClr val="0070C0"/>
+                  </a:solidFill>
+                  <a:effectLst/>
+                  <a:latin typeface="Calibri" panose="020F0502020204030204" pitchFamily="34" charset="0"/>
+                  <a:ea typeface="DengXian" panose="02010600030101010101" pitchFamily="2" charset="-122"/>
+                  <a:cs typeface="Times New Roman" panose="02020603050405020304" pitchFamily="18" charset="0"/>
+                </a:rPr>
+                <a:t>S2</a:t>
+              </a:r>
+            </a:p>
+          </p:txBody>
+        </p:sp>
+        <p:sp>
+          <p:nvSpPr>
+            <p:cNvPr id="30" name="Text Box 2">
+              <a:extLst>
+                <a:ext uri="{FF2B5EF4-FFF2-40B4-BE49-F238E27FC236}">
+                  <a16:creationId xmlns:a16="http://schemas.microsoft.com/office/drawing/2014/main" id="{9760F0C1-93CD-17B7-C0C9-52BDDB811BEA}"/>
+                </a:ext>
+              </a:extLst>
+            </p:cNvPr>
+            <p:cNvSpPr txBox="1">
+              <a:spLocks noChangeArrowheads="1"/>
+            </p:cNvSpPr>
+            <p:nvPr/>
+          </p:nvSpPr>
+          <p:spPr bwMode="auto">
+            <a:xfrm>
+              <a:off x="1679174" y="3106641"/>
+              <a:ext cx="406392" cy="281362"/>
+            </a:xfrm>
+            <a:prstGeom prst="rect">
+              <a:avLst/>
+            </a:prstGeom>
+            <a:noFill/>
+            <a:ln w="9525">
+              <a:noFill/>
+              <a:miter lim="800000"/>
+              <a:headEnd/>
+              <a:tailEnd/>
+            </a:ln>
+          </p:spPr>
+          <p:txBody>
+            <a:bodyPr rot="0" vert="horz" wrap="square" lIns="91440" tIns="45720" rIns="91440" bIns="45720" anchor="t" anchorCtr="0">
+              <a:noAutofit/>
+            </a:bodyPr>
+            <a:lstStyle/>
+            <a:p>
+              <a:pPr marL="0" marR="0">
+                <a:lnSpc>
+                  <a:spcPct val="107000"/>
+                </a:lnSpc>
+                <a:spcBef>
+                  <a:spcPts val="0"/>
+                </a:spcBef>
+                <a:spcAft>
+                  <a:spcPts val="800"/>
+                </a:spcAft>
+              </a:pPr>
+              <a:r>
+                <a:rPr lang="en-US" sz="1600" dirty="0">
+                  <a:solidFill>
+                    <a:srgbClr val="0070C0"/>
+                  </a:solidFill>
+                  <a:effectLst/>
+                  <a:latin typeface="Calibri" panose="020F0502020204030204" pitchFamily="34" charset="0"/>
+                  <a:ea typeface="DengXian" panose="02010600030101010101" pitchFamily="2" charset="-122"/>
+                  <a:cs typeface="Times New Roman" panose="02020603050405020304" pitchFamily="18" charset="0"/>
+                </a:rPr>
+                <a:t>S3</a:t>
+              </a:r>
+            </a:p>
+          </p:txBody>
+        </p:sp>
+        <p:sp>
+          <p:nvSpPr>
+            <p:cNvPr id="31" name="Text Box 2">
+              <a:extLst>
+                <a:ext uri="{FF2B5EF4-FFF2-40B4-BE49-F238E27FC236}">
+                  <a16:creationId xmlns:a16="http://schemas.microsoft.com/office/drawing/2014/main" id="{27F0A3C5-A664-4BC7-9AA0-3C6EF2FA84AA}"/>
+                </a:ext>
+              </a:extLst>
+            </p:cNvPr>
+            <p:cNvSpPr txBox="1">
+              <a:spLocks noChangeArrowheads="1"/>
+            </p:cNvSpPr>
+            <p:nvPr/>
+          </p:nvSpPr>
+          <p:spPr bwMode="auto">
+            <a:xfrm>
+              <a:off x="1925502" y="3553096"/>
+              <a:ext cx="406392" cy="281362"/>
+            </a:xfrm>
+            <a:prstGeom prst="rect">
+              <a:avLst/>
+            </a:prstGeom>
+            <a:noFill/>
+            <a:ln w="9525">
+              <a:noFill/>
+              <a:miter lim="800000"/>
+              <a:headEnd/>
+              <a:tailEnd/>
+            </a:ln>
+          </p:spPr>
+          <p:txBody>
+            <a:bodyPr rot="0" vert="horz" wrap="square" lIns="91440" tIns="45720" rIns="91440" bIns="45720" anchor="t" anchorCtr="0">
+              <a:noAutofit/>
+            </a:bodyPr>
+            <a:lstStyle/>
+            <a:p>
+              <a:pPr marL="0" marR="0">
+                <a:lnSpc>
+                  <a:spcPct val="107000"/>
+                </a:lnSpc>
+                <a:spcBef>
+                  <a:spcPts val="0"/>
+                </a:spcBef>
+                <a:spcAft>
+                  <a:spcPts val="800"/>
+                </a:spcAft>
+              </a:pPr>
+              <a:r>
+                <a:rPr lang="en-US" sz="1600" dirty="0">
+                  <a:solidFill>
+                    <a:srgbClr val="0070C0"/>
+                  </a:solidFill>
+                  <a:effectLst/>
+                  <a:latin typeface="Calibri" panose="020F0502020204030204" pitchFamily="34" charset="0"/>
+                  <a:ea typeface="DengXian" panose="02010600030101010101" pitchFamily="2" charset="-122"/>
+                  <a:cs typeface="Times New Roman" panose="02020603050405020304" pitchFamily="18" charset="0"/>
+                </a:rPr>
+                <a:t>S4</a:t>
+              </a:r>
+            </a:p>
+          </p:txBody>
+        </p:sp>
+        <p:sp>
+          <p:nvSpPr>
+            <p:cNvPr id="32" name="Text Box 2">
+              <a:extLst>
+                <a:ext uri="{FF2B5EF4-FFF2-40B4-BE49-F238E27FC236}">
+                  <a16:creationId xmlns:a16="http://schemas.microsoft.com/office/drawing/2014/main" id="{F35CACFB-C4A0-24D4-35ED-D7FAE9691DAE}"/>
+                </a:ext>
+              </a:extLst>
+            </p:cNvPr>
+            <p:cNvSpPr txBox="1">
+              <a:spLocks noChangeArrowheads="1"/>
+            </p:cNvSpPr>
+            <p:nvPr/>
+          </p:nvSpPr>
+          <p:spPr bwMode="auto">
+            <a:xfrm>
+              <a:off x="1231544" y="3832094"/>
+              <a:ext cx="406392" cy="281362"/>
+            </a:xfrm>
+            <a:prstGeom prst="rect">
+              <a:avLst/>
+            </a:prstGeom>
+            <a:noFill/>
+            <a:ln w="9525">
+              <a:noFill/>
+              <a:miter lim="800000"/>
+              <a:headEnd/>
+              <a:tailEnd/>
+            </a:ln>
+          </p:spPr>
+          <p:txBody>
+            <a:bodyPr rot="0" vert="horz" wrap="square" lIns="91440" tIns="45720" rIns="91440" bIns="45720" anchor="t" anchorCtr="0">
+              <a:noAutofit/>
+            </a:bodyPr>
+            <a:lstStyle/>
+            <a:p>
+              <a:pPr marL="0" marR="0">
+                <a:lnSpc>
+                  <a:spcPct val="107000"/>
+                </a:lnSpc>
+                <a:spcBef>
+                  <a:spcPts val="0"/>
+                </a:spcBef>
+                <a:spcAft>
+                  <a:spcPts val="800"/>
+                </a:spcAft>
+              </a:pPr>
+              <a:r>
+                <a:rPr lang="en-US" sz="1600" dirty="0">
+                  <a:solidFill>
+                    <a:srgbClr val="0070C0"/>
+                  </a:solidFill>
+                  <a:effectLst/>
+                  <a:latin typeface="Calibri" panose="020F0502020204030204" pitchFamily="34" charset="0"/>
+                  <a:ea typeface="DengXian" panose="02010600030101010101" pitchFamily="2" charset="-122"/>
+                  <a:cs typeface="Times New Roman" panose="02020603050405020304" pitchFamily="18" charset="0"/>
+                </a:rPr>
+                <a:t>S5</a:t>
+              </a:r>
+            </a:p>
+          </p:txBody>
+        </p:sp>
+      </p:grpSp>
+      <p:sp>
+        <p:nvSpPr>
+          <p:cNvPr id="40" name="TextBox 39">
+            <a:extLst>
+              <a:ext uri="{FF2B5EF4-FFF2-40B4-BE49-F238E27FC236}">
+                <a16:creationId xmlns:a16="http://schemas.microsoft.com/office/drawing/2014/main" id="{5456C7A7-4E6A-B06D-A0A2-BF15EFB5DAA3}"/>
+              </a:ext>
+            </a:extLst>
+          </p:cNvPr>
+          <p:cNvSpPr txBox="1"/>
+          <p:nvPr/>
+        </p:nvSpPr>
+        <p:spPr>
+          <a:xfrm>
+            <a:off x="1937385" y="1891165"/>
+            <a:ext cx="2637631" cy="400110"/>
+          </a:xfrm>
+          <a:prstGeom prst="rect">
+            <a:avLst/>
+          </a:prstGeom>
+          <a:noFill/>
+        </p:spPr>
+        <p:txBody>
+          <a:bodyPr wrap="square" rtlCol="0">
+            <a:spAutoFit/>
+          </a:bodyPr>
+          <a:lstStyle/>
+          <a:p>
+            <a:pPr algn="ctr"/>
+            <a:r>
+              <a:rPr lang="en-US" sz="2000" i="1" dirty="0"/>
+              <a:t>PDG from source code</a:t>
+            </a:r>
+          </a:p>
+        </p:txBody>
+      </p:sp>
+      <p:sp>
+        <p:nvSpPr>
+          <p:cNvPr id="47" name="TextBox 46">
+            <a:extLst>
+              <a:ext uri="{FF2B5EF4-FFF2-40B4-BE49-F238E27FC236}">
+                <a16:creationId xmlns:a16="http://schemas.microsoft.com/office/drawing/2014/main" id="{CB2ABDEA-8EFB-671E-DDA9-E05E4DBB08D3}"/>
+              </a:ext>
+            </a:extLst>
+          </p:cNvPr>
+          <p:cNvSpPr txBox="1"/>
+          <p:nvPr/>
+        </p:nvSpPr>
+        <p:spPr>
+          <a:xfrm>
+            <a:off x="1821289" y="2975044"/>
+            <a:ext cx="818382" cy="369332"/>
+          </a:xfrm>
+          <a:prstGeom prst="rect">
+            <a:avLst/>
+          </a:prstGeom>
+          <a:noFill/>
+        </p:spPr>
+        <p:txBody>
+          <a:bodyPr wrap="none" rtlCol="0">
+            <a:spAutoFit/>
+          </a:bodyPr>
+          <a:lstStyle/>
+          <a:p>
+            <a:pPr algn="ctr"/>
+            <a:r>
+              <a:rPr lang="en-US" dirty="0"/>
+              <a:t>Training</a:t>
+            </a:r>
+          </a:p>
+        </p:txBody>
+      </p:sp>
+      <p:cxnSp>
+        <p:nvCxnSpPr>
+          <p:cNvPr id="56" name="Connector: Elbow 55">
+            <a:extLst>
+              <a:ext uri="{FF2B5EF4-FFF2-40B4-BE49-F238E27FC236}">
+                <a16:creationId xmlns:a16="http://schemas.microsoft.com/office/drawing/2014/main" id="{4E71D239-9B1F-D65B-96B5-22186B5B1599}"/>
+              </a:ext>
+            </a:extLst>
+          </p:cNvPr>
+          <p:cNvCxnSpPr>
+            <a:cxnSpLocks/>
+          </p:cNvCxnSpPr>
+          <p:nvPr/>
+        </p:nvCxnSpPr>
+        <p:spPr>
+          <a:xfrm>
+            <a:off x="1757202" y="3112109"/>
+            <a:ext cx="933504" cy="181564"/>
+          </a:xfrm>
+          <a:prstGeom prst="bentConnector3">
+            <a:avLst>
+              <a:gd name="adj1" fmla="val -288"/>
+            </a:avLst>
+          </a:prstGeom>
+          <a:ln>
+            <a:tailEnd type="triangle"/>
+          </a:ln>
+        </p:spPr>
+        <p:style>
+          <a:lnRef idx="1">
+            <a:schemeClr val="dk1"/>
+          </a:lnRef>
+          <a:fillRef idx="0">
+            <a:schemeClr val="dk1"/>
+          </a:fillRef>
+          <a:effectRef idx="0">
+            <a:schemeClr val="dk1"/>
+          </a:effectRef>
+          <a:fontRef idx="minor">
+            <a:schemeClr val="tx1"/>
+          </a:fontRef>
+        </p:style>
+      </p:cxnSp>
+      <p:cxnSp>
+        <p:nvCxnSpPr>
+          <p:cNvPr id="58" name="Connector: Elbow 57">
+            <a:extLst>
+              <a:ext uri="{FF2B5EF4-FFF2-40B4-BE49-F238E27FC236}">
+                <a16:creationId xmlns:a16="http://schemas.microsoft.com/office/drawing/2014/main" id="{DABB5391-7353-16E1-4208-6CA68FE555E5}"/>
+              </a:ext>
+            </a:extLst>
+          </p:cNvPr>
+          <p:cNvCxnSpPr>
+            <a:cxnSpLocks/>
+          </p:cNvCxnSpPr>
+          <p:nvPr/>
+        </p:nvCxnSpPr>
+        <p:spPr>
+          <a:xfrm flipV="1">
+            <a:off x="1733500" y="3349809"/>
+            <a:ext cx="1254116" cy="509547"/>
+          </a:xfrm>
+          <a:prstGeom prst="bentConnector3">
+            <a:avLst>
+              <a:gd name="adj1" fmla="val 219"/>
+            </a:avLst>
+          </a:prstGeom>
+          <a:ln>
+            <a:prstDash val="dash"/>
+            <a:tailEnd type="triangle"/>
+          </a:ln>
+        </p:spPr>
+        <p:style>
+          <a:lnRef idx="1">
+            <a:schemeClr val="dk1"/>
+          </a:lnRef>
+          <a:fillRef idx="0">
+            <a:schemeClr val="dk1"/>
+          </a:fillRef>
+          <a:effectRef idx="0">
+            <a:schemeClr val="dk1"/>
+          </a:effectRef>
+          <a:fontRef idx="minor">
+            <a:schemeClr val="tx1"/>
+          </a:fontRef>
+        </p:style>
+      </p:cxnSp>
+      <p:sp>
+        <p:nvSpPr>
+          <p:cNvPr id="64" name="TextBox 63">
+            <a:extLst>
+              <a:ext uri="{FF2B5EF4-FFF2-40B4-BE49-F238E27FC236}">
+                <a16:creationId xmlns:a16="http://schemas.microsoft.com/office/drawing/2014/main" id="{C9E08E32-9E3F-4118-6951-2D9E990E743B}"/>
+              </a:ext>
+            </a:extLst>
+          </p:cNvPr>
+          <p:cNvSpPr txBox="1"/>
+          <p:nvPr/>
+        </p:nvSpPr>
+        <p:spPr>
+          <a:xfrm>
+            <a:off x="1570784" y="3290459"/>
+            <a:ext cx="1335820" cy="369332"/>
+          </a:xfrm>
+          <a:prstGeom prst="rect">
+            <a:avLst/>
+          </a:prstGeom>
+          <a:noFill/>
+        </p:spPr>
+        <p:txBody>
+          <a:bodyPr wrap="square" rtlCol="0">
+            <a:spAutoFit/>
+          </a:bodyPr>
+          <a:lstStyle/>
+          <a:p>
+            <a:pPr algn="ctr"/>
+            <a:r>
+              <a:rPr lang="en-US" dirty="0"/>
+              <a:t>Predicting</a:t>
+            </a:r>
+          </a:p>
+        </p:txBody>
+      </p:sp>
+      <p:grpSp>
+        <p:nvGrpSpPr>
+          <p:cNvPr id="69" name="Group 68">
+            <a:extLst>
+              <a:ext uri="{FF2B5EF4-FFF2-40B4-BE49-F238E27FC236}">
+                <a16:creationId xmlns:a16="http://schemas.microsoft.com/office/drawing/2014/main" id="{4F7D6099-EF1A-DF2F-A520-CC1DB6B02A6A}"/>
+              </a:ext>
+            </a:extLst>
+          </p:cNvPr>
+          <p:cNvGrpSpPr/>
+          <p:nvPr/>
+        </p:nvGrpSpPr>
+        <p:grpSpPr>
+          <a:xfrm>
+            <a:off x="6529652" y="2535251"/>
+            <a:ext cx="1513414" cy="1663700"/>
+            <a:chOff x="4930286" y="2611370"/>
+            <a:chExt cx="1561305" cy="1663700"/>
+          </a:xfrm>
+        </p:grpSpPr>
+        <p:sp>
+          <p:nvSpPr>
+            <p:cNvPr id="65" name="Rectangle: Rounded Corners 64">
+              <a:extLst>
+                <a:ext uri="{FF2B5EF4-FFF2-40B4-BE49-F238E27FC236}">
+                  <a16:creationId xmlns:a16="http://schemas.microsoft.com/office/drawing/2014/main" id="{27F41A77-DBB6-21DD-6834-B2F4379C8EDC}"/>
+                </a:ext>
+              </a:extLst>
+            </p:cNvPr>
+            <p:cNvSpPr/>
+            <p:nvPr/>
+          </p:nvSpPr>
+          <p:spPr>
+            <a:xfrm>
+              <a:off x="4930286" y="2611370"/>
+              <a:ext cx="1561305" cy="1663700"/>
+            </a:xfrm>
+            <a:prstGeom prst="roundRect">
+              <a:avLst/>
+            </a:prstGeom>
+            <a:noFill/>
+            <a:ln>
+              <a:solidFill>
+                <a:schemeClr val="accent1">
+                  <a:lumMod val="50000"/>
+                </a:schemeClr>
+              </a:solidFill>
+            </a:ln>
+          </p:spPr>
+          <p:style>
+            <a:lnRef idx="2">
+              <a:schemeClr val="accent1">
+                <a:shade val="50000"/>
+              </a:schemeClr>
+            </a:lnRef>
+            <a:fillRef idx="1">
+              <a:schemeClr val="accent1"/>
+            </a:fillRef>
+            <a:effectRef idx="0">
+              <a:schemeClr val="accent1"/>
+            </a:effectRef>
+            <a:fontRef idx="minor">
+              <a:schemeClr val="lt1"/>
+            </a:fontRef>
+          </p:style>
+          <p:txBody>
+            <a:bodyPr rot="0" spcFirstLastPara="0" vert="horz" wrap="square" lIns="91440" tIns="45720" rIns="91440" bIns="45720" numCol="1" spcCol="0" rtlCol="0" fromWordArt="0" anchor="ctr" anchorCtr="0" forceAA="0" compatLnSpc="1">
+              <a:prstTxWarp prst="textNoShape">
+                <a:avLst/>
+              </a:prstTxWarp>
+              <a:noAutofit/>
+            </a:bodyPr>
+            <a:lstStyle/>
+            <a:p>
+              <a:endParaRPr lang="en-US"/>
+            </a:p>
+          </p:txBody>
+        </p:sp>
+        <p:sp>
+          <p:nvSpPr>
+            <p:cNvPr id="66" name="Rectangle: Rounded Corners 65">
+              <a:extLst>
+                <a:ext uri="{FF2B5EF4-FFF2-40B4-BE49-F238E27FC236}">
+                  <a16:creationId xmlns:a16="http://schemas.microsoft.com/office/drawing/2014/main" id="{C5C4434A-ABEB-CB9B-C1A0-0758F62CFB73}"/>
+                </a:ext>
+              </a:extLst>
+            </p:cNvPr>
+            <p:cNvSpPr/>
+            <p:nvPr/>
+          </p:nvSpPr>
+          <p:spPr>
+            <a:xfrm>
+              <a:off x="5038928" y="2696206"/>
+              <a:ext cx="1266244" cy="304521"/>
+            </a:xfrm>
+            <a:prstGeom prst="roundRect">
+              <a:avLst>
+                <a:gd name="adj" fmla="val 0"/>
+              </a:avLst>
+            </a:prstGeom>
+            <a:noFill/>
+            <a:ln>
+              <a:solidFill>
+                <a:schemeClr val="tx1"/>
+              </a:solidFill>
+            </a:ln>
+          </p:spPr>
+          <p:style>
+            <a:lnRef idx="2">
+              <a:schemeClr val="accent1">
+                <a:shade val="50000"/>
+              </a:schemeClr>
+            </a:lnRef>
+            <a:fillRef idx="1">
+              <a:schemeClr val="accent1"/>
+            </a:fillRef>
+            <a:effectRef idx="0">
+              <a:schemeClr val="accent1"/>
+            </a:effectRef>
+            <a:fontRef idx="minor">
+              <a:schemeClr val="lt1"/>
+            </a:fontRef>
+          </p:style>
+          <p:txBody>
+            <a:bodyPr rot="0" spcFirstLastPara="0" vert="horz" wrap="square" lIns="45720" tIns="0" rIns="45720" bIns="0" numCol="1" spcCol="0" rtlCol="0" fromWordArt="0" anchor="ctr" anchorCtr="0" forceAA="0" compatLnSpc="1">
+              <a:prstTxWarp prst="textNoShape">
+                <a:avLst/>
+              </a:prstTxWarp>
+              <a:noAutofit/>
+            </a:bodyPr>
+            <a:lstStyle/>
+            <a:p>
+              <a:pPr marL="0" marR="0" algn="ctr">
+                <a:lnSpc>
+                  <a:spcPct val="107000"/>
+                </a:lnSpc>
+                <a:spcBef>
+                  <a:spcPts val="0"/>
+                </a:spcBef>
+                <a:spcAft>
+                  <a:spcPts val="800"/>
+                </a:spcAft>
+              </a:pPr>
+              <a:r>
+                <a:rPr lang="en-US" dirty="0">
+                  <a:solidFill>
+                    <a:srgbClr val="000000"/>
+                  </a:solidFill>
+                  <a:ea typeface="DengXian" panose="02010600030101010101" pitchFamily="2" charset="-122"/>
+                  <a:cs typeface="Times New Roman" panose="02020603050405020304" pitchFamily="18" charset="0"/>
+                </a:rPr>
+                <a:t>Classifier-E1</a:t>
+              </a:r>
+              <a:endParaRPr lang="en-US" dirty="0">
+                <a:effectLst/>
+                <a:ea typeface="DengXian" panose="02010600030101010101" pitchFamily="2" charset="-122"/>
+                <a:cs typeface="Times New Roman" panose="02020603050405020304" pitchFamily="18" charset="0"/>
+              </a:endParaRPr>
+            </a:p>
+          </p:txBody>
+        </p:sp>
+      </p:grpSp>
+      <p:sp>
+        <p:nvSpPr>
+          <p:cNvPr id="70" name="TextBox 69">
+            <a:extLst>
+              <a:ext uri="{FF2B5EF4-FFF2-40B4-BE49-F238E27FC236}">
+                <a16:creationId xmlns:a16="http://schemas.microsoft.com/office/drawing/2014/main" id="{1A999AB6-93A1-8A23-B58A-E9CE4F5071A7}"/>
+              </a:ext>
+            </a:extLst>
+          </p:cNvPr>
+          <p:cNvSpPr txBox="1"/>
+          <p:nvPr/>
+        </p:nvSpPr>
+        <p:spPr>
+          <a:xfrm>
+            <a:off x="8054753" y="2566147"/>
+            <a:ext cx="485519" cy="369332"/>
+          </a:xfrm>
+          <a:prstGeom prst="rect">
+            <a:avLst/>
+          </a:prstGeom>
+          <a:noFill/>
+        </p:spPr>
+        <p:txBody>
+          <a:bodyPr wrap="none" rtlCol="0">
+            <a:spAutoFit/>
+          </a:bodyPr>
+          <a:lstStyle/>
+          <a:p>
+            <a:pPr algn="ctr"/>
+            <a:r>
+              <a:rPr lang="en-US" dirty="0"/>
+              <a:t>Yes</a:t>
+            </a:r>
+          </a:p>
+        </p:txBody>
+      </p:sp>
+      <p:cxnSp>
+        <p:nvCxnSpPr>
+          <p:cNvPr id="71" name="Straight Arrow Connector 70">
+            <a:extLst>
+              <a:ext uri="{FF2B5EF4-FFF2-40B4-BE49-F238E27FC236}">
+                <a16:creationId xmlns:a16="http://schemas.microsoft.com/office/drawing/2014/main" id="{4CFFCCC3-B473-49B6-EA7B-A4D5C37D0384}"/>
+              </a:ext>
+            </a:extLst>
+          </p:cNvPr>
+          <p:cNvCxnSpPr>
+            <a:cxnSpLocks/>
+          </p:cNvCxnSpPr>
+          <p:nvPr/>
+        </p:nvCxnSpPr>
+        <p:spPr>
+          <a:xfrm>
+            <a:off x="7904536" y="2780455"/>
+            <a:ext cx="243840" cy="0"/>
+          </a:xfrm>
+          <a:prstGeom prst="straightConnector1">
+            <a:avLst/>
+          </a:prstGeom>
+          <a:ln w="12700">
+            <a:tailEnd type="triangle"/>
+          </a:ln>
+        </p:spPr>
+        <p:style>
+          <a:lnRef idx="1">
+            <a:schemeClr val="dk1"/>
+          </a:lnRef>
+          <a:fillRef idx="0">
+            <a:schemeClr val="dk1"/>
+          </a:fillRef>
+          <a:effectRef idx="0">
+            <a:schemeClr val="dk1"/>
+          </a:effectRef>
+          <a:fontRef idx="minor">
+            <a:schemeClr val="tx1"/>
+          </a:fontRef>
+        </p:style>
+      </p:cxnSp>
+      <p:cxnSp>
+        <p:nvCxnSpPr>
+          <p:cNvPr id="72" name="Straight Arrow Connector 71">
+            <a:extLst>
+              <a:ext uri="{FF2B5EF4-FFF2-40B4-BE49-F238E27FC236}">
+                <a16:creationId xmlns:a16="http://schemas.microsoft.com/office/drawing/2014/main" id="{206ECC40-DEE2-6C2C-4208-E7EF51C18CBF}"/>
+              </a:ext>
+            </a:extLst>
+          </p:cNvPr>
+          <p:cNvCxnSpPr>
+            <a:cxnSpLocks/>
+          </p:cNvCxnSpPr>
+          <p:nvPr/>
+        </p:nvCxnSpPr>
+        <p:spPr>
+          <a:xfrm>
+            <a:off x="7904536" y="3115107"/>
+            <a:ext cx="243840" cy="0"/>
+          </a:xfrm>
+          <a:prstGeom prst="straightConnector1">
+            <a:avLst/>
+          </a:prstGeom>
+          <a:ln w="12700">
+            <a:tailEnd type="triangle"/>
+          </a:ln>
+        </p:spPr>
+        <p:style>
+          <a:lnRef idx="1">
+            <a:schemeClr val="dk1"/>
+          </a:lnRef>
+          <a:fillRef idx="0">
+            <a:schemeClr val="dk1"/>
+          </a:fillRef>
+          <a:effectRef idx="0">
+            <a:schemeClr val="dk1"/>
+          </a:effectRef>
+          <a:fontRef idx="minor">
+            <a:schemeClr val="tx1"/>
+          </a:fontRef>
+        </p:style>
+      </p:cxnSp>
+      <p:sp>
+        <p:nvSpPr>
+          <p:cNvPr id="73" name="TextBox 72">
+            <a:extLst>
+              <a:ext uri="{FF2B5EF4-FFF2-40B4-BE49-F238E27FC236}">
+                <a16:creationId xmlns:a16="http://schemas.microsoft.com/office/drawing/2014/main" id="{ED532153-6942-1D48-F960-6B6F22C4922A}"/>
+              </a:ext>
+            </a:extLst>
+          </p:cNvPr>
+          <p:cNvSpPr txBox="1"/>
+          <p:nvPr/>
+        </p:nvSpPr>
+        <p:spPr>
+          <a:xfrm>
+            <a:off x="8069724" y="2910039"/>
+            <a:ext cx="455574" cy="369332"/>
+          </a:xfrm>
+          <a:prstGeom prst="rect">
+            <a:avLst/>
+          </a:prstGeom>
+          <a:noFill/>
+        </p:spPr>
+        <p:txBody>
+          <a:bodyPr wrap="none" rtlCol="0">
+            <a:spAutoFit/>
+          </a:bodyPr>
+          <a:lstStyle/>
+          <a:p>
+            <a:pPr algn="ctr"/>
+            <a:r>
+              <a:rPr lang="en-US" dirty="0"/>
+              <a:t>No</a:t>
+            </a:r>
+          </a:p>
+        </p:txBody>
+      </p:sp>
+      <p:sp>
+        <p:nvSpPr>
+          <p:cNvPr id="75" name="TextBox 74">
+            <a:extLst>
+              <a:ext uri="{FF2B5EF4-FFF2-40B4-BE49-F238E27FC236}">
+                <a16:creationId xmlns:a16="http://schemas.microsoft.com/office/drawing/2014/main" id="{2966E5C6-EC0A-A887-F4FF-4096B73D975A}"/>
+              </a:ext>
+            </a:extLst>
+          </p:cNvPr>
+          <p:cNvSpPr txBox="1"/>
+          <p:nvPr/>
+        </p:nvSpPr>
+        <p:spPr>
+          <a:xfrm>
+            <a:off x="8039781" y="3730140"/>
+            <a:ext cx="485519" cy="369332"/>
+          </a:xfrm>
+          <a:prstGeom prst="rect">
+            <a:avLst/>
+          </a:prstGeom>
+          <a:noFill/>
+        </p:spPr>
+        <p:txBody>
+          <a:bodyPr wrap="none" rtlCol="0">
+            <a:spAutoFit/>
+          </a:bodyPr>
+          <a:lstStyle/>
+          <a:p>
+            <a:pPr algn="ctr"/>
+            <a:r>
+              <a:rPr lang="en-US" dirty="0"/>
+              <a:t>Yes</a:t>
+            </a:r>
+          </a:p>
+        </p:txBody>
+      </p:sp>
+      <p:sp>
+        <p:nvSpPr>
+          <p:cNvPr id="76" name="Rectangle: Rounded Corners 75">
+            <a:extLst>
+              <a:ext uri="{FF2B5EF4-FFF2-40B4-BE49-F238E27FC236}">
+                <a16:creationId xmlns:a16="http://schemas.microsoft.com/office/drawing/2014/main" id="{E3365C50-33A7-6B31-5BC8-66CBB7A10D8E}"/>
+              </a:ext>
+            </a:extLst>
+          </p:cNvPr>
+          <p:cNvSpPr/>
+          <p:nvPr/>
+        </p:nvSpPr>
+        <p:spPr>
+          <a:xfrm>
+            <a:off x="6638292" y="2978098"/>
+            <a:ext cx="1266244" cy="304521"/>
+          </a:xfrm>
+          <a:prstGeom prst="roundRect">
+            <a:avLst>
+              <a:gd name="adj" fmla="val 0"/>
+            </a:avLst>
+          </a:prstGeom>
+          <a:noFill/>
+          <a:ln>
+            <a:solidFill>
+              <a:schemeClr val="tx1"/>
+            </a:solidFill>
+          </a:ln>
+        </p:spPr>
+        <p:style>
+          <a:lnRef idx="2">
+            <a:schemeClr val="accent1">
+              <a:shade val="50000"/>
+            </a:schemeClr>
+          </a:lnRef>
+          <a:fillRef idx="1">
+            <a:schemeClr val="accent1"/>
+          </a:fillRef>
+          <a:effectRef idx="0">
+            <a:schemeClr val="accent1"/>
+          </a:effectRef>
+          <a:fontRef idx="minor">
+            <a:schemeClr val="lt1"/>
+          </a:fontRef>
+        </p:style>
+        <p:txBody>
+          <a:bodyPr rot="0" spcFirstLastPara="0" vert="horz" wrap="square" lIns="45720" tIns="0" rIns="45720" bIns="0" numCol="1" spcCol="0" rtlCol="0" fromWordArt="0" anchor="ctr" anchorCtr="0" forceAA="0" compatLnSpc="1">
+            <a:prstTxWarp prst="textNoShape">
+              <a:avLst/>
+            </a:prstTxWarp>
+            <a:noAutofit/>
+          </a:bodyPr>
+          <a:lstStyle/>
+          <a:p>
+            <a:pPr marL="0" marR="0" algn="ctr">
+              <a:lnSpc>
+                <a:spcPct val="107000"/>
+              </a:lnSpc>
+              <a:spcBef>
+                <a:spcPts val="0"/>
+              </a:spcBef>
+              <a:spcAft>
+                <a:spcPts val="800"/>
+              </a:spcAft>
+            </a:pPr>
+            <a:r>
+              <a:rPr lang="en-US" dirty="0">
+                <a:solidFill>
+                  <a:srgbClr val="000000"/>
+                </a:solidFill>
+                <a:ea typeface="DengXian" panose="02010600030101010101" pitchFamily="2" charset="-122"/>
+                <a:cs typeface="Times New Roman" panose="02020603050405020304" pitchFamily="18" charset="0"/>
+              </a:rPr>
+              <a:t>Classifier-E2</a:t>
+            </a:r>
+            <a:endParaRPr lang="en-US" dirty="0">
+              <a:effectLst/>
+              <a:ea typeface="DengXian" panose="02010600030101010101" pitchFamily="2" charset="-122"/>
+              <a:cs typeface="Times New Roman" panose="02020603050405020304" pitchFamily="18" charset="0"/>
+            </a:endParaRPr>
+          </a:p>
+        </p:txBody>
+      </p:sp>
+      <p:sp>
+        <p:nvSpPr>
+          <p:cNvPr id="77" name="Rectangle: Rounded Corners 76">
+            <a:extLst>
+              <a:ext uri="{FF2B5EF4-FFF2-40B4-BE49-F238E27FC236}">
+                <a16:creationId xmlns:a16="http://schemas.microsoft.com/office/drawing/2014/main" id="{6CBBF0C1-9E04-FCCA-9E5D-DAAFFC6405D9}"/>
+              </a:ext>
+            </a:extLst>
+          </p:cNvPr>
+          <p:cNvSpPr/>
+          <p:nvPr/>
+        </p:nvSpPr>
+        <p:spPr>
+          <a:xfrm>
+            <a:off x="6623321" y="3771527"/>
+            <a:ext cx="1266244" cy="304521"/>
+          </a:xfrm>
+          <a:prstGeom prst="roundRect">
+            <a:avLst>
+              <a:gd name="adj" fmla="val 0"/>
+            </a:avLst>
+          </a:prstGeom>
+          <a:noFill/>
+          <a:ln>
+            <a:solidFill>
+              <a:schemeClr val="tx1"/>
+            </a:solidFill>
+          </a:ln>
+        </p:spPr>
+        <p:style>
+          <a:lnRef idx="2">
+            <a:schemeClr val="accent1">
+              <a:shade val="50000"/>
+            </a:schemeClr>
+          </a:lnRef>
+          <a:fillRef idx="1">
+            <a:schemeClr val="accent1"/>
+          </a:fillRef>
+          <a:effectRef idx="0">
+            <a:schemeClr val="accent1"/>
+          </a:effectRef>
+          <a:fontRef idx="minor">
+            <a:schemeClr val="lt1"/>
+          </a:fontRef>
+        </p:style>
+        <p:txBody>
+          <a:bodyPr rot="0" spcFirstLastPara="0" vert="horz" wrap="square" lIns="45720" tIns="0" rIns="45720" bIns="0" numCol="1" spcCol="0" rtlCol="0" fromWordArt="0" anchor="ctr" anchorCtr="0" forceAA="0" compatLnSpc="1">
+            <a:prstTxWarp prst="textNoShape">
+              <a:avLst/>
+            </a:prstTxWarp>
+            <a:noAutofit/>
+          </a:bodyPr>
+          <a:lstStyle/>
+          <a:p>
+            <a:pPr marL="0" marR="0" algn="ctr">
+              <a:lnSpc>
+                <a:spcPct val="107000"/>
+              </a:lnSpc>
+              <a:spcBef>
+                <a:spcPts val="0"/>
+              </a:spcBef>
+              <a:spcAft>
+                <a:spcPts val="800"/>
+              </a:spcAft>
+            </a:pPr>
+            <a:r>
+              <a:rPr lang="en-US" dirty="0">
+                <a:solidFill>
+                  <a:srgbClr val="000000"/>
+                </a:solidFill>
+                <a:ea typeface="DengXian" panose="02010600030101010101" pitchFamily="2" charset="-122"/>
+                <a:cs typeface="Times New Roman" panose="02020603050405020304" pitchFamily="18" charset="0"/>
+              </a:rPr>
+              <a:t>Classifier-En</a:t>
+            </a:r>
+            <a:endParaRPr lang="en-US" dirty="0">
+              <a:effectLst/>
+              <a:ea typeface="DengXian" panose="02010600030101010101" pitchFamily="2" charset="-122"/>
+              <a:cs typeface="Times New Roman" panose="02020603050405020304" pitchFamily="18" charset="0"/>
+            </a:endParaRPr>
+          </a:p>
+        </p:txBody>
+      </p:sp>
+      <p:sp>
+        <p:nvSpPr>
+          <p:cNvPr id="33" name="TextBox 32">
+            <a:extLst>
+              <a:ext uri="{FF2B5EF4-FFF2-40B4-BE49-F238E27FC236}">
+                <a16:creationId xmlns:a16="http://schemas.microsoft.com/office/drawing/2014/main" id="{C014F0DB-B836-C7AC-970A-04F3E7982D5E}"/>
+              </a:ext>
+            </a:extLst>
+          </p:cNvPr>
+          <p:cNvSpPr txBox="1"/>
+          <p:nvPr/>
+        </p:nvSpPr>
+        <p:spPr>
+          <a:xfrm>
+            <a:off x="2696971" y="2930895"/>
+            <a:ext cx="1622309" cy="923330"/>
+          </a:xfrm>
+          <a:prstGeom prst="rect">
+            <a:avLst/>
+          </a:prstGeom>
+          <a:gradFill flip="none" rotWithShape="1">
+            <a:gsLst>
+              <a:gs pos="0">
+                <a:schemeClr val="accent5">
+                  <a:lumMod val="67000"/>
+                </a:schemeClr>
+              </a:gs>
+              <a:gs pos="48000">
+                <a:schemeClr val="accent5">
+                  <a:lumMod val="97000"/>
+                  <a:lumOff val="3000"/>
+                </a:schemeClr>
+              </a:gs>
+              <a:gs pos="100000">
+                <a:schemeClr val="accent5">
+                  <a:lumMod val="60000"/>
+                  <a:lumOff val="40000"/>
+                </a:schemeClr>
+              </a:gs>
+            </a:gsLst>
+            <a:lin ang="16200000" scaled="1"/>
+            <a:tileRect/>
+          </a:gradFill>
+          <a:ln>
+            <a:noFill/>
+          </a:ln>
+        </p:spPr>
+        <p:style>
+          <a:lnRef idx="0">
+            <a:scrgbClr r="0" g="0" b="0"/>
+          </a:lnRef>
+          <a:fillRef idx="0">
+            <a:scrgbClr r="0" g="0" b="0"/>
+          </a:fillRef>
+          <a:effectRef idx="0">
+            <a:scrgbClr r="0" g="0" b="0"/>
+          </a:effectRef>
+          <a:fontRef idx="minor">
+            <a:schemeClr val="lt1"/>
+          </a:fontRef>
+        </p:style>
+        <p:txBody>
+          <a:bodyPr wrap="square" rtlCol="0">
+            <a:spAutoFit/>
+          </a:bodyPr>
+          <a:lstStyle/>
+          <a:p>
+            <a:pPr algn="ctr"/>
+            <a:r>
+              <a:rPr lang="en-US" dirty="0"/>
+              <a:t>Feature Vector Representation Generation</a:t>
+            </a:r>
+          </a:p>
+        </p:txBody>
+      </p:sp>
+      <p:grpSp>
+        <p:nvGrpSpPr>
+          <p:cNvPr id="44" name="Group 43">
+            <a:extLst>
+              <a:ext uri="{FF2B5EF4-FFF2-40B4-BE49-F238E27FC236}">
+                <a16:creationId xmlns:a16="http://schemas.microsoft.com/office/drawing/2014/main" id="{E57511CB-7A12-32C7-0BED-5783DE6D5DCD}"/>
+              </a:ext>
+            </a:extLst>
+          </p:cNvPr>
+          <p:cNvGrpSpPr/>
+          <p:nvPr/>
+        </p:nvGrpSpPr>
+        <p:grpSpPr>
+          <a:xfrm>
+            <a:off x="4409364" y="2747327"/>
+            <a:ext cx="982626" cy="1024200"/>
+            <a:chOff x="7927995" y="3480430"/>
+            <a:chExt cx="982626" cy="1024200"/>
+          </a:xfrm>
+        </p:grpSpPr>
+        <p:grpSp>
+          <p:nvGrpSpPr>
+            <p:cNvPr id="45" name="Group 44">
+              <a:extLst>
+                <a:ext uri="{FF2B5EF4-FFF2-40B4-BE49-F238E27FC236}">
+                  <a16:creationId xmlns:a16="http://schemas.microsoft.com/office/drawing/2014/main" id="{3CBC3677-EF2D-D68C-673C-072D32CEE625}"/>
+                </a:ext>
+              </a:extLst>
+            </p:cNvPr>
+            <p:cNvGrpSpPr/>
+            <p:nvPr/>
+          </p:nvGrpSpPr>
+          <p:grpSpPr>
+            <a:xfrm>
+              <a:off x="8070834" y="3827808"/>
+              <a:ext cx="601598" cy="496652"/>
+              <a:chOff x="355600" y="488949"/>
+              <a:chExt cx="584200" cy="635962"/>
+            </a:xfrm>
+          </p:grpSpPr>
+          <p:sp>
+            <p:nvSpPr>
+              <p:cNvPr id="54" name="Oval 53">
+                <a:extLst>
+                  <a:ext uri="{FF2B5EF4-FFF2-40B4-BE49-F238E27FC236}">
+                    <a16:creationId xmlns:a16="http://schemas.microsoft.com/office/drawing/2014/main" id="{73B1F6B7-DFD8-1AC2-CDC2-A93894761917}"/>
+                  </a:ext>
+                </a:extLst>
+              </p:cNvPr>
+              <p:cNvSpPr/>
+              <p:nvPr/>
+            </p:nvSpPr>
+            <p:spPr>
+              <a:xfrm>
+                <a:off x="368300" y="488949"/>
+                <a:ext cx="114300" cy="115261"/>
+              </a:xfrm>
+              <a:prstGeom prst="ellipse">
+                <a:avLst/>
+              </a:prstGeom>
+              <a:solidFill>
+                <a:schemeClr val="accent2">
+                  <a:lumMod val="60000"/>
+                  <a:lumOff val="40000"/>
+                </a:schemeClr>
+              </a:solidFill>
+              <a:ln>
+                <a:solidFill>
+                  <a:srgbClr val="C00000"/>
+                </a:solidFill>
+              </a:ln>
+            </p:spPr>
+            <p:style>
+              <a:lnRef idx="2">
+                <a:schemeClr val="accent1">
+                  <a:shade val="50000"/>
+                </a:schemeClr>
+              </a:lnRef>
+              <a:fillRef idx="1">
+                <a:schemeClr val="accent1"/>
+              </a:fillRef>
+              <a:effectRef idx="0">
+                <a:schemeClr val="accent1"/>
+              </a:effectRef>
+              <a:fontRef idx="minor">
+                <a:schemeClr val="lt1"/>
+              </a:fontRef>
+            </p:style>
+            <p:txBody>
+              <a:bodyPr rot="0" spcFirstLastPara="0" vert="horz" wrap="square" lIns="91440" tIns="45720" rIns="91440" bIns="45720" numCol="1" spcCol="0" rtlCol="0" fromWordArt="0" anchor="ctr" anchorCtr="0" forceAA="0" compatLnSpc="1">
+                <a:prstTxWarp prst="textNoShape">
+                  <a:avLst/>
+                </a:prstTxWarp>
+                <a:noAutofit/>
+              </a:bodyPr>
+              <a:lstStyle/>
+              <a:p>
+                <a:endParaRPr lang="en-US" dirty="0">
+                  <a:solidFill>
+                    <a:srgbClr val="0070C0"/>
+                  </a:solidFill>
+                </a:endParaRPr>
+              </a:p>
+            </p:txBody>
+          </p:sp>
+          <p:sp>
+            <p:nvSpPr>
+              <p:cNvPr id="55" name="Oval 54">
+                <a:extLst>
+                  <a:ext uri="{FF2B5EF4-FFF2-40B4-BE49-F238E27FC236}">
+                    <a16:creationId xmlns:a16="http://schemas.microsoft.com/office/drawing/2014/main" id="{3EC51463-F980-4D76-F9A4-2B61C596AD96}"/>
+                  </a:ext>
+                </a:extLst>
+              </p:cNvPr>
+              <p:cNvSpPr/>
+              <p:nvPr/>
+            </p:nvSpPr>
+            <p:spPr>
+              <a:xfrm>
+                <a:off x="825500" y="539750"/>
+                <a:ext cx="114300" cy="115261"/>
+              </a:xfrm>
+              <a:prstGeom prst="ellipse">
+                <a:avLst/>
+              </a:prstGeom>
+              <a:solidFill>
+                <a:schemeClr val="accent4">
+                  <a:lumMod val="20000"/>
+                  <a:lumOff val="80000"/>
+                </a:schemeClr>
+              </a:solidFill>
+              <a:ln>
+                <a:solidFill>
+                  <a:schemeClr val="accent4">
+                    <a:lumMod val="60000"/>
+                    <a:lumOff val="40000"/>
+                  </a:schemeClr>
+                </a:solidFill>
+              </a:ln>
+            </p:spPr>
+            <p:style>
+              <a:lnRef idx="2">
+                <a:schemeClr val="accent1">
+                  <a:shade val="50000"/>
+                </a:schemeClr>
+              </a:lnRef>
+              <a:fillRef idx="1">
+                <a:schemeClr val="accent1"/>
+              </a:fillRef>
+              <a:effectRef idx="0">
+                <a:schemeClr val="accent1"/>
+              </a:effectRef>
+              <a:fontRef idx="minor">
+                <a:schemeClr val="lt1"/>
+              </a:fontRef>
+            </p:style>
+            <p:txBody>
+              <a:bodyPr rot="0" spcFirstLastPara="0" vert="horz" wrap="square" lIns="91440" tIns="45720" rIns="91440" bIns="45720" numCol="1" spcCol="0" rtlCol="0" fromWordArt="0" anchor="ctr" anchorCtr="0" forceAA="0" compatLnSpc="1">
+                <a:prstTxWarp prst="textNoShape">
+                  <a:avLst/>
+                </a:prstTxWarp>
+                <a:noAutofit/>
+              </a:bodyPr>
+              <a:lstStyle/>
+              <a:p>
+                <a:endParaRPr lang="en-US" dirty="0">
+                  <a:solidFill>
+                    <a:srgbClr val="0070C0"/>
+                  </a:solidFill>
+                </a:endParaRPr>
+              </a:p>
+            </p:txBody>
+          </p:sp>
+          <p:sp>
+            <p:nvSpPr>
+              <p:cNvPr id="57" name="Oval 56">
+                <a:extLst>
+                  <a:ext uri="{FF2B5EF4-FFF2-40B4-BE49-F238E27FC236}">
+                    <a16:creationId xmlns:a16="http://schemas.microsoft.com/office/drawing/2014/main" id="{AD49FCA0-D341-0FDC-CACD-3153C82480C1}"/>
+                  </a:ext>
+                </a:extLst>
+              </p:cNvPr>
+              <p:cNvSpPr/>
+              <p:nvPr/>
+            </p:nvSpPr>
+            <p:spPr>
+              <a:xfrm>
+                <a:off x="355600" y="1009650"/>
+                <a:ext cx="114300" cy="115261"/>
+              </a:xfrm>
+              <a:prstGeom prst="ellipse">
+                <a:avLst/>
+              </a:prstGeom>
+              <a:solidFill>
+                <a:schemeClr val="accent4">
+                  <a:lumMod val="20000"/>
+                  <a:lumOff val="80000"/>
+                </a:schemeClr>
+              </a:solidFill>
+              <a:ln>
+                <a:solidFill>
+                  <a:schemeClr val="accent4">
+                    <a:lumMod val="60000"/>
+                    <a:lumOff val="40000"/>
+                  </a:schemeClr>
+                </a:solidFill>
+              </a:ln>
+            </p:spPr>
+            <p:style>
+              <a:lnRef idx="2">
+                <a:schemeClr val="accent1">
+                  <a:shade val="50000"/>
+                </a:schemeClr>
+              </a:lnRef>
+              <a:fillRef idx="1">
+                <a:schemeClr val="accent1"/>
+              </a:fillRef>
+              <a:effectRef idx="0">
+                <a:schemeClr val="accent1"/>
+              </a:effectRef>
+              <a:fontRef idx="minor">
+                <a:schemeClr val="lt1"/>
+              </a:fontRef>
+            </p:style>
+            <p:txBody>
+              <a:bodyPr rot="0" spcFirstLastPara="0" vert="horz" wrap="square" lIns="91440" tIns="45720" rIns="91440" bIns="45720" numCol="1" spcCol="0" rtlCol="0" fromWordArt="0" anchor="ctr" anchorCtr="0" forceAA="0" compatLnSpc="1">
+                <a:prstTxWarp prst="textNoShape">
+                  <a:avLst/>
+                </a:prstTxWarp>
+                <a:noAutofit/>
+              </a:bodyPr>
+              <a:lstStyle/>
+              <a:p>
+                <a:endParaRPr lang="en-US" dirty="0">
+                  <a:solidFill>
+                    <a:srgbClr val="0070C0"/>
+                  </a:solidFill>
+                </a:endParaRPr>
+              </a:p>
+            </p:txBody>
+          </p:sp>
+        </p:grpSp>
+        <p:cxnSp>
+          <p:nvCxnSpPr>
+            <p:cNvPr id="46" name="Straight Arrow Connector 45">
+              <a:extLst>
+                <a:ext uri="{FF2B5EF4-FFF2-40B4-BE49-F238E27FC236}">
+                  <a16:creationId xmlns:a16="http://schemas.microsoft.com/office/drawing/2014/main" id="{BF896366-A34A-493B-3396-66FF12246D15}"/>
+                </a:ext>
+              </a:extLst>
+            </p:cNvPr>
+            <p:cNvCxnSpPr>
+              <a:stCxn id="57" idx="7"/>
+              <a:endCxn id="55" idx="3"/>
+            </p:cNvCxnSpPr>
+            <p:nvPr/>
+          </p:nvCxnSpPr>
+          <p:spPr>
+            <a:xfrm flipV="1">
+              <a:off x="8171302" y="3944072"/>
+              <a:ext cx="400665" cy="303173"/>
+            </a:xfrm>
+            <a:prstGeom prst="straightConnector1">
+              <a:avLst/>
+            </a:prstGeom>
+            <a:ln w="12700">
+              <a:solidFill>
+                <a:schemeClr val="tx1"/>
+              </a:solidFill>
+              <a:tailEnd type="triangle" w="sm" len="med"/>
+            </a:ln>
+          </p:spPr>
+          <p:style>
+            <a:lnRef idx="1">
+              <a:schemeClr val="accent1"/>
+            </a:lnRef>
+            <a:fillRef idx="0">
+              <a:schemeClr val="accent1"/>
+            </a:fillRef>
+            <a:effectRef idx="0">
+              <a:schemeClr val="accent1"/>
+            </a:effectRef>
+            <a:fontRef idx="minor">
+              <a:schemeClr val="tx1"/>
+            </a:fontRef>
+          </p:style>
+        </p:cxnSp>
+        <p:cxnSp>
+          <p:nvCxnSpPr>
+            <p:cNvPr id="48" name="Straight Arrow Connector 47">
+              <a:extLst>
+                <a:ext uri="{FF2B5EF4-FFF2-40B4-BE49-F238E27FC236}">
+                  <a16:creationId xmlns:a16="http://schemas.microsoft.com/office/drawing/2014/main" id="{D9F900D0-BAD0-7951-5D3F-B151724AD2E5}"/>
+                </a:ext>
+              </a:extLst>
+            </p:cNvPr>
+            <p:cNvCxnSpPr>
+              <a:endCxn id="57" idx="3"/>
+            </p:cNvCxnSpPr>
+            <p:nvPr/>
+          </p:nvCxnSpPr>
+          <p:spPr>
+            <a:xfrm flipV="1">
+              <a:off x="7927995" y="4310887"/>
+              <a:ext cx="159610" cy="192944"/>
+            </a:xfrm>
+            <a:prstGeom prst="straightConnector1">
+              <a:avLst/>
+            </a:prstGeom>
+            <a:ln w="12700">
+              <a:solidFill>
+                <a:schemeClr val="tx1"/>
+              </a:solidFill>
+              <a:tailEnd type="triangle" w="sm" len="med"/>
+            </a:ln>
+          </p:spPr>
+          <p:style>
+            <a:lnRef idx="1">
+              <a:schemeClr val="accent1"/>
+            </a:lnRef>
+            <a:fillRef idx="0">
+              <a:schemeClr val="accent1"/>
+            </a:fillRef>
+            <a:effectRef idx="0">
+              <a:schemeClr val="accent1"/>
+            </a:effectRef>
+            <a:fontRef idx="minor">
+              <a:schemeClr val="tx1"/>
+            </a:fontRef>
+          </p:style>
+        </p:cxnSp>
+        <p:cxnSp>
+          <p:nvCxnSpPr>
+            <p:cNvPr id="49" name="Straight Arrow Connector 48">
+              <a:extLst>
+                <a:ext uri="{FF2B5EF4-FFF2-40B4-BE49-F238E27FC236}">
+                  <a16:creationId xmlns:a16="http://schemas.microsoft.com/office/drawing/2014/main" id="{B45EEAA6-4BCF-4249-E64B-E437360DDF15}"/>
+                </a:ext>
+              </a:extLst>
+            </p:cNvPr>
+            <p:cNvCxnSpPr>
+              <a:cxnSpLocks/>
+              <a:stCxn id="57" idx="0"/>
+              <a:endCxn id="54" idx="4"/>
+            </p:cNvCxnSpPr>
+            <p:nvPr/>
+          </p:nvCxnSpPr>
+          <p:spPr>
+            <a:xfrm flipV="1">
+              <a:off x="8129687" y="3917595"/>
+              <a:ext cx="13078" cy="316474"/>
+            </a:xfrm>
+            <a:prstGeom prst="straightConnector1">
+              <a:avLst/>
+            </a:prstGeom>
+            <a:ln w="12700">
+              <a:solidFill>
+                <a:schemeClr val="tx1"/>
+              </a:solidFill>
+              <a:tailEnd type="triangle" w="sm" len="med"/>
+            </a:ln>
+          </p:spPr>
+          <p:style>
+            <a:lnRef idx="1">
+              <a:schemeClr val="accent1"/>
+            </a:lnRef>
+            <a:fillRef idx="0">
+              <a:schemeClr val="accent1"/>
+            </a:fillRef>
+            <a:effectRef idx="0">
+              <a:schemeClr val="accent1"/>
+            </a:effectRef>
+            <a:fontRef idx="minor">
+              <a:schemeClr val="tx1"/>
+            </a:fontRef>
+          </p:style>
+        </p:cxnSp>
+        <p:cxnSp>
+          <p:nvCxnSpPr>
+            <p:cNvPr id="50" name="Straight Arrow Connector 49">
+              <a:extLst>
+                <a:ext uri="{FF2B5EF4-FFF2-40B4-BE49-F238E27FC236}">
+                  <a16:creationId xmlns:a16="http://schemas.microsoft.com/office/drawing/2014/main" id="{BD1145B6-7A9F-42CB-2046-AA280F1DC954}"/>
+                </a:ext>
+              </a:extLst>
+            </p:cNvPr>
+            <p:cNvCxnSpPr>
+              <a:cxnSpLocks/>
+              <a:stCxn id="55" idx="2"/>
+              <a:endCxn id="54" idx="6"/>
+            </p:cNvCxnSpPr>
+            <p:nvPr/>
+          </p:nvCxnSpPr>
+          <p:spPr>
+            <a:xfrm flipH="1" flipV="1">
+              <a:off x="8201617" y="3872611"/>
+              <a:ext cx="353111" cy="39653"/>
+            </a:xfrm>
+            <a:prstGeom prst="straightConnector1">
+              <a:avLst/>
+            </a:prstGeom>
+            <a:ln w="12700">
+              <a:solidFill>
+                <a:schemeClr val="tx1"/>
+              </a:solidFill>
+              <a:tailEnd type="triangle" w="sm" len="med"/>
+            </a:ln>
+          </p:spPr>
+          <p:style>
+            <a:lnRef idx="1">
+              <a:schemeClr val="accent1"/>
+            </a:lnRef>
+            <a:fillRef idx="0">
+              <a:schemeClr val="accent1"/>
+            </a:fillRef>
+            <a:effectRef idx="0">
+              <a:schemeClr val="accent1"/>
+            </a:effectRef>
+            <a:fontRef idx="minor">
+              <a:schemeClr val="tx1"/>
+            </a:fontRef>
+          </p:style>
+        </p:cxnSp>
+        <p:sp>
+          <p:nvSpPr>
+            <p:cNvPr id="51" name="Text Box 2">
+              <a:extLst>
+                <a:ext uri="{FF2B5EF4-FFF2-40B4-BE49-F238E27FC236}">
+                  <a16:creationId xmlns:a16="http://schemas.microsoft.com/office/drawing/2014/main" id="{F8EDE234-30FF-A306-98FB-22DFF553FE54}"/>
+                </a:ext>
+              </a:extLst>
+            </p:cNvPr>
+            <p:cNvSpPr txBox="1">
+              <a:spLocks noChangeArrowheads="1"/>
+            </p:cNvSpPr>
+            <p:nvPr/>
+          </p:nvSpPr>
+          <p:spPr bwMode="auto">
+            <a:xfrm>
+              <a:off x="7958539" y="3480430"/>
+              <a:ext cx="410107" cy="231134"/>
+            </a:xfrm>
+            <a:prstGeom prst="rect">
+              <a:avLst/>
+            </a:prstGeom>
+            <a:noFill/>
+            <a:ln w="9525">
+              <a:noFill/>
+              <a:miter lim="800000"/>
+              <a:headEnd/>
+              <a:tailEnd/>
+            </a:ln>
+          </p:spPr>
+          <p:txBody>
+            <a:bodyPr rot="0" vert="horz" wrap="square" lIns="91440" tIns="45720" rIns="91440" bIns="45720" anchor="t" anchorCtr="0">
+              <a:noAutofit/>
+            </a:bodyPr>
+            <a:lstStyle/>
+            <a:p>
+              <a:pPr marL="0" marR="0">
+                <a:lnSpc>
+                  <a:spcPct val="107000"/>
+                </a:lnSpc>
+                <a:spcBef>
+                  <a:spcPts val="0"/>
+                </a:spcBef>
+                <a:spcAft>
+                  <a:spcPts val="800"/>
+                </a:spcAft>
+              </a:pPr>
+              <a:r>
+                <a:rPr lang="en-US" sz="1600" dirty="0">
+                  <a:solidFill>
+                    <a:srgbClr val="0070C0"/>
+                  </a:solidFill>
+                  <a:effectLst/>
+                  <a:latin typeface="Calibri" panose="020F0502020204030204" pitchFamily="34" charset="0"/>
+                  <a:ea typeface="DengXian" panose="02010600030101010101" pitchFamily="2" charset="-122"/>
+                  <a:cs typeface="Times New Roman" panose="02020603050405020304" pitchFamily="18" charset="0"/>
+                </a:rPr>
+                <a:t>V3</a:t>
+              </a:r>
+            </a:p>
+          </p:txBody>
+        </p:sp>
+        <p:sp>
+          <p:nvSpPr>
+            <p:cNvPr id="52" name="Text Box 2">
+              <a:extLst>
+                <a:ext uri="{FF2B5EF4-FFF2-40B4-BE49-F238E27FC236}">
+                  <a16:creationId xmlns:a16="http://schemas.microsoft.com/office/drawing/2014/main" id="{E211E4CC-EF03-9B8F-32FC-15C82BEE2F7C}"/>
+                </a:ext>
+              </a:extLst>
+            </p:cNvPr>
+            <p:cNvSpPr txBox="1">
+              <a:spLocks noChangeArrowheads="1"/>
+            </p:cNvSpPr>
+            <p:nvPr/>
+          </p:nvSpPr>
+          <p:spPr bwMode="auto">
+            <a:xfrm>
+              <a:off x="8500514" y="3625609"/>
+              <a:ext cx="410107" cy="231134"/>
+            </a:xfrm>
+            <a:prstGeom prst="rect">
+              <a:avLst/>
+            </a:prstGeom>
+            <a:noFill/>
+            <a:ln w="9525">
+              <a:noFill/>
+              <a:miter lim="800000"/>
+              <a:headEnd/>
+              <a:tailEnd/>
+            </a:ln>
+          </p:spPr>
+          <p:txBody>
+            <a:bodyPr rot="0" vert="horz" wrap="square" lIns="91440" tIns="45720" rIns="91440" bIns="45720" anchor="t" anchorCtr="0">
+              <a:noAutofit/>
+            </a:bodyPr>
+            <a:lstStyle/>
+            <a:p>
+              <a:pPr marL="0" marR="0">
+                <a:lnSpc>
+                  <a:spcPct val="107000"/>
+                </a:lnSpc>
+                <a:spcBef>
+                  <a:spcPts val="0"/>
+                </a:spcBef>
+                <a:spcAft>
+                  <a:spcPts val="800"/>
+                </a:spcAft>
+              </a:pPr>
+              <a:r>
+                <a:rPr lang="en-US" sz="1600" dirty="0">
+                  <a:solidFill>
+                    <a:srgbClr val="0070C0"/>
+                  </a:solidFill>
+                  <a:effectLst/>
+                  <a:latin typeface="Calibri" panose="020F0502020204030204" pitchFamily="34" charset="0"/>
+                  <a:ea typeface="DengXian" panose="02010600030101010101" pitchFamily="2" charset="-122"/>
+                  <a:cs typeface="Times New Roman" panose="02020603050405020304" pitchFamily="18" charset="0"/>
+                </a:rPr>
+                <a:t>V4</a:t>
+              </a:r>
+            </a:p>
+          </p:txBody>
+        </p:sp>
+        <p:sp>
+          <p:nvSpPr>
+            <p:cNvPr id="53" name="Text Box 2">
+              <a:extLst>
+                <a:ext uri="{FF2B5EF4-FFF2-40B4-BE49-F238E27FC236}">
+                  <a16:creationId xmlns:a16="http://schemas.microsoft.com/office/drawing/2014/main" id="{FC7AF492-FD60-3D60-917D-979F03E0980D}"/>
+                </a:ext>
+              </a:extLst>
+            </p:cNvPr>
+            <p:cNvSpPr txBox="1">
+              <a:spLocks noChangeArrowheads="1"/>
+            </p:cNvSpPr>
+            <p:nvPr/>
+          </p:nvSpPr>
+          <p:spPr bwMode="auto">
+            <a:xfrm>
+              <a:off x="8093647" y="4273496"/>
+              <a:ext cx="410107" cy="231134"/>
+            </a:xfrm>
+            <a:prstGeom prst="rect">
+              <a:avLst/>
+            </a:prstGeom>
+            <a:noFill/>
+            <a:ln w="9525">
+              <a:noFill/>
+              <a:miter lim="800000"/>
+              <a:headEnd/>
+              <a:tailEnd/>
+            </a:ln>
+          </p:spPr>
+          <p:txBody>
+            <a:bodyPr rot="0" vert="horz" wrap="square" lIns="91440" tIns="45720" rIns="91440" bIns="45720" anchor="t" anchorCtr="0">
+              <a:noAutofit/>
+            </a:bodyPr>
+            <a:lstStyle/>
+            <a:p>
+              <a:pPr marL="0" marR="0">
+                <a:lnSpc>
+                  <a:spcPct val="107000"/>
+                </a:lnSpc>
+                <a:spcBef>
+                  <a:spcPts val="0"/>
+                </a:spcBef>
+                <a:spcAft>
+                  <a:spcPts val="800"/>
+                </a:spcAft>
+              </a:pPr>
+              <a:r>
+                <a:rPr lang="en-US" sz="1600" dirty="0">
+                  <a:solidFill>
+                    <a:srgbClr val="0070C0"/>
+                  </a:solidFill>
+                  <a:effectLst/>
+                  <a:latin typeface="Calibri" panose="020F0502020204030204" pitchFamily="34" charset="0"/>
+                  <a:ea typeface="DengXian" panose="02010600030101010101" pitchFamily="2" charset="-122"/>
+                  <a:cs typeface="Times New Roman" panose="02020603050405020304" pitchFamily="18" charset="0"/>
+                </a:rPr>
+                <a:t>V5</a:t>
+              </a:r>
+            </a:p>
+          </p:txBody>
+        </p:sp>
+      </p:grpSp>
+      <p:cxnSp>
+        <p:nvCxnSpPr>
+          <p:cNvPr id="59" name="Straight Arrow Connector 58">
+            <a:extLst>
+              <a:ext uri="{FF2B5EF4-FFF2-40B4-BE49-F238E27FC236}">
+                <a16:creationId xmlns:a16="http://schemas.microsoft.com/office/drawing/2014/main" id="{EB8A2C3A-F795-C0FE-BE84-DE92DF21B93A}"/>
+              </a:ext>
+            </a:extLst>
+          </p:cNvPr>
+          <p:cNvCxnSpPr>
+            <a:cxnSpLocks/>
+          </p:cNvCxnSpPr>
+          <p:nvPr/>
+        </p:nvCxnSpPr>
+        <p:spPr>
+          <a:xfrm>
+            <a:off x="4317622" y="3395912"/>
+            <a:ext cx="188961" cy="0"/>
+          </a:xfrm>
+          <a:prstGeom prst="straightConnector1">
+            <a:avLst/>
+          </a:prstGeom>
+          <a:ln w="12700">
+            <a:tailEnd type="triangle"/>
+          </a:ln>
+        </p:spPr>
+        <p:style>
+          <a:lnRef idx="1">
+            <a:schemeClr val="dk1"/>
+          </a:lnRef>
+          <a:fillRef idx="0">
+            <a:schemeClr val="dk1"/>
+          </a:fillRef>
+          <a:effectRef idx="0">
+            <a:schemeClr val="dk1"/>
+          </a:effectRef>
+          <a:fontRef idx="minor">
+            <a:schemeClr val="tx1"/>
+          </a:fontRef>
+        </p:style>
+      </p:cxnSp>
+      <p:cxnSp>
+        <p:nvCxnSpPr>
+          <p:cNvPr id="61" name="Straight Arrow Connector 60">
+            <a:extLst>
+              <a:ext uri="{FF2B5EF4-FFF2-40B4-BE49-F238E27FC236}">
+                <a16:creationId xmlns:a16="http://schemas.microsoft.com/office/drawing/2014/main" id="{AF184929-70C2-0BDC-C11C-DDE6195767B8}"/>
+              </a:ext>
+            </a:extLst>
+          </p:cNvPr>
+          <p:cNvCxnSpPr>
+            <a:cxnSpLocks/>
+          </p:cNvCxnSpPr>
+          <p:nvPr/>
+        </p:nvCxnSpPr>
+        <p:spPr>
+          <a:xfrm>
+            <a:off x="5036453" y="3403423"/>
+            <a:ext cx="188961" cy="0"/>
+          </a:xfrm>
+          <a:prstGeom prst="straightConnector1">
+            <a:avLst/>
+          </a:prstGeom>
+          <a:ln w="12700">
+            <a:tailEnd type="triangle"/>
+          </a:ln>
+        </p:spPr>
+        <p:style>
+          <a:lnRef idx="1">
+            <a:schemeClr val="dk1"/>
+          </a:lnRef>
+          <a:fillRef idx="0">
+            <a:schemeClr val="dk1"/>
+          </a:fillRef>
+          <a:effectRef idx="0">
+            <a:schemeClr val="dk1"/>
+          </a:effectRef>
+          <a:fontRef idx="minor">
+            <a:schemeClr val="tx1"/>
+          </a:fontRef>
+        </p:style>
+      </p:cxnSp>
+      <p:cxnSp>
+        <p:nvCxnSpPr>
+          <p:cNvPr id="67" name="Straight Arrow Connector 66">
+            <a:extLst>
+              <a:ext uri="{FF2B5EF4-FFF2-40B4-BE49-F238E27FC236}">
+                <a16:creationId xmlns:a16="http://schemas.microsoft.com/office/drawing/2014/main" id="{DEE6ED0B-6471-B067-1BEE-82275E575D9F}"/>
+              </a:ext>
+            </a:extLst>
+          </p:cNvPr>
+          <p:cNvCxnSpPr>
+            <a:cxnSpLocks/>
+          </p:cNvCxnSpPr>
+          <p:nvPr/>
+        </p:nvCxnSpPr>
+        <p:spPr>
+          <a:xfrm>
+            <a:off x="7889565" y="3913874"/>
+            <a:ext cx="243840" cy="0"/>
+          </a:xfrm>
+          <a:prstGeom prst="straightConnector1">
+            <a:avLst/>
+          </a:prstGeom>
+          <a:ln w="12700">
+            <a:tailEnd type="triangle"/>
+          </a:ln>
+        </p:spPr>
+        <p:style>
+          <a:lnRef idx="1">
+            <a:schemeClr val="dk1"/>
+          </a:lnRef>
+          <a:fillRef idx="0">
+            <a:schemeClr val="dk1"/>
+          </a:fillRef>
+          <a:effectRef idx="0">
+            <a:schemeClr val="dk1"/>
+          </a:effectRef>
+          <a:fontRef idx="minor">
+            <a:schemeClr val="tx1"/>
+          </a:fontRef>
+        </p:style>
+      </p:cxnSp>
+    </p:spTree>
+    <p:extLst>
+      <p:ext uri="{BB962C8B-B14F-4D97-AF65-F5344CB8AC3E}">
+        <p14:creationId xmlns:p14="http://schemas.microsoft.com/office/powerpoint/2010/main" val="3154792121"/>
+      </p:ext>
+    </p:extLst>
+  </p:cSld>
+  <p:clrMapOvr>
+    <a:masterClrMapping/>
+  </p:clrMapOvr>
+</p:sld>
+</file>
+
 <file path=ppt/theme/theme1.xml><?xml version="1.0" encoding="utf-8"?>
 <a:theme xmlns:a="http://schemas.openxmlformats.org/drawingml/2006/main" name="Office Theme">
   <a:themeElements>

</xml_diff>

<commit_message>
fixing the issues that Yi raised
</commit_message>
<xml_diff>
--- a/figures.pptx
+++ b/figures.pptx
@@ -13,6 +13,7 @@
     <p:sldId id="270" r:id="rId7"/>
     <p:sldId id="271" r:id="rId8"/>
     <p:sldId id="272" r:id="rId9"/>
+    <p:sldId id="273" r:id="rId10"/>
   </p:sldIdLst>
   <p:sldSz cx="12192000" cy="6858000"/>
   <p:notesSz cx="6858000" cy="9144000"/>
@@ -32291,6 +32292,2956 @@
 </p:sld>
 </file>
 
+<file path=ppt/slides/slide9.xml><?xml version="1.0" encoding="utf-8"?>
+<p:sld xmlns:a="http://schemas.openxmlformats.org/drawingml/2006/main" xmlns:r="http://schemas.openxmlformats.org/officeDocument/2006/relationships" xmlns:p="http://schemas.openxmlformats.org/presentationml/2006/main">
+  <p:cSld>
+    <p:spTree>
+      <p:nvGrpSpPr>
+        <p:cNvPr id="1" name=""/>
+        <p:cNvGrpSpPr/>
+        <p:nvPr/>
+      </p:nvGrpSpPr>
+      <p:grpSpPr>
+        <a:xfrm>
+          <a:off x="0" y="0"/>
+          <a:ext cx="0" cy="0"/>
+          <a:chOff x="0" y="0"/>
+          <a:chExt cx="0" cy="0"/>
+        </a:xfrm>
+      </p:grpSpPr>
+      <p:grpSp>
+        <p:nvGrpSpPr>
+          <p:cNvPr id="2" name="Group 1">
+            <a:extLst>
+              <a:ext uri="{FF2B5EF4-FFF2-40B4-BE49-F238E27FC236}">
+                <a16:creationId xmlns:a16="http://schemas.microsoft.com/office/drawing/2014/main" id="{B5B3E00E-36AD-1B99-670E-ACC3DFACD001}"/>
+              </a:ext>
+            </a:extLst>
+          </p:cNvPr>
+          <p:cNvGrpSpPr/>
+          <p:nvPr/>
+        </p:nvGrpSpPr>
+        <p:grpSpPr>
+          <a:xfrm>
+            <a:off x="1375905" y="4364140"/>
+            <a:ext cx="1138945" cy="903204"/>
+            <a:chOff x="7691043" y="3600627"/>
+            <a:chExt cx="1138945" cy="903204"/>
+          </a:xfrm>
+        </p:grpSpPr>
+        <p:grpSp>
+          <p:nvGrpSpPr>
+            <p:cNvPr id="3" name="Group 2">
+              <a:extLst>
+                <a:ext uri="{FF2B5EF4-FFF2-40B4-BE49-F238E27FC236}">
+                  <a16:creationId xmlns:a16="http://schemas.microsoft.com/office/drawing/2014/main" id="{43FD067E-5B6F-F0D9-1784-F0B95CCDE00A}"/>
+                </a:ext>
+              </a:extLst>
+            </p:cNvPr>
+            <p:cNvGrpSpPr/>
+            <p:nvPr/>
+          </p:nvGrpSpPr>
+          <p:grpSpPr>
+            <a:xfrm>
+              <a:off x="8070834" y="3827808"/>
+              <a:ext cx="601598" cy="496651"/>
+              <a:chOff x="355600" y="488950"/>
+              <a:chExt cx="584200" cy="635961"/>
+            </a:xfrm>
+          </p:grpSpPr>
+          <p:sp>
+            <p:nvSpPr>
+              <p:cNvPr id="11" name="Oval 10">
+                <a:extLst>
+                  <a:ext uri="{FF2B5EF4-FFF2-40B4-BE49-F238E27FC236}">
+                    <a16:creationId xmlns:a16="http://schemas.microsoft.com/office/drawing/2014/main" id="{E5600EDD-EA64-16AD-E06E-323D1D4EAB05}"/>
+                  </a:ext>
+                </a:extLst>
+              </p:cNvPr>
+              <p:cNvSpPr/>
+              <p:nvPr/>
+            </p:nvSpPr>
+            <p:spPr>
+              <a:xfrm>
+                <a:off x="368300" y="488950"/>
+                <a:ext cx="114300" cy="115261"/>
+              </a:xfrm>
+              <a:prstGeom prst="ellipse">
+                <a:avLst/>
+              </a:prstGeom>
+              <a:solidFill>
+                <a:schemeClr val="accent2">
+                  <a:lumMod val="60000"/>
+                  <a:lumOff val="40000"/>
+                </a:schemeClr>
+              </a:solidFill>
+              <a:ln>
+                <a:solidFill>
+                  <a:srgbClr val="C00000"/>
+                </a:solidFill>
+              </a:ln>
+            </p:spPr>
+            <p:style>
+              <a:lnRef idx="2">
+                <a:schemeClr val="accent1">
+                  <a:shade val="50000"/>
+                </a:schemeClr>
+              </a:lnRef>
+              <a:fillRef idx="1">
+                <a:schemeClr val="accent1"/>
+              </a:fillRef>
+              <a:effectRef idx="0">
+                <a:schemeClr val="accent1"/>
+              </a:effectRef>
+              <a:fontRef idx="minor">
+                <a:schemeClr val="lt1"/>
+              </a:fontRef>
+            </p:style>
+            <p:txBody>
+              <a:bodyPr rot="0" spcFirstLastPara="0" vert="horz" wrap="square" lIns="91440" tIns="45720" rIns="91440" bIns="45720" numCol="1" spcCol="0" rtlCol="0" fromWordArt="0" anchor="ctr" anchorCtr="0" forceAA="0" compatLnSpc="1">
+                <a:prstTxWarp prst="textNoShape">
+                  <a:avLst/>
+                </a:prstTxWarp>
+                <a:noAutofit/>
+              </a:bodyPr>
+              <a:lstStyle/>
+              <a:p>
+                <a:endParaRPr lang="en-US" dirty="0">
+                  <a:solidFill>
+                    <a:srgbClr val="0070C0"/>
+                  </a:solidFill>
+                </a:endParaRPr>
+              </a:p>
+            </p:txBody>
+          </p:sp>
+          <p:sp>
+            <p:nvSpPr>
+              <p:cNvPr id="12" name="Oval 11">
+                <a:extLst>
+                  <a:ext uri="{FF2B5EF4-FFF2-40B4-BE49-F238E27FC236}">
+                    <a16:creationId xmlns:a16="http://schemas.microsoft.com/office/drawing/2014/main" id="{F995D46B-A09D-3E01-C6F6-D14D0A41043A}"/>
+                  </a:ext>
+                </a:extLst>
+              </p:cNvPr>
+              <p:cNvSpPr/>
+              <p:nvPr/>
+            </p:nvSpPr>
+            <p:spPr>
+              <a:xfrm>
+                <a:off x="825500" y="539750"/>
+                <a:ext cx="114300" cy="115261"/>
+              </a:xfrm>
+              <a:prstGeom prst="ellipse">
+                <a:avLst/>
+              </a:prstGeom>
+              <a:solidFill>
+                <a:schemeClr val="accent4">
+                  <a:lumMod val="20000"/>
+                  <a:lumOff val="80000"/>
+                </a:schemeClr>
+              </a:solidFill>
+              <a:ln>
+                <a:solidFill>
+                  <a:schemeClr val="accent4">
+                    <a:lumMod val="60000"/>
+                    <a:lumOff val="40000"/>
+                  </a:schemeClr>
+                </a:solidFill>
+              </a:ln>
+            </p:spPr>
+            <p:style>
+              <a:lnRef idx="2">
+                <a:schemeClr val="accent1">
+                  <a:shade val="50000"/>
+                </a:schemeClr>
+              </a:lnRef>
+              <a:fillRef idx="1">
+                <a:schemeClr val="accent1"/>
+              </a:fillRef>
+              <a:effectRef idx="0">
+                <a:schemeClr val="accent1"/>
+              </a:effectRef>
+              <a:fontRef idx="minor">
+                <a:schemeClr val="lt1"/>
+              </a:fontRef>
+            </p:style>
+            <p:txBody>
+              <a:bodyPr rot="0" spcFirstLastPara="0" vert="horz" wrap="square" lIns="91440" tIns="45720" rIns="91440" bIns="45720" numCol="1" spcCol="0" rtlCol="0" fromWordArt="0" anchor="ctr" anchorCtr="0" forceAA="0" compatLnSpc="1">
+                <a:prstTxWarp prst="textNoShape">
+                  <a:avLst/>
+                </a:prstTxWarp>
+                <a:noAutofit/>
+              </a:bodyPr>
+              <a:lstStyle/>
+              <a:p>
+                <a:endParaRPr lang="en-US" dirty="0">
+                  <a:solidFill>
+                    <a:srgbClr val="0070C0"/>
+                  </a:solidFill>
+                </a:endParaRPr>
+              </a:p>
+            </p:txBody>
+          </p:sp>
+          <p:sp>
+            <p:nvSpPr>
+              <p:cNvPr id="13" name="Oval 12">
+                <a:extLst>
+                  <a:ext uri="{FF2B5EF4-FFF2-40B4-BE49-F238E27FC236}">
+                    <a16:creationId xmlns:a16="http://schemas.microsoft.com/office/drawing/2014/main" id="{D381A1B5-BFDA-D7FF-8205-C39DED23AB09}"/>
+                  </a:ext>
+                </a:extLst>
+              </p:cNvPr>
+              <p:cNvSpPr/>
+              <p:nvPr/>
+            </p:nvSpPr>
+            <p:spPr>
+              <a:xfrm>
+                <a:off x="355600" y="1009650"/>
+                <a:ext cx="114300" cy="115261"/>
+              </a:xfrm>
+              <a:prstGeom prst="ellipse">
+                <a:avLst/>
+              </a:prstGeom>
+              <a:solidFill>
+                <a:schemeClr val="accent4">
+                  <a:lumMod val="20000"/>
+                  <a:lumOff val="80000"/>
+                </a:schemeClr>
+              </a:solidFill>
+              <a:ln>
+                <a:solidFill>
+                  <a:schemeClr val="accent4">
+                    <a:lumMod val="60000"/>
+                    <a:lumOff val="40000"/>
+                  </a:schemeClr>
+                </a:solidFill>
+              </a:ln>
+            </p:spPr>
+            <p:style>
+              <a:lnRef idx="2">
+                <a:schemeClr val="accent1">
+                  <a:shade val="50000"/>
+                </a:schemeClr>
+              </a:lnRef>
+              <a:fillRef idx="1">
+                <a:schemeClr val="accent1"/>
+              </a:fillRef>
+              <a:effectRef idx="0">
+                <a:schemeClr val="accent1"/>
+              </a:effectRef>
+              <a:fontRef idx="minor">
+                <a:schemeClr val="lt1"/>
+              </a:fontRef>
+            </p:style>
+            <p:txBody>
+              <a:bodyPr rot="0" spcFirstLastPara="0" vert="horz" wrap="square" lIns="91440" tIns="45720" rIns="91440" bIns="45720" numCol="1" spcCol="0" rtlCol="0" fromWordArt="0" anchor="ctr" anchorCtr="0" forceAA="0" compatLnSpc="1">
+                <a:prstTxWarp prst="textNoShape">
+                  <a:avLst/>
+                </a:prstTxWarp>
+                <a:noAutofit/>
+              </a:bodyPr>
+              <a:lstStyle/>
+              <a:p>
+                <a:endParaRPr lang="en-US" dirty="0">
+                  <a:solidFill>
+                    <a:srgbClr val="0070C0"/>
+                  </a:solidFill>
+                </a:endParaRPr>
+              </a:p>
+            </p:txBody>
+          </p:sp>
+        </p:grpSp>
+        <p:cxnSp>
+          <p:nvCxnSpPr>
+            <p:cNvPr id="4" name="Straight Arrow Connector 3">
+              <a:extLst>
+                <a:ext uri="{FF2B5EF4-FFF2-40B4-BE49-F238E27FC236}">
+                  <a16:creationId xmlns:a16="http://schemas.microsoft.com/office/drawing/2014/main" id="{0A6DE654-C333-BF74-1E0B-8EA674ABCD47}"/>
+                </a:ext>
+              </a:extLst>
+            </p:cNvPr>
+            <p:cNvCxnSpPr>
+              <a:stCxn id="13" idx="7"/>
+              <a:endCxn id="12" idx="3"/>
+            </p:cNvCxnSpPr>
+            <p:nvPr/>
+          </p:nvCxnSpPr>
+          <p:spPr>
+            <a:xfrm flipV="1">
+              <a:off x="8171302" y="3944072"/>
+              <a:ext cx="400665" cy="303173"/>
+            </a:xfrm>
+            <a:prstGeom prst="straightConnector1">
+              <a:avLst/>
+            </a:prstGeom>
+            <a:ln w="12700">
+              <a:solidFill>
+                <a:schemeClr val="tx1"/>
+              </a:solidFill>
+              <a:tailEnd type="triangle" w="sm" len="med"/>
+            </a:ln>
+          </p:spPr>
+          <p:style>
+            <a:lnRef idx="1">
+              <a:schemeClr val="accent1"/>
+            </a:lnRef>
+            <a:fillRef idx="0">
+              <a:schemeClr val="accent1"/>
+            </a:fillRef>
+            <a:effectRef idx="0">
+              <a:schemeClr val="accent1"/>
+            </a:effectRef>
+            <a:fontRef idx="minor">
+              <a:schemeClr val="tx1"/>
+            </a:fontRef>
+          </p:style>
+        </p:cxnSp>
+        <p:cxnSp>
+          <p:nvCxnSpPr>
+            <p:cNvPr id="5" name="Straight Arrow Connector 4">
+              <a:extLst>
+                <a:ext uri="{FF2B5EF4-FFF2-40B4-BE49-F238E27FC236}">
+                  <a16:creationId xmlns:a16="http://schemas.microsoft.com/office/drawing/2014/main" id="{15CA0A79-4F7C-AFA2-0226-E20E31837FA7}"/>
+                </a:ext>
+              </a:extLst>
+            </p:cNvPr>
+            <p:cNvCxnSpPr>
+              <a:endCxn id="13" idx="3"/>
+            </p:cNvCxnSpPr>
+            <p:nvPr/>
+          </p:nvCxnSpPr>
+          <p:spPr>
+            <a:xfrm flipV="1">
+              <a:off x="7927995" y="4310887"/>
+              <a:ext cx="159610" cy="192944"/>
+            </a:xfrm>
+            <a:prstGeom prst="straightConnector1">
+              <a:avLst/>
+            </a:prstGeom>
+            <a:ln w="12700">
+              <a:solidFill>
+                <a:schemeClr val="tx1"/>
+              </a:solidFill>
+              <a:tailEnd type="triangle" w="sm" len="med"/>
+            </a:ln>
+          </p:spPr>
+          <p:style>
+            <a:lnRef idx="1">
+              <a:schemeClr val="accent1"/>
+            </a:lnRef>
+            <a:fillRef idx="0">
+              <a:schemeClr val="accent1"/>
+            </a:fillRef>
+            <a:effectRef idx="0">
+              <a:schemeClr val="accent1"/>
+            </a:effectRef>
+            <a:fontRef idx="minor">
+              <a:schemeClr val="tx1"/>
+            </a:fontRef>
+          </p:style>
+        </p:cxnSp>
+        <p:cxnSp>
+          <p:nvCxnSpPr>
+            <p:cNvPr id="6" name="Straight Arrow Connector 5">
+              <a:extLst>
+                <a:ext uri="{FF2B5EF4-FFF2-40B4-BE49-F238E27FC236}">
+                  <a16:creationId xmlns:a16="http://schemas.microsoft.com/office/drawing/2014/main" id="{9EC6DED2-AAE5-BED7-D0D4-3EA678D446CF}"/>
+                </a:ext>
+              </a:extLst>
+            </p:cNvPr>
+            <p:cNvCxnSpPr>
+              <a:stCxn id="13" idx="0"/>
+              <a:endCxn id="11" idx="4"/>
+            </p:cNvCxnSpPr>
+            <p:nvPr/>
+          </p:nvCxnSpPr>
+          <p:spPr>
+            <a:xfrm flipV="1">
+              <a:off x="8129687" y="3917595"/>
+              <a:ext cx="13078" cy="316474"/>
+            </a:xfrm>
+            <a:prstGeom prst="straightConnector1">
+              <a:avLst/>
+            </a:prstGeom>
+            <a:ln w="12700">
+              <a:solidFill>
+                <a:schemeClr val="tx1"/>
+              </a:solidFill>
+              <a:tailEnd type="triangle" w="sm" len="med"/>
+            </a:ln>
+          </p:spPr>
+          <p:style>
+            <a:lnRef idx="1">
+              <a:schemeClr val="accent1"/>
+            </a:lnRef>
+            <a:fillRef idx="0">
+              <a:schemeClr val="accent1"/>
+            </a:fillRef>
+            <a:effectRef idx="0">
+              <a:schemeClr val="accent1"/>
+            </a:effectRef>
+            <a:fontRef idx="minor">
+              <a:schemeClr val="tx1"/>
+            </a:fontRef>
+          </p:style>
+        </p:cxnSp>
+        <p:cxnSp>
+          <p:nvCxnSpPr>
+            <p:cNvPr id="7" name="Straight Arrow Connector 6">
+              <a:extLst>
+                <a:ext uri="{FF2B5EF4-FFF2-40B4-BE49-F238E27FC236}">
+                  <a16:creationId xmlns:a16="http://schemas.microsoft.com/office/drawing/2014/main" id="{A965939C-B653-11EB-BF38-CC9FB4FE4AA7}"/>
+                </a:ext>
+              </a:extLst>
+            </p:cNvPr>
+            <p:cNvCxnSpPr>
+              <a:stCxn id="12" idx="2"/>
+              <a:endCxn id="11" idx="6"/>
+            </p:cNvCxnSpPr>
+            <p:nvPr/>
+          </p:nvCxnSpPr>
+          <p:spPr>
+            <a:xfrm flipH="1" flipV="1">
+              <a:off x="8201617" y="3872611"/>
+              <a:ext cx="353111" cy="39653"/>
+            </a:xfrm>
+            <a:prstGeom prst="straightConnector1">
+              <a:avLst/>
+            </a:prstGeom>
+            <a:ln w="12700">
+              <a:solidFill>
+                <a:schemeClr val="tx1"/>
+              </a:solidFill>
+              <a:tailEnd type="triangle" w="sm" len="med"/>
+            </a:ln>
+          </p:spPr>
+          <p:style>
+            <a:lnRef idx="1">
+              <a:schemeClr val="accent1"/>
+            </a:lnRef>
+            <a:fillRef idx="0">
+              <a:schemeClr val="accent1"/>
+            </a:fillRef>
+            <a:effectRef idx="0">
+              <a:schemeClr val="accent1"/>
+            </a:effectRef>
+            <a:fontRef idx="minor">
+              <a:schemeClr val="tx1"/>
+            </a:fontRef>
+          </p:style>
+        </p:cxnSp>
+        <p:sp>
+          <p:nvSpPr>
+            <p:cNvPr id="8" name="Text Box 2">
+              <a:extLst>
+                <a:ext uri="{FF2B5EF4-FFF2-40B4-BE49-F238E27FC236}">
+                  <a16:creationId xmlns:a16="http://schemas.microsoft.com/office/drawing/2014/main" id="{7FCD0976-8022-365E-039C-BBACC3B553C2}"/>
+                </a:ext>
+              </a:extLst>
+            </p:cNvPr>
+            <p:cNvSpPr txBox="1">
+              <a:spLocks noChangeArrowheads="1"/>
+            </p:cNvSpPr>
+            <p:nvPr/>
+          </p:nvSpPr>
+          <p:spPr bwMode="auto">
+            <a:xfrm>
+              <a:off x="8171302" y="3600627"/>
+              <a:ext cx="410107" cy="231134"/>
+            </a:xfrm>
+            <a:prstGeom prst="rect">
+              <a:avLst/>
+            </a:prstGeom>
+            <a:noFill/>
+            <a:ln w="9525">
+              <a:noFill/>
+              <a:miter lim="800000"/>
+              <a:headEnd/>
+              <a:tailEnd/>
+            </a:ln>
+          </p:spPr>
+          <p:txBody>
+            <a:bodyPr rot="0" vert="horz" wrap="square" lIns="91440" tIns="45720" rIns="91440" bIns="45720" anchor="t" anchorCtr="0">
+              <a:noAutofit/>
+            </a:bodyPr>
+            <a:lstStyle/>
+            <a:p>
+              <a:pPr marL="0" marR="0">
+                <a:lnSpc>
+                  <a:spcPct val="107000"/>
+                </a:lnSpc>
+                <a:spcBef>
+                  <a:spcPts val="0"/>
+                </a:spcBef>
+                <a:spcAft>
+                  <a:spcPts val="800"/>
+                </a:spcAft>
+              </a:pPr>
+              <a:r>
+                <a:rPr lang="en-US" sz="1600" dirty="0">
+                  <a:solidFill>
+                    <a:srgbClr val="0070C0"/>
+                  </a:solidFill>
+                  <a:effectLst/>
+                  <a:latin typeface="Calibri" panose="020F0502020204030204" pitchFamily="34" charset="0"/>
+                  <a:ea typeface="DengXian" panose="02010600030101010101" pitchFamily="2" charset="-122"/>
+                  <a:cs typeface="Times New Roman" panose="02020603050405020304" pitchFamily="18" charset="0"/>
+                </a:rPr>
+                <a:t>S3</a:t>
+              </a:r>
+            </a:p>
+          </p:txBody>
+        </p:sp>
+        <p:sp>
+          <p:nvSpPr>
+            <p:cNvPr id="9" name="Text Box 2">
+              <a:extLst>
+                <a:ext uri="{FF2B5EF4-FFF2-40B4-BE49-F238E27FC236}">
+                  <a16:creationId xmlns:a16="http://schemas.microsoft.com/office/drawing/2014/main" id="{C8868525-A16D-29BB-0D20-CA12758993E6}"/>
+                </a:ext>
+              </a:extLst>
+            </p:cNvPr>
+            <p:cNvSpPr txBox="1">
+              <a:spLocks noChangeArrowheads="1"/>
+            </p:cNvSpPr>
+            <p:nvPr/>
+          </p:nvSpPr>
+          <p:spPr bwMode="auto">
+            <a:xfrm>
+              <a:off x="8419881" y="3967383"/>
+              <a:ext cx="410107" cy="231134"/>
+            </a:xfrm>
+            <a:prstGeom prst="rect">
+              <a:avLst/>
+            </a:prstGeom>
+            <a:noFill/>
+            <a:ln w="9525">
+              <a:noFill/>
+              <a:miter lim="800000"/>
+              <a:headEnd/>
+              <a:tailEnd/>
+            </a:ln>
+          </p:spPr>
+          <p:txBody>
+            <a:bodyPr rot="0" vert="horz" wrap="square" lIns="91440" tIns="45720" rIns="91440" bIns="45720" anchor="t" anchorCtr="0">
+              <a:noAutofit/>
+            </a:bodyPr>
+            <a:lstStyle/>
+            <a:p>
+              <a:pPr marL="0" marR="0">
+                <a:lnSpc>
+                  <a:spcPct val="107000"/>
+                </a:lnSpc>
+                <a:spcBef>
+                  <a:spcPts val="0"/>
+                </a:spcBef>
+                <a:spcAft>
+                  <a:spcPts val="800"/>
+                </a:spcAft>
+              </a:pPr>
+              <a:r>
+                <a:rPr lang="en-US" sz="1600" dirty="0">
+                  <a:solidFill>
+                    <a:srgbClr val="0070C0"/>
+                  </a:solidFill>
+                  <a:effectLst/>
+                  <a:latin typeface="Calibri" panose="020F0502020204030204" pitchFamily="34" charset="0"/>
+                  <a:ea typeface="DengXian" panose="02010600030101010101" pitchFamily="2" charset="-122"/>
+                  <a:cs typeface="Times New Roman" panose="02020603050405020304" pitchFamily="18" charset="0"/>
+                </a:rPr>
+                <a:t>S4</a:t>
+              </a:r>
+            </a:p>
+          </p:txBody>
+        </p:sp>
+        <p:sp>
+          <p:nvSpPr>
+            <p:cNvPr id="10" name="Text Box 2">
+              <a:extLst>
+                <a:ext uri="{FF2B5EF4-FFF2-40B4-BE49-F238E27FC236}">
+                  <a16:creationId xmlns:a16="http://schemas.microsoft.com/office/drawing/2014/main" id="{A9CCBF9D-1911-3007-3CCA-9D4147C8FAFC}"/>
+                </a:ext>
+              </a:extLst>
+            </p:cNvPr>
+            <p:cNvSpPr txBox="1">
+              <a:spLocks noChangeArrowheads="1"/>
+            </p:cNvSpPr>
+            <p:nvPr/>
+          </p:nvSpPr>
+          <p:spPr bwMode="auto">
+            <a:xfrm>
+              <a:off x="7691043" y="4191197"/>
+              <a:ext cx="410107" cy="231134"/>
+            </a:xfrm>
+            <a:prstGeom prst="rect">
+              <a:avLst/>
+            </a:prstGeom>
+            <a:noFill/>
+            <a:ln w="9525">
+              <a:noFill/>
+              <a:miter lim="800000"/>
+              <a:headEnd/>
+              <a:tailEnd/>
+            </a:ln>
+          </p:spPr>
+          <p:txBody>
+            <a:bodyPr rot="0" vert="horz" wrap="square" lIns="91440" tIns="45720" rIns="91440" bIns="45720" anchor="t" anchorCtr="0">
+              <a:noAutofit/>
+            </a:bodyPr>
+            <a:lstStyle/>
+            <a:p>
+              <a:pPr marL="0" marR="0">
+                <a:lnSpc>
+                  <a:spcPct val="107000"/>
+                </a:lnSpc>
+                <a:spcBef>
+                  <a:spcPts val="0"/>
+                </a:spcBef>
+                <a:spcAft>
+                  <a:spcPts val="800"/>
+                </a:spcAft>
+              </a:pPr>
+              <a:r>
+                <a:rPr lang="en-US" sz="1600" dirty="0">
+                  <a:solidFill>
+                    <a:srgbClr val="0070C0"/>
+                  </a:solidFill>
+                  <a:effectLst/>
+                  <a:latin typeface="Calibri" panose="020F0502020204030204" pitchFamily="34" charset="0"/>
+                  <a:ea typeface="DengXian" panose="02010600030101010101" pitchFamily="2" charset="-122"/>
+                  <a:cs typeface="Times New Roman" panose="02020603050405020304" pitchFamily="18" charset="0"/>
+                </a:rPr>
+                <a:t>S5</a:t>
+              </a:r>
+            </a:p>
+          </p:txBody>
+        </p:sp>
+      </p:grpSp>
+      <p:cxnSp>
+        <p:nvCxnSpPr>
+          <p:cNvPr id="14" name="Straight Arrow Connector 13">
+            <a:extLst>
+              <a:ext uri="{FF2B5EF4-FFF2-40B4-BE49-F238E27FC236}">
+                <a16:creationId xmlns:a16="http://schemas.microsoft.com/office/drawing/2014/main" id="{1AA3B3B6-8F4B-817A-A44B-D7EAC7BCE28D}"/>
+              </a:ext>
+            </a:extLst>
+          </p:cNvPr>
+          <p:cNvCxnSpPr>
+            <a:cxnSpLocks/>
+          </p:cNvCxnSpPr>
+          <p:nvPr/>
+        </p:nvCxnSpPr>
+        <p:spPr>
+          <a:xfrm>
+            <a:off x="6141968" y="3398804"/>
+            <a:ext cx="371940" cy="1362"/>
+          </a:xfrm>
+          <a:prstGeom prst="straightConnector1">
+            <a:avLst/>
+          </a:prstGeom>
+          <a:ln w="12700">
+            <a:tailEnd type="triangle"/>
+          </a:ln>
+        </p:spPr>
+        <p:style>
+          <a:lnRef idx="1">
+            <a:schemeClr val="dk1"/>
+          </a:lnRef>
+          <a:fillRef idx="0">
+            <a:schemeClr val="dk1"/>
+          </a:fillRef>
+          <a:effectRef idx="0">
+            <a:schemeClr val="dk1"/>
+          </a:effectRef>
+          <a:fontRef idx="minor">
+            <a:schemeClr val="tx1"/>
+          </a:fontRef>
+        </p:style>
+      </p:cxnSp>
+      <p:sp>
+        <p:nvSpPr>
+          <p:cNvPr id="15" name="TextBox 14">
+            <a:extLst>
+              <a:ext uri="{FF2B5EF4-FFF2-40B4-BE49-F238E27FC236}">
+                <a16:creationId xmlns:a16="http://schemas.microsoft.com/office/drawing/2014/main" id="{0B028F61-D399-8C9E-24A9-8A3F354F7CED}"/>
+              </a:ext>
+            </a:extLst>
+          </p:cNvPr>
+          <p:cNvSpPr txBox="1"/>
+          <p:nvPr/>
+        </p:nvSpPr>
+        <p:spPr>
+          <a:xfrm>
+            <a:off x="767507" y="3795095"/>
+            <a:ext cx="2444929" cy="707886"/>
+          </a:xfrm>
+          <a:prstGeom prst="rect">
+            <a:avLst/>
+          </a:prstGeom>
+          <a:noFill/>
+        </p:spPr>
+        <p:txBody>
+          <a:bodyPr wrap="square" rtlCol="0">
+            <a:spAutoFit/>
+          </a:bodyPr>
+          <a:lstStyle/>
+          <a:p>
+            <a:pPr algn="ctr"/>
+            <a:r>
+              <a:rPr lang="en-US" sz="2000" i="1" dirty="0"/>
+              <a:t>PDG subgraph from </a:t>
+            </a:r>
+            <a:r>
+              <a:rPr lang="en-US" sz="2000" i="1" dirty="0" err="1">
+                <a:latin typeface="Courier New" panose="02070309020205020404" pitchFamily="49" charset="0"/>
+                <a:cs typeface="Courier New" panose="02070309020205020404" pitchFamily="49" charset="0"/>
+              </a:rPr>
+              <a:t>GNNExplainer</a:t>
+            </a:r>
+            <a:endParaRPr lang="en-US" sz="2000" i="1" dirty="0">
+              <a:latin typeface="Courier New" panose="02070309020205020404" pitchFamily="49" charset="0"/>
+              <a:cs typeface="Courier New" panose="02070309020205020404" pitchFamily="49" charset="0"/>
+            </a:endParaRPr>
+          </a:p>
+        </p:txBody>
+      </p:sp>
+      <p:sp>
+        <p:nvSpPr>
+          <p:cNvPr id="16" name="TextBox 15">
+            <a:extLst>
+              <a:ext uri="{FF2B5EF4-FFF2-40B4-BE49-F238E27FC236}">
+                <a16:creationId xmlns:a16="http://schemas.microsoft.com/office/drawing/2014/main" id="{E635067D-EC04-BB3E-2B5F-5CB7422D7B02}"/>
+              </a:ext>
+            </a:extLst>
+          </p:cNvPr>
+          <p:cNvSpPr txBox="1"/>
+          <p:nvPr/>
+        </p:nvSpPr>
+        <p:spPr>
+          <a:xfrm>
+            <a:off x="5225414" y="3212337"/>
+            <a:ext cx="927049" cy="369332"/>
+          </a:xfrm>
+          <a:prstGeom prst="rect">
+            <a:avLst/>
+          </a:prstGeom>
+          <a:gradFill flip="none" rotWithShape="1">
+            <a:gsLst>
+              <a:gs pos="0">
+                <a:schemeClr val="accent5">
+                  <a:lumMod val="67000"/>
+                </a:schemeClr>
+              </a:gs>
+              <a:gs pos="48000">
+                <a:schemeClr val="accent5">
+                  <a:lumMod val="97000"/>
+                  <a:lumOff val="3000"/>
+                </a:schemeClr>
+              </a:gs>
+              <a:gs pos="100000">
+                <a:schemeClr val="accent5">
+                  <a:lumMod val="60000"/>
+                  <a:lumOff val="40000"/>
+                </a:schemeClr>
+              </a:gs>
+            </a:gsLst>
+            <a:lin ang="16200000" scaled="1"/>
+            <a:tileRect/>
+          </a:gradFill>
+          <a:ln>
+            <a:noFill/>
+          </a:ln>
+        </p:spPr>
+        <p:style>
+          <a:lnRef idx="0">
+            <a:scrgbClr r="0" g="0" b="0"/>
+          </a:lnRef>
+          <a:fillRef idx="0">
+            <a:scrgbClr r="0" g="0" b="0"/>
+          </a:fillRef>
+          <a:effectRef idx="0">
+            <a:scrgbClr r="0" g="0" b="0"/>
+          </a:effectRef>
+          <a:fontRef idx="minor">
+            <a:schemeClr val="lt1"/>
+          </a:fontRef>
+        </p:style>
+        <p:txBody>
+          <a:bodyPr wrap="square" rtlCol="0">
+            <a:spAutoFit/>
+          </a:bodyPr>
+          <a:lstStyle/>
+          <a:p>
+            <a:pPr algn="ctr"/>
+            <a:r>
+              <a:rPr lang="en-US" dirty="0"/>
+              <a:t>R-GCN</a:t>
+            </a:r>
+          </a:p>
+        </p:txBody>
+      </p:sp>
+      <p:sp>
+        <p:nvSpPr>
+          <p:cNvPr id="34" name="Oval 33">
+            <a:extLst>
+              <a:ext uri="{FF2B5EF4-FFF2-40B4-BE49-F238E27FC236}">
+                <a16:creationId xmlns:a16="http://schemas.microsoft.com/office/drawing/2014/main" id="{D01FFA17-B20B-2AAE-D31A-24FAF8341770}"/>
+              </a:ext>
+            </a:extLst>
+          </p:cNvPr>
+          <p:cNvSpPr/>
+          <p:nvPr/>
+        </p:nvSpPr>
+        <p:spPr>
+          <a:xfrm>
+            <a:off x="1695273" y="2425953"/>
+            <a:ext cx="116638" cy="109573"/>
+          </a:xfrm>
+          <a:prstGeom prst="ellipse">
+            <a:avLst/>
+          </a:prstGeom>
+          <a:solidFill>
+            <a:schemeClr val="accent2">
+              <a:lumMod val="60000"/>
+              <a:lumOff val="40000"/>
+            </a:schemeClr>
+          </a:solidFill>
+          <a:ln>
+            <a:solidFill>
+              <a:srgbClr val="C00000"/>
+            </a:solidFill>
+          </a:ln>
+        </p:spPr>
+        <p:style>
+          <a:lnRef idx="2">
+            <a:schemeClr val="accent1">
+              <a:shade val="50000"/>
+            </a:schemeClr>
+          </a:lnRef>
+          <a:fillRef idx="1">
+            <a:schemeClr val="accent1"/>
+          </a:fillRef>
+          <a:effectRef idx="0">
+            <a:schemeClr val="accent1"/>
+          </a:effectRef>
+          <a:fontRef idx="minor">
+            <a:schemeClr val="lt1"/>
+          </a:fontRef>
+        </p:style>
+        <p:txBody>
+          <a:bodyPr rot="0" spcFirstLastPara="0" vert="horz" wrap="square" lIns="91440" tIns="45720" rIns="91440" bIns="45720" numCol="1" spcCol="0" rtlCol="0" fromWordArt="0" anchor="ctr" anchorCtr="0" forceAA="0" compatLnSpc="1">
+            <a:prstTxWarp prst="textNoShape">
+              <a:avLst/>
+            </a:prstTxWarp>
+            <a:noAutofit/>
+          </a:bodyPr>
+          <a:lstStyle/>
+          <a:p>
+            <a:endParaRPr lang="en-US" dirty="0">
+              <a:solidFill>
+                <a:srgbClr val="0070C0"/>
+              </a:solidFill>
+            </a:endParaRPr>
+          </a:p>
+        </p:txBody>
+      </p:sp>
+      <p:sp>
+        <p:nvSpPr>
+          <p:cNvPr id="37" name="Oval 36">
+            <a:extLst>
+              <a:ext uri="{FF2B5EF4-FFF2-40B4-BE49-F238E27FC236}">
+                <a16:creationId xmlns:a16="http://schemas.microsoft.com/office/drawing/2014/main" id="{527D0FFA-B11B-B889-2657-C69E7FF035B9}"/>
+              </a:ext>
+            </a:extLst>
+          </p:cNvPr>
+          <p:cNvSpPr/>
+          <p:nvPr/>
+        </p:nvSpPr>
+        <p:spPr>
+          <a:xfrm>
+            <a:off x="2161824" y="2474246"/>
+            <a:ext cx="116638" cy="109573"/>
+          </a:xfrm>
+          <a:prstGeom prst="ellipse">
+            <a:avLst/>
+          </a:prstGeom>
+          <a:solidFill>
+            <a:schemeClr val="accent4">
+              <a:lumMod val="20000"/>
+              <a:lumOff val="80000"/>
+            </a:schemeClr>
+          </a:solidFill>
+          <a:ln>
+            <a:solidFill>
+              <a:schemeClr val="accent4">
+                <a:lumMod val="60000"/>
+                <a:lumOff val="40000"/>
+              </a:schemeClr>
+            </a:solidFill>
+          </a:ln>
+        </p:spPr>
+        <p:style>
+          <a:lnRef idx="2">
+            <a:schemeClr val="accent1">
+              <a:shade val="50000"/>
+            </a:schemeClr>
+          </a:lnRef>
+          <a:fillRef idx="1">
+            <a:schemeClr val="accent1"/>
+          </a:fillRef>
+          <a:effectRef idx="0">
+            <a:schemeClr val="accent1"/>
+          </a:effectRef>
+          <a:fontRef idx="minor">
+            <a:schemeClr val="lt1"/>
+          </a:fontRef>
+        </p:style>
+        <p:txBody>
+          <a:bodyPr rot="0" spcFirstLastPara="0" vert="horz" wrap="square" lIns="91440" tIns="45720" rIns="91440" bIns="45720" numCol="1" spcCol="0" rtlCol="0" fromWordArt="0" anchor="ctr" anchorCtr="0" forceAA="0" compatLnSpc="1">
+            <a:prstTxWarp prst="textNoShape">
+              <a:avLst/>
+            </a:prstTxWarp>
+            <a:noAutofit/>
+          </a:bodyPr>
+          <a:lstStyle/>
+          <a:p>
+            <a:endParaRPr lang="en-US" dirty="0">
+              <a:solidFill>
+                <a:srgbClr val="0070C0"/>
+              </a:solidFill>
+            </a:endParaRPr>
+          </a:p>
+        </p:txBody>
+      </p:sp>
+      <p:sp>
+        <p:nvSpPr>
+          <p:cNvPr id="38" name="Oval 37">
+            <a:extLst>
+              <a:ext uri="{FF2B5EF4-FFF2-40B4-BE49-F238E27FC236}">
+                <a16:creationId xmlns:a16="http://schemas.microsoft.com/office/drawing/2014/main" id="{C1E0EFCC-3ABA-283A-C847-9A36894BB99C}"/>
+              </a:ext>
+            </a:extLst>
+          </p:cNvPr>
+          <p:cNvSpPr/>
+          <p:nvPr/>
+        </p:nvSpPr>
+        <p:spPr>
+          <a:xfrm>
+            <a:off x="1682313" y="2920957"/>
+            <a:ext cx="116638" cy="109573"/>
+          </a:xfrm>
+          <a:prstGeom prst="ellipse">
+            <a:avLst/>
+          </a:prstGeom>
+          <a:solidFill>
+            <a:schemeClr val="accent4">
+              <a:lumMod val="20000"/>
+              <a:lumOff val="80000"/>
+            </a:schemeClr>
+          </a:solidFill>
+          <a:ln>
+            <a:solidFill>
+              <a:schemeClr val="accent4">
+                <a:lumMod val="60000"/>
+                <a:lumOff val="40000"/>
+              </a:schemeClr>
+            </a:solidFill>
+          </a:ln>
+        </p:spPr>
+        <p:style>
+          <a:lnRef idx="2">
+            <a:schemeClr val="accent1">
+              <a:shade val="50000"/>
+            </a:schemeClr>
+          </a:lnRef>
+          <a:fillRef idx="1">
+            <a:schemeClr val="accent1"/>
+          </a:fillRef>
+          <a:effectRef idx="0">
+            <a:schemeClr val="accent1"/>
+          </a:effectRef>
+          <a:fontRef idx="minor">
+            <a:schemeClr val="lt1"/>
+          </a:fontRef>
+        </p:style>
+        <p:txBody>
+          <a:bodyPr rot="0" spcFirstLastPara="0" vert="horz" wrap="square" lIns="91440" tIns="45720" rIns="91440" bIns="45720" numCol="1" spcCol="0" rtlCol="0" fromWordArt="0" anchor="ctr" anchorCtr="0" forceAA="0" compatLnSpc="1">
+            <a:prstTxWarp prst="textNoShape">
+              <a:avLst/>
+            </a:prstTxWarp>
+            <a:noAutofit/>
+          </a:bodyPr>
+          <a:lstStyle/>
+          <a:p>
+            <a:endParaRPr lang="en-US" dirty="0">
+              <a:solidFill>
+                <a:srgbClr val="0070C0"/>
+              </a:solidFill>
+            </a:endParaRPr>
+          </a:p>
+        </p:txBody>
+      </p:sp>
+      <p:cxnSp>
+        <p:nvCxnSpPr>
+          <p:cNvPr id="19" name="Straight Arrow Connector 18">
+            <a:extLst>
+              <a:ext uri="{FF2B5EF4-FFF2-40B4-BE49-F238E27FC236}">
+                <a16:creationId xmlns:a16="http://schemas.microsoft.com/office/drawing/2014/main" id="{70488C0B-5358-5158-73DD-50419C312F3D}"/>
+              </a:ext>
+            </a:extLst>
+          </p:cNvPr>
+          <p:cNvCxnSpPr>
+            <a:stCxn id="38" idx="7"/>
+            <a:endCxn id="37" idx="3"/>
+          </p:cNvCxnSpPr>
+          <p:nvPr/>
+        </p:nvCxnSpPr>
+        <p:spPr>
+          <a:xfrm flipV="1">
+            <a:off x="1781870" y="2567482"/>
+            <a:ext cx="397036" cy="369055"/>
+          </a:xfrm>
+          <a:prstGeom prst="straightConnector1">
+            <a:avLst/>
+          </a:prstGeom>
+          <a:ln w="12700">
+            <a:solidFill>
+              <a:schemeClr val="tx1"/>
+            </a:solidFill>
+            <a:tailEnd type="triangle" w="sm" len="med"/>
+          </a:ln>
+        </p:spPr>
+        <p:style>
+          <a:lnRef idx="1">
+            <a:schemeClr val="accent1"/>
+          </a:lnRef>
+          <a:fillRef idx="0">
+            <a:schemeClr val="accent1"/>
+          </a:fillRef>
+          <a:effectRef idx="0">
+            <a:schemeClr val="accent1"/>
+          </a:effectRef>
+          <a:fontRef idx="minor">
+            <a:schemeClr val="tx1"/>
+          </a:fontRef>
+        </p:style>
+      </p:cxnSp>
+      <p:cxnSp>
+        <p:nvCxnSpPr>
+          <p:cNvPr id="22" name="Straight Arrow Connector 21">
+            <a:extLst>
+              <a:ext uri="{FF2B5EF4-FFF2-40B4-BE49-F238E27FC236}">
+                <a16:creationId xmlns:a16="http://schemas.microsoft.com/office/drawing/2014/main" id="{2D84153F-7DC3-B17C-7FAC-7372CB571638}"/>
+              </a:ext>
+            </a:extLst>
+          </p:cNvPr>
+          <p:cNvCxnSpPr>
+            <a:endCxn id="38" idx="3"/>
+          </p:cNvCxnSpPr>
+          <p:nvPr/>
+        </p:nvCxnSpPr>
+        <p:spPr>
+          <a:xfrm flipV="1">
+            <a:off x="1540767" y="3014008"/>
+            <a:ext cx="158164" cy="234873"/>
+          </a:xfrm>
+          <a:prstGeom prst="straightConnector1">
+            <a:avLst/>
+          </a:prstGeom>
+          <a:ln w="12700">
+            <a:solidFill>
+              <a:schemeClr val="tx1"/>
+            </a:solidFill>
+            <a:tailEnd type="triangle" w="sm" len="med"/>
+          </a:ln>
+        </p:spPr>
+        <p:style>
+          <a:lnRef idx="1">
+            <a:schemeClr val="accent1"/>
+          </a:lnRef>
+          <a:fillRef idx="0">
+            <a:schemeClr val="accent1"/>
+          </a:fillRef>
+          <a:effectRef idx="0">
+            <a:schemeClr val="accent1"/>
+          </a:effectRef>
+          <a:fontRef idx="minor">
+            <a:schemeClr val="tx1"/>
+          </a:fontRef>
+        </p:style>
+      </p:cxnSp>
+      <p:cxnSp>
+        <p:nvCxnSpPr>
+          <p:cNvPr id="23" name="Straight Arrow Connector 22">
+            <a:extLst>
+              <a:ext uri="{FF2B5EF4-FFF2-40B4-BE49-F238E27FC236}">
+                <a16:creationId xmlns:a16="http://schemas.microsoft.com/office/drawing/2014/main" id="{46592C84-9145-455F-1638-93C5F2834F25}"/>
+              </a:ext>
+            </a:extLst>
+          </p:cNvPr>
+          <p:cNvCxnSpPr>
+            <a:stCxn id="38" idx="0"/>
+            <a:endCxn id="34" idx="4"/>
+          </p:cNvCxnSpPr>
+          <p:nvPr/>
+        </p:nvCxnSpPr>
+        <p:spPr>
+          <a:xfrm flipV="1">
+            <a:off x="1740632" y="2535251"/>
+            <a:ext cx="12960" cy="385247"/>
+          </a:xfrm>
+          <a:prstGeom prst="straightConnector1">
+            <a:avLst/>
+          </a:prstGeom>
+          <a:ln w="12700">
+            <a:solidFill>
+              <a:schemeClr val="tx1"/>
+            </a:solidFill>
+            <a:tailEnd type="triangle" w="sm" len="med"/>
+          </a:ln>
+        </p:spPr>
+        <p:style>
+          <a:lnRef idx="1">
+            <a:schemeClr val="accent1"/>
+          </a:lnRef>
+          <a:fillRef idx="0">
+            <a:schemeClr val="accent1"/>
+          </a:fillRef>
+          <a:effectRef idx="0">
+            <a:schemeClr val="accent1"/>
+          </a:effectRef>
+          <a:fontRef idx="minor">
+            <a:schemeClr val="tx1"/>
+          </a:fontRef>
+        </p:style>
+      </p:cxnSp>
+      <p:cxnSp>
+        <p:nvCxnSpPr>
+          <p:cNvPr id="24" name="Straight Arrow Connector 23">
+            <a:extLst>
+              <a:ext uri="{FF2B5EF4-FFF2-40B4-BE49-F238E27FC236}">
+                <a16:creationId xmlns:a16="http://schemas.microsoft.com/office/drawing/2014/main" id="{7430C076-FC99-A882-1F77-687394D73CA0}"/>
+              </a:ext>
+            </a:extLst>
+          </p:cNvPr>
+          <p:cNvCxnSpPr>
+            <a:stCxn id="37" idx="2"/>
+            <a:endCxn id="34" idx="6"/>
+          </p:cNvCxnSpPr>
+          <p:nvPr/>
+        </p:nvCxnSpPr>
+        <p:spPr>
+          <a:xfrm flipH="1" flipV="1">
+            <a:off x="1811911" y="2480491"/>
+            <a:ext cx="349913" cy="48270"/>
+          </a:xfrm>
+          <a:prstGeom prst="straightConnector1">
+            <a:avLst/>
+          </a:prstGeom>
+          <a:ln w="12700">
+            <a:solidFill>
+              <a:schemeClr val="tx1"/>
+            </a:solidFill>
+            <a:tailEnd type="triangle" w="sm" len="med"/>
+          </a:ln>
+        </p:spPr>
+        <p:style>
+          <a:lnRef idx="1">
+            <a:schemeClr val="accent1"/>
+          </a:lnRef>
+          <a:fillRef idx="0">
+            <a:schemeClr val="accent1"/>
+          </a:fillRef>
+          <a:effectRef idx="0">
+            <a:schemeClr val="accent1"/>
+          </a:effectRef>
+          <a:fontRef idx="minor">
+            <a:schemeClr val="tx1"/>
+          </a:fontRef>
+        </p:style>
+      </p:cxnSp>
+      <p:sp>
+        <p:nvSpPr>
+          <p:cNvPr id="30" name="Text Box 2">
+            <a:extLst>
+              <a:ext uri="{FF2B5EF4-FFF2-40B4-BE49-F238E27FC236}">
+                <a16:creationId xmlns:a16="http://schemas.microsoft.com/office/drawing/2014/main" id="{9760F0C1-93CD-17B7-C0C9-52BDDB811BEA}"/>
+              </a:ext>
+            </a:extLst>
+          </p:cNvPr>
+          <p:cNvSpPr txBox="1">
+            <a:spLocks noChangeArrowheads="1"/>
+          </p:cNvSpPr>
+          <p:nvPr/>
+        </p:nvSpPr>
+        <p:spPr bwMode="auto">
+          <a:xfrm>
+            <a:off x="1764331" y="2153713"/>
+            <a:ext cx="406392" cy="281362"/>
+          </a:xfrm>
+          <a:prstGeom prst="rect">
+            <a:avLst/>
+          </a:prstGeom>
+          <a:noFill/>
+          <a:ln w="9525">
+            <a:noFill/>
+            <a:miter lim="800000"/>
+            <a:headEnd/>
+            <a:tailEnd/>
+          </a:ln>
+        </p:spPr>
+        <p:txBody>
+          <a:bodyPr rot="0" vert="horz" wrap="square" lIns="91440" tIns="45720" rIns="91440" bIns="45720" anchor="t" anchorCtr="0">
+            <a:noAutofit/>
+          </a:bodyPr>
+          <a:lstStyle/>
+          <a:p>
+            <a:pPr marL="0" marR="0">
+              <a:lnSpc>
+                <a:spcPct val="107000"/>
+              </a:lnSpc>
+              <a:spcBef>
+                <a:spcPts val="0"/>
+              </a:spcBef>
+              <a:spcAft>
+                <a:spcPts val="800"/>
+              </a:spcAft>
+            </a:pPr>
+            <a:r>
+              <a:rPr lang="en-US" sz="1600" dirty="0">
+                <a:solidFill>
+                  <a:srgbClr val="0070C0"/>
+                </a:solidFill>
+                <a:effectLst/>
+                <a:latin typeface="Calibri" panose="020F0502020204030204" pitchFamily="34" charset="0"/>
+                <a:ea typeface="DengXian" panose="02010600030101010101" pitchFamily="2" charset="-122"/>
+                <a:cs typeface="Times New Roman" panose="02020603050405020304" pitchFamily="18" charset="0"/>
+              </a:rPr>
+              <a:t>S3</a:t>
+            </a:r>
+          </a:p>
+        </p:txBody>
+      </p:sp>
+      <p:sp>
+        <p:nvSpPr>
+          <p:cNvPr id="31" name="Text Box 2">
+            <a:extLst>
+              <a:ext uri="{FF2B5EF4-FFF2-40B4-BE49-F238E27FC236}">
+                <a16:creationId xmlns:a16="http://schemas.microsoft.com/office/drawing/2014/main" id="{27F0A3C5-A664-4BC7-9AA0-3C6EF2FA84AA}"/>
+              </a:ext>
+            </a:extLst>
+          </p:cNvPr>
+          <p:cNvSpPr txBox="1">
+            <a:spLocks noChangeArrowheads="1"/>
+          </p:cNvSpPr>
+          <p:nvPr/>
+        </p:nvSpPr>
+        <p:spPr bwMode="auto">
+          <a:xfrm>
+            <a:off x="2028198" y="2595858"/>
+            <a:ext cx="406392" cy="281362"/>
+          </a:xfrm>
+          <a:prstGeom prst="rect">
+            <a:avLst/>
+          </a:prstGeom>
+          <a:noFill/>
+          <a:ln w="9525">
+            <a:noFill/>
+            <a:miter lim="800000"/>
+            <a:headEnd/>
+            <a:tailEnd/>
+          </a:ln>
+        </p:spPr>
+        <p:txBody>
+          <a:bodyPr rot="0" vert="horz" wrap="square" lIns="91440" tIns="45720" rIns="91440" bIns="45720" anchor="t" anchorCtr="0">
+            <a:noAutofit/>
+          </a:bodyPr>
+          <a:lstStyle/>
+          <a:p>
+            <a:pPr marL="0" marR="0">
+              <a:lnSpc>
+                <a:spcPct val="107000"/>
+              </a:lnSpc>
+              <a:spcBef>
+                <a:spcPts val="0"/>
+              </a:spcBef>
+              <a:spcAft>
+                <a:spcPts val="800"/>
+              </a:spcAft>
+            </a:pPr>
+            <a:r>
+              <a:rPr lang="en-US" sz="1600" dirty="0">
+                <a:solidFill>
+                  <a:srgbClr val="0070C0"/>
+                </a:solidFill>
+                <a:effectLst/>
+                <a:latin typeface="Calibri" panose="020F0502020204030204" pitchFamily="34" charset="0"/>
+                <a:ea typeface="DengXian" panose="02010600030101010101" pitchFamily="2" charset="-122"/>
+                <a:cs typeface="Times New Roman" panose="02020603050405020304" pitchFamily="18" charset="0"/>
+              </a:rPr>
+              <a:t>S4</a:t>
+            </a:r>
+          </a:p>
+        </p:txBody>
+      </p:sp>
+      <p:sp>
+        <p:nvSpPr>
+          <p:cNvPr id="32" name="Text Box 2">
+            <a:extLst>
+              <a:ext uri="{FF2B5EF4-FFF2-40B4-BE49-F238E27FC236}">
+                <a16:creationId xmlns:a16="http://schemas.microsoft.com/office/drawing/2014/main" id="{F35CACFB-C4A0-24D4-35ED-D7FAE9691DAE}"/>
+              </a:ext>
+            </a:extLst>
+          </p:cNvPr>
+          <p:cNvSpPr txBox="1">
+            <a:spLocks noChangeArrowheads="1"/>
+          </p:cNvSpPr>
+          <p:nvPr/>
+        </p:nvSpPr>
+        <p:spPr bwMode="auto">
+          <a:xfrm>
+            <a:off x="1334240" y="2874856"/>
+            <a:ext cx="406392" cy="281362"/>
+          </a:xfrm>
+          <a:prstGeom prst="rect">
+            <a:avLst/>
+          </a:prstGeom>
+          <a:noFill/>
+          <a:ln w="9525">
+            <a:noFill/>
+            <a:miter lim="800000"/>
+            <a:headEnd/>
+            <a:tailEnd/>
+          </a:ln>
+        </p:spPr>
+        <p:txBody>
+          <a:bodyPr rot="0" vert="horz" wrap="square" lIns="91440" tIns="45720" rIns="91440" bIns="45720" anchor="t" anchorCtr="0">
+            <a:noAutofit/>
+          </a:bodyPr>
+          <a:lstStyle/>
+          <a:p>
+            <a:pPr marL="0" marR="0">
+              <a:lnSpc>
+                <a:spcPct val="107000"/>
+              </a:lnSpc>
+              <a:spcBef>
+                <a:spcPts val="0"/>
+              </a:spcBef>
+              <a:spcAft>
+                <a:spcPts val="800"/>
+              </a:spcAft>
+            </a:pPr>
+            <a:r>
+              <a:rPr lang="en-US" sz="1600" dirty="0">
+                <a:solidFill>
+                  <a:srgbClr val="0070C0"/>
+                </a:solidFill>
+                <a:effectLst/>
+                <a:latin typeface="Calibri" panose="020F0502020204030204" pitchFamily="34" charset="0"/>
+                <a:ea typeface="DengXian" panose="02010600030101010101" pitchFamily="2" charset="-122"/>
+                <a:cs typeface="Times New Roman" panose="02020603050405020304" pitchFamily="18" charset="0"/>
+              </a:rPr>
+              <a:t>S5</a:t>
+            </a:r>
+          </a:p>
+        </p:txBody>
+      </p:sp>
+      <p:sp>
+        <p:nvSpPr>
+          <p:cNvPr id="40" name="TextBox 39">
+            <a:extLst>
+              <a:ext uri="{FF2B5EF4-FFF2-40B4-BE49-F238E27FC236}">
+                <a16:creationId xmlns:a16="http://schemas.microsoft.com/office/drawing/2014/main" id="{5456C7A7-4E6A-B06D-A0A2-BF15EFB5DAA3}"/>
+              </a:ext>
+            </a:extLst>
+          </p:cNvPr>
+          <p:cNvSpPr txBox="1"/>
+          <p:nvPr/>
+        </p:nvSpPr>
+        <p:spPr>
+          <a:xfrm>
+            <a:off x="1679991" y="1928916"/>
+            <a:ext cx="2637631" cy="707886"/>
+          </a:xfrm>
+          <a:prstGeom prst="rect">
+            <a:avLst/>
+          </a:prstGeom>
+          <a:noFill/>
+        </p:spPr>
+        <p:txBody>
+          <a:bodyPr wrap="square" rtlCol="0">
+            <a:spAutoFit/>
+          </a:bodyPr>
+          <a:lstStyle/>
+          <a:p>
+            <a:pPr algn="ctr"/>
+            <a:r>
+              <a:rPr lang="en-US" sz="2000" i="1" dirty="0"/>
+              <a:t>PDG subgraph from source code</a:t>
+            </a:r>
+          </a:p>
+        </p:txBody>
+      </p:sp>
+      <p:sp>
+        <p:nvSpPr>
+          <p:cNvPr id="47" name="TextBox 46">
+            <a:extLst>
+              <a:ext uri="{FF2B5EF4-FFF2-40B4-BE49-F238E27FC236}">
+                <a16:creationId xmlns:a16="http://schemas.microsoft.com/office/drawing/2014/main" id="{CB2ABDEA-8EFB-671E-DDA9-E05E4DBB08D3}"/>
+              </a:ext>
+            </a:extLst>
+          </p:cNvPr>
+          <p:cNvSpPr txBox="1"/>
+          <p:nvPr/>
+        </p:nvSpPr>
+        <p:spPr>
+          <a:xfrm>
+            <a:off x="1821289" y="2975044"/>
+            <a:ext cx="818382" cy="369332"/>
+          </a:xfrm>
+          <a:prstGeom prst="rect">
+            <a:avLst/>
+          </a:prstGeom>
+          <a:noFill/>
+        </p:spPr>
+        <p:txBody>
+          <a:bodyPr wrap="none" rtlCol="0">
+            <a:spAutoFit/>
+          </a:bodyPr>
+          <a:lstStyle/>
+          <a:p>
+            <a:pPr algn="ctr"/>
+            <a:r>
+              <a:rPr lang="en-US" dirty="0"/>
+              <a:t>Training</a:t>
+            </a:r>
+          </a:p>
+        </p:txBody>
+      </p:sp>
+      <p:cxnSp>
+        <p:nvCxnSpPr>
+          <p:cNvPr id="56" name="Connector: Elbow 55">
+            <a:extLst>
+              <a:ext uri="{FF2B5EF4-FFF2-40B4-BE49-F238E27FC236}">
+                <a16:creationId xmlns:a16="http://schemas.microsoft.com/office/drawing/2014/main" id="{4E71D239-9B1F-D65B-96B5-22186B5B1599}"/>
+              </a:ext>
+            </a:extLst>
+          </p:cNvPr>
+          <p:cNvCxnSpPr>
+            <a:cxnSpLocks/>
+          </p:cNvCxnSpPr>
+          <p:nvPr/>
+        </p:nvCxnSpPr>
+        <p:spPr>
+          <a:xfrm>
+            <a:off x="1757202" y="3112109"/>
+            <a:ext cx="933504" cy="181564"/>
+          </a:xfrm>
+          <a:prstGeom prst="bentConnector3">
+            <a:avLst>
+              <a:gd name="adj1" fmla="val -288"/>
+            </a:avLst>
+          </a:prstGeom>
+          <a:ln>
+            <a:tailEnd type="triangle"/>
+          </a:ln>
+        </p:spPr>
+        <p:style>
+          <a:lnRef idx="1">
+            <a:schemeClr val="dk1"/>
+          </a:lnRef>
+          <a:fillRef idx="0">
+            <a:schemeClr val="dk1"/>
+          </a:fillRef>
+          <a:effectRef idx="0">
+            <a:schemeClr val="dk1"/>
+          </a:effectRef>
+          <a:fontRef idx="minor">
+            <a:schemeClr val="tx1"/>
+          </a:fontRef>
+        </p:style>
+      </p:cxnSp>
+      <p:cxnSp>
+        <p:nvCxnSpPr>
+          <p:cNvPr id="58" name="Connector: Elbow 57">
+            <a:extLst>
+              <a:ext uri="{FF2B5EF4-FFF2-40B4-BE49-F238E27FC236}">
+                <a16:creationId xmlns:a16="http://schemas.microsoft.com/office/drawing/2014/main" id="{DABB5391-7353-16E1-4208-6CA68FE555E5}"/>
+              </a:ext>
+            </a:extLst>
+          </p:cNvPr>
+          <p:cNvCxnSpPr>
+            <a:cxnSpLocks/>
+          </p:cNvCxnSpPr>
+          <p:nvPr/>
+        </p:nvCxnSpPr>
+        <p:spPr>
+          <a:xfrm flipV="1">
+            <a:off x="1733500" y="3349809"/>
+            <a:ext cx="1254116" cy="509547"/>
+          </a:xfrm>
+          <a:prstGeom prst="bentConnector3">
+            <a:avLst>
+              <a:gd name="adj1" fmla="val 219"/>
+            </a:avLst>
+          </a:prstGeom>
+          <a:ln>
+            <a:prstDash val="dash"/>
+            <a:tailEnd type="triangle"/>
+          </a:ln>
+        </p:spPr>
+        <p:style>
+          <a:lnRef idx="1">
+            <a:schemeClr val="dk1"/>
+          </a:lnRef>
+          <a:fillRef idx="0">
+            <a:schemeClr val="dk1"/>
+          </a:fillRef>
+          <a:effectRef idx="0">
+            <a:schemeClr val="dk1"/>
+          </a:effectRef>
+          <a:fontRef idx="minor">
+            <a:schemeClr val="tx1"/>
+          </a:fontRef>
+        </p:style>
+      </p:cxnSp>
+      <p:sp>
+        <p:nvSpPr>
+          <p:cNvPr id="64" name="TextBox 63">
+            <a:extLst>
+              <a:ext uri="{FF2B5EF4-FFF2-40B4-BE49-F238E27FC236}">
+                <a16:creationId xmlns:a16="http://schemas.microsoft.com/office/drawing/2014/main" id="{C9E08E32-9E3F-4118-6951-2D9E990E743B}"/>
+              </a:ext>
+            </a:extLst>
+          </p:cNvPr>
+          <p:cNvSpPr txBox="1"/>
+          <p:nvPr/>
+        </p:nvSpPr>
+        <p:spPr>
+          <a:xfrm>
+            <a:off x="1570784" y="3290459"/>
+            <a:ext cx="1335820" cy="369332"/>
+          </a:xfrm>
+          <a:prstGeom prst="rect">
+            <a:avLst/>
+          </a:prstGeom>
+          <a:noFill/>
+        </p:spPr>
+        <p:txBody>
+          <a:bodyPr wrap="square" rtlCol="0">
+            <a:spAutoFit/>
+          </a:bodyPr>
+          <a:lstStyle/>
+          <a:p>
+            <a:pPr algn="ctr"/>
+            <a:r>
+              <a:rPr lang="en-US" dirty="0"/>
+              <a:t>Predicting</a:t>
+            </a:r>
+          </a:p>
+        </p:txBody>
+      </p:sp>
+      <p:grpSp>
+        <p:nvGrpSpPr>
+          <p:cNvPr id="69" name="Group 68">
+            <a:extLst>
+              <a:ext uri="{FF2B5EF4-FFF2-40B4-BE49-F238E27FC236}">
+                <a16:creationId xmlns:a16="http://schemas.microsoft.com/office/drawing/2014/main" id="{4F7D6099-EF1A-DF2F-A520-CC1DB6B02A6A}"/>
+              </a:ext>
+            </a:extLst>
+          </p:cNvPr>
+          <p:cNvGrpSpPr/>
+          <p:nvPr/>
+        </p:nvGrpSpPr>
+        <p:grpSpPr>
+          <a:xfrm>
+            <a:off x="6529652" y="2535251"/>
+            <a:ext cx="1513414" cy="1663700"/>
+            <a:chOff x="4930286" y="2611370"/>
+            <a:chExt cx="1561305" cy="1663700"/>
+          </a:xfrm>
+        </p:grpSpPr>
+        <p:sp>
+          <p:nvSpPr>
+            <p:cNvPr id="65" name="Rectangle: Rounded Corners 64">
+              <a:extLst>
+                <a:ext uri="{FF2B5EF4-FFF2-40B4-BE49-F238E27FC236}">
+                  <a16:creationId xmlns:a16="http://schemas.microsoft.com/office/drawing/2014/main" id="{27F41A77-DBB6-21DD-6834-B2F4379C8EDC}"/>
+                </a:ext>
+              </a:extLst>
+            </p:cNvPr>
+            <p:cNvSpPr/>
+            <p:nvPr/>
+          </p:nvSpPr>
+          <p:spPr>
+            <a:xfrm>
+              <a:off x="4930286" y="2611370"/>
+              <a:ext cx="1561305" cy="1663700"/>
+            </a:xfrm>
+            <a:prstGeom prst="roundRect">
+              <a:avLst/>
+            </a:prstGeom>
+            <a:noFill/>
+            <a:ln>
+              <a:solidFill>
+                <a:schemeClr val="accent1">
+                  <a:lumMod val="50000"/>
+                </a:schemeClr>
+              </a:solidFill>
+            </a:ln>
+          </p:spPr>
+          <p:style>
+            <a:lnRef idx="2">
+              <a:schemeClr val="accent1">
+                <a:shade val="50000"/>
+              </a:schemeClr>
+            </a:lnRef>
+            <a:fillRef idx="1">
+              <a:schemeClr val="accent1"/>
+            </a:fillRef>
+            <a:effectRef idx="0">
+              <a:schemeClr val="accent1"/>
+            </a:effectRef>
+            <a:fontRef idx="minor">
+              <a:schemeClr val="lt1"/>
+            </a:fontRef>
+          </p:style>
+          <p:txBody>
+            <a:bodyPr rot="0" spcFirstLastPara="0" vert="horz" wrap="square" lIns="91440" tIns="45720" rIns="91440" bIns="45720" numCol="1" spcCol="0" rtlCol="0" fromWordArt="0" anchor="ctr" anchorCtr="0" forceAA="0" compatLnSpc="1">
+              <a:prstTxWarp prst="textNoShape">
+                <a:avLst/>
+              </a:prstTxWarp>
+              <a:noAutofit/>
+            </a:bodyPr>
+            <a:lstStyle/>
+            <a:p>
+              <a:endParaRPr lang="en-US"/>
+            </a:p>
+          </p:txBody>
+        </p:sp>
+        <p:sp>
+          <p:nvSpPr>
+            <p:cNvPr id="66" name="Rectangle: Rounded Corners 65">
+              <a:extLst>
+                <a:ext uri="{FF2B5EF4-FFF2-40B4-BE49-F238E27FC236}">
+                  <a16:creationId xmlns:a16="http://schemas.microsoft.com/office/drawing/2014/main" id="{C5C4434A-ABEB-CB9B-C1A0-0758F62CFB73}"/>
+                </a:ext>
+              </a:extLst>
+            </p:cNvPr>
+            <p:cNvSpPr/>
+            <p:nvPr/>
+          </p:nvSpPr>
+          <p:spPr>
+            <a:xfrm>
+              <a:off x="5038928" y="2696206"/>
+              <a:ext cx="1266244" cy="304521"/>
+            </a:xfrm>
+            <a:prstGeom prst="roundRect">
+              <a:avLst>
+                <a:gd name="adj" fmla="val 0"/>
+              </a:avLst>
+            </a:prstGeom>
+            <a:noFill/>
+            <a:ln>
+              <a:solidFill>
+                <a:schemeClr val="tx1"/>
+              </a:solidFill>
+            </a:ln>
+          </p:spPr>
+          <p:style>
+            <a:lnRef idx="2">
+              <a:schemeClr val="accent1">
+                <a:shade val="50000"/>
+              </a:schemeClr>
+            </a:lnRef>
+            <a:fillRef idx="1">
+              <a:schemeClr val="accent1"/>
+            </a:fillRef>
+            <a:effectRef idx="0">
+              <a:schemeClr val="accent1"/>
+            </a:effectRef>
+            <a:fontRef idx="minor">
+              <a:schemeClr val="lt1"/>
+            </a:fontRef>
+          </p:style>
+          <p:txBody>
+            <a:bodyPr rot="0" spcFirstLastPara="0" vert="horz" wrap="square" lIns="45720" tIns="0" rIns="45720" bIns="0" numCol="1" spcCol="0" rtlCol="0" fromWordArt="0" anchor="ctr" anchorCtr="0" forceAA="0" compatLnSpc="1">
+              <a:prstTxWarp prst="textNoShape">
+                <a:avLst/>
+              </a:prstTxWarp>
+              <a:noAutofit/>
+            </a:bodyPr>
+            <a:lstStyle/>
+            <a:p>
+              <a:pPr marL="0" marR="0" algn="ctr">
+                <a:lnSpc>
+                  <a:spcPct val="107000"/>
+                </a:lnSpc>
+                <a:spcBef>
+                  <a:spcPts val="0"/>
+                </a:spcBef>
+                <a:spcAft>
+                  <a:spcPts val="800"/>
+                </a:spcAft>
+              </a:pPr>
+              <a:r>
+                <a:rPr lang="en-US" dirty="0">
+                  <a:solidFill>
+                    <a:srgbClr val="000000"/>
+                  </a:solidFill>
+                  <a:ea typeface="DengXian" panose="02010600030101010101" pitchFamily="2" charset="-122"/>
+                  <a:cs typeface="Times New Roman" panose="02020603050405020304" pitchFamily="18" charset="0"/>
+                </a:rPr>
+                <a:t>Classifier-E1</a:t>
+              </a:r>
+              <a:endParaRPr lang="en-US" dirty="0">
+                <a:effectLst/>
+                <a:ea typeface="DengXian" panose="02010600030101010101" pitchFamily="2" charset="-122"/>
+                <a:cs typeface="Times New Roman" panose="02020603050405020304" pitchFamily="18" charset="0"/>
+              </a:endParaRPr>
+            </a:p>
+          </p:txBody>
+        </p:sp>
+      </p:grpSp>
+      <p:sp>
+        <p:nvSpPr>
+          <p:cNvPr id="70" name="TextBox 69">
+            <a:extLst>
+              <a:ext uri="{FF2B5EF4-FFF2-40B4-BE49-F238E27FC236}">
+                <a16:creationId xmlns:a16="http://schemas.microsoft.com/office/drawing/2014/main" id="{1A999AB6-93A1-8A23-B58A-E9CE4F5071A7}"/>
+              </a:ext>
+            </a:extLst>
+          </p:cNvPr>
+          <p:cNvSpPr txBox="1"/>
+          <p:nvPr/>
+        </p:nvSpPr>
+        <p:spPr>
+          <a:xfrm>
+            <a:off x="8054753" y="2566147"/>
+            <a:ext cx="485519" cy="369332"/>
+          </a:xfrm>
+          <a:prstGeom prst="rect">
+            <a:avLst/>
+          </a:prstGeom>
+          <a:noFill/>
+        </p:spPr>
+        <p:txBody>
+          <a:bodyPr wrap="none" rtlCol="0">
+            <a:spAutoFit/>
+          </a:bodyPr>
+          <a:lstStyle/>
+          <a:p>
+            <a:pPr algn="ctr"/>
+            <a:r>
+              <a:rPr lang="en-US" dirty="0"/>
+              <a:t>Yes</a:t>
+            </a:r>
+          </a:p>
+        </p:txBody>
+      </p:sp>
+      <p:cxnSp>
+        <p:nvCxnSpPr>
+          <p:cNvPr id="71" name="Straight Arrow Connector 70">
+            <a:extLst>
+              <a:ext uri="{FF2B5EF4-FFF2-40B4-BE49-F238E27FC236}">
+                <a16:creationId xmlns:a16="http://schemas.microsoft.com/office/drawing/2014/main" id="{4CFFCCC3-B473-49B6-EA7B-A4D5C37D0384}"/>
+              </a:ext>
+            </a:extLst>
+          </p:cNvPr>
+          <p:cNvCxnSpPr>
+            <a:cxnSpLocks/>
+          </p:cNvCxnSpPr>
+          <p:nvPr/>
+        </p:nvCxnSpPr>
+        <p:spPr>
+          <a:xfrm>
+            <a:off x="7904536" y="2780455"/>
+            <a:ext cx="243840" cy="0"/>
+          </a:xfrm>
+          <a:prstGeom prst="straightConnector1">
+            <a:avLst/>
+          </a:prstGeom>
+          <a:ln w="12700">
+            <a:tailEnd type="triangle"/>
+          </a:ln>
+        </p:spPr>
+        <p:style>
+          <a:lnRef idx="1">
+            <a:schemeClr val="dk1"/>
+          </a:lnRef>
+          <a:fillRef idx="0">
+            <a:schemeClr val="dk1"/>
+          </a:fillRef>
+          <a:effectRef idx="0">
+            <a:schemeClr val="dk1"/>
+          </a:effectRef>
+          <a:fontRef idx="minor">
+            <a:schemeClr val="tx1"/>
+          </a:fontRef>
+        </p:style>
+      </p:cxnSp>
+      <p:cxnSp>
+        <p:nvCxnSpPr>
+          <p:cNvPr id="72" name="Straight Arrow Connector 71">
+            <a:extLst>
+              <a:ext uri="{FF2B5EF4-FFF2-40B4-BE49-F238E27FC236}">
+                <a16:creationId xmlns:a16="http://schemas.microsoft.com/office/drawing/2014/main" id="{206ECC40-DEE2-6C2C-4208-E7EF51C18CBF}"/>
+              </a:ext>
+            </a:extLst>
+          </p:cNvPr>
+          <p:cNvCxnSpPr>
+            <a:cxnSpLocks/>
+          </p:cNvCxnSpPr>
+          <p:nvPr/>
+        </p:nvCxnSpPr>
+        <p:spPr>
+          <a:xfrm>
+            <a:off x="7904536" y="3115107"/>
+            <a:ext cx="243840" cy="0"/>
+          </a:xfrm>
+          <a:prstGeom prst="straightConnector1">
+            <a:avLst/>
+          </a:prstGeom>
+          <a:ln w="12700">
+            <a:tailEnd type="triangle"/>
+          </a:ln>
+        </p:spPr>
+        <p:style>
+          <a:lnRef idx="1">
+            <a:schemeClr val="dk1"/>
+          </a:lnRef>
+          <a:fillRef idx="0">
+            <a:schemeClr val="dk1"/>
+          </a:fillRef>
+          <a:effectRef idx="0">
+            <a:schemeClr val="dk1"/>
+          </a:effectRef>
+          <a:fontRef idx="minor">
+            <a:schemeClr val="tx1"/>
+          </a:fontRef>
+        </p:style>
+      </p:cxnSp>
+      <p:sp>
+        <p:nvSpPr>
+          <p:cNvPr id="73" name="TextBox 72">
+            <a:extLst>
+              <a:ext uri="{FF2B5EF4-FFF2-40B4-BE49-F238E27FC236}">
+                <a16:creationId xmlns:a16="http://schemas.microsoft.com/office/drawing/2014/main" id="{ED532153-6942-1D48-F960-6B6F22C4922A}"/>
+              </a:ext>
+            </a:extLst>
+          </p:cNvPr>
+          <p:cNvSpPr txBox="1"/>
+          <p:nvPr/>
+        </p:nvSpPr>
+        <p:spPr>
+          <a:xfrm>
+            <a:off x="8069724" y="2910039"/>
+            <a:ext cx="455574" cy="369332"/>
+          </a:xfrm>
+          <a:prstGeom prst="rect">
+            <a:avLst/>
+          </a:prstGeom>
+          <a:noFill/>
+        </p:spPr>
+        <p:txBody>
+          <a:bodyPr wrap="none" rtlCol="0">
+            <a:spAutoFit/>
+          </a:bodyPr>
+          <a:lstStyle/>
+          <a:p>
+            <a:pPr algn="ctr"/>
+            <a:r>
+              <a:rPr lang="en-US" dirty="0"/>
+              <a:t>No</a:t>
+            </a:r>
+          </a:p>
+        </p:txBody>
+      </p:sp>
+      <p:sp>
+        <p:nvSpPr>
+          <p:cNvPr id="75" name="TextBox 74">
+            <a:extLst>
+              <a:ext uri="{FF2B5EF4-FFF2-40B4-BE49-F238E27FC236}">
+                <a16:creationId xmlns:a16="http://schemas.microsoft.com/office/drawing/2014/main" id="{2966E5C6-EC0A-A887-F4FF-4096B73D975A}"/>
+              </a:ext>
+            </a:extLst>
+          </p:cNvPr>
+          <p:cNvSpPr txBox="1"/>
+          <p:nvPr/>
+        </p:nvSpPr>
+        <p:spPr>
+          <a:xfrm>
+            <a:off x="8039781" y="3730140"/>
+            <a:ext cx="485519" cy="369332"/>
+          </a:xfrm>
+          <a:prstGeom prst="rect">
+            <a:avLst/>
+          </a:prstGeom>
+          <a:noFill/>
+        </p:spPr>
+        <p:txBody>
+          <a:bodyPr wrap="none" rtlCol="0">
+            <a:spAutoFit/>
+          </a:bodyPr>
+          <a:lstStyle/>
+          <a:p>
+            <a:pPr algn="ctr"/>
+            <a:r>
+              <a:rPr lang="en-US" dirty="0"/>
+              <a:t>Yes</a:t>
+            </a:r>
+          </a:p>
+        </p:txBody>
+      </p:sp>
+      <p:sp>
+        <p:nvSpPr>
+          <p:cNvPr id="76" name="Rectangle: Rounded Corners 75">
+            <a:extLst>
+              <a:ext uri="{FF2B5EF4-FFF2-40B4-BE49-F238E27FC236}">
+                <a16:creationId xmlns:a16="http://schemas.microsoft.com/office/drawing/2014/main" id="{E3365C50-33A7-6B31-5BC8-66CBB7A10D8E}"/>
+              </a:ext>
+            </a:extLst>
+          </p:cNvPr>
+          <p:cNvSpPr/>
+          <p:nvPr/>
+        </p:nvSpPr>
+        <p:spPr>
+          <a:xfrm>
+            <a:off x="6638292" y="2978098"/>
+            <a:ext cx="1266244" cy="304521"/>
+          </a:xfrm>
+          <a:prstGeom prst="roundRect">
+            <a:avLst>
+              <a:gd name="adj" fmla="val 0"/>
+            </a:avLst>
+          </a:prstGeom>
+          <a:noFill/>
+          <a:ln>
+            <a:solidFill>
+              <a:schemeClr val="tx1"/>
+            </a:solidFill>
+          </a:ln>
+        </p:spPr>
+        <p:style>
+          <a:lnRef idx="2">
+            <a:schemeClr val="accent1">
+              <a:shade val="50000"/>
+            </a:schemeClr>
+          </a:lnRef>
+          <a:fillRef idx="1">
+            <a:schemeClr val="accent1"/>
+          </a:fillRef>
+          <a:effectRef idx="0">
+            <a:schemeClr val="accent1"/>
+          </a:effectRef>
+          <a:fontRef idx="minor">
+            <a:schemeClr val="lt1"/>
+          </a:fontRef>
+        </p:style>
+        <p:txBody>
+          <a:bodyPr rot="0" spcFirstLastPara="0" vert="horz" wrap="square" lIns="45720" tIns="0" rIns="45720" bIns="0" numCol="1" spcCol="0" rtlCol="0" fromWordArt="0" anchor="ctr" anchorCtr="0" forceAA="0" compatLnSpc="1">
+            <a:prstTxWarp prst="textNoShape">
+              <a:avLst/>
+            </a:prstTxWarp>
+            <a:noAutofit/>
+          </a:bodyPr>
+          <a:lstStyle/>
+          <a:p>
+            <a:pPr marL="0" marR="0" algn="ctr">
+              <a:lnSpc>
+                <a:spcPct val="107000"/>
+              </a:lnSpc>
+              <a:spcBef>
+                <a:spcPts val="0"/>
+              </a:spcBef>
+              <a:spcAft>
+                <a:spcPts val="800"/>
+              </a:spcAft>
+            </a:pPr>
+            <a:r>
+              <a:rPr lang="en-US" dirty="0">
+                <a:solidFill>
+                  <a:srgbClr val="000000"/>
+                </a:solidFill>
+                <a:ea typeface="DengXian" panose="02010600030101010101" pitchFamily="2" charset="-122"/>
+                <a:cs typeface="Times New Roman" panose="02020603050405020304" pitchFamily="18" charset="0"/>
+              </a:rPr>
+              <a:t>Classifier-E2</a:t>
+            </a:r>
+            <a:endParaRPr lang="en-US" dirty="0">
+              <a:effectLst/>
+              <a:ea typeface="DengXian" panose="02010600030101010101" pitchFamily="2" charset="-122"/>
+              <a:cs typeface="Times New Roman" panose="02020603050405020304" pitchFamily="18" charset="0"/>
+            </a:endParaRPr>
+          </a:p>
+        </p:txBody>
+      </p:sp>
+      <p:sp>
+        <p:nvSpPr>
+          <p:cNvPr id="77" name="Rectangle: Rounded Corners 76">
+            <a:extLst>
+              <a:ext uri="{FF2B5EF4-FFF2-40B4-BE49-F238E27FC236}">
+                <a16:creationId xmlns:a16="http://schemas.microsoft.com/office/drawing/2014/main" id="{6CBBF0C1-9E04-FCCA-9E5D-DAAFFC6405D9}"/>
+              </a:ext>
+            </a:extLst>
+          </p:cNvPr>
+          <p:cNvSpPr/>
+          <p:nvPr/>
+        </p:nvSpPr>
+        <p:spPr>
+          <a:xfrm>
+            <a:off x="6623321" y="3771527"/>
+            <a:ext cx="1266244" cy="304521"/>
+          </a:xfrm>
+          <a:prstGeom prst="roundRect">
+            <a:avLst>
+              <a:gd name="adj" fmla="val 0"/>
+            </a:avLst>
+          </a:prstGeom>
+          <a:noFill/>
+          <a:ln>
+            <a:solidFill>
+              <a:schemeClr val="tx1"/>
+            </a:solidFill>
+          </a:ln>
+        </p:spPr>
+        <p:style>
+          <a:lnRef idx="2">
+            <a:schemeClr val="accent1">
+              <a:shade val="50000"/>
+            </a:schemeClr>
+          </a:lnRef>
+          <a:fillRef idx="1">
+            <a:schemeClr val="accent1"/>
+          </a:fillRef>
+          <a:effectRef idx="0">
+            <a:schemeClr val="accent1"/>
+          </a:effectRef>
+          <a:fontRef idx="minor">
+            <a:schemeClr val="lt1"/>
+          </a:fontRef>
+        </p:style>
+        <p:txBody>
+          <a:bodyPr rot="0" spcFirstLastPara="0" vert="horz" wrap="square" lIns="45720" tIns="0" rIns="45720" bIns="0" numCol="1" spcCol="0" rtlCol="0" fromWordArt="0" anchor="ctr" anchorCtr="0" forceAA="0" compatLnSpc="1">
+            <a:prstTxWarp prst="textNoShape">
+              <a:avLst/>
+            </a:prstTxWarp>
+            <a:noAutofit/>
+          </a:bodyPr>
+          <a:lstStyle/>
+          <a:p>
+            <a:pPr marL="0" marR="0" algn="ctr">
+              <a:lnSpc>
+                <a:spcPct val="107000"/>
+              </a:lnSpc>
+              <a:spcBef>
+                <a:spcPts val="0"/>
+              </a:spcBef>
+              <a:spcAft>
+                <a:spcPts val="800"/>
+              </a:spcAft>
+            </a:pPr>
+            <a:r>
+              <a:rPr lang="en-US" dirty="0">
+                <a:solidFill>
+                  <a:srgbClr val="000000"/>
+                </a:solidFill>
+                <a:ea typeface="DengXian" panose="02010600030101010101" pitchFamily="2" charset="-122"/>
+                <a:cs typeface="Times New Roman" panose="02020603050405020304" pitchFamily="18" charset="0"/>
+              </a:rPr>
+              <a:t>Classifier-En</a:t>
+            </a:r>
+            <a:endParaRPr lang="en-US" dirty="0">
+              <a:effectLst/>
+              <a:ea typeface="DengXian" panose="02010600030101010101" pitchFamily="2" charset="-122"/>
+              <a:cs typeface="Times New Roman" panose="02020603050405020304" pitchFamily="18" charset="0"/>
+            </a:endParaRPr>
+          </a:p>
+        </p:txBody>
+      </p:sp>
+      <p:sp>
+        <p:nvSpPr>
+          <p:cNvPr id="33" name="TextBox 32">
+            <a:extLst>
+              <a:ext uri="{FF2B5EF4-FFF2-40B4-BE49-F238E27FC236}">
+                <a16:creationId xmlns:a16="http://schemas.microsoft.com/office/drawing/2014/main" id="{C014F0DB-B836-C7AC-970A-04F3E7982D5E}"/>
+              </a:ext>
+            </a:extLst>
+          </p:cNvPr>
+          <p:cNvSpPr txBox="1"/>
+          <p:nvPr/>
+        </p:nvSpPr>
+        <p:spPr>
+          <a:xfrm>
+            <a:off x="2696971" y="2930895"/>
+            <a:ext cx="1622309" cy="923330"/>
+          </a:xfrm>
+          <a:prstGeom prst="rect">
+            <a:avLst/>
+          </a:prstGeom>
+          <a:gradFill flip="none" rotWithShape="1">
+            <a:gsLst>
+              <a:gs pos="0">
+                <a:schemeClr val="accent5">
+                  <a:lumMod val="67000"/>
+                </a:schemeClr>
+              </a:gs>
+              <a:gs pos="48000">
+                <a:schemeClr val="accent5">
+                  <a:lumMod val="97000"/>
+                  <a:lumOff val="3000"/>
+                </a:schemeClr>
+              </a:gs>
+              <a:gs pos="100000">
+                <a:schemeClr val="accent5">
+                  <a:lumMod val="60000"/>
+                  <a:lumOff val="40000"/>
+                </a:schemeClr>
+              </a:gs>
+            </a:gsLst>
+            <a:lin ang="16200000" scaled="1"/>
+            <a:tileRect/>
+          </a:gradFill>
+          <a:ln>
+            <a:noFill/>
+          </a:ln>
+        </p:spPr>
+        <p:style>
+          <a:lnRef idx="0">
+            <a:scrgbClr r="0" g="0" b="0"/>
+          </a:lnRef>
+          <a:fillRef idx="0">
+            <a:scrgbClr r="0" g="0" b="0"/>
+          </a:fillRef>
+          <a:effectRef idx="0">
+            <a:scrgbClr r="0" g="0" b="0"/>
+          </a:effectRef>
+          <a:fontRef idx="minor">
+            <a:schemeClr val="lt1"/>
+          </a:fontRef>
+        </p:style>
+        <p:txBody>
+          <a:bodyPr wrap="square" rtlCol="0">
+            <a:spAutoFit/>
+          </a:bodyPr>
+          <a:lstStyle/>
+          <a:p>
+            <a:pPr algn="ctr"/>
+            <a:r>
+              <a:rPr lang="en-US" dirty="0"/>
+              <a:t>Feature Vector Representation Generation</a:t>
+            </a:r>
+          </a:p>
+        </p:txBody>
+      </p:sp>
+      <p:grpSp>
+        <p:nvGrpSpPr>
+          <p:cNvPr id="44" name="Group 43">
+            <a:extLst>
+              <a:ext uri="{FF2B5EF4-FFF2-40B4-BE49-F238E27FC236}">
+                <a16:creationId xmlns:a16="http://schemas.microsoft.com/office/drawing/2014/main" id="{E57511CB-7A12-32C7-0BED-5783DE6D5DCD}"/>
+              </a:ext>
+            </a:extLst>
+          </p:cNvPr>
+          <p:cNvGrpSpPr/>
+          <p:nvPr/>
+        </p:nvGrpSpPr>
+        <p:grpSpPr>
+          <a:xfrm>
+            <a:off x="4409364" y="2747327"/>
+            <a:ext cx="982626" cy="1024200"/>
+            <a:chOff x="7927995" y="3480430"/>
+            <a:chExt cx="982626" cy="1024200"/>
+          </a:xfrm>
+        </p:grpSpPr>
+        <p:grpSp>
+          <p:nvGrpSpPr>
+            <p:cNvPr id="45" name="Group 44">
+              <a:extLst>
+                <a:ext uri="{FF2B5EF4-FFF2-40B4-BE49-F238E27FC236}">
+                  <a16:creationId xmlns:a16="http://schemas.microsoft.com/office/drawing/2014/main" id="{3CBC3677-EF2D-D68C-673C-072D32CEE625}"/>
+                </a:ext>
+              </a:extLst>
+            </p:cNvPr>
+            <p:cNvGrpSpPr/>
+            <p:nvPr/>
+          </p:nvGrpSpPr>
+          <p:grpSpPr>
+            <a:xfrm>
+              <a:off x="8070834" y="3827808"/>
+              <a:ext cx="601598" cy="496652"/>
+              <a:chOff x="355600" y="488949"/>
+              <a:chExt cx="584200" cy="635962"/>
+            </a:xfrm>
+          </p:grpSpPr>
+          <p:sp>
+            <p:nvSpPr>
+              <p:cNvPr id="54" name="Oval 53">
+                <a:extLst>
+                  <a:ext uri="{FF2B5EF4-FFF2-40B4-BE49-F238E27FC236}">
+                    <a16:creationId xmlns:a16="http://schemas.microsoft.com/office/drawing/2014/main" id="{73B1F6B7-DFD8-1AC2-CDC2-A93894761917}"/>
+                  </a:ext>
+                </a:extLst>
+              </p:cNvPr>
+              <p:cNvSpPr/>
+              <p:nvPr/>
+            </p:nvSpPr>
+            <p:spPr>
+              <a:xfrm>
+                <a:off x="368300" y="488949"/>
+                <a:ext cx="114300" cy="115261"/>
+              </a:xfrm>
+              <a:prstGeom prst="ellipse">
+                <a:avLst/>
+              </a:prstGeom>
+              <a:solidFill>
+                <a:schemeClr val="accent2">
+                  <a:lumMod val="60000"/>
+                  <a:lumOff val="40000"/>
+                </a:schemeClr>
+              </a:solidFill>
+              <a:ln>
+                <a:solidFill>
+                  <a:srgbClr val="C00000"/>
+                </a:solidFill>
+              </a:ln>
+            </p:spPr>
+            <p:style>
+              <a:lnRef idx="2">
+                <a:schemeClr val="accent1">
+                  <a:shade val="50000"/>
+                </a:schemeClr>
+              </a:lnRef>
+              <a:fillRef idx="1">
+                <a:schemeClr val="accent1"/>
+              </a:fillRef>
+              <a:effectRef idx="0">
+                <a:schemeClr val="accent1"/>
+              </a:effectRef>
+              <a:fontRef idx="minor">
+                <a:schemeClr val="lt1"/>
+              </a:fontRef>
+            </p:style>
+            <p:txBody>
+              <a:bodyPr rot="0" spcFirstLastPara="0" vert="horz" wrap="square" lIns="91440" tIns="45720" rIns="91440" bIns="45720" numCol="1" spcCol="0" rtlCol="0" fromWordArt="0" anchor="ctr" anchorCtr="0" forceAA="0" compatLnSpc="1">
+                <a:prstTxWarp prst="textNoShape">
+                  <a:avLst/>
+                </a:prstTxWarp>
+                <a:noAutofit/>
+              </a:bodyPr>
+              <a:lstStyle/>
+              <a:p>
+                <a:endParaRPr lang="en-US" dirty="0">
+                  <a:solidFill>
+                    <a:srgbClr val="0070C0"/>
+                  </a:solidFill>
+                </a:endParaRPr>
+              </a:p>
+            </p:txBody>
+          </p:sp>
+          <p:sp>
+            <p:nvSpPr>
+              <p:cNvPr id="55" name="Oval 54">
+                <a:extLst>
+                  <a:ext uri="{FF2B5EF4-FFF2-40B4-BE49-F238E27FC236}">
+                    <a16:creationId xmlns:a16="http://schemas.microsoft.com/office/drawing/2014/main" id="{3EC51463-F980-4D76-F9A4-2B61C596AD96}"/>
+                  </a:ext>
+                </a:extLst>
+              </p:cNvPr>
+              <p:cNvSpPr/>
+              <p:nvPr/>
+            </p:nvSpPr>
+            <p:spPr>
+              <a:xfrm>
+                <a:off x="825500" y="539750"/>
+                <a:ext cx="114300" cy="115261"/>
+              </a:xfrm>
+              <a:prstGeom prst="ellipse">
+                <a:avLst/>
+              </a:prstGeom>
+              <a:solidFill>
+                <a:schemeClr val="accent4">
+                  <a:lumMod val="20000"/>
+                  <a:lumOff val="80000"/>
+                </a:schemeClr>
+              </a:solidFill>
+              <a:ln>
+                <a:solidFill>
+                  <a:schemeClr val="accent4">
+                    <a:lumMod val="60000"/>
+                    <a:lumOff val="40000"/>
+                  </a:schemeClr>
+                </a:solidFill>
+              </a:ln>
+            </p:spPr>
+            <p:style>
+              <a:lnRef idx="2">
+                <a:schemeClr val="accent1">
+                  <a:shade val="50000"/>
+                </a:schemeClr>
+              </a:lnRef>
+              <a:fillRef idx="1">
+                <a:schemeClr val="accent1"/>
+              </a:fillRef>
+              <a:effectRef idx="0">
+                <a:schemeClr val="accent1"/>
+              </a:effectRef>
+              <a:fontRef idx="minor">
+                <a:schemeClr val="lt1"/>
+              </a:fontRef>
+            </p:style>
+            <p:txBody>
+              <a:bodyPr rot="0" spcFirstLastPara="0" vert="horz" wrap="square" lIns="91440" tIns="45720" rIns="91440" bIns="45720" numCol="1" spcCol="0" rtlCol="0" fromWordArt="0" anchor="ctr" anchorCtr="0" forceAA="0" compatLnSpc="1">
+                <a:prstTxWarp prst="textNoShape">
+                  <a:avLst/>
+                </a:prstTxWarp>
+                <a:noAutofit/>
+              </a:bodyPr>
+              <a:lstStyle/>
+              <a:p>
+                <a:endParaRPr lang="en-US" dirty="0">
+                  <a:solidFill>
+                    <a:srgbClr val="0070C0"/>
+                  </a:solidFill>
+                </a:endParaRPr>
+              </a:p>
+            </p:txBody>
+          </p:sp>
+          <p:sp>
+            <p:nvSpPr>
+              <p:cNvPr id="57" name="Oval 56">
+                <a:extLst>
+                  <a:ext uri="{FF2B5EF4-FFF2-40B4-BE49-F238E27FC236}">
+                    <a16:creationId xmlns:a16="http://schemas.microsoft.com/office/drawing/2014/main" id="{AD49FCA0-D341-0FDC-CACD-3153C82480C1}"/>
+                  </a:ext>
+                </a:extLst>
+              </p:cNvPr>
+              <p:cNvSpPr/>
+              <p:nvPr/>
+            </p:nvSpPr>
+            <p:spPr>
+              <a:xfrm>
+                <a:off x="355600" y="1009650"/>
+                <a:ext cx="114300" cy="115261"/>
+              </a:xfrm>
+              <a:prstGeom prst="ellipse">
+                <a:avLst/>
+              </a:prstGeom>
+              <a:solidFill>
+                <a:schemeClr val="accent4">
+                  <a:lumMod val="20000"/>
+                  <a:lumOff val="80000"/>
+                </a:schemeClr>
+              </a:solidFill>
+              <a:ln>
+                <a:solidFill>
+                  <a:schemeClr val="accent4">
+                    <a:lumMod val="60000"/>
+                    <a:lumOff val="40000"/>
+                  </a:schemeClr>
+                </a:solidFill>
+              </a:ln>
+            </p:spPr>
+            <p:style>
+              <a:lnRef idx="2">
+                <a:schemeClr val="accent1">
+                  <a:shade val="50000"/>
+                </a:schemeClr>
+              </a:lnRef>
+              <a:fillRef idx="1">
+                <a:schemeClr val="accent1"/>
+              </a:fillRef>
+              <a:effectRef idx="0">
+                <a:schemeClr val="accent1"/>
+              </a:effectRef>
+              <a:fontRef idx="minor">
+                <a:schemeClr val="lt1"/>
+              </a:fontRef>
+            </p:style>
+            <p:txBody>
+              <a:bodyPr rot="0" spcFirstLastPara="0" vert="horz" wrap="square" lIns="91440" tIns="45720" rIns="91440" bIns="45720" numCol="1" spcCol="0" rtlCol="0" fromWordArt="0" anchor="ctr" anchorCtr="0" forceAA="0" compatLnSpc="1">
+                <a:prstTxWarp prst="textNoShape">
+                  <a:avLst/>
+                </a:prstTxWarp>
+                <a:noAutofit/>
+              </a:bodyPr>
+              <a:lstStyle/>
+              <a:p>
+                <a:endParaRPr lang="en-US" dirty="0">
+                  <a:solidFill>
+                    <a:srgbClr val="0070C0"/>
+                  </a:solidFill>
+                </a:endParaRPr>
+              </a:p>
+            </p:txBody>
+          </p:sp>
+        </p:grpSp>
+        <p:cxnSp>
+          <p:nvCxnSpPr>
+            <p:cNvPr id="46" name="Straight Arrow Connector 45">
+              <a:extLst>
+                <a:ext uri="{FF2B5EF4-FFF2-40B4-BE49-F238E27FC236}">
+                  <a16:creationId xmlns:a16="http://schemas.microsoft.com/office/drawing/2014/main" id="{BF896366-A34A-493B-3396-66FF12246D15}"/>
+                </a:ext>
+              </a:extLst>
+            </p:cNvPr>
+            <p:cNvCxnSpPr>
+              <a:stCxn id="57" idx="7"/>
+              <a:endCxn id="55" idx="3"/>
+            </p:cNvCxnSpPr>
+            <p:nvPr/>
+          </p:nvCxnSpPr>
+          <p:spPr>
+            <a:xfrm flipV="1">
+              <a:off x="8171302" y="3944072"/>
+              <a:ext cx="400665" cy="303173"/>
+            </a:xfrm>
+            <a:prstGeom prst="straightConnector1">
+              <a:avLst/>
+            </a:prstGeom>
+            <a:ln w="12700">
+              <a:solidFill>
+                <a:schemeClr val="tx1"/>
+              </a:solidFill>
+              <a:tailEnd type="triangle" w="sm" len="med"/>
+            </a:ln>
+          </p:spPr>
+          <p:style>
+            <a:lnRef idx="1">
+              <a:schemeClr val="accent1"/>
+            </a:lnRef>
+            <a:fillRef idx="0">
+              <a:schemeClr val="accent1"/>
+            </a:fillRef>
+            <a:effectRef idx="0">
+              <a:schemeClr val="accent1"/>
+            </a:effectRef>
+            <a:fontRef idx="minor">
+              <a:schemeClr val="tx1"/>
+            </a:fontRef>
+          </p:style>
+        </p:cxnSp>
+        <p:cxnSp>
+          <p:nvCxnSpPr>
+            <p:cNvPr id="48" name="Straight Arrow Connector 47">
+              <a:extLst>
+                <a:ext uri="{FF2B5EF4-FFF2-40B4-BE49-F238E27FC236}">
+                  <a16:creationId xmlns:a16="http://schemas.microsoft.com/office/drawing/2014/main" id="{D9F900D0-BAD0-7951-5D3F-B151724AD2E5}"/>
+                </a:ext>
+              </a:extLst>
+            </p:cNvPr>
+            <p:cNvCxnSpPr>
+              <a:endCxn id="57" idx="3"/>
+            </p:cNvCxnSpPr>
+            <p:nvPr/>
+          </p:nvCxnSpPr>
+          <p:spPr>
+            <a:xfrm flipV="1">
+              <a:off x="7927995" y="4310887"/>
+              <a:ext cx="159610" cy="192944"/>
+            </a:xfrm>
+            <a:prstGeom prst="straightConnector1">
+              <a:avLst/>
+            </a:prstGeom>
+            <a:ln w="12700">
+              <a:solidFill>
+                <a:schemeClr val="tx1"/>
+              </a:solidFill>
+              <a:tailEnd type="triangle" w="sm" len="med"/>
+            </a:ln>
+          </p:spPr>
+          <p:style>
+            <a:lnRef idx="1">
+              <a:schemeClr val="accent1"/>
+            </a:lnRef>
+            <a:fillRef idx="0">
+              <a:schemeClr val="accent1"/>
+            </a:fillRef>
+            <a:effectRef idx="0">
+              <a:schemeClr val="accent1"/>
+            </a:effectRef>
+            <a:fontRef idx="minor">
+              <a:schemeClr val="tx1"/>
+            </a:fontRef>
+          </p:style>
+        </p:cxnSp>
+        <p:cxnSp>
+          <p:nvCxnSpPr>
+            <p:cNvPr id="49" name="Straight Arrow Connector 48">
+              <a:extLst>
+                <a:ext uri="{FF2B5EF4-FFF2-40B4-BE49-F238E27FC236}">
+                  <a16:creationId xmlns:a16="http://schemas.microsoft.com/office/drawing/2014/main" id="{B45EEAA6-4BCF-4249-E64B-E437360DDF15}"/>
+                </a:ext>
+              </a:extLst>
+            </p:cNvPr>
+            <p:cNvCxnSpPr>
+              <a:cxnSpLocks/>
+              <a:stCxn id="57" idx="0"/>
+              <a:endCxn id="54" idx="4"/>
+            </p:cNvCxnSpPr>
+            <p:nvPr/>
+          </p:nvCxnSpPr>
+          <p:spPr>
+            <a:xfrm flipV="1">
+              <a:off x="8129687" y="3917595"/>
+              <a:ext cx="13078" cy="316474"/>
+            </a:xfrm>
+            <a:prstGeom prst="straightConnector1">
+              <a:avLst/>
+            </a:prstGeom>
+            <a:ln w="12700">
+              <a:solidFill>
+                <a:schemeClr val="tx1"/>
+              </a:solidFill>
+              <a:tailEnd type="triangle" w="sm" len="med"/>
+            </a:ln>
+          </p:spPr>
+          <p:style>
+            <a:lnRef idx="1">
+              <a:schemeClr val="accent1"/>
+            </a:lnRef>
+            <a:fillRef idx="0">
+              <a:schemeClr val="accent1"/>
+            </a:fillRef>
+            <a:effectRef idx="0">
+              <a:schemeClr val="accent1"/>
+            </a:effectRef>
+            <a:fontRef idx="minor">
+              <a:schemeClr val="tx1"/>
+            </a:fontRef>
+          </p:style>
+        </p:cxnSp>
+        <p:cxnSp>
+          <p:nvCxnSpPr>
+            <p:cNvPr id="50" name="Straight Arrow Connector 49">
+              <a:extLst>
+                <a:ext uri="{FF2B5EF4-FFF2-40B4-BE49-F238E27FC236}">
+                  <a16:creationId xmlns:a16="http://schemas.microsoft.com/office/drawing/2014/main" id="{BD1145B6-7A9F-42CB-2046-AA280F1DC954}"/>
+                </a:ext>
+              </a:extLst>
+            </p:cNvPr>
+            <p:cNvCxnSpPr>
+              <a:cxnSpLocks/>
+              <a:stCxn id="55" idx="2"/>
+              <a:endCxn id="54" idx="6"/>
+            </p:cNvCxnSpPr>
+            <p:nvPr/>
+          </p:nvCxnSpPr>
+          <p:spPr>
+            <a:xfrm flipH="1" flipV="1">
+              <a:off x="8201617" y="3872611"/>
+              <a:ext cx="353111" cy="39653"/>
+            </a:xfrm>
+            <a:prstGeom prst="straightConnector1">
+              <a:avLst/>
+            </a:prstGeom>
+            <a:ln w="12700">
+              <a:solidFill>
+                <a:schemeClr val="tx1"/>
+              </a:solidFill>
+              <a:tailEnd type="triangle" w="sm" len="med"/>
+            </a:ln>
+          </p:spPr>
+          <p:style>
+            <a:lnRef idx="1">
+              <a:schemeClr val="accent1"/>
+            </a:lnRef>
+            <a:fillRef idx="0">
+              <a:schemeClr val="accent1"/>
+            </a:fillRef>
+            <a:effectRef idx="0">
+              <a:schemeClr val="accent1"/>
+            </a:effectRef>
+            <a:fontRef idx="minor">
+              <a:schemeClr val="tx1"/>
+            </a:fontRef>
+          </p:style>
+        </p:cxnSp>
+        <p:sp>
+          <p:nvSpPr>
+            <p:cNvPr id="51" name="Text Box 2">
+              <a:extLst>
+                <a:ext uri="{FF2B5EF4-FFF2-40B4-BE49-F238E27FC236}">
+                  <a16:creationId xmlns:a16="http://schemas.microsoft.com/office/drawing/2014/main" id="{F8EDE234-30FF-A306-98FB-22DFF553FE54}"/>
+                </a:ext>
+              </a:extLst>
+            </p:cNvPr>
+            <p:cNvSpPr txBox="1">
+              <a:spLocks noChangeArrowheads="1"/>
+            </p:cNvSpPr>
+            <p:nvPr/>
+          </p:nvSpPr>
+          <p:spPr bwMode="auto">
+            <a:xfrm>
+              <a:off x="7958539" y="3480430"/>
+              <a:ext cx="410107" cy="231134"/>
+            </a:xfrm>
+            <a:prstGeom prst="rect">
+              <a:avLst/>
+            </a:prstGeom>
+            <a:noFill/>
+            <a:ln w="9525">
+              <a:noFill/>
+              <a:miter lim="800000"/>
+              <a:headEnd/>
+              <a:tailEnd/>
+            </a:ln>
+          </p:spPr>
+          <p:txBody>
+            <a:bodyPr rot="0" vert="horz" wrap="square" lIns="91440" tIns="45720" rIns="91440" bIns="45720" anchor="t" anchorCtr="0">
+              <a:noAutofit/>
+            </a:bodyPr>
+            <a:lstStyle/>
+            <a:p>
+              <a:pPr marL="0" marR="0">
+                <a:lnSpc>
+                  <a:spcPct val="107000"/>
+                </a:lnSpc>
+                <a:spcBef>
+                  <a:spcPts val="0"/>
+                </a:spcBef>
+                <a:spcAft>
+                  <a:spcPts val="800"/>
+                </a:spcAft>
+              </a:pPr>
+              <a:r>
+                <a:rPr lang="en-US" sz="1600" dirty="0">
+                  <a:solidFill>
+                    <a:srgbClr val="0070C0"/>
+                  </a:solidFill>
+                  <a:effectLst/>
+                  <a:latin typeface="Calibri" panose="020F0502020204030204" pitchFamily="34" charset="0"/>
+                  <a:ea typeface="DengXian" panose="02010600030101010101" pitchFamily="2" charset="-122"/>
+                  <a:cs typeface="Times New Roman" panose="02020603050405020304" pitchFamily="18" charset="0"/>
+                </a:rPr>
+                <a:t>V3</a:t>
+              </a:r>
+            </a:p>
+          </p:txBody>
+        </p:sp>
+        <p:sp>
+          <p:nvSpPr>
+            <p:cNvPr id="52" name="Text Box 2">
+              <a:extLst>
+                <a:ext uri="{FF2B5EF4-FFF2-40B4-BE49-F238E27FC236}">
+                  <a16:creationId xmlns:a16="http://schemas.microsoft.com/office/drawing/2014/main" id="{E211E4CC-EF03-9B8F-32FC-15C82BEE2F7C}"/>
+                </a:ext>
+              </a:extLst>
+            </p:cNvPr>
+            <p:cNvSpPr txBox="1">
+              <a:spLocks noChangeArrowheads="1"/>
+            </p:cNvSpPr>
+            <p:nvPr/>
+          </p:nvSpPr>
+          <p:spPr bwMode="auto">
+            <a:xfrm>
+              <a:off x="8500514" y="3625609"/>
+              <a:ext cx="410107" cy="231134"/>
+            </a:xfrm>
+            <a:prstGeom prst="rect">
+              <a:avLst/>
+            </a:prstGeom>
+            <a:noFill/>
+            <a:ln w="9525">
+              <a:noFill/>
+              <a:miter lim="800000"/>
+              <a:headEnd/>
+              <a:tailEnd/>
+            </a:ln>
+          </p:spPr>
+          <p:txBody>
+            <a:bodyPr rot="0" vert="horz" wrap="square" lIns="91440" tIns="45720" rIns="91440" bIns="45720" anchor="t" anchorCtr="0">
+              <a:noAutofit/>
+            </a:bodyPr>
+            <a:lstStyle/>
+            <a:p>
+              <a:pPr marL="0" marR="0">
+                <a:lnSpc>
+                  <a:spcPct val="107000"/>
+                </a:lnSpc>
+                <a:spcBef>
+                  <a:spcPts val="0"/>
+                </a:spcBef>
+                <a:spcAft>
+                  <a:spcPts val="800"/>
+                </a:spcAft>
+              </a:pPr>
+              <a:r>
+                <a:rPr lang="en-US" sz="1600" dirty="0">
+                  <a:solidFill>
+                    <a:srgbClr val="0070C0"/>
+                  </a:solidFill>
+                  <a:effectLst/>
+                  <a:latin typeface="Calibri" panose="020F0502020204030204" pitchFamily="34" charset="0"/>
+                  <a:ea typeface="DengXian" panose="02010600030101010101" pitchFamily="2" charset="-122"/>
+                  <a:cs typeface="Times New Roman" panose="02020603050405020304" pitchFamily="18" charset="0"/>
+                </a:rPr>
+                <a:t>V4</a:t>
+              </a:r>
+            </a:p>
+          </p:txBody>
+        </p:sp>
+        <p:sp>
+          <p:nvSpPr>
+            <p:cNvPr id="53" name="Text Box 2">
+              <a:extLst>
+                <a:ext uri="{FF2B5EF4-FFF2-40B4-BE49-F238E27FC236}">
+                  <a16:creationId xmlns:a16="http://schemas.microsoft.com/office/drawing/2014/main" id="{FC7AF492-FD60-3D60-917D-979F03E0980D}"/>
+                </a:ext>
+              </a:extLst>
+            </p:cNvPr>
+            <p:cNvSpPr txBox="1">
+              <a:spLocks noChangeArrowheads="1"/>
+            </p:cNvSpPr>
+            <p:nvPr/>
+          </p:nvSpPr>
+          <p:spPr bwMode="auto">
+            <a:xfrm>
+              <a:off x="8093647" y="4273496"/>
+              <a:ext cx="410107" cy="231134"/>
+            </a:xfrm>
+            <a:prstGeom prst="rect">
+              <a:avLst/>
+            </a:prstGeom>
+            <a:noFill/>
+            <a:ln w="9525">
+              <a:noFill/>
+              <a:miter lim="800000"/>
+              <a:headEnd/>
+              <a:tailEnd/>
+            </a:ln>
+          </p:spPr>
+          <p:txBody>
+            <a:bodyPr rot="0" vert="horz" wrap="square" lIns="91440" tIns="45720" rIns="91440" bIns="45720" anchor="t" anchorCtr="0">
+              <a:noAutofit/>
+            </a:bodyPr>
+            <a:lstStyle/>
+            <a:p>
+              <a:pPr marL="0" marR="0">
+                <a:lnSpc>
+                  <a:spcPct val="107000"/>
+                </a:lnSpc>
+                <a:spcBef>
+                  <a:spcPts val="0"/>
+                </a:spcBef>
+                <a:spcAft>
+                  <a:spcPts val="800"/>
+                </a:spcAft>
+              </a:pPr>
+              <a:r>
+                <a:rPr lang="en-US" sz="1600" dirty="0">
+                  <a:solidFill>
+                    <a:srgbClr val="0070C0"/>
+                  </a:solidFill>
+                  <a:effectLst/>
+                  <a:latin typeface="Calibri" panose="020F0502020204030204" pitchFamily="34" charset="0"/>
+                  <a:ea typeface="DengXian" panose="02010600030101010101" pitchFamily="2" charset="-122"/>
+                  <a:cs typeface="Times New Roman" panose="02020603050405020304" pitchFamily="18" charset="0"/>
+                </a:rPr>
+                <a:t>V5</a:t>
+              </a:r>
+            </a:p>
+          </p:txBody>
+        </p:sp>
+      </p:grpSp>
+      <p:cxnSp>
+        <p:nvCxnSpPr>
+          <p:cNvPr id="59" name="Straight Arrow Connector 58">
+            <a:extLst>
+              <a:ext uri="{FF2B5EF4-FFF2-40B4-BE49-F238E27FC236}">
+                <a16:creationId xmlns:a16="http://schemas.microsoft.com/office/drawing/2014/main" id="{EB8A2C3A-F795-C0FE-BE84-DE92DF21B93A}"/>
+              </a:ext>
+            </a:extLst>
+          </p:cNvPr>
+          <p:cNvCxnSpPr>
+            <a:cxnSpLocks/>
+          </p:cNvCxnSpPr>
+          <p:nvPr/>
+        </p:nvCxnSpPr>
+        <p:spPr>
+          <a:xfrm>
+            <a:off x="4317622" y="3395912"/>
+            <a:ext cx="188961" cy="0"/>
+          </a:xfrm>
+          <a:prstGeom prst="straightConnector1">
+            <a:avLst/>
+          </a:prstGeom>
+          <a:ln w="12700">
+            <a:tailEnd type="triangle"/>
+          </a:ln>
+        </p:spPr>
+        <p:style>
+          <a:lnRef idx="1">
+            <a:schemeClr val="dk1"/>
+          </a:lnRef>
+          <a:fillRef idx="0">
+            <a:schemeClr val="dk1"/>
+          </a:fillRef>
+          <a:effectRef idx="0">
+            <a:schemeClr val="dk1"/>
+          </a:effectRef>
+          <a:fontRef idx="minor">
+            <a:schemeClr val="tx1"/>
+          </a:fontRef>
+        </p:style>
+      </p:cxnSp>
+      <p:cxnSp>
+        <p:nvCxnSpPr>
+          <p:cNvPr id="61" name="Straight Arrow Connector 60">
+            <a:extLst>
+              <a:ext uri="{FF2B5EF4-FFF2-40B4-BE49-F238E27FC236}">
+                <a16:creationId xmlns:a16="http://schemas.microsoft.com/office/drawing/2014/main" id="{AF184929-70C2-0BDC-C11C-DDE6195767B8}"/>
+              </a:ext>
+            </a:extLst>
+          </p:cNvPr>
+          <p:cNvCxnSpPr>
+            <a:cxnSpLocks/>
+          </p:cNvCxnSpPr>
+          <p:nvPr/>
+        </p:nvCxnSpPr>
+        <p:spPr>
+          <a:xfrm>
+            <a:off x="5036453" y="3403423"/>
+            <a:ext cx="188961" cy="0"/>
+          </a:xfrm>
+          <a:prstGeom prst="straightConnector1">
+            <a:avLst/>
+          </a:prstGeom>
+          <a:ln w="12700">
+            <a:tailEnd type="triangle"/>
+          </a:ln>
+        </p:spPr>
+        <p:style>
+          <a:lnRef idx="1">
+            <a:schemeClr val="dk1"/>
+          </a:lnRef>
+          <a:fillRef idx="0">
+            <a:schemeClr val="dk1"/>
+          </a:fillRef>
+          <a:effectRef idx="0">
+            <a:schemeClr val="dk1"/>
+          </a:effectRef>
+          <a:fontRef idx="minor">
+            <a:schemeClr val="tx1"/>
+          </a:fontRef>
+        </p:style>
+      </p:cxnSp>
+      <p:cxnSp>
+        <p:nvCxnSpPr>
+          <p:cNvPr id="67" name="Straight Arrow Connector 66">
+            <a:extLst>
+              <a:ext uri="{FF2B5EF4-FFF2-40B4-BE49-F238E27FC236}">
+                <a16:creationId xmlns:a16="http://schemas.microsoft.com/office/drawing/2014/main" id="{DEE6ED0B-6471-B067-1BEE-82275E575D9F}"/>
+              </a:ext>
+            </a:extLst>
+          </p:cNvPr>
+          <p:cNvCxnSpPr>
+            <a:cxnSpLocks/>
+          </p:cNvCxnSpPr>
+          <p:nvPr/>
+        </p:nvCxnSpPr>
+        <p:spPr>
+          <a:xfrm>
+            <a:off x="7889565" y="3913874"/>
+            <a:ext cx="243840" cy="0"/>
+          </a:xfrm>
+          <a:prstGeom prst="straightConnector1">
+            <a:avLst/>
+          </a:prstGeom>
+          <a:ln w="12700">
+            <a:tailEnd type="triangle"/>
+          </a:ln>
+        </p:spPr>
+        <p:style>
+          <a:lnRef idx="1">
+            <a:schemeClr val="dk1"/>
+          </a:lnRef>
+          <a:fillRef idx="0">
+            <a:schemeClr val="dk1"/>
+          </a:fillRef>
+          <a:effectRef idx="0">
+            <a:schemeClr val="dk1"/>
+          </a:effectRef>
+          <a:fontRef idx="minor">
+            <a:schemeClr val="tx1"/>
+          </a:fontRef>
+        </p:style>
+      </p:cxnSp>
+      <p:sp>
+        <p:nvSpPr>
+          <p:cNvPr id="39" name="Text Box 2">
+            <a:extLst>
+              <a:ext uri="{FF2B5EF4-FFF2-40B4-BE49-F238E27FC236}">
+                <a16:creationId xmlns:a16="http://schemas.microsoft.com/office/drawing/2014/main" id="{550A1CC7-05DA-E1E5-672B-714EC84F396F}"/>
+              </a:ext>
+            </a:extLst>
+          </p:cNvPr>
+          <p:cNvSpPr txBox="1">
+            <a:spLocks noChangeArrowheads="1"/>
+          </p:cNvSpPr>
+          <p:nvPr/>
+        </p:nvSpPr>
+        <p:spPr bwMode="auto">
+          <a:xfrm>
+            <a:off x="6152463" y="3048237"/>
+            <a:ext cx="410107" cy="231134"/>
+          </a:xfrm>
+          <a:prstGeom prst="rect">
+            <a:avLst/>
+          </a:prstGeom>
+          <a:noFill/>
+          <a:ln w="9525">
+            <a:noFill/>
+            <a:miter lim="800000"/>
+            <a:headEnd/>
+            <a:tailEnd/>
+          </a:ln>
+        </p:spPr>
+        <p:txBody>
+          <a:bodyPr rot="0" vert="horz" wrap="square" lIns="91440" tIns="45720" rIns="91440" bIns="45720" anchor="t" anchorCtr="0">
+            <a:noAutofit/>
+          </a:bodyPr>
+          <a:lstStyle/>
+          <a:p>
+            <a:pPr marL="0" marR="0">
+              <a:lnSpc>
+                <a:spcPct val="107000"/>
+              </a:lnSpc>
+              <a:spcBef>
+                <a:spcPts val="0"/>
+              </a:spcBef>
+              <a:spcAft>
+                <a:spcPts val="800"/>
+              </a:spcAft>
+            </a:pPr>
+            <a:r>
+              <a:rPr lang="en-US" sz="2000" dirty="0">
+                <a:solidFill>
+                  <a:srgbClr val="0070C0"/>
+                </a:solidFill>
+                <a:effectLst/>
+                <a:latin typeface="Calibri" panose="020F0502020204030204" pitchFamily="34" charset="0"/>
+                <a:ea typeface="DengXian" panose="02010600030101010101" pitchFamily="2" charset="-122"/>
+                <a:cs typeface="Times New Roman" panose="02020603050405020304" pitchFamily="18" charset="0"/>
+              </a:rPr>
+              <a:t>V</a:t>
+            </a:r>
+          </a:p>
+        </p:txBody>
+      </p:sp>
+    </p:spTree>
+    <p:extLst>
+      <p:ext uri="{BB962C8B-B14F-4D97-AF65-F5344CB8AC3E}">
+        <p14:creationId xmlns:p14="http://schemas.microsoft.com/office/powerpoint/2010/main" val="126812299"/>
+      </p:ext>
+    </p:extLst>
+  </p:cSld>
+  <p:clrMapOvr>
+    <a:masterClrMapping/>
+  </p:clrMapOvr>
+</p:sld>
+</file>
+
 <file path=ppt/theme/theme1.xml><?xml version="1.0" encoding="utf-8"?>
 <a:theme xmlns:a="http://schemas.openxmlformats.org/drawingml/2006/main" name="Office Theme">
   <a:themeElements>

</xml_diff>